<commit_message>
refine training slides before flying to Shanghai
</commit_message>
<xml_diff>
--- a/training/ProgrammingLanguage/001_closure.pptx
+++ b/training/ProgrammingLanguage/001_closure.pptx
@@ -5,10 +5,10 @@
     <p:sldMasterId id="2147483660" r:id="rId1"/>
   </p:sldMasterIdLst>
   <p:notesMasterIdLst>
-    <p:notesMasterId r:id="rId22"/>
+    <p:notesMasterId r:id="rId30"/>
   </p:notesMasterIdLst>
   <p:handoutMasterIdLst>
-    <p:handoutMasterId r:id="rId23"/>
+    <p:handoutMasterId r:id="rId31"/>
   </p:handoutMasterIdLst>
   <p:sldIdLst>
     <p:sldId id="340" r:id="rId2"/>
@@ -31,6 +31,14 @@
     <p:sldId id="375" r:id="rId19"/>
     <p:sldId id="376" r:id="rId20"/>
     <p:sldId id="377" r:id="rId21"/>
+    <p:sldId id="378" r:id="rId22"/>
+    <p:sldId id="379" r:id="rId23"/>
+    <p:sldId id="380" r:id="rId24"/>
+    <p:sldId id="381" r:id="rId25"/>
+    <p:sldId id="382" r:id="rId26"/>
+    <p:sldId id="383" r:id="rId27"/>
+    <p:sldId id="384" r:id="rId28"/>
+    <p:sldId id="385" r:id="rId29"/>
   </p:sldIdLst>
   <p:sldSz cx="12195175" cy="6859588"/>
   <p:notesSz cx="6797675" cy="9874250"/>
@@ -178,6 +186,14 @@
             <p14:sldId id="375"/>
             <p14:sldId id="376"/>
             <p14:sldId id="377"/>
+            <p14:sldId id="378"/>
+            <p14:sldId id="379"/>
+            <p14:sldId id="380"/>
+            <p14:sldId id="381"/>
+            <p14:sldId id="382"/>
+            <p14:sldId id="383"/>
+            <p14:sldId id="384"/>
+            <p14:sldId id="385"/>
           </p14:sldIdLst>
         </p14:section>
       </p14:sectionLst>
@@ -684,6 +700,460 @@
 </p:notes>
 </file>
 
+<file path=ppt/notesSlides/notesSlide10.xml><?xml version="1.0" encoding="utf-8"?>
+<p:notes xmlns:a="http://schemas.openxmlformats.org/drawingml/2006/main" xmlns:r="http://schemas.openxmlformats.org/officeDocument/2006/relationships" xmlns:p="http://schemas.openxmlformats.org/presentationml/2006/main">
+  <p:cSld>
+    <p:spTree>
+      <p:nvGrpSpPr>
+        <p:cNvPr id="1" name=""/>
+        <p:cNvGrpSpPr/>
+        <p:nvPr/>
+      </p:nvGrpSpPr>
+      <p:grpSpPr>
+        <a:xfrm>
+          <a:off x="0" y="0"/>
+          <a:ext cx="0" cy="0"/>
+          <a:chOff x="0" y="0"/>
+          <a:chExt cx="0" cy="0"/>
+        </a:xfrm>
+      </p:grpSpPr>
+      <p:sp>
+        <p:nvSpPr>
+          <p:cNvPr id="2" name="Slide Image Placeholder 1"/>
+          <p:cNvSpPr>
+            <a:spLocks noGrp="1" noRot="1" noChangeAspect="1"/>
+          </p:cNvSpPr>
+          <p:nvPr>
+            <p:ph type="sldImg"/>
+          </p:nvPr>
+        </p:nvSpPr>
+        <p:spPr/>
+      </p:sp>
+      <p:sp>
+        <p:nvSpPr>
+          <p:cNvPr id="3" name="Notes Placeholder 2"/>
+          <p:cNvSpPr>
+            <a:spLocks noGrp="1"/>
+          </p:cNvSpPr>
+          <p:nvPr>
+            <p:ph type="body" idx="1"/>
+          </p:nvPr>
+        </p:nvSpPr>
+        <p:spPr/>
+        <p:txBody>
+          <a:bodyPr/>
+          <a:lstStyle/>
+          <a:p>
+            <a:r>
+              <a:rPr lang="en-US" dirty="0" smtClean="0"/>
+              <a:t>Demo: 005_lazy_evaluation.html</a:t>
+            </a:r>
+            <a:endParaRPr lang="en-US" dirty="0"/>
+          </a:p>
+        </p:txBody>
+      </p:sp>
+      <p:sp>
+        <p:nvSpPr>
+          <p:cNvPr id="4" name="Slide Number Placeholder 3"/>
+          <p:cNvSpPr>
+            <a:spLocks noGrp="1"/>
+          </p:cNvSpPr>
+          <p:nvPr>
+            <p:ph type="sldNum" sz="quarter" idx="10"/>
+          </p:nvPr>
+        </p:nvSpPr>
+        <p:spPr/>
+        <p:txBody>
+          <a:bodyPr/>
+          <a:lstStyle/>
+          <a:p>
+            <a:fld id="{7D8C2C35-2B8A-446E-BEC0-FD36716C29AC}" type="slidenum">
+              <a:rPr lang="de-DE" smtClean="0"/>
+              <a:pPr/>
+              <a:t>11</a:t>
+            </a:fld>
+            <a:endParaRPr lang="de-DE" dirty="0"/>
+          </a:p>
+        </p:txBody>
+      </p:sp>
+    </p:spTree>
+    <p:extLst>
+      <p:ext uri="{BB962C8B-B14F-4D97-AF65-F5344CB8AC3E}">
+        <p14:creationId xmlns:p14="http://schemas.microsoft.com/office/powerpoint/2010/main" val="3410434924"/>
+      </p:ext>
+    </p:extLst>
+  </p:cSld>
+  <p:clrMapOvr>
+    <a:masterClrMapping/>
+  </p:clrMapOvr>
+</p:notes>
+</file>
+
+<file path=ppt/notesSlides/notesSlide11.xml><?xml version="1.0" encoding="utf-8"?>
+<p:notes xmlns:a="http://schemas.openxmlformats.org/drawingml/2006/main" xmlns:r="http://schemas.openxmlformats.org/officeDocument/2006/relationships" xmlns:p="http://schemas.openxmlformats.org/presentationml/2006/main">
+  <p:cSld>
+    <p:spTree>
+      <p:nvGrpSpPr>
+        <p:cNvPr id="1" name=""/>
+        <p:cNvGrpSpPr/>
+        <p:nvPr/>
+      </p:nvGrpSpPr>
+      <p:grpSpPr>
+        <a:xfrm>
+          <a:off x="0" y="0"/>
+          <a:ext cx="0" cy="0"/>
+          <a:chOff x="0" y="0"/>
+          <a:chExt cx="0" cy="0"/>
+        </a:xfrm>
+      </p:grpSpPr>
+      <p:sp>
+        <p:nvSpPr>
+          <p:cNvPr id="4" name="Slide Number Placeholder 3"/>
+          <p:cNvSpPr>
+            <a:spLocks noGrp="1"/>
+          </p:cNvSpPr>
+          <p:nvPr>
+            <p:ph type="sldNum" sz="quarter" idx="10"/>
+          </p:nvPr>
+        </p:nvSpPr>
+        <p:spPr/>
+        <p:txBody>
+          <a:bodyPr/>
+          <a:lstStyle/>
+          <a:p>
+            <a:fld id="{7D8C2C35-2B8A-446E-BEC0-FD36716C29AC}" type="slidenum">
+              <a:rPr lang="de-DE" smtClean="0"/>
+              <a:pPr/>
+              <a:t>14</a:t>
+            </a:fld>
+            <a:endParaRPr lang="de-DE" dirty="0"/>
+          </a:p>
+        </p:txBody>
+      </p:sp>
+      <p:sp>
+        <p:nvSpPr>
+          <p:cNvPr id="9" name="Slide Image Placeholder 8"/>
+          <p:cNvSpPr>
+            <a:spLocks noGrp="1" noRot="1" noChangeAspect="1"/>
+          </p:cNvSpPr>
+          <p:nvPr>
+            <p:ph type="sldImg"/>
+          </p:nvPr>
+        </p:nvSpPr>
+        <p:spPr>
+          <a:xfrm>
+            <a:off x="547688" y="612775"/>
+            <a:ext cx="5762625" cy="3241675"/>
+          </a:xfrm>
+        </p:spPr>
+      </p:sp>
+      <p:sp>
+        <p:nvSpPr>
+          <p:cNvPr id="10" name="Notes Placeholder 9"/>
+          <p:cNvSpPr>
+            <a:spLocks noGrp="1"/>
+          </p:cNvSpPr>
+          <p:nvPr>
+            <p:ph type="body" idx="1"/>
+          </p:nvPr>
+        </p:nvSpPr>
+        <p:spPr/>
+        <p:txBody>
+          <a:bodyPr>
+            <a:normAutofit/>
+          </a:bodyPr>
+          <a:lstStyle/>
+          <a:p>
+            <a:r>
+              <a:rPr lang="en-US" dirty="0" smtClean="0"/>
+              <a:t>Here delay &amp; force is shown with a recursion:</a:t>
+            </a:r>
+          </a:p>
+          <a:p>
+            <a:r>
+              <a:rPr lang="en-US" dirty="0" smtClean="0"/>
+              <a:t>Base condition are 0 and 1; for 1 the heavy computation is performed; all other function calls use the result of the succeeding function</a:t>
+            </a:r>
+            <a:endParaRPr lang="en-US" dirty="0"/>
+          </a:p>
+        </p:txBody>
+      </p:sp>
+    </p:spTree>
+    <p:extLst>
+      <p:ext uri="{BB962C8B-B14F-4D97-AF65-F5344CB8AC3E}">
+        <p14:creationId xmlns:p14="http://schemas.microsoft.com/office/powerpoint/2010/main" val="682080673"/>
+      </p:ext>
+    </p:extLst>
+  </p:cSld>
+  <p:clrMapOvr>
+    <a:masterClrMapping/>
+  </p:clrMapOvr>
+</p:notes>
+</file>
+
+<file path=ppt/notesSlides/notesSlide12.xml><?xml version="1.0" encoding="utf-8"?>
+<p:notes xmlns:a="http://schemas.openxmlformats.org/drawingml/2006/main" xmlns:r="http://schemas.openxmlformats.org/officeDocument/2006/relationships" xmlns:p="http://schemas.openxmlformats.org/presentationml/2006/main">
+  <p:cSld>
+    <p:spTree>
+      <p:nvGrpSpPr>
+        <p:cNvPr id="1" name=""/>
+        <p:cNvGrpSpPr/>
+        <p:nvPr/>
+      </p:nvGrpSpPr>
+      <p:grpSpPr>
+        <a:xfrm>
+          <a:off x="0" y="0"/>
+          <a:ext cx="0" cy="0"/>
+          <a:chOff x="0" y="0"/>
+          <a:chExt cx="0" cy="0"/>
+        </a:xfrm>
+      </p:grpSpPr>
+      <p:sp>
+        <p:nvSpPr>
+          <p:cNvPr id="2" name="Slide Image Placeholder 1"/>
+          <p:cNvSpPr>
+            <a:spLocks noGrp="1" noRot="1" noChangeAspect="1"/>
+          </p:cNvSpPr>
+          <p:nvPr>
+            <p:ph type="sldImg"/>
+          </p:nvPr>
+        </p:nvSpPr>
+        <p:spPr/>
+      </p:sp>
+      <p:sp>
+        <p:nvSpPr>
+          <p:cNvPr id="3" name="Notes Placeholder 2"/>
+          <p:cNvSpPr>
+            <a:spLocks noGrp="1"/>
+          </p:cNvSpPr>
+          <p:nvPr>
+            <p:ph type="body" idx="1"/>
+          </p:nvPr>
+        </p:nvSpPr>
+        <p:spPr/>
+        <p:txBody>
+          <a:bodyPr/>
+          <a:lstStyle/>
+          <a:p>
+            <a:r>
+              <a:rPr lang="en-US" dirty="0" smtClean="0"/>
+              <a:t>Demo: 007_singleton.html</a:t>
+            </a:r>
+            <a:endParaRPr lang="en-US" dirty="0"/>
+          </a:p>
+        </p:txBody>
+      </p:sp>
+      <p:sp>
+        <p:nvSpPr>
+          <p:cNvPr id="4" name="Slide Number Placeholder 3"/>
+          <p:cNvSpPr>
+            <a:spLocks noGrp="1"/>
+          </p:cNvSpPr>
+          <p:nvPr>
+            <p:ph type="sldNum" sz="quarter" idx="10"/>
+          </p:nvPr>
+        </p:nvSpPr>
+        <p:spPr/>
+        <p:txBody>
+          <a:bodyPr/>
+          <a:lstStyle/>
+          <a:p>
+            <a:fld id="{7D8C2C35-2B8A-446E-BEC0-FD36716C29AC}" type="slidenum">
+              <a:rPr lang="de-DE" smtClean="0"/>
+              <a:pPr/>
+              <a:t>20</a:t>
+            </a:fld>
+            <a:endParaRPr lang="de-DE" dirty="0"/>
+          </a:p>
+        </p:txBody>
+      </p:sp>
+    </p:spTree>
+    <p:extLst>
+      <p:ext uri="{BB962C8B-B14F-4D97-AF65-F5344CB8AC3E}">
+        <p14:creationId xmlns:p14="http://schemas.microsoft.com/office/powerpoint/2010/main" val="2664122178"/>
+      </p:ext>
+    </p:extLst>
+  </p:cSld>
+  <p:clrMapOvr>
+    <a:masterClrMapping/>
+  </p:clrMapOvr>
+</p:notes>
+</file>
+
+<file path=ppt/notesSlides/notesSlide13.xml><?xml version="1.0" encoding="utf-8"?>
+<p:notes xmlns:a="http://schemas.openxmlformats.org/drawingml/2006/main" xmlns:r="http://schemas.openxmlformats.org/officeDocument/2006/relationships" xmlns:p="http://schemas.openxmlformats.org/presentationml/2006/main">
+  <p:cSld>
+    <p:spTree>
+      <p:nvGrpSpPr>
+        <p:cNvPr id="1" name=""/>
+        <p:cNvGrpSpPr/>
+        <p:nvPr/>
+      </p:nvGrpSpPr>
+      <p:grpSpPr>
+        <a:xfrm>
+          <a:off x="0" y="0"/>
+          <a:ext cx="0" cy="0"/>
+          <a:chOff x="0" y="0"/>
+          <a:chExt cx="0" cy="0"/>
+        </a:xfrm>
+      </p:grpSpPr>
+      <p:sp>
+        <p:nvSpPr>
+          <p:cNvPr id="2" name="Slide Image Placeholder 1"/>
+          <p:cNvSpPr>
+            <a:spLocks noGrp="1" noRot="1" noChangeAspect="1"/>
+          </p:cNvSpPr>
+          <p:nvPr>
+            <p:ph type="sldImg"/>
+          </p:nvPr>
+        </p:nvSpPr>
+        <p:spPr/>
+      </p:sp>
+      <p:sp>
+        <p:nvSpPr>
+          <p:cNvPr id="3" name="Notes Placeholder 2"/>
+          <p:cNvSpPr>
+            <a:spLocks noGrp="1"/>
+          </p:cNvSpPr>
+          <p:nvPr>
+            <p:ph type="body" idx="1"/>
+          </p:nvPr>
+        </p:nvSpPr>
+        <p:spPr/>
+        <p:txBody>
+          <a:bodyPr/>
+          <a:lstStyle/>
+          <a:p>
+            <a:r>
+              <a:rPr lang="en-US" dirty="0" smtClean="0"/>
+              <a:t>http://localhost:8090/cus.crm.mycalendar/?responderOn=true</a:t>
+            </a:r>
+            <a:endParaRPr lang="en-US" dirty="0"/>
+          </a:p>
+        </p:txBody>
+      </p:sp>
+      <p:sp>
+        <p:nvSpPr>
+          <p:cNvPr id="4" name="Slide Number Placeholder 3"/>
+          <p:cNvSpPr>
+            <a:spLocks noGrp="1"/>
+          </p:cNvSpPr>
+          <p:nvPr>
+            <p:ph type="sldNum" sz="quarter" idx="10"/>
+          </p:nvPr>
+        </p:nvSpPr>
+        <p:spPr/>
+        <p:txBody>
+          <a:bodyPr/>
+          <a:lstStyle/>
+          <a:p>
+            <a:fld id="{7D8C2C35-2B8A-446E-BEC0-FD36716C29AC}" type="slidenum">
+              <a:rPr lang="de-DE" smtClean="0"/>
+              <a:pPr/>
+              <a:t>21</a:t>
+            </a:fld>
+            <a:endParaRPr lang="de-DE" dirty="0"/>
+          </a:p>
+        </p:txBody>
+      </p:sp>
+    </p:spTree>
+    <p:extLst>
+      <p:ext uri="{BB962C8B-B14F-4D97-AF65-F5344CB8AC3E}">
+        <p14:creationId xmlns:p14="http://schemas.microsoft.com/office/powerpoint/2010/main" val="2696855891"/>
+      </p:ext>
+    </p:extLst>
+  </p:cSld>
+  <p:clrMapOvr>
+    <a:masterClrMapping/>
+  </p:clrMapOvr>
+</p:notes>
+</file>
+
+<file path=ppt/notesSlides/notesSlide14.xml><?xml version="1.0" encoding="utf-8"?>
+<p:notes xmlns:a="http://schemas.openxmlformats.org/drawingml/2006/main" xmlns:r="http://schemas.openxmlformats.org/officeDocument/2006/relationships" xmlns:p="http://schemas.openxmlformats.org/presentationml/2006/main">
+  <p:cSld>
+    <p:spTree>
+      <p:nvGrpSpPr>
+        <p:cNvPr id="1" name=""/>
+        <p:cNvGrpSpPr/>
+        <p:nvPr/>
+      </p:nvGrpSpPr>
+      <p:grpSpPr>
+        <a:xfrm>
+          <a:off x="0" y="0"/>
+          <a:ext cx="0" cy="0"/>
+          <a:chOff x="0" y="0"/>
+          <a:chExt cx="0" cy="0"/>
+        </a:xfrm>
+      </p:grpSpPr>
+      <p:sp>
+        <p:nvSpPr>
+          <p:cNvPr id="2" name="Slide Image Placeholder 1"/>
+          <p:cNvSpPr>
+            <a:spLocks noGrp="1" noRot="1" noChangeAspect="1"/>
+          </p:cNvSpPr>
+          <p:nvPr>
+            <p:ph type="sldImg"/>
+          </p:nvPr>
+        </p:nvSpPr>
+        <p:spPr/>
+      </p:sp>
+      <p:sp>
+        <p:nvSpPr>
+          <p:cNvPr id="3" name="Notes Placeholder 2"/>
+          <p:cNvSpPr>
+            <a:spLocks noGrp="1"/>
+          </p:cNvSpPr>
+          <p:nvPr>
+            <p:ph type="body" idx="1"/>
+          </p:nvPr>
+        </p:nvSpPr>
+        <p:spPr/>
+        <p:txBody>
+          <a:bodyPr/>
+          <a:lstStyle/>
+          <a:p>
+            <a:endParaRPr lang="en-US" dirty="0"/>
+          </a:p>
+        </p:txBody>
+      </p:sp>
+      <p:sp>
+        <p:nvSpPr>
+          <p:cNvPr id="4" name="Slide Number Placeholder 3"/>
+          <p:cNvSpPr>
+            <a:spLocks noGrp="1"/>
+          </p:cNvSpPr>
+          <p:nvPr>
+            <p:ph type="sldNum" sz="quarter" idx="10"/>
+          </p:nvPr>
+        </p:nvSpPr>
+        <p:spPr/>
+        <p:txBody>
+          <a:bodyPr/>
+          <a:lstStyle/>
+          <a:p>
+            <a:fld id="{7D8C2C35-2B8A-446E-BEC0-FD36716C29AC}" type="slidenum">
+              <a:rPr lang="de-DE" smtClean="0"/>
+              <a:pPr/>
+              <a:t>28</a:t>
+            </a:fld>
+            <a:endParaRPr lang="de-DE" dirty="0"/>
+          </a:p>
+        </p:txBody>
+      </p:sp>
+    </p:spTree>
+    <p:extLst>
+      <p:ext uri="{BB962C8B-B14F-4D97-AF65-F5344CB8AC3E}">
+        <p14:creationId xmlns:p14="http://schemas.microsoft.com/office/powerpoint/2010/main" val="2581486582"/>
+      </p:ext>
+    </p:extLst>
+  </p:cSld>
+  <p:clrMapOvr>
+    <a:masterClrMapping/>
+  </p:clrMapOvr>
+</p:notes>
+</file>
+
 <file path=ppt/notesSlides/notesSlide2.xml><?xml version="1.0" encoding="utf-8"?>
 <p:notes xmlns:a="http://schemas.openxmlformats.org/drawingml/2006/main" xmlns:r="http://schemas.openxmlformats.org/officeDocument/2006/relationships" xmlns:p="http://schemas.openxmlformats.org/presentationml/2006/main">
   <p:cSld>
@@ -799,6 +1269,41 @@
       </p:grpSpPr>
       <p:sp>
         <p:nvSpPr>
+          <p:cNvPr id="2" name="Slide Image Placeholder 1"/>
+          <p:cNvSpPr>
+            <a:spLocks noGrp="1" noRot="1" noChangeAspect="1"/>
+          </p:cNvSpPr>
+          <p:nvPr>
+            <p:ph type="sldImg"/>
+          </p:nvPr>
+        </p:nvSpPr>
+        <p:spPr/>
+      </p:sp>
+      <p:sp>
+        <p:nvSpPr>
+          <p:cNvPr id="3" name="Notes Placeholder 2"/>
+          <p:cNvSpPr>
+            <a:spLocks noGrp="1"/>
+          </p:cNvSpPr>
+          <p:nvPr>
+            <p:ph type="body" idx="1"/>
+          </p:nvPr>
+        </p:nvSpPr>
+        <p:spPr/>
+        <p:txBody>
+          <a:bodyPr/>
+          <a:lstStyle/>
+          <a:p>
+            <a:r>
+              <a:rPr lang="en-US" dirty="0" smtClean="0"/>
+              <a:t>Demo: 001_DynamicScope.html</a:t>
+            </a:r>
+            <a:endParaRPr lang="en-US" dirty="0"/>
+          </a:p>
+        </p:txBody>
+      </p:sp>
+      <p:sp>
+        <p:nvSpPr>
           <p:cNvPr id="4" name="Slide Number Placeholder 3"/>
           <p:cNvSpPr>
             <a:spLocks noGrp="1"/>
@@ -815,83 +1320,16 @@
             <a:fld id="{7D8C2C35-2B8A-446E-BEC0-FD36716C29AC}" type="slidenum">
               <a:rPr lang="de-DE" smtClean="0"/>
               <a:pPr/>
-              <a:t>4</a:t>
+              <a:t>3</a:t>
             </a:fld>
             <a:endParaRPr lang="de-DE" dirty="0"/>
-          </a:p>
-        </p:txBody>
-      </p:sp>
-      <p:sp>
-        <p:nvSpPr>
-          <p:cNvPr id="9" name="Slide Image Placeholder 8"/>
-          <p:cNvSpPr>
-            <a:spLocks noGrp="1" noRot="1" noChangeAspect="1"/>
-          </p:cNvSpPr>
-          <p:nvPr>
-            <p:ph type="sldImg"/>
-          </p:nvPr>
-        </p:nvSpPr>
-        <p:spPr>
-          <a:xfrm>
-            <a:off x="547688" y="612775"/>
-            <a:ext cx="5762625" cy="3241675"/>
-          </a:xfrm>
-        </p:spPr>
-      </p:sp>
-      <p:sp>
-        <p:nvSpPr>
-          <p:cNvPr id="10" name="Notes Placeholder 9"/>
-          <p:cNvSpPr>
-            <a:spLocks noGrp="1"/>
-          </p:cNvSpPr>
-          <p:nvPr>
-            <p:ph type="body" idx="1"/>
-          </p:nvPr>
-        </p:nvSpPr>
-        <p:spPr/>
-        <p:txBody>
-          <a:bodyPr>
-            <a:normAutofit/>
-          </a:bodyPr>
-          <a:lstStyle/>
-          <a:p>
-            <a:r>
-              <a:rPr lang="en-US" dirty="0" smtClean="0"/>
-              <a:t>A function with variables that are not passed as parameters or declared locally </a:t>
-            </a:r>
-            <a:r>
-              <a:rPr lang="en-US" dirty="0" smtClean="0">
-                <a:sym typeface="Wingdings" panose="05000000000000000000" pitchFamily="2" charset="2"/>
-              </a:rPr>
-              <a:t> free variables</a:t>
-            </a:r>
-          </a:p>
-          <a:p>
-            <a:endParaRPr lang="en-US" dirty="0">
-              <a:sym typeface="Wingdings" panose="05000000000000000000" pitchFamily="2" charset="2"/>
-            </a:endParaRPr>
-          </a:p>
-          <a:p>
-            <a:r>
-              <a:rPr lang="en-US" dirty="0" smtClean="0">
-                <a:sym typeface="Wingdings" panose="05000000000000000000" pitchFamily="2" charset="2"/>
-              </a:rPr>
-              <a:t>These free variables are bound to values of the lexical environment at declaration</a:t>
-            </a:r>
-            <a:endParaRPr lang="en-US" dirty="0" smtClean="0"/>
-          </a:p>
-          <a:p>
-            <a:endParaRPr lang="en-US" dirty="0"/>
-          </a:p>
-          <a:p>
-            <a:endParaRPr lang="en-US" dirty="0"/>
           </a:p>
         </p:txBody>
       </p:sp>
     </p:spTree>
     <p:extLst>
       <p:ext uri="{BB962C8B-B14F-4D97-AF65-F5344CB8AC3E}">
-        <p14:creationId xmlns:p14="http://schemas.microsoft.com/office/powerpoint/2010/main" val="3414235574"/>
+        <p14:creationId xmlns:p14="http://schemas.microsoft.com/office/powerpoint/2010/main" val="3797708947"/>
       </p:ext>
     </p:extLst>
   </p:cSld>
@@ -936,7 +1374,7 @@
             <a:fld id="{7D8C2C35-2B8A-446E-BEC0-FD36716C29AC}" type="slidenum">
               <a:rPr lang="de-DE" smtClean="0"/>
               <a:pPr/>
-              <a:t>6</a:t>
+              <a:t>4</a:t>
             </a:fld>
             <a:endParaRPr lang="de-DE" dirty="0"/>
           </a:p>
@@ -978,17 +1416,33 @@
           <a:p>
             <a:r>
               <a:rPr lang="en-US" dirty="0" smtClean="0"/>
-              <a:t>Do you remember those monolithic event handlers? Callbacks are much more elegant…</a:t>
-            </a:r>
-          </a:p>
-          <a:p>
+              <a:t>A function with variables that are not passed as parameters or declared locally </a:t>
+            </a:r>
+            <a:r>
+              <a:rPr lang="en-US" dirty="0" smtClean="0">
+                <a:sym typeface="Wingdings" panose="05000000000000000000" pitchFamily="2" charset="2"/>
+              </a:rPr>
+              <a:t> free variables</a:t>
+            </a:r>
+          </a:p>
+          <a:p>
+            <a:endParaRPr lang="en-US" dirty="0">
+              <a:sym typeface="Wingdings" panose="05000000000000000000" pitchFamily="2" charset="2"/>
+            </a:endParaRPr>
+          </a:p>
+          <a:p>
+            <a:r>
+              <a:rPr lang="en-US" dirty="0" smtClean="0">
+                <a:sym typeface="Wingdings" panose="05000000000000000000" pitchFamily="2" charset="2"/>
+              </a:rPr>
+              <a:t>These free variables are bound to values of the lexical environment at declaration</a:t>
+            </a:r>
             <a:endParaRPr lang="en-US" dirty="0" smtClean="0"/>
           </a:p>
           <a:p>
-            <a:r>
-              <a:rPr lang="en-US" dirty="0" smtClean="0"/>
-              <a:t>On the other hand – a callback does not need to have free variables…</a:t>
-            </a:r>
+            <a:endParaRPr lang="en-US" dirty="0"/>
+          </a:p>
+          <a:p>
             <a:endParaRPr lang="en-US" dirty="0"/>
           </a:p>
         </p:txBody>
@@ -996,7 +1450,7 @@
     </p:spTree>
     <p:extLst>
       <p:ext uri="{BB962C8B-B14F-4D97-AF65-F5344CB8AC3E}">
-        <p14:creationId xmlns:p14="http://schemas.microsoft.com/office/powerpoint/2010/main" val="2745482735"/>
+        <p14:creationId xmlns:p14="http://schemas.microsoft.com/office/powerpoint/2010/main" val="3414235574"/>
       </p:ext>
     </p:extLst>
   </p:cSld>
@@ -1025,6 +1479,41 @@
       </p:grpSpPr>
       <p:sp>
         <p:nvSpPr>
+          <p:cNvPr id="2" name="Slide Image Placeholder 1"/>
+          <p:cNvSpPr>
+            <a:spLocks noGrp="1" noRot="1" noChangeAspect="1"/>
+          </p:cNvSpPr>
+          <p:nvPr>
+            <p:ph type="sldImg"/>
+          </p:nvPr>
+        </p:nvSpPr>
+        <p:spPr/>
+      </p:sp>
+      <p:sp>
+        <p:nvSpPr>
+          <p:cNvPr id="3" name="Notes Placeholder 2"/>
+          <p:cNvSpPr>
+            <a:spLocks noGrp="1"/>
+          </p:cNvSpPr>
+          <p:nvPr>
+            <p:ph type="body" idx="1"/>
+          </p:nvPr>
+        </p:nvSpPr>
+        <p:spPr/>
+        <p:txBody>
+          <a:bodyPr/>
+          <a:lstStyle/>
+          <a:p>
+            <a:r>
+              <a:rPr lang="en-US" dirty="0" smtClean="0"/>
+              <a:t>Demo: 002_LexicalScope.html</a:t>
+            </a:r>
+            <a:endParaRPr lang="en-US" dirty="0"/>
+          </a:p>
+        </p:txBody>
+      </p:sp>
+      <p:sp>
+        <p:nvSpPr>
           <p:cNvPr id="4" name="Slide Number Placeholder 3"/>
           <p:cNvSpPr>
             <a:spLocks noGrp="1"/>
@@ -1041,73 +1530,16 @@
             <a:fld id="{7D8C2C35-2B8A-446E-BEC0-FD36716C29AC}" type="slidenum">
               <a:rPr lang="de-DE" smtClean="0"/>
               <a:pPr/>
-              <a:t>7</a:t>
+              <a:t>5</a:t>
             </a:fld>
             <a:endParaRPr lang="de-DE" dirty="0"/>
-          </a:p>
-        </p:txBody>
-      </p:sp>
-      <p:sp>
-        <p:nvSpPr>
-          <p:cNvPr id="9" name="Slide Image Placeholder 8"/>
-          <p:cNvSpPr>
-            <a:spLocks noGrp="1" noRot="1" noChangeAspect="1"/>
-          </p:cNvSpPr>
-          <p:nvPr>
-            <p:ph type="sldImg"/>
-          </p:nvPr>
-        </p:nvSpPr>
-        <p:spPr>
-          <a:xfrm>
-            <a:off x="547688" y="612775"/>
-            <a:ext cx="5762625" cy="3241675"/>
-          </a:xfrm>
-        </p:spPr>
-      </p:sp>
-      <p:sp>
-        <p:nvSpPr>
-          <p:cNvPr id="10" name="Notes Placeholder 9"/>
-          <p:cNvSpPr>
-            <a:spLocks noGrp="1"/>
-          </p:cNvSpPr>
-          <p:nvPr>
-            <p:ph type="body" idx="1"/>
-          </p:nvPr>
-        </p:nvSpPr>
-        <p:spPr/>
-        <p:txBody>
-          <a:bodyPr>
-            <a:normAutofit/>
-          </a:bodyPr>
-          <a:lstStyle/>
-          <a:p>
-            <a:r>
-              <a:rPr lang="en-US" dirty="0" smtClean="0"/>
-              <a:t>JavaScript</a:t>
-            </a:r>
-            <a:r>
-              <a:rPr lang="en-US" baseline="0" dirty="0" smtClean="0"/>
-              <a:t> file: </a:t>
-            </a:r>
-            <a:r>
-              <a:rPr lang="en-US" baseline="0" dirty="0" err="1" smtClean="0"/>
-              <a:t>OrderAnalyticsController</a:t>
-            </a:r>
-            <a:endParaRPr lang="en-US" baseline="0" dirty="0" smtClean="0"/>
-          </a:p>
-          <a:p>
-            <a:r>
-              <a:rPr lang="en-US" baseline="0" dirty="0" smtClean="0"/>
-              <a:t>HTML file: index.html</a:t>
-            </a:r>
-            <a:endParaRPr lang="en-US" dirty="0"/>
           </a:p>
         </p:txBody>
       </p:sp>
     </p:spTree>
     <p:extLst>
       <p:ext uri="{BB962C8B-B14F-4D97-AF65-F5344CB8AC3E}">
-        <p14:creationId xmlns:p14="http://schemas.microsoft.com/office/powerpoint/2010/main" val="1606603295"/>
+        <p14:creationId xmlns:p14="http://schemas.microsoft.com/office/powerpoint/2010/main" val="563522725"/>
       </p:ext>
     </p:extLst>
   </p:cSld>
@@ -1152,7 +1584,7 @@
             <a:fld id="{7D8C2C35-2B8A-446E-BEC0-FD36716C29AC}" type="slidenum">
               <a:rPr lang="de-DE" smtClean="0"/>
               <a:pPr/>
-              <a:t>9</a:t>
+              <a:t>6</a:t>
             </a:fld>
             <a:endParaRPr lang="de-DE" dirty="0"/>
           </a:p>
@@ -1194,27 +1626,16 @@
           <a:p>
             <a:r>
               <a:rPr lang="en-US" dirty="0" smtClean="0"/>
-              <a:t>Sometimes one wants to control when an expression is evaluated and that is evaluated exactly once:</a:t>
-            </a:r>
-          </a:p>
-          <a:p>
-            <a:pPr marL="285750" indent="-285750">
-              <a:buFontTx/>
-              <a:buChar char="-"/>
-            </a:pPr>
+              <a:t>Do you remember those monolithic event handlers? Callbacks are much more elegant…</a:t>
+            </a:r>
+          </a:p>
+          <a:p>
+            <a:endParaRPr lang="en-US" dirty="0" smtClean="0"/>
+          </a:p>
+          <a:p>
             <a:r>
               <a:rPr lang="en-US" dirty="0" smtClean="0"/>
-              <a:t>Result is used many times</a:t>
-            </a:r>
-          </a:p>
-          <a:p>
-            <a:pPr marL="285750" indent="-285750">
-              <a:buFontTx/>
-              <a:buChar char="-"/>
-            </a:pPr>
-            <a:r>
-              <a:rPr lang="en-US" dirty="0" smtClean="0"/>
-              <a:t>Computing is expensive</a:t>
+              <a:t>On the other hand – a callback does not need to have free variables…</a:t>
             </a:r>
             <a:endParaRPr lang="en-US" dirty="0"/>
           </a:p>
@@ -1223,7 +1644,7 @@
     </p:spTree>
     <p:extLst>
       <p:ext uri="{BB962C8B-B14F-4D97-AF65-F5344CB8AC3E}">
-        <p14:creationId xmlns:p14="http://schemas.microsoft.com/office/powerpoint/2010/main" val="4149311787"/>
+        <p14:creationId xmlns:p14="http://schemas.microsoft.com/office/powerpoint/2010/main" val="2745482735"/>
       </p:ext>
     </p:extLst>
   </p:cSld>
@@ -1268,7 +1689,7 @@
             <a:fld id="{7D8C2C35-2B8A-446E-BEC0-FD36716C29AC}" type="slidenum">
               <a:rPr lang="de-DE" smtClean="0"/>
               <a:pPr/>
-              <a:t>14</a:t>
+              <a:t>7</a:t>
             </a:fld>
             <a:endParaRPr lang="de-DE" dirty="0"/>
           </a:p>
@@ -1310,13 +1731,7 @@
           <a:p>
             <a:r>
               <a:rPr lang="en-US" dirty="0" smtClean="0"/>
-              <a:t>Here delay &amp; force is shown with a recursion:</a:t>
-            </a:r>
-          </a:p>
-          <a:p>
-            <a:r>
-              <a:rPr lang="en-US" dirty="0" smtClean="0"/>
-              <a:t>Base condition are 0 and 1; for 1 the heavy computation is performed; all other function calls use the result of the succeeding function</a:t>
+              <a:t>Demo: 003_closure_callback.html</a:t>
             </a:r>
             <a:endParaRPr lang="en-US" dirty="0"/>
           </a:p>
@@ -1325,7 +1740,212 @@
     </p:spTree>
     <p:extLst>
       <p:ext uri="{BB962C8B-B14F-4D97-AF65-F5344CB8AC3E}">
-        <p14:creationId xmlns:p14="http://schemas.microsoft.com/office/powerpoint/2010/main" val="682080673"/>
+        <p14:creationId xmlns:p14="http://schemas.microsoft.com/office/powerpoint/2010/main" val="1606603295"/>
+      </p:ext>
+    </p:extLst>
+  </p:cSld>
+  <p:clrMapOvr>
+    <a:masterClrMapping/>
+  </p:clrMapOvr>
+</p:notes>
+</file>
+
+<file path=ppt/notesSlides/notesSlide8.xml><?xml version="1.0" encoding="utf-8"?>
+<p:notes xmlns:a="http://schemas.openxmlformats.org/drawingml/2006/main" xmlns:r="http://schemas.openxmlformats.org/officeDocument/2006/relationships" xmlns:p="http://schemas.openxmlformats.org/presentationml/2006/main">
+  <p:cSld>
+    <p:spTree>
+      <p:nvGrpSpPr>
+        <p:cNvPr id="1" name=""/>
+        <p:cNvGrpSpPr/>
+        <p:nvPr/>
+      </p:nvGrpSpPr>
+      <p:grpSpPr>
+        <a:xfrm>
+          <a:off x="0" y="0"/>
+          <a:ext cx="0" cy="0"/>
+          <a:chOff x="0" y="0"/>
+          <a:chExt cx="0" cy="0"/>
+        </a:xfrm>
+      </p:grpSpPr>
+      <p:sp>
+        <p:nvSpPr>
+          <p:cNvPr id="2" name="Slide Image Placeholder 1"/>
+          <p:cNvSpPr>
+            <a:spLocks noGrp="1" noRot="1" noChangeAspect="1"/>
+          </p:cNvSpPr>
+          <p:nvPr>
+            <p:ph type="sldImg"/>
+          </p:nvPr>
+        </p:nvSpPr>
+        <p:spPr/>
+      </p:sp>
+      <p:sp>
+        <p:nvSpPr>
+          <p:cNvPr id="3" name="Notes Placeholder 2"/>
+          <p:cNvSpPr>
+            <a:spLocks noGrp="1"/>
+          </p:cNvSpPr>
+          <p:nvPr>
+            <p:ph type="body" idx="1"/>
+          </p:nvPr>
+        </p:nvSpPr>
+        <p:spPr/>
+        <p:txBody>
+          <a:bodyPr/>
+          <a:lstStyle/>
+          <a:p>
+            <a:r>
+              <a:rPr lang="en-US" dirty="0" smtClean="0"/>
+              <a:t>Demo: 004_closure_callback2.html</a:t>
+            </a:r>
+            <a:endParaRPr lang="en-US" dirty="0"/>
+          </a:p>
+        </p:txBody>
+      </p:sp>
+      <p:sp>
+        <p:nvSpPr>
+          <p:cNvPr id="4" name="Slide Number Placeholder 3"/>
+          <p:cNvSpPr>
+            <a:spLocks noGrp="1"/>
+          </p:cNvSpPr>
+          <p:nvPr>
+            <p:ph type="sldNum" sz="quarter" idx="10"/>
+          </p:nvPr>
+        </p:nvSpPr>
+        <p:spPr/>
+        <p:txBody>
+          <a:bodyPr/>
+          <a:lstStyle/>
+          <a:p>
+            <a:fld id="{7D8C2C35-2B8A-446E-BEC0-FD36716C29AC}" type="slidenum">
+              <a:rPr lang="de-DE" smtClean="0"/>
+              <a:pPr/>
+              <a:t>8</a:t>
+            </a:fld>
+            <a:endParaRPr lang="de-DE" dirty="0"/>
+          </a:p>
+        </p:txBody>
+      </p:sp>
+    </p:spTree>
+    <p:extLst>
+      <p:ext uri="{BB962C8B-B14F-4D97-AF65-F5344CB8AC3E}">
+        <p14:creationId xmlns:p14="http://schemas.microsoft.com/office/powerpoint/2010/main" val="3871593062"/>
+      </p:ext>
+    </p:extLst>
+  </p:cSld>
+  <p:clrMapOvr>
+    <a:masterClrMapping/>
+  </p:clrMapOvr>
+</p:notes>
+</file>
+
+<file path=ppt/notesSlides/notesSlide9.xml><?xml version="1.0" encoding="utf-8"?>
+<p:notes xmlns:a="http://schemas.openxmlformats.org/drawingml/2006/main" xmlns:r="http://schemas.openxmlformats.org/officeDocument/2006/relationships" xmlns:p="http://schemas.openxmlformats.org/presentationml/2006/main">
+  <p:cSld>
+    <p:spTree>
+      <p:nvGrpSpPr>
+        <p:cNvPr id="1" name=""/>
+        <p:cNvGrpSpPr/>
+        <p:nvPr/>
+      </p:nvGrpSpPr>
+      <p:grpSpPr>
+        <a:xfrm>
+          <a:off x="0" y="0"/>
+          <a:ext cx="0" cy="0"/>
+          <a:chOff x="0" y="0"/>
+          <a:chExt cx="0" cy="0"/>
+        </a:xfrm>
+      </p:grpSpPr>
+      <p:sp>
+        <p:nvSpPr>
+          <p:cNvPr id="4" name="Slide Number Placeholder 3"/>
+          <p:cNvSpPr>
+            <a:spLocks noGrp="1"/>
+          </p:cNvSpPr>
+          <p:nvPr>
+            <p:ph type="sldNum" sz="quarter" idx="10"/>
+          </p:nvPr>
+        </p:nvSpPr>
+        <p:spPr/>
+        <p:txBody>
+          <a:bodyPr/>
+          <a:lstStyle/>
+          <a:p>
+            <a:fld id="{7D8C2C35-2B8A-446E-BEC0-FD36716C29AC}" type="slidenum">
+              <a:rPr lang="de-DE" smtClean="0"/>
+              <a:pPr/>
+              <a:t>9</a:t>
+            </a:fld>
+            <a:endParaRPr lang="de-DE" dirty="0"/>
+          </a:p>
+        </p:txBody>
+      </p:sp>
+      <p:sp>
+        <p:nvSpPr>
+          <p:cNvPr id="9" name="Slide Image Placeholder 8"/>
+          <p:cNvSpPr>
+            <a:spLocks noGrp="1" noRot="1" noChangeAspect="1"/>
+          </p:cNvSpPr>
+          <p:nvPr>
+            <p:ph type="sldImg"/>
+          </p:nvPr>
+        </p:nvSpPr>
+        <p:spPr>
+          <a:xfrm>
+            <a:off x="547688" y="612775"/>
+            <a:ext cx="5762625" cy="3241675"/>
+          </a:xfrm>
+        </p:spPr>
+      </p:sp>
+      <p:sp>
+        <p:nvSpPr>
+          <p:cNvPr id="10" name="Notes Placeholder 9"/>
+          <p:cNvSpPr>
+            <a:spLocks noGrp="1"/>
+          </p:cNvSpPr>
+          <p:nvPr>
+            <p:ph type="body" idx="1"/>
+          </p:nvPr>
+        </p:nvSpPr>
+        <p:spPr/>
+        <p:txBody>
+          <a:bodyPr>
+            <a:normAutofit/>
+          </a:bodyPr>
+          <a:lstStyle/>
+          <a:p>
+            <a:r>
+              <a:rPr lang="en-US" dirty="0" smtClean="0"/>
+              <a:t>Sometimes one wants to control when an expression is evaluated and that is evaluated exactly once:</a:t>
+            </a:r>
+          </a:p>
+          <a:p>
+            <a:pPr marL="285750" indent="-285750">
+              <a:buFontTx/>
+              <a:buChar char="-"/>
+            </a:pPr>
+            <a:r>
+              <a:rPr lang="en-US" dirty="0" smtClean="0"/>
+              <a:t>Result is used many times</a:t>
+            </a:r>
+          </a:p>
+          <a:p>
+            <a:pPr marL="285750" indent="-285750">
+              <a:buFontTx/>
+              <a:buChar char="-"/>
+            </a:pPr>
+            <a:r>
+              <a:rPr lang="en-US" dirty="0" smtClean="0"/>
+              <a:t>Computing is expensive</a:t>
+            </a:r>
+            <a:endParaRPr lang="en-US" dirty="0"/>
+          </a:p>
+        </p:txBody>
+      </p:sp>
+    </p:spTree>
+    <p:extLst>
+      <p:ext uri="{BB962C8B-B14F-4D97-AF65-F5344CB8AC3E}">
+        <p14:creationId xmlns:p14="http://schemas.microsoft.com/office/powerpoint/2010/main" val="4149311787"/>
       </p:ext>
     </p:extLst>
   </p:cSld>
@@ -7796,7 +8416,7 @@
           <p:nvPr/>
         </p:nvPicPr>
         <p:blipFill>
-          <a:blip r:embed="rId2">
+          <a:blip r:embed="rId3">
             <a:extLst>
               <a:ext uri="{28A0092B-C50C-407E-A947-70E740481C1C}">
                 <a14:useLocalDpi xmlns:a14="http://schemas.microsoft.com/office/drawing/2010/main" val="0"/>
@@ -7837,7 +8457,7 @@
           <p:nvPr/>
         </p:nvPicPr>
         <p:blipFill>
-          <a:blip r:embed="rId3">
+          <a:blip r:embed="rId4">
             <a:extLst>
               <a:ext uri="{28A0092B-C50C-407E-A947-70E740481C1C}">
                 <a14:useLocalDpi xmlns:a14="http://schemas.microsoft.com/office/drawing/2010/main" val="0"/>
@@ -8203,6 +8823,76 @@
           </a:extLst>
         </p:spPr>
       </p:pic>
+      <p:sp>
+        <p:nvSpPr>
+          <p:cNvPr id="5" name="Oval Callout 4"/>
+          <p:cNvSpPr/>
+          <p:nvPr/>
+        </p:nvSpPr>
+        <p:spPr bwMode="gray">
+          <a:xfrm>
+            <a:off x="6335303" y="5084619"/>
+            <a:ext cx="5191680" cy="1267360"/>
+          </a:xfrm>
+          <a:prstGeom prst="wedgeEllipseCallout">
+            <a:avLst>
+              <a:gd name="adj1" fmla="val -60847"/>
+              <a:gd name="adj2" fmla="val -50741"/>
+            </a:avLst>
+          </a:prstGeom>
+          <a:solidFill>
+            <a:schemeClr val="accent1"/>
+          </a:solidFill>
+          <a:ln w="6350" algn="ctr">
+            <a:noFill/>
+            <a:miter lim="800000"/>
+            <a:headEnd/>
+            <a:tailEnd/>
+          </a:ln>
+        </p:spPr>
+        <p:txBody>
+          <a:bodyPr lIns="90000" tIns="72000" rIns="90000" bIns="72000" rtlCol="0" anchor="ctr"/>
+          <a:lstStyle/>
+          <a:p>
+            <a:pPr algn="ctr" defTabSz="914400" fontAlgn="base">
+              <a:spcBef>
+                <a:spcPct val="50000"/>
+              </a:spcBef>
+              <a:spcAft>
+                <a:spcPct val="0"/>
+              </a:spcAft>
+              <a:buClr>
+                <a:srgbClr val="F0AB00"/>
+              </a:buClr>
+              <a:buSzPct val="80000"/>
+            </a:pPr>
+            <a:r>
+              <a:rPr lang="en-US" sz="2000" b="1" kern="0" dirty="0" err="1">
+                <a:ea typeface="Arial Unicode MS" pitchFamily="34" charset="-128"/>
+                <a:cs typeface="Arial Unicode MS" pitchFamily="34" charset="-128"/>
+              </a:rPr>
+              <a:t>println</a:t>
+            </a:r>
+            <a:r>
+              <a:rPr lang="en-US" sz="2000" b="1" kern="0" dirty="0">
+                <a:ea typeface="Arial Unicode MS" pitchFamily="34" charset="-128"/>
+                <a:cs typeface="Arial Unicode MS" pitchFamily="34" charset="-128"/>
+              </a:rPr>
+              <a:t>("I am true") is converted into an anonymous function in Java</a:t>
+            </a:r>
+            <a:endParaRPr kumimoji="0" lang="en-US" sz="2000" b="1" i="0" u="none" strike="noStrike" kern="0" cap="none" spc="0" normalizeH="0" baseline="0" noProof="0" dirty="0" err="1" smtClean="0">
+              <a:ln>
+                <a:noFill/>
+              </a:ln>
+              <a:effectLst/>
+              <a:uLnTx/>
+              <a:uFillTx/>
+              <a:ea typeface="Arial Unicode MS" pitchFamily="34" charset="-128"/>
+              <a:cs typeface="Arial Unicode MS" pitchFamily="34" charset="-128"/>
+            </a:endParaRPr>
+          </a:p>
+        </p:txBody>
+      </p:sp>
     </p:spTree>
     <p:extLst>
       <p:ext uri="{BB962C8B-B14F-4D97-AF65-F5344CB8AC3E}">
@@ -8266,6 +8956,51 @@
                       </p:childTnLst>
                     </p:cTn>
                   </p:par>
+                  <p:par>
+                    <p:cTn id="7" fill="hold">
+                      <p:stCondLst>
+                        <p:cond delay="indefinite"/>
+                      </p:stCondLst>
+                      <p:childTnLst>
+                        <p:par>
+                          <p:cTn id="8" fill="hold">
+                            <p:stCondLst>
+                              <p:cond delay="0"/>
+                            </p:stCondLst>
+                            <p:childTnLst>
+                              <p:par>
+                                <p:cTn id="9" presetID="1" presetClass="entr" presetSubtype="0" fill="hold" grpId="0" nodeType="clickEffect">
+                                  <p:stCondLst>
+                                    <p:cond delay="0"/>
+                                  </p:stCondLst>
+                                  <p:childTnLst>
+                                    <p:set>
+                                      <p:cBhvr>
+                                        <p:cTn id="10" dur="1" fill="hold">
+                                          <p:stCondLst>
+                                            <p:cond delay="0"/>
+                                          </p:stCondLst>
+                                        </p:cTn>
+                                        <p:tgtEl>
+                                          <p:spTgt spid="5"/>
+                                        </p:tgtEl>
+                                        <p:attrNameLst>
+                                          <p:attrName>style.visibility</p:attrName>
+                                        </p:attrNameLst>
+                                      </p:cBhvr>
+                                      <p:to>
+                                        <p:strVal val="visible"/>
+                                      </p:to>
+                                    </p:set>
+                                  </p:childTnLst>
+                                </p:cTn>
+                              </p:par>
+                            </p:childTnLst>
+                          </p:cTn>
+                        </p:par>
+                      </p:childTnLst>
+                    </p:cTn>
+                  </p:par>
                 </p:childTnLst>
               </p:cTn>
               <p:prevCondLst>
@@ -8287,6 +9022,9 @@
         </p:cTn>
       </p:par>
     </p:tnLst>
+    <p:bldLst>
+      <p:bldP spid="5" grpId="0" animBg="1"/>
+    </p:bldLst>
   </p:timing>
 </p:sld>
 </file>
@@ -10776,7 +11514,7 @@
           <p:nvPr/>
         </p:nvPicPr>
         <p:blipFill>
-          <a:blip r:embed="rId2"/>
+          <a:blip r:embed="rId3"/>
           <a:stretch>
             <a:fillRect/>
           </a:stretch>
@@ -10800,7 +11538,7 @@
           <p:nvPr/>
         </p:nvPicPr>
         <p:blipFill>
-          <a:blip r:embed="rId3"/>
+          <a:blip r:embed="rId4"/>
           <a:stretch>
             <a:fillRect/>
           </a:stretch>
@@ -10815,6 +11553,54 @@
           </a:prstGeom>
         </p:spPr>
       </p:pic>
+      <p:sp>
+        <p:nvSpPr>
+          <p:cNvPr id="3" name="TextBox 2"/>
+          <p:cNvSpPr txBox="1"/>
+          <p:nvPr/>
+        </p:nvSpPr>
+        <p:spPr>
+          <a:xfrm>
+            <a:off x="6276109" y="1440625"/>
+            <a:ext cx="5375564" cy="2154436"/>
+          </a:xfrm>
+          <a:prstGeom prst="rect">
+            <a:avLst/>
+          </a:prstGeom>
+          <a:noFill/>
+        </p:spPr>
+        <p:txBody>
+          <a:bodyPr wrap="square" lIns="0" tIns="0" rIns="0" bIns="0" rtlCol="0">
+            <a:spAutoFit/>
+          </a:bodyPr>
+          <a:lstStyle/>
+          <a:p>
+            <a:pPr fontAlgn="base">
+              <a:spcBef>
+                <a:spcPts val="600"/>
+              </a:spcBef>
+              <a:spcAft>
+                <a:spcPct val="0"/>
+              </a:spcAft>
+              <a:buClr>
+                <a:srgbClr val="F0AB00"/>
+              </a:buClr>
+              <a:buSzPct val="80000"/>
+            </a:pPr>
+            <a:r>
+              <a:rPr lang="en-US" altLang="zh-CN" sz="2800" kern="0" dirty="0" smtClean="0">
+                <a:ea typeface="Arial Unicode MS" pitchFamily="34" charset="-128"/>
+                <a:cs typeface="Arial Unicode MS" pitchFamily="34" charset="-128"/>
+              </a:rPr>
+              <a:t>Bridge Pattern: decouple the abstract part and the concrete implementation part, so that each of both could change independently. </a:t>
+            </a:r>
+            <a:endParaRPr lang="en-US" sz="2800" kern="0" dirty="0" smtClean="0">
+              <a:ea typeface="Arial Unicode MS" pitchFamily="34" charset="-128"/>
+              <a:cs typeface="Arial Unicode MS" pitchFamily="34" charset="-128"/>
+            </a:endParaRPr>
+          </a:p>
+        </p:txBody>
+      </p:sp>
     </p:spTree>
     <p:extLst>
       <p:ext uri="{BB962C8B-B14F-4D97-AF65-F5344CB8AC3E}">
@@ -10828,7 +11614,2190 @@
   <p:timing>
     <p:tnLst>
       <p:par>
+        <p:cTn id="1" dur="indefinite" restart="never" nodeType="tmRoot">
+          <p:childTnLst>
+            <p:seq concurrent="1" nextAc="seek">
+              <p:cTn id="2" dur="indefinite" nodeType="mainSeq">
+                <p:childTnLst>
+                  <p:par>
+                    <p:cTn id="3" fill="hold">
+                      <p:stCondLst>
+                        <p:cond delay="indefinite"/>
+                      </p:stCondLst>
+                      <p:childTnLst>
+                        <p:par>
+                          <p:cTn id="4" fill="hold">
+                            <p:stCondLst>
+                              <p:cond delay="0"/>
+                            </p:stCondLst>
+                            <p:childTnLst>
+                              <p:par>
+                                <p:cTn id="5" presetID="1" presetClass="entr" presetSubtype="0" fill="hold" nodeType="clickEffect">
+                                  <p:stCondLst>
+                                    <p:cond delay="0"/>
+                                  </p:stCondLst>
+                                  <p:childTnLst>
+                                    <p:set>
+                                      <p:cBhvr>
+                                        <p:cTn id="6" dur="1" fill="hold">
+                                          <p:stCondLst>
+                                            <p:cond delay="0"/>
+                                          </p:stCondLst>
+                                        </p:cTn>
+                                        <p:tgtEl>
+                                          <p:spTgt spid="3">
+                                            <p:txEl>
+                                              <p:pRg st="0" end="0"/>
+                                            </p:txEl>
+                                          </p:spTgt>
+                                        </p:tgtEl>
+                                        <p:attrNameLst>
+                                          <p:attrName>style.visibility</p:attrName>
+                                        </p:attrNameLst>
+                                      </p:cBhvr>
+                                      <p:to>
+                                        <p:strVal val="visible"/>
+                                      </p:to>
+                                    </p:set>
+                                  </p:childTnLst>
+                                </p:cTn>
+                              </p:par>
+                            </p:childTnLst>
+                          </p:cTn>
+                        </p:par>
+                      </p:childTnLst>
+                    </p:cTn>
+                  </p:par>
+                </p:childTnLst>
+              </p:cTn>
+              <p:prevCondLst>
+                <p:cond evt="onPrev" delay="0">
+                  <p:tgtEl>
+                    <p:sldTgt/>
+                  </p:tgtEl>
+                </p:cond>
+              </p:prevCondLst>
+              <p:nextCondLst>
+                <p:cond evt="onNext" delay="0">
+                  <p:tgtEl>
+                    <p:sldTgt/>
+                  </p:tgtEl>
+                </p:cond>
+              </p:nextCondLst>
+            </p:seq>
+          </p:childTnLst>
+        </p:cTn>
+      </p:par>
+    </p:tnLst>
+  </p:timing>
+</p:sld>
+</file>
+
+<file path=ppt/slides/slide21.xml><?xml version="1.0" encoding="utf-8"?>
+<p:sld xmlns:a="http://schemas.openxmlformats.org/drawingml/2006/main" xmlns:r="http://schemas.openxmlformats.org/officeDocument/2006/relationships" xmlns:p="http://schemas.openxmlformats.org/presentationml/2006/main">
+  <p:cSld>
+    <p:spTree>
+      <p:nvGrpSpPr>
+        <p:cNvPr id="1" name=""/>
+        <p:cNvGrpSpPr/>
+        <p:nvPr/>
+      </p:nvGrpSpPr>
+      <p:grpSpPr>
+        <a:xfrm>
+          <a:off x="0" y="0"/>
+          <a:ext cx="0" cy="0"/>
+          <a:chOff x="0" y="0"/>
+          <a:chExt cx="0" cy="0"/>
+        </a:xfrm>
+      </p:grpSpPr>
+      <p:sp>
+        <p:nvSpPr>
+          <p:cNvPr id="2" name="Title 1"/>
+          <p:cNvSpPr>
+            <a:spLocks noGrp="1"/>
+          </p:cNvSpPr>
+          <p:nvPr>
+            <p:ph type="title"/>
+          </p:nvPr>
+        </p:nvSpPr>
+        <p:spPr/>
+        <p:txBody>
+          <a:bodyPr/>
+          <a:lstStyle/>
+          <a:p>
+            <a:r>
+              <a:rPr lang="en-US" dirty="0" smtClean="0"/>
+              <a:t>An example in UI5 Application</a:t>
+            </a:r>
+            <a:endParaRPr lang="en-US" dirty="0"/>
+          </a:p>
+        </p:txBody>
+      </p:sp>
+      <p:sp>
+        <p:nvSpPr>
+          <p:cNvPr id="5" name="TextBox 4"/>
+          <p:cNvSpPr txBox="1"/>
+          <p:nvPr/>
+        </p:nvSpPr>
+        <p:spPr>
+          <a:xfrm>
+            <a:off x="166255" y="1440873"/>
+            <a:ext cx="11513127" cy="1708160"/>
+          </a:xfrm>
+          <a:prstGeom prst="rect">
+            <a:avLst/>
+          </a:prstGeom>
+          <a:noFill/>
+        </p:spPr>
+        <p:txBody>
+          <a:bodyPr wrap="square" lIns="0" tIns="0" rIns="0" bIns="0" rtlCol="0">
+            <a:spAutoFit/>
+          </a:bodyPr>
+          <a:lstStyle/>
+          <a:p>
+            <a:pPr fontAlgn="base">
+              <a:spcBef>
+                <a:spcPts val="600"/>
+              </a:spcBef>
+              <a:spcAft>
+                <a:spcPct val="0"/>
+              </a:spcAft>
+              <a:buClr>
+                <a:srgbClr val="F0AB00"/>
+              </a:buClr>
+              <a:buSzPct val="80000"/>
+            </a:pPr>
+            <a:r>
+              <a:rPr lang="en-US" sz="2400" kern="0" dirty="0" smtClean="0">
+                <a:ea typeface="Arial Unicode MS" pitchFamily="34" charset="-128"/>
+                <a:cs typeface="Arial Unicode MS" pitchFamily="34" charset="-128"/>
+              </a:rPr>
+              <a:t>This pattern is widely used in JavaScript Libraries and applications. </a:t>
+            </a:r>
+          </a:p>
+          <a:p>
+            <a:pPr fontAlgn="base">
+              <a:spcBef>
+                <a:spcPts val="600"/>
+              </a:spcBef>
+              <a:spcAft>
+                <a:spcPct val="0"/>
+              </a:spcAft>
+              <a:buClr>
+                <a:srgbClr val="F0AB00"/>
+              </a:buClr>
+              <a:buSzPct val="80000"/>
+            </a:pPr>
+            <a:endParaRPr lang="en-US" sz="2400" kern="0" dirty="0">
+              <a:ea typeface="Arial Unicode MS" pitchFamily="34" charset="-128"/>
+              <a:cs typeface="Arial Unicode MS" pitchFamily="34" charset="-128"/>
+            </a:endParaRPr>
+          </a:p>
+          <a:p>
+            <a:pPr fontAlgn="base">
+              <a:spcBef>
+                <a:spcPts val="600"/>
+              </a:spcBef>
+              <a:spcAft>
+                <a:spcPct val="0"/>
+              </a:spcAft>
+              <a:buClr>
+                <a:srgbClr val="F0AB00"/>
+              </a:buClr>
+              <a:buSzPct val="80000"/>
+            </a:pPr>
+            <a:r>
+              <a:rPr lang="en-US" sz="2400" kern="0" dirty="0" smtClean="0">
+                <a:ea typeface="Arial Unicode MS" pitchFamily="34" charset="-128"/>
+                <a:cs typeface="Arial Unicode MS" pitchFamily="34" charset="-128"/>
+              </a:rPr>
+              <a:t>An example </a:t>
+            </a:r>
+            <a:r>
+              <a:rPr lang="en-US" sz="2400" kern="0" dirty="0">
+                <a:ea typeface="Arial Unicode MS" pitchFamily="34" charset="-128"/>
+                <a:cs typeface="Arial Unicode MS" pitchFamily="34" charset="-128"/>
+              </a:rPr>
+              <a:t>in Fiori: </a:t>
+            </a:r>
+            <a:r>
+              <a:rPr lang="en-US" sz="2400" kern="0" dirty="0" err="1">
+                <a:ea typeface="Arial Unicode MS" pitchFamily="34" charset="-128"/>
+                <a:cs typeface="Arial Unicode MS" pitchFamily="34" charset="-128"/>
+              </a:rPr>
+              <a:t>jQueryproxy.wrf</a:t>
+            </a:r>
+            <a:endParaRPr lang="en-US" sz="2400" kern="0" dirty="0" smtClean="0">
+              <a:ea typeface="Arial Unicode MS" pitchFamily="34" charset="-128"/>
+              <a:cs typeface="Arial Unicode MS" pitchFamily="34" charset="-128"/>
+            </a:endParaRPr>
+          </a:p>
+          <a:p>
+            <a:pPr fontAlgn="base">
+              <a:spcBef>
+                <a:spcPts val="600"/>
+              </a:spcBef>
+              <a:spcAft>
+                <a:spcPct val="0"/>
+              </a:spcAft>
+              <a:buClr>
+                <a:srgbClr val="F0AB00"/>
+              </a:buClr>
+              <a:buSzPct val="80000"/>
+            </a:pPr>
+            <a:endParaRPr lang="en-US" sz="2400" kern="0" dirty="0" smtClean="0">
+              <a:ea typeface="Arial Unicode MS" pitchFamily="34" charset="-128"/>
+              <a:cs typeface="Arial Unicode MS" pitchFamily="34" charset="-128"/>
+            </a:endParaRPr>
+          </a:p>
+        </p:txBody>
+      </p:sp>
+    </p:spTree>
+    <p:extLst>
+      <p:ext uri="{BB962C8B-B14F-4D97-AF65-F5344CB8AC3E}">
+        <p14:creationId xmlns:p14="http://schemas.microsoft.com/office/powerpoint/2010/main" val="672182119"/>
+      </p:ext>
+    </p:extLst>
+  </p:cSld>
+  <p:clrMapOvr>
+    <a:masterClrMapping/>
+  </p:clrMapOvr>
+  <p:timing>
+    <p:tnLst>
+      <p:par>
         <p:cTn id="1" dur="indefinite" restart="never" nodeType="tmRoot"/>
+      </p:par>
+    </p:tnLst>
+  </p:timing>
+</p:sld>
+</file>
+
+<file path=ppt/slides/slide22.xml><?xml version="1.0" encoding="utf-8"?>
+<p:sld xmlns:a="http://schemas.openxmlformats.org/drawingml/2006/main" xmlns:r="http://schemas.openxmlformats.org/officeDocument/2006/relationships" xmlns:p="http://schemas.openxmlformats.org/presentationml/2006/main">
+  <p:cSld>
+    <p:spTree>
+      <p:nvGrpSpPr>
+        <p:cNvPr id="1" name=""/>
+        <p:cNvGrpSpPr/>
+        <p:nvPr/>
+      </p:nvGrpSpPr>
+      <p:grpSpPr>
+        <a:xfrm>
+          <a:off x="0" y="0"/>
+          <a:ext cx="0" cy="0"/>
+          <a:chOff x="0" y="0"/>
+          <a:chExt cx="0" cy="0"/>
+        </a:xfrm>
+      </p:grpSpPr>
+      <p:sp>
+        <p:nvSpPr>
+          <p:cNvPr id="2" name="Title 1"/>
+          <p:cNvSpPr>
+            <a:spLocks noGrp="1"/>
+          </p:cNvSpPr>
+          <p:nvPr>
+            <p:ph type="title"/>
+          </p:nvPr>
+        </p:nvSpPr>
+        <p:spPr/>
+        <p:txBody>
+          <a:bodyPr/>
+          <a:lstStyle/>
+          <a:p>
+            <a:r>
+              <a:rPr lang="en-US" dirty="0" smtClean="0"/>
+              <a:t>Currying</a:t>
+            </a:r>
+            <a:endParaRPr lang="en-US" dirty="0"/>
+          </a:p>
+        </p:txBody>
+      </p:sp>
+      <p:sp>
+        <p:nvSpPr>
+          <p:cNvPr id="5" name="TextBox 4"/>
+          <p:cNvSpPr txBox="1"/>
+          <p:nvPr/>
+        </p:nvSpPr>
+        <p:spPr>
+          <a:xfrm>
+            <a:off x="324000" y="1413164"/>
+            <a:ext cx="11327673" cy="2446824"/>
+          </a:xfrm>
+          <a:prstGeom prst="rect">
+            <a:avLst/>
+          </a:prstGeom>
+          <a:noFill/>
+        </p:spPr>
+        <p:txBody>
+          <a:bodyPr wrap="square" lIns="0" tIns="0" rIns="0" bIns="0" rtlCol="0">
+            <a:spAutoFit/>
+          </a:bodyPr>
+          <a:lstStyle/>
+          <a:p>
+            <a:pPr fontAlgn="base">
+              <a:spcBef>
+                <a:spcPts val="600"/>
+              </a:spcBef>
+              <a:spcAft>
+                <a:spcPct val="0"/>
+              </a:spcAft>
+              <a:buClr>
+                <a:srgbClr val="F0AB00"/>
+              </a:buClr>
+              <a:buSzPct val="80000"/>
+            </a:pPr>
+            <a:r>
+              <a:rPr lang="en-US" sz="2400"/>
+              <a:t>n mathematics and computer science, currying is the technique of translating the evaluation of a function that takes multiple arguments (or a tuple of arguments) into evaluating a sequence of functions, each with a single argument</a:t>
+            </a:r>
+            <a:r>
+              <a:rPr lang="en-US" sz="2400" smtClean="0"/>
+              <a:t>. </a:t>
+            </a:r>
+          </a:p>
+          <a:p>
+            <a:pPr fontAlgn="base">
+              <a:spcBef>
+                <a:spcPts val="600"/>
+              </a:spcBef>
+              <a:spcAft>
+                <a:spcPct val="0"/>
+              </a:spcAft>
+              <a:buClr>
+                <a:srgbClr val="F0AB00"/>
+              </a:buClr>
+              <a:buSzPct val="80000"/>
+            </a:pPr>
+            <a:r>
+              <a:rPr lang="en-US" sz="2400" smtClean="0">
+                <a:hlinkClick r:id="rId2" tooltip="Haskell Curry"/>
+              </a:rPr>
+              <a:t>Haskell Curry</a:t>
+            </a:r>
+            <a:endParaRPr lang="en-US" sz="2400" smtClean="0"/>
+          </a:p>
+          <a:p>
+            <a:pPr fontAlgn="base">
+              <a:spcBef>
+                <a:spcPts val="600"/>
+              </a:spcBef>
+              <a:spcAft>
+                <a:spcPct val="0"/>
+              </a:spcAft>
+              <a:buClr>
+                <a:srgbClr val="F0AB00"/>
+              </a:buClr>
+              <a:buSzPct val="80000"/>
+            </a:pPr>
+            <a:r>
+              <a:rPr lang="en-US" sz="2400" kern="0">
+                <a:ea typeface="Arial Unicode MS" pitchFamily="34" charset="-128"/>
+                <a:cs typeface="Arial Unicode MS" pitchFamily="34" charset="-128"/>
+                <a:hlinkClick r:id="rId3"/>
+              </a:rPr>
+              <a:t>https://</a:t>
+            </a:r>
+            <a:r>
+              <a:rPr lang="en-US" sz="2400" kern="0" smtClean="0">
+                <a:ea typeface="Arial Unicode MS" pitchFamily="34" charset="-128"/>
+                <a:cs typeface="Arial Unicode MS" pitchFamily="34" charset="-128"/>
+                <a:hlinkClick r:id="rId3"/>
+              </a:rPr>
+              <a:t>en.wikipedia.org/wiki/Currying</a:t>
+            </a:r>
+            <a:endParaRPr lang="en-US" sz="2400" kern="0" smtClean="0">
+              <a:ea typeface="Arial Unicode MS" pitchFamily="34" charset="-128"/>
+              <a:cs typeface="Arial Unicode MS" pitchFamily="34" charset="-128"/>
+            </a:endParaRPr>
+          </a:p>
+          <a:p>
+            <a:pPr fontAlgn="base">
+              <a:spcBef>
+                <a:spcPts val="600"/>
+              </a:spcBef>
+              <a:spcAft>
+                <a:spcPct val="0"/>
+              </a:spcAft>
+              <a:buClr>
+                <a:srgbClr val="F0AB00"/>
+              </a:buClr>
+              <a:buSzPct val="80000"/>
+            </a:pPr>
+            <a:endParaRPr lang="en-US" sz="2400" kern="0" dirty="0" err="1" smtClean="0">
+              <a:ea typeface="Arial Unicode MS" pitchFamily="34" charset="-128"/>
+              <a:cs typeface="Arial Unicode MS" pitchFamily="34" charset="-128"/>
+            </a:endParaRPr>
+          </a:p>
+        </p:txBody>
+      </p:sp>
+      <p:sp>
+        <p:nvSpPr>
+          <p:cNvPr id="3" name="TextBox 2"/>
+          <p:cNvSpPr txBox="1"/>
+          <p:nvPr/>
+        </p:nvSpPr>
+        <p:spPr>
+          <a:xfrm>
+            <a:off x="324000" y="3859988"/>
+            <a:ext cx="6409309" cy="2154436"/>
+          </a:xfrm>
+          <a:prstGeom prst="rect">
+            <a:avLst/>
+          </a:prstGeom>
+          <a:noFill/>
+        </p:spPr>
+        <p:txBody>
+          <a:bodyPr wrap="square" lIns="0" tIns="0" rIns="0" bIns="0" rtlCol="0">
+            <a:spAutoFit/>
+          </a:bodyPr>
+          <a:lstStyle/>
+          <a:p>
+            <a:pPr fontAlgn="base">
+              <a:spcBef>
+                <a:spcPts val="600"/>
+              </a:spcBef>
+              <a:spcAft>
+                <a:spcPct val="0"/>
+              </a:spcAft>
+              <a:buClr>
+                <a:srgbClr val="F0AB00"/>
+              </a:buClr>
+              <a:buSzPct val="80000"/>
+            </a:pPr>
+            <a:r>
+              <a:rPr lang="en-US" sz="2400" kern="0" dirty="0">
+                <a:ea typeface="Arial Unicode MS" pitchFamily="34" charset="-128"/>
+                <a:cs typeface="Arial Unicode MS" pitchFamily="34" charset="-128"/>
+              </a:rPr>
+              <a:t>function </a:t>
+            </a:r>
+            <a:r>
+              <a:rPr lang="en-US" sz="2400" kern="0" dirty="0" err="1">
+                <a:ea typeface="Arial Unicode MS" pitchFamily="34" charset="-128"/>
+                <a:cs typeface="Arial Unicode MS" pitchFamily="34" charset="-128"/>
+              </a:rPr>
+              <a:t>simpleGreet</a:t>
+            </a:r>
+            <a:r>
+              <a:rPr lang="en-US" sz="2400" kern="0" dirty="0">
+                <a:ea typeface="Arial Unicode MS" pitchFamily="34" charset="-128"/>
+                <a:cs typeface="Arial Unicode MS" pitchFamily="34" charset="-128"/>
+              </a:rPr>
+              <a:t>(greeting, name) {</a:t>
+            </a:r>
+          </a:p>
+          <a:p>
+            <a:pPr fontAlgn="base">
+              <a:spcBef>
+                <a:spcPts val="600"/>
+              </a:spcBef>
+              <a:spcAft>
+                <a:spcPct val="0"/>
+              </a:spcAft>
+              <a:buClr>
+                <a:srgbClr val="F0AB00"/>
+              </a:buClr>
+              <a:buSzPct val="80000"/>
+            </a:pPr>
+            <a:r>
+              <a:rPr lang="en-US" sz="2400" kern="0" dirty="0">
+                <a:ea typeface="Arial Unicode MS" pitchFamily="34" charset="-128"/>
+                <a:cs typeface="Arial Unicode MS" pitchFamily="34" charset="-128"/>
+              </a:rPr>
+              <a:t>	console.log(greeting + ", " + name);</a:t>
+            </a:r>
+          </a:p>
+          <a:p>
+            <a:pPr fontAlgn="base">
+              <a:spcBef>
+                <a:spcPts val="600"/>
+              </a:spcBef>
+              <a:spcAft>
+                <a:spcPct val="0"/>
+              </a:spcAft>
+              <a:buClr>
+                <a:srgbClr val="F0AB00"/>
+              </a:buClr>
+              <a:buSzPct val="80000"/>
+            </a:pPr>
+            <a:r>
+              <a:rPr lang="en-US" sz="2400" kern="0" dirty="0" smtClean="0">
+                <a:ea typeface="Arial Unicode MS" pitchFamily="34" charset="-128"/>
+                <a:cs typeface="Arial Unicode MS" pitchFamily="34" charset="-128"/>
+              </a:rPr>
+              <a:t>}</a:t>
+            </a:r>
+            <a:endParaRPr lang="en-US" sz="2400" kern="0" dirty="0">
+              <a:ea typeface="Arial Unicode MS" pitchFamily="34" charset="-128"/>
+              <a:cs typeface="Arial Unicode MS" pitchFamily="34" charset="-128"/>
+            </a:endParaRPr>
+          </a:p>
+          <a:p>
+            <a:pPr fontAlgn="base">
+              <a:spcBef>
+                <a:spcPts val="600"/>
+              </a:spcBef>
+              <a:spcAft>
+                <a:spcPct val="0"/>
+              </a:spcAft>
+              <a:buClr>
+                <a:srgbClr val="F0AB00"/>
+              </a:buClr>
+              <a:buSzPct val="80000"/>
+            </a:pPr>
+            <a:r>
+              <a:rPr lang="en-US" sz="2400" kern="0" dirty="0" err="1">
+                <a:ea typeface="Arial Unicode MS" pitchFamily="34" charset="-128"/>
+                <a:cs typeface="Arial Unicode MS" pitchFamily="34" charset="-128"/>
+              </a:rPr>
+              <a:t>simpleGreet</a:t>
+            </a:r>
+            <a:r>
+              <a:rPr lang="en-US" sz="2400" kern="0" dirty="0">
+                <a:ea typeface="Arial Unicode MS" pitchFamily="34" charset="-128"/>
+                <a:cs typeface="Arial Unicode MS" pitchFamily="34" charset="-128"/>
+              </a:rPr>
+              <a:t>("Hello", "Orlando");</a:t>
+            </a:r>
+          </a:p>
+          <a:p>
+            <a:pPr fontAlgn="base">
+              <a:spcBef>
+                <a:spcPts val="600"/>
+              </a:spcBef>
+              <a:spcAft>
+                <a:spcPct val="0"/>
+              </a:spcAft>
+              <a:buClr>
+                <a:srgbClr val="F0AB00"/>
+              </a:buClr>
+              <a:buSzPct val="80000"/>
+            </a:pPr>
+            <a:r>
+              <a:rPr lang="en-US" sz="2400" kern="0" dirty="0" err="1">
+                <a:ea typeface="Arial Unicode MS" pitchFamily="34" charset="-128"/>
+                <a:cs typeface="Arial Unicode MS" pitchFamily="34" charset="-128"/>
+              </a:rPr>
+              <a:t>simpleGreet</a:t>
+            </a:r>
+            <a:r>
+              <a:rPr lang="en-US" sz="2400" kern="0" dirty="0">
+                <a:ea typeface="Arial Unicode MS" pitchFamily="34" charset="-128"/>
+                <a:cs typeface="Arial Unicode MS" pitchFamily="34" charset="-128"/>
+              </a:rPr>
+              <a:t>("Hello", "Jerry");</a:t>
+            </a:r>
+            <a:endParaRPr lang="en-US" sz="2400" kern="0" dirty="0" smtClean="0">
+              <a:ea typeface="Arial Unicode MS" pitchFamily="34" charset="-128"/>
+              <a:cs typeface="Arial Unicode MS" pitchFamily="34" charset="-128"/>
+            </a:endParaRPr>
+          </a:p>
+        </p:txBody>
+      </p:sp>
+      <p:pic>
+        <p:nvPicPr>
+          <p:cNvPr id="4" name="Picture 3"/>
+          <p:cNvPicPr>
+            <a:picLocks noChangeAspect="1"/>
+          </p:cNvPicPr>
+          <p:nvPr/>
+        </p:nvPicPr>
+        <p:blipFill>
+          <a:blip r:embed="rId4"/>
+          <a:stretch>
+            <a:fillRect/>
+          </a:stretch>
+        </p:blipFill>
+        <p:spPr>
+          <a:xfrm>
+            <a:off x="7441075" y="4702310"/>
+            <a:ext cx="2312526" cy="892555"/>
+          </a:xfrm>
+          <a:prstGeom prst="rect">
+            <a:avLst/>
+          </a:prstGeom>
+        </p:spPr>
+      </p:pic>
+    </p:spTree>
+    <p:extLst>
+      <p:ext uri="{BB962C8B-B14F-4D97-AF65-F5344CB8AC3E}">
+        <p14:creationId xmlns:p14="http://schemas.microsoft.com/office/powerpoint/2010/main" val="3381381217"/>
+      </p:ext>
+    </p:extLst>
+  </p:cSld>
+  <p:clrMapOvr>
+    <a:masterClrMapping/>
+  </p:clrMapOvr>
+  <p:timing>
+    <p:tnLst>
+      <p:par>
+        <p:cTn id="1" dur="indefinite" restart="never" nodeType="tmRoot">
+          <p:childTnLst>
+            <p:seq concurrent="1" nextAc="seek">
+              <p:cTn id="2" dur="indefinite" nodeType="mainSeq">
+                <p:childTnLst>
+                  <p:par>
+                    <p:cTn id="3" fill="hold">
+                      <p:stCondLst>
+                        <p:cond delay="indefinite"/>
+                      </p:stCondLst>
+                      <p:childTnLst>
+                        <p:par>
+                          <p:cTn id="4" fill="hold">
+                            <p:stCondLst>
+                              <p:cond delay="0"/>
+                            </p:stCondLst>
+                            <p:childTnLst>
+                              <p:par>
+                                <p:cTn id="5" presetID="1" presetClass="entr" presetSubtype="0" fill="hold" grpId="0" nodeType="clickEffect">
+                                  <p:stCondLst>
+                                    <p:cond delay="0"/>
+                                  </p:stCondLst>
+                                  <p:childTnLst>
+                                    <p:set>
+                                      <p:cBhvr>
+                                        <p:cTn id="6" dur="1" fill="hold">
+                                          <p:stCondLst>
+                                            <p:cond delay="0"/>
+                                          </p:stCondLst>
+                                        </p:cTn>
+                                        <p:tgtEl>
+                                          <p:spTgt spid="3"/>
+                                        </p:tgtEl>
+                                        <p:attrNameLst>
+                                          <p:attrName>style.visibility</p:attrName>
+                                        </p:attrNameLst>
+                                      </p:cBhvr>
+                                      <p:to>
+                                        <p:strVal val="visible"/>
+                                      </p:to>
+                                    </p:set>
+                                  </p:childTnLst>
+                                </p:cTn>
+                              </p:par>
+                            </p:childTnLst>
+                          </p:cTn>
+                        </p:par>
+                      </p:childTnLst>
+                    </p:cTn>
+                  </p:par>
+                  <p:par>
+                    <p:cTn id="7" fill="hold">
+                      <p:stCondLst>
+                        <p:cond delay="indefinite"/>
+                      </p:stCondLst>
+                      <p:childTnLst>
+                        <p:par>
+                          <p:cTn id="8" fill="hold">
+                            <p:stCondLst>
+                              <p:cond delay="0"/>
+                            </p:stCondLst>
+                            <p:childTnLst>
+                              <p:par>
+                                <p:cTn id="9" presetID="1" presetClass="entr" presetSubtype="0" fill="hold" nodeType="clickEffect">
+                                  <p:stCondLst>
+                                    <p:cond delay="0"/>
+                                  </p:stCondLst>
+                                  <p:childTnLst>
+                                    <p:set>
+                                      <p:cBhvr>
+                                        <p:cTn id="10" dur="1" fill="hold">
+                                          <p:stCondLst>
+                                            <p:cond delay="0"/>
+                                          </p:stCondLst>
+                                        </p:cTn>
+                                        <p:tgtEl>
+                                          <p:spTgt spid="4"/>
+                                        </p:tgtEl>
+                                        <p:attrNameLst>
+                                          <p:attrName>style.visibility</p:attrName>
+                                        </p:attrNameLst>
+                                      </p:cBhvr>
+                                      <p:to>
+                                        <p:strVal val="visible"/>
+                                      </p:to>
+                                    </p:set>
+                                  </p:childTnLst>
+                                </p:cTn>
+                              </p:par>
+                            </p:childTnLst>
+                          </p:cTn>
+                        </p:par>
+                      </p:childTnLst>
+                    </p:cTn>
+                  </p:par>
+                </p:childTnLst>
+              </p:cTn>
+              <p:prevCondLst>
+                <p:cond evt="onPrev" delay="0">
+                  <p:tgtEl>
+                    <p:sldTgt/>
+                  </p:tgtEl>
+                </p:cond>
+              </p:prevCondLst>
+              <p:nextCondLst>
+                <p:cond evt="onNext" delay="0">
+                  <p:tgtEl>
+                    <p:sldTgt/>
+                  </p:tgtEl>
+                </p:cond>
+              </p:nextCondLst>
+            </p:seq>
+          </p:childTnLst>
+        </p:cTn>
+      </p:par>
+    </p:tnLst>
+    <p:bldLst>
+      <p:bldP spid="3" grpId="0"/>
+    </p:bldLst>
+  </p:timing>
+</p:sld>
+</file>
+
+<file path=ppt/slides/slide23.xml><?xml version="1.0" encoding="utf-8"?>
+<p:sld xmlns:a="http://schemas.openxmlformats.org/drawingml/2006/main" xmlns:r="http://schemas.openxmlformats.org/officeDocument/2006/relationships" xmlns:p="http://schemas.openxmlformats.org/presentationml/2006/main">
+  <p:cSld>
+    <p:spTree>
+      <p:nvGrpSpPr>
+        <p:cNvPr id="1" name=""/>
+        <p:cNvGrpSpPr/>
+        <p:nvPr/>
+      </p:nvGrpSpPr>
+      <p:grpSpPr>
+        <a:xfrm>
+          <a:off x="0" y="0"/>
+          <a:ext cx="0" cy="0"/>
+          <a:chOff x="0" y="0"/>
+          <a:chExt cx="0" cy="0"/>
+        </a:xfrm>
+      </p:grpSpPr>
+      <p:sp>
+        <p:nvSpPr>
+          <p:cNvPr id="2" name="Title 1"/>
+          <p:cNvSpPr>
+            <a:spLocks noGrp="1"/>
+          </p:cNvSpPr>
+          <p:nvPr>
+            <p:ph type="title"/>
+          </p:nvPr>
+        </p:nvSpPr>
+        <p:spPr/>
+        <p:txBody>
+          <a:bodyPr/>
+          <a:lstStyle/>
+          <a:p>
+            <a:r>
+              <a:rPr lang="en-US" dirty="0"/>
+              <a:t>Currying</a:t>
+            </a:r>
+          </a:p>
+        </p:txBody>
+      </p:sp>
+      <p:pic>
+        <p:nvPicPr>
+          <p:cNvPr id="5" name="Picture 4"/>
+          <p:cNvPicPr>
+            <a:picLocks noChangeAspect="1"/>
+          </p:cNvPicPr>
+          <p:nvPr/>
+        </p:nvPicPr>
+        <p:blipFill>
+          <a:blip r:embed="rId2"/>
+          <a:stretch>
+            <a:fillRect/>
+          </a:stretch>
+        </p:blipFill>
+        <p:spPr>
+          <a:xfrm>
+            <a:off x="324000" y="1355329"/>
+            <a:ext cx="5582882" cy="2690197"/>
+          </a:xfrm>
+          <a:prstGeom prst="rect">
+            <a:avLst/>
+          </a:prstGeom>
+        </p:spPr>
+      </p:pic>
+      <p:pic>
+        <p:nvPicPr>
+          <p:cNvPr id="6" name="Picture 5"/>
+          <p:cNvPicPr>
+            <a:picLocks noChangeAspect="1"/>
+          </p:cNvPicPr>
+          <p:nvPr/>
+        </p:nvPicPr>
+        <p:blipFill>
+          <a:blip r:embed="rId3"/>
+          <a:stretch>
+            <a:fillRect/>
+          </a:stretch>
+        </p:blipFill>
+        <p:spPr>
+          <a:xfrm>
+            <a:off x="2560201" y="4045525"/>
+            <a:ext cx="8262390" cy="2133601"/>
+          </a:xfrm>
+          <a:prstGeom prst="rect">
+            <a:avLst/>
+          </a:prstGeom>
+        </p:spPr>
+      </p:pic>
+    </p:spTree>
+    <p:extLst>
+      <p:ext uri="{BB962C8B-B14F-4D97-AF65-F5344CB8AC3E}">
+        <p14:creationId xmlns:p14="http://schemas.microsoft.com/office/powerpoint/2010/main" val="3719723145"/>
+      </p:ext>
+    </p:extLst>
+  </p:cSld>
+  <p:clrMapOvr>
+    <a:masterClrMapping/>
+  </p:clrMapOvr>
+  <p:timing>
+    <p:tnLst>
+      <p:par>
+        <p:cTn id="1" dur="indefinite" restart="never" nodeType="tmRoot">
+          <p:childTnLst>
+            <p:seq concurrent="1" nextAc="seek">
+              <p:cTn id="2" dur="indefinite" nodeType="mainSeq">
+                <p:childTnLst>
+                  <p:par>
+                    <p:cTn id="3" fill="hold">
+                      <p:stCondLst>
+                        <p:cond delay="indefinite"/>
+                      </p:stCondLst>
+                      <p:childTnLst>
+                        <p:par>
+                          <p:cTn id="4" fill="hold">
+                            <p:stCondLst>
+                              <p:cond delay="0"/>
+                            </p:stCondLst>
+                            <p:childTnLst>
+                              <p:par>
+                                <p:cTn id="5" presetID="1" presetClass="entr" presetSubtype="0" fill="hold" nodeType="clickEffect">
+                                  <p:stCondLst>
+                                    <p:cond delay="0"/>
+                                  </p:stCondLst>
+                                  <p:childTnLst>
+                                    <p:set>
+                                      <p:cBhvr>
+                                        <p:cTn id="6" dur="1" fill="hold">
+                                          <p:stCondLst>
+                                            <p:cond delay="0"/>
+                                          </p:stCondLst>
+                                        </p:cTn>
+                                        <p:tgtEl>
+                                          <p:spTgt spid="6"/>
+                                        </p:tgtEl>
+                                        <p:attrNameLst>
+                                          <p:attrName>style.visibility</p:attrName>
+                                        </p:attrNameLst>
+                                      </p:cBhvr>
+                                      <p:to>
+                                        <p:strVal val="visible"/>
+                                      </p:to>
+                                    </p:set>
+                                  </p:childTnLst>
+                                </p:cTn>
+                              </p:par>
+                            </p:childTnLst>
+                          </p:cTn>
+                        </p:par>
+                      </p:childTnLst>
+                    </p:cTn>
+                  </p:par>
+                </p:childTnLst>
+              </p:cTn>
+              <p:prevCondLst>
+                <p:cond evt="onPrev" delay="0">
+                  <p:tgtEl>
+                    <p:sldTgt/>
+                  </p:tgtEl>
+                </p:cond>
+              </p:prevCondLst>
+              <p:nextCondLst>
+                <p:cond evt="onNext" delay="0">
+                  <p:tgtEl>
+                    <p:sldTgt/>
+                  </p:tgtEl>
+                </p:cond>
+              </p:nextCondLst>
+            </p:seq>
+          </p:childTnLst>
+        </p:cTn>
+      </p:par>
+    </p:tnLst>
+  </p:timing>
+</p:sld>
+</file>
+
+<file path=ppt/slides/slide24.xml><?xml version="1.0" encoding="utf-8"?>
+<p:sld xmlns:a="http://schemas.openxmlformats.org/drawingml/2006/main" xmlns:r="http://schemas.openxmlformats.org/officeDocument/2006/relationships" xmlns:p="http://schemas.openxmlformats.org/presentationml/2006/main">
+  <p:cSld>
+    <p:spTree>
+      <p:nvGrpSpPr>
+        <p:cNvPr id="1" name=""/>
+        <p:cNvGrpSpPr/>
+        <p:nvPr/>
+      </p:nvGrpSpPr>
+      <p:grpSpPr>
+        <a:xfrm>
+          <a:off x="0" y="0"/>
+          <a:ext cx="0" cy="0"/>
+          <a:chOff x="0" y="0"/>
+          <a:chExt cx="0" cy="0"/>
+        </a:xfrm>
+      </p:grpSpPr>
+      <p:sp>
+        <p:nvSpPr>
+          <p:cNvPr id="2" name="Title 1"/>
+          <p:cNvSpPr>
+            <a:spLocks noGrp="1"/>
+          </p:cNvSpPr>
+          <p:nvPr>
+            <p:ph type="title"/>
+          </p:nvPr>
+        </p:nvSpPr>
+        <p:spPr/>
+        <p:txBody>
+          <a:bodyPr/>
+          <a:lstStyle/>
+          <a:p>
+            <a:r>
+              <a:rPr lang="en-US" altLang="zh-CN" dirty="0" smtClean="0"/>
+              <a:t>Why and When Currying</a:t>
+            </a:r>
+            <a:endParaRPr lang="en-US" dirty="0"/>
+          </a:p>
+        </p:txBody>
+      </p:sp>
+      <p:sp>
+        <p:nvSpPr>
+          <p:cNvPr id="5" name="TextBox 4"/>
+          <p:cNvSpPr txBox="1"/>
+          <p:nvPr/>
+        </p:nvSpPr>
+        <p:spPr>
+          <a:xfrm>
+            <a:off x="324000" y="1413164"/>
+            <a:ext cx="11258400" cy="984885"/>
+          </a:xfrm>
+          <a:prstGeom prst="rect">
+            <a:avLst/>
+          </a:prstGeom>
+          <a:noFill/>
+        </p:spPr>
+        <p:txBody>
+          <a:bodyPr wrap="square" lIns="0" tIns="0" rIns="0" bIns="0" rtlCol="0">
+            <a:spAutoFit/>
+          </a:bodyPr>
+          <a:lstStyle/>
+          <a:p>
+            <a:pPr fontAlgn="base">
+              <a:spcBef>
+                <a:spcPts val="600"/>
+              </a:spcBef>
+              <a:spcAft>
+                <a:spcPct val="0"/>
+              </a:spcAft>
+              <a:buClr>
+                <a:srgbClr val="F0AB00"/>
+              </a:buClr>
+              <a:buSzPct val="80000"/>
+            </a:pPr>
+            <a:r>
+              <a:rPr lang="en-US" sz="3200" kern="0" dirty="0" smtClean="0">
+                <a:ea typeface="Arial Unicode MS" pitchFamily="34" charset="-128"/>
+                <a:cs typeface="Arial Unicode MS" pitchFamily="34" charset="-128"/>
+              </a:rPr>
+              <a:t>It is a natural product in a given programming language where the function could be treated as first class.</a:t>
+            </a:r>
+            <a:endParaRPr lang="en-US" sz="3200" kern="0" dirty="0" smtClean="0">
+              <a:ea typeface="Arial Unicode MS" pitchFamily="34" charset="-128"/>
+              <a:cs typeface="Arial Unicode MS" pitchFamily="34" charset="-128"/>
+            </a:endParaRPr>
+          </a:p>
+        </p:txBody>
+      </p:sp>
+      <p:pic>
+        <p:nvPicPr>
+          <p:cNvPr id="6" name="Picture 5"/>
+          <p:cNvPicPr>
+            <a:picLocks noChangeAspect="1"/>
+          </p:cNvPicPr>
+          <p:nvPr/>
+        </p:nvPicPr>
+        <p:blipFill>
+          <a:blip r:embed="rId2"/>
+          <a:stretch>
+            <a:fillRect/>
+          </a:stretch>
+        </p:blipFill>
+        <p:spPr>
+          <a:xfrm>
+            <a:off x="324000" y="2730963"/>
+            <a:ext cx="5704174" cy="1066892"/>
+          </a:xfrm>
+          <a:prstGeom prst="rect">
+            <a:avLst/>
+          </a:prstGeom>
+        </p:spPr>
+      </p:pic>
+      <p:pic>
+        <p:nvPicPr>
+          <p:cNvPr id="7" name="Picture 6"/>
+          <p:cNvPicPr>
+            <a:picLocks noChangeAspect="1"/>
+          </p:cNvPicPr>
+          <p:nvPr/>
+        </p:nvPicPr>
+        <p:blipFill>
+          <a:blip r:embed="rId3"/>
+          <a:stretch>
+            <a:fillRect/>
+          </a:stretch>
+        </p:blipFill>
+        <p:spPr>
+          <a:xfrm>
+            <a:off x="6440642" y="2730963"/>
+            <a:ext cx="4412362" cy="1066892"/>
+          </a:xfrm>
+          <a:prstGeom prst="rect">
+            <a:avLst/>
+          </a:prstGeom>
+        </p:spPr>
+      </p:pic>
+      <p:sp>
+        <p:nvSpPr>
+          <p:cNvPr id="8" name="TextBox 7"/>
+          <p:cNvSpPr txBox="1"/>
+          <p:nvPr/>
+        </p:nvSpPr>
+        <p:spPr>
+          <a:xfrm>
+            <a:off x="1759527" y="3990109"/>
+            <a:ext cx="2632364" cy="276999"/>
+          </a:xfrm>
+          <a:prstGeom prst="rect">
+            <a:avLst/>
+          </a:prstGeom>
+          <a:noFill/>
+        </p:spPr>
+        <p:txBody>
+          <a:bodyPr wrap="square" lIns="0" tIns="0" rIns="0" bIns="0" rtlCol="0">
+            <a:spAutoFit/>
+          </a:bodyPr>
+          <a:lstStyle/>
+          <a:p>
+            <a:pPr fontAlgn="base">
+              <a:spcBef>
+                <a:spcPts val="600"/>
+              </a:spcBef>
+              <a:spcAft>
+                <a:spcPct val="0"/>
+              </a:spcAft>
+              <a:buClr>
+                <a:srgbClr val="F0AB00"/>
+              </a:buClr>
+              <a:buSzPct val="80000"/>
+            </a:pPr>
+            <a:r>
+              <a:rPr lang="en-US" sz="1800" kern="0" dirty="0" smtClean="0">
+                <a:ea typeface="Arial Unicode MS" pitchFamily="34" charset="-128"/>
+                <a:cs typeface="Arial Unicode MS" pitchFamily="34" charset="-128"/>
+              </a:rPr>
+              <a:t>approach1</a:t>
+            </a:r>
+            <a:endParaRPr lang="en-US" sz="1800" kern="0" dirty="0" smtClean="0">
+              <a:ea typeface="Arial Unicode MS" pitchFamily="34" charset="-128"/>
+              <a:cs typeface="Arial Unicode MS" pitchFamily="34" charset="-128"/>
+            </a:endParaRPr>
+          </a:p>
+        </p:txBody>
+      </p:sp>
+      <p:sp>
+        <p:nvSpPr>
+          <p:cNvPr id="9" name="TextBox 8"/>
+          <p:cNvSpPr txBox="1"/>
+          <p:nvPr/>
+        </p:nvSpPr>
+        <p:spPr>
+          <a:xfrm>
+            <a:off x="7813963" y="3990108"/>
+            <a:ext cx="2632364" cy="276999"/>
+          </a:xfrm>
+          <a:prstGeom prst="rect">
+            <a:avLst/>
+          </a:prstGeom>
+          <a:noFill/>
+        </p:spPr>
+        <p:txBody>
+          <a:bodyPr wrap="square" lIns="0" tIns="0" rIns="0" bIns="0" rtlCol="0">
+            <a:spAutoFit/>
+          </a:bodyPr>
+          <a:lstStyle/>
+          <a:p>
+            <a:pPr fontAlgn="base">
+              <a:spcBef>
+                <a:spcPts val="600"/>
+              </a:spcBef>
+              <a:spcAft>
+                <a:spcPct val="0"/>
+              </a:spcAft>
+              <a:buClr>
+                <a:srgbClr val="F0AB00"/>
+              </a:buClr>
+              <a:buSzPct val="80000"/>
+            </a:pPr>
+            <a:r>
+              <a:rPr lang="en-US" sz="1800" kern="0" dirty="0" smtClean="0">
+                <a:ea typeface="Arial Unicode MS" pitchFamily="34" charset="-128"/>
+                <a:cs typeface="Arial Unicode MS" pitchFamily="34" charset="-128"/>
+              </a:rPr>
+              <a:t>approach2</a:t>
+            </a:r>
+            <a:endParaRPr lang="en-US" sz="1800" kern="0" dirty="0" smtClean="0">
+              <a:ea typeface="Arial Unicode MS" pitchFamily="34" charset="-128"/>
+              <a:cs typeface="Arial Unicode MS" pitchFamily="34" charset="-128"/>
+            </a:endParaRPr>
+          </a:p>
+        </p:txBody>
+      </p:sp>
+      <p:sp>
+        <p:nvSpPr>
+          <p:cNvPr id="10" name="TextBox 9"/>
+          <p:cNvSpPr txBox="1"/>
+          <p:nvPr/>
+        </p:nvSpPr>
+        <p:spPr>
+          <a:xfrm>
+            <a:off x="324000" y="4627418"/>
+            <a:ext cx="11258400" cy="1077218"/>
+          </a:xfrm>
+          <a:prstGeom prst="rect">
+            <a:avLst/>
+          </a:prstGeom>
+          <a:noFill/>
+        </p:spPr>
+        <p:txBody>
+          <a:bodyPr wrap="square" lIns="0" tIns="0" rIns="0" bIns="0" rtlCol="0">
+            <a:spAutoFit/>
+          </a:bodyPr>
+          <a:lstStyle/>
+          <a:p>
+            <a:pPr fontAlgn="base">
+              <a:spcBef>
+                <a:spcPts val="600"/>
+              </a:spcBef>
+              <a:spcAft>
+                <a:spcPct val="0"/>
+              </a:spcAft>
+              <a:buClr>
+                <a:srgbClr val="F0AB00"/>
+              </a:buClr>
+              <a:buSzPct val="80000"/>
+            </a:pPr>
+            <a:r>
+              <a:rPr lang="en-US" sz="2000" kern="0" dirty="0" smtClean="0">
+                <a:ea typeface="Arial Unicode MS" pitchFamily="34" charset="-128"/>
+                <a:cs typeface="Arial Unicode MS" pitchFamily="34" charset="-128"/>
+              </a:rPr>
+              <a:t>Approach1: Could be used when multiple arguments only makes sense when they work as a whole.</a:t>
+            </a:r>
+          </a:p>
+          <a:p>
+            <a:pPr fontAlgn="base">
+              <a:spcBef>
+                <a:spcPts val="600"/>
+              </a:spcBef>
+              <a:spcAft>
+                <a:spcPct val="0"/>
+              </a:spcAft>
+              <a:buClr>
+                <a:srgbClr val="F0AB00"/>
+              </a:buClr>
+              <a:buSzPct val="80000"/>
+            </a:pPr>
+            <a:endParaRPr lang="en-US" sz="2000" kern="0" dirty="0">
+              <a:ea typeface="Arial Unicode MS" pitchFamily="34" charset="-128"/>
+              <a:cs typeface="Arial Unicode MS" pitchFamily="34" charset="-128"/>
+            </a:endParaRPr>
+          </a:p>
+          <a:p>
+            <a:pPr fontAlgn="base">
+              <a:spcBef>
+                <a:spcPts val="600"/>
+              </a:spcBef>
+              <a:spcAft>
+                <a:spcPct val="0"/>
+              </a:spcAft>
+              <a:buClr>
+                <a:srgbClr val="F0AB00"/>
+              </a:buClr>
+              <a:buSzPct val="80000"/>
+            </a:pPr>
+            <a:r>
+              <a:rPr lang="en-US" sz="2000" kern="0" dirty="0" smtClean="0">
+                <a:ea typeface="Arial Unicode MS" pitchFamily="34" charset="-128"/>
+                <a:cs typeface="Arial Unicode MS" pitchFamily="34" charset="-128"/>
+              </a:rPr>
+              <a:t>Approach2: Could be used if it makes sense to specify some arguments in a sequential way.  </a:t>
+            </a:r>
+            <a:endParaRPr lang="en-US" sz="2000" kern="0" dirty="0" smtClean="0">
+              <a:ea typeface="Arial Unicode MS" pitchFamily="34" charset="-128"/>
+              <a:cs typeface="Arial Unicode MS" pitchFamily="34" charset="-128"/>
+            </a:endParaRPr>
+          </a:p>
+        </p:txBody>
+      </p:sp>
+    </p:spTree>
+    <p:extLst>
+      <p:ext uri="{BB962C8B-B14F-4D97-AF65-F5344CB8AC3E}">
+        <p14:creationId xmlns:p14="http://schemas.microsoft.com/office/powerpoint/2010/main" val="3678825893"/>
+      </p:ext>
+    </p:extLst>
+  </p:cSld>
+  <p:clrMapOvr>
+    <a:masterClrMapping/>
+  </p:clrMapOvr>
+  <p:timing>
+    <p:tnLst>
+      <p:par>
+        <p:cTn id="1" dur="indefinite" restart="never" nodeType="tmRoot">
+          <p:childTnLst>
+            <p:seq concurrent="1" nextAc="seek">
+              <p:cTn id="2" dur="indefinite" nodeType="mainSeq">
+                <p:childTnLst>
+                  <p:par>
+                    <p:cTn id="3" fill="hold">
+                      <p:stCondLst>
+                        <p:cond delay="indefinite"/>
+                      </p:stCondLst>
+                      <p:childTnLst>
+                        <p:par>
+                          <p:cTn id="4" fill="hold">
+                            <p:stCondLst>
+                              <p:cond delay="0"/>
+                            </p:stCondLst>
+                            <p:childTnLst>
+                              <p:par>
+                                <p:cTn id="5" presetID="1" presetClass="entr" presetSubtype="0" fill="hold" nodeType="clickEffect">
+                                  <p:stCondLst>
+                                    <p:cond delay="0"/>
+                                  </p:stCondLst>
+                                  <p:childTnLst>
+                                    <p:set>
+                                      <p:cBhvr>
+                                        <p:cTn id="6" dur="1" fill="hold">
+                                          <p:stCondLst>
+                                            <p:cond delay="0"/>
+                                          </p:stCondLst>
+                                        </p:cTn>
+                                        <p:tgtEl>
+                                          <p:spTgt spid="6"/>
+                                        </p:tgtEl>
+                                        <p:attrNameLst>
+                                          <p:attrName>style.visibility</p:attrName>
+                                        </p:attrNameLst>
+                                      </p:cBhvr>
+                                      <p:to>
+                                        <p:strVal val="visible"/>
+                                      </p:to>
+                                    </p:set>
+                                  </p:childTnLst>
+                                </p:cTn>
+                              </p:par>
+                              <p:par>
+                                <p:cTn id="7" presetID="1" presetClass="entr" presetSubtype="0" fill="hold" nodeType="withEffect">
+                                  <p:stCondLst>
+                                    <p:cond delay="0"/>
+                                  </p:stCondLst>
+                                  <p:childTnLst>
+                                    <p:set>
+                                      <p:cBhvr>
+                                        <p:cTn id="8" dur="1" fill="hold">
+                                          <p:stCondLst>
+                                            <p:cond delay="0"/>
+                                          </p:stCondLst>
+                                        </p:cTn>
+                                        <p:tgtEl>
+                                          <p:spTgt spid="7"/>
+                                        </p:tgtEl>
+                                        <p:attrNameLst>
+                                          <p:attrName>style.visibility</p:attrName>
+                                        </p:attrNameLst>
+                                      </p:cBhvr>
+                                      <p:to>
+                                        <p:strVal val="visible"/>
+                                      </p:to>
+                                    </p:set>
+                                  </p:childTnLst>
+                                </p:cTn>
+                              </p:par>
+                              <p:par>
+                                <p:cTn id="9" presetID="1" presetClass="entr" presetSubtype="0" fill="hold" grpId="0" nodeType="withEffect">
+                                  <p:stCondLst>
+                                    <p:cond delay="0"/>
+                                  </p:stCondLst>
+                                  <p:childTnLst>
+                                    <p:set>
+                                      <p:cBhvr>
+                                        <p:cTn id="10" dur="1" fill="hold">
+                                          <p:stCondLst>
+                                            <p:cond delay="0"/>
+                                          </p:stCondLst>
+                                        </p:cTn>
+                                        <p:tgtEl>
+                                          <p:spTgt spid="8"/>
+                                        </p:tgtEl>
+                                        <p:attrNameLst>
+                                          <p:attrName>style.visibility</p:attrName>
+                                        </p:attrNameLst>
+                                      </p:cBhvr>
+                                      <p:to>
+                                        <p:strVal val="visible"/>
+                                      </p:to>
+                                    </p:set>
+                                  </p:childTnLst>
+                                </p:cTn>
+                              </p:par>
+                              <p:par>
+                                <p:cTn id="11" presetID="1" presetClass="entr" presetSubtype="0" fill="hold" grpId="0" nodeType="withEffect">
+                                  <p:stCondLst>
+                                    <p:cond delay="0"/>
+                                  </p:stCondLst>
+                                  <p:childTnLst>
+                                    <p:set>
+                                      <p:cBhvr>
+                                        <p:cTn id="12" dur="1" fill="hold">
+                                          <p:stCondLst>
+                                            <p:cond delay="0"/>
+                                          </p:stCondLst>
+                                        </p:cTn>
+                                        <p:tgtEl>
+                                          <p:spTgt spid="9"/>
+                                        </p:tgtEl>
+                                        <p:attrNameLst>
+                                          <p:attrName>style.visibility</p:attrName>
+                                        </p:attrNameLst>
+                                      </p:cBhvr>
+                                      <p:to>
+                                        <p:strVal val="visible"/>
+                                      </p:to>
+                                    </p:set>
+                                  </p:childTnLst>
+                                </p:cTn>
+                              </p:par>
+                            </p:childTnLst>
+                          </p:cTn>
+                        </p:par>
+                      </p:childTnLst>
+                    </p:cTn>
+                  </p:par>
+                  <p:par>
+                    <p:cTn id="13" fill="hold">
+                      <p:stCondLst>
+                        <p:cond delay="indefinite"/>
+                      </p:stCondLst>
+                      <p:childTnLst>
+                        <p:par>
+                          <p:cTn id="14" fill="hold">
+                            <p:stCondLst>
+                              <p:cond delay="0"/>
+                            </p:stCondLst>
+                            <p:childTnLst>
+                              <p:par>
+                                <p:cTn id="15" presetID="1" presetClass="entr" presetSubtype="0" fill="hold" grpId="0" nodeType="clickEffect">
+                                  <p:stCondLst>
+                                    <p:cond delay="0"/>
+                                  </p:stCondLst>
+                                  <p:childTnLst>
+                                    <p:set>
+                                      <p:cBhvr>
+                                        <p:cTn id="16" dur="1" fill="hold">
+                                          <p:stCondLst>
+                                            <p:cond delay="0"/>
+                                          </p:stCondLst>
+                                        </p:cTn>
+                                        <p:tgtEl>
+                                          <p:spTgt spid="10"/>
+                                        </p:tgtEl>
+                                        <p:attrNameLst>
+                                          <p:attrName>style.visibility</p:attrName>
+                                        </p:attrNameLst>
+                                      </p:cBhvr>
+                                      <p:to>
+                                        <p:strVal val="visible"/>
+                                      </p:to>
+                                    </p:set>
+                                  </p:childTnLst>
+                                </p:cTn>
+                              </p:par>
+                            </p:childTnLst>
+                          </p:cTn>
+                        </p:par>
+                      </p:childTnLst>
+                    </p:cTn>
+                  </p:par>
+                </p:childTnLst>
+              </p:cTn>
+              <p:prevCondLst>
+                <p:cond evt="onPrev" delay="0">
+                  <p:tgtEl>
+                    <p:sldTgt/>
+                  </p:tgtEl>
+                </p:cond>
+              </p:prevCondLst>
+              <p:nextCondLst>
+                <p:cond evt="onNext" delay="0">
+                  <p:tgtEl>
+                    <p:sldTgt/>
+                  </p:tgtEl>
+                </p:cond>
+              </p:nextCondLst>
+            </p:seq>
+          </p:childTnLst>
+        </p:cTn>
+      </p:par>
+    </p:tnLst>
+    <p:bldLst>
+      <p:bldP spid="8" grpId="0"/>
+      <p:bldP spid="9" grpId="0"/>
+      <p:bldP spid="10" grpId="0"/>
+    </p:bldLst>
+  </p:timing>
+</p:sld>
+</file>
+
+<file path=ppt/slides/slide25.xml><?xml version="1.0" encoding="utf-8"?>
+<p:sld xmlns:a="http://schemas.openxmlformats.org/drawingml/2006/main" xmlns:r="http://schemas.openxmlformats.org/officeDocument/2006/relationships" xmlns:p="http://schemas.openxmlformats.org/presentationml/2006/main">
+  <p:cSld>
+    <p:spTree>
+      <p:nvGrpSpPr>
+        <p:cNvPr id="1" name=""/>
+        <p:cNvGrpSpPr/>
+        <p:nvPr/>
+      </p:nvGrpSpPr>
+      <p:grpSpPr>
+        <a:xfrm>
+          <a:off x="0" y="0"/>
+          <a:ext cx="0" cy="0"/>
+          <a:chOff x="0" y="0"/>
+          <a:chExt cx="0" cy="0"/>
+        </a:xfrm>
+      </p:grpSpPr>
+      <p:sp>
+        <p:nvSpPr>
+          <p:cNvPr id="2" name="Title 1"/>
+          <p:cNvSpPr>
+            <a:spLocks noGrp="1"/>
+          </p:cNvSpPr>
+          <p:nvPr>
+            <p:ph type="title"/>
+          </p:nvPr>
+        </p:nvSpPr>
+        <p:spPr/>
+        <p:txBody>
+          <a:bodyPr/>
+          <a:lstStyle/>
+          <a:p>
+            <a:r>
+              <a:rPr lang="en-US" dirty="0" smtClean="0"/>
+              <a:t>Currying</a:t>
+            </a:r>
+            <a:endParaRPr lang="en-US" dirty="0"/>
+          </a:p>
+        </p:txBody>
+      </p:sp>
+      <p:sp>
+        <p:nvSpPr>
+          <p:cNvPr id="5" name="TextBox 4"/>
+          <p:cNvSpPr txBox="1"/>
+          <p:nvPr/>
+        </p:nvSpPr>
+        <p:spPr>
+          <a:xfrm>
+            <a:off x="324000" y="1385455"/>
+            <a:ext cx="11244545" cy="861774"/>
+          </a:xfrm>
+          <a:prstGeom prst="rect">
+            <a:avLst/>
+          </a:prstGeom>
+          <a:noFill/>
+        </p:spPr>
+        <p:txBody>
+          <a:bodyPr wrap="square" lIns="0" tIns="0" rIns="0" bIns="0" rtlCol="0">
+            <a:spAutoFit/>
+          </a:bodyPr>
+          <a:lstStyle/>
+          <a:p>
+            <a:pPr fontAlgn="base">
+              <a:spcBef>
+                <a:spcPts val="600"/>
+              </a:spcBef>
+              <a:spcAft>
+                <a:spcPct val="0"/>
+              </a:spcAft>
+              <a:buClr>
+                <a:srgbClr val="F0AB00"/>
+              </a:buClr>
+              <a:buSzPct val="80000"/>
+            </a:pPr>
+            <a:r>
+              <a:rPr lang="en-US" sz="2800" kern="0" dirty="0" smtClean="0">
+                <a:ea typeface="Arial Unicode MS" pitchFamily="34" charset="-128"/>
+                <a:cs typeface="Arial Unicode MS" pitchFamily="34" charset="-128"/>
+              </a:rPr>
+              <a:t>Currying can enable us to combine the functions in a </a:t>
+            </a:r>
+            <a:r>
+              <a:rPr lang="en-US" sz="2800" b="1" kern="0" dirty="0" smtClean="0">
+                <a:solidFill>
+                  <a:srgbClr val="FF0000"/>
+                </a:solidFill>
+                <a:ea typeface="Arial Unicode MS" pitchFamily="34" charset="-128"/>
+                <a:cs typeface="Arial Unicode MS" pitchFamily="34" charset="-128"/>
+              </a:rPr>
+              <a:t>more fine grained </a:t>
+            </a:r>
+            <a:r>
+              <a:rPr lang="en-US" sz="2800" kern="0" dirty="0" smtClean="0">
+                <a:ea typeface="Arial Unicode MS" pitchFamily="34" charset="-128"/>
+                <a:cs typeface="Arial Unicode MS" pitchFamily="34" charset="-128"/>
+              </a:rPr>
+              <a:t>way, to build some </a:t>
+            </a:r>
+            <a:r>
+              <a:rPr lang="en-US" sz="2800" b="1" kern="0" dirty="0" smtClean="0">
+                <a:solidFill>
+                  <a:srgbClr val="FF0000"/>
+                </a:solidFill>
+                <a:ea typeface="Arial Unicode MS" pitchFamily="34" charset="-128"/>
+                <a:cs typeface="Arial Unicode MS" pitchFamily="34" charset="-128"/>
+              </a:rPr>
+              <a:t>customized</a:t>
+            </a:r>
+            <a:r>
+              <a:rPr lang="en-US" sz="2800" kern="0" dirty="0" smtClean="0">
+                <a:ea typeface="Arial Unicode MS" pitchFamily="34" charset="-128"/>
+                <a:cs typeface="Arial Unicode MS" pitchFamily="34" charset="-128"/>
+              </a:rPr>
+              <a:t> functions. </a:t>
+            </a:r>
+            <a:endParaRPr lang="en-US" sz="2800" kern="0" dirty="0" smtClean="0">
+              <a:ea typeface="Arial Unicode MS" pitchFamily="34" charset="-128"/>
+              <a:cs typeface="Arial Unicode MS" pitchFamily="34" charset="-128"/>
+            </a:endParaRPr>
+          </a:p>
+        </p:txBody>
+      </p:sp>
+      <p:pic>
+        <p:nvPicPr>
+          <p:cNvPr id="7" name="Picture 6"/>
+          <p:cNvPicPr>
+            <a:picLocks noChangeAspect="1"/>
+          </p:cNvPicPr>
+          <p:nvPr/>
+        </p:nvPicPr>
+        <p:blipFill>
+          <a:blip r:embed="rId2"/>
+          <a:stretch>
+            <a:fillRect/>
+          </a:stretch>
+        </p:blipFill>
+        <p:spPr>
+          <a:xfrm>
+            <a:off x="324000" y="2452255"/>
+            <a:ext cx="8861564" cy="1029608"/>
+          </a:xfrm>
+          <a:prstGeom prst="rect">
+            <a:avLst/>
+          </a:prstGeom>
+        </p:spPr>
+      </p:pic>
+      <p:pic>
+        <p:nvPicPr>
+          <p:cNvPr id="8" name="Picture 7"/>
+          <p:cNvPicPr>
+            <a:picLocks noChangeAspect="1"/>
+          </p:cNvPicPr>
+          <p:nvPr/>
+        </p:nvPicPr>
+        <p:blipFill>
+          <a:blip r:embed="rId3"/>
+          <a:stretch>
+            <a:fillRect/>
+          </a:stretch>
+        </p:blipFill>
+        <p:spPr>
+          <a:xfrm>
+            <a:off x="324000" y="3875133"/>
+            <a:ext cx="8556764" cy="2409555"/>
+          </a:xfrm>
+          <a:prstGeom prst="rect">
+            <a:avLst/>
+          </a:prstGeom>
+        </p:spPr>
+      </p:pic>
+    </p:spTree>
+    <p:extLst>
+      <p:ext uri="{BB962C8B-B14F-4D97-AF65-F5344CB8AC3E}">
+        <p14:creationId xmlns:p14="http://schemas.microsoft.com/office/powerpoint/2010/main" val="4260317391"/>
+      </p:ext>
+    </p:extLst>
+  </p:cSld>
+  <p:clrMapOvr>
+    <a:masterClrMapping/>
+  </p:clrMapOvr>
+  <p:timing>
+    <p:tnLst>
+      <p:par>
+        <p:cTn id="1" dur="indefinite" restart="never" nodeType="tmRoot">
+          <p:childTnLst>
+            <p:seq concurrent="1" nextAc="seek">
+              <p:cTn id="2" dur="indefinite" nodeType="mainSeq">
+                <p:childTnLst>
+                  <p:par>
+                    <p:cTn id="3" fill="hold">
+                      <p:stCondLst>
+                        <p:cond delay="indefinite"/>
+                      </p:stCondLst>
+                      <p:childTnLst>
+                        <p:par>
+                          <p:cTn id="4" fill="hold">
+                            <p:stCondLst>
+                              <p:cond delay="0"/>
+                            </p:stCondLst>
+                            <p:childTnLst>
+                              <p:par>
+                                <p:cTn id="5" presetID="1" presetClass="entr" presetSubtype="0" fill="hold" nodeType="clickEffect">
+                                  <p:stCondLst>
+                                    <p:cond delay="0"/>
+                                  </p:stCondLst>
+                                  <p:childTnLst>
+                                    <p:set>
+                                      <p:cBhvr>
+                                        <p:cTn id="6" dur="1" fill="hold">
+                                          <p:stCondLst>
+                                            <p:cond delay="0"/>
+                                          </p:stCondLst>
+                                        </p:cTn>
+                                        <p:tgtEl>
+                                          <p:spTgt spid="7"/>
+                                        </p:tgtEl>
+                                        <p:attrNameLst>
+                                          <p:attrName>style.visibility</p:attrName>
+                                        </p:attrNameLst>
+                                      </p:cBhvr>
+                                      <p:to>
+                                        <p:strVal val="visible"/>
+                                      </p:to>
+                                    </p:set>
+                                  </p:childTnLst>
+                                </p:cTn>
+                              </p:par>
+                            </p:childTnLst>
+                          </p:cTn>
+                        </p:par>
+                      </p:childTnLst>
+                    </p:cTn>
+                  </p:par>
+                  <p:par>
+                    <p:cTn id="7" fill="hold">
+                      <p:stCondLst>
+                        <p:cond delay="indefinite"/>
+                      </p:stCondLst>
+                      <p:childTnLst>
+                        <p:par>
+                          <p:cTn id="8" fill="hold">
+                            <p:stCondLst>
+                              <p:cond delay="0"/>
+                            </p:stCondLst>
+                            <p:childTnLst>
+                              <p:par>
+                                <p:cTn id="9" presetID="1" presetClass="entr" presetSubtype="0" fill="hold" nodeType="clickEffect">
+                                  <p:stCondLst>
+                                    <p:cond delay="0"/>
+                                  </p:stCondLst>
+                                  <p:childTnLst>
+                                    <p:set>
+                                      <p:cBhvr>
+                                        <p:cTn id="10" dur="1" fill="hold">
+                                          <p:stCondLst>
+                                            <p:cond delay="0"/>
+                                          </p:stCondLst>
+                                        </p:cTn>
+                                        <p:tgtEl>
+                                          <p:spTgt spid="8"/>
+                                        </p:tgtEl>
+                                        <p:attrNameLst>
+                                          <p:attrName>style.visibility</p:attrName>
+                                        </p:attrNameLst>
+                                      </p:cBhvr>
+                                      <p:to>
+                                        <p:strVal val="visible"/>
+                                      </p:to>
+                                    </p:set>
+                                  </p:childTnLst>
+                                </p:cTn>
+                              </p:par>
+                            </p:childTnLst>
+                          </p:cTn>
+                        </p:par>
+                      </p:childTnLst>
+                    </p:cTn>
+                  </p:par>
+                </p:childTnLst>
+              </p:cTn>
+              <p:prevCondLst>
+                <p:cond evt="onPrev" delay="0">
+                  <p:tgtEl>
+                    <p:sldTgt/>
+                  </p:tgtEl>
+                </p:cond>
+              </p:prevCondLst>
+              <p:nextCondLst>
+                <p:cond evt="onNext" delay="0">
+                  <p:tgtEl>
+                    <p:sldTgt/>
+                  </p:tgtEl>
+                </p:cond>
+              </p:nextCondLst>
+            </p:seq>
+          </p:childTnLst>
+        </p:cTn>
+      </p:par>
+    </p:tnLst>
+  </p:timing>
+</p:sld>
+</file>
+
+<file path=ppt/slides/slide26.xml><?xml version="1.0" encoding="utf-8"?>
+<p:sld xmlns:a="http://schemas.openxmlformats.org/drawingml/2006/main" xmlns:r="http://schemas.openxmlformats.org/officeDocument/2006/relationships" xmlns:p="http://schemas.openxmlformats.org/presentationml/2006/main">
+  <p:cSld>
+    <p:spTree>
+      <p:nvGrpSpPr>
+        <p:cNvPr id="1" name=""/>
+        <p:cNvGrpSpPr/>
+        <p:nvPr/>
+      </p:nvGrpSpPr>
+      <p:grpSpPr>
+        <a:xfrm>
+          <a:off x="0" y="0"/>
+          <a:ext cx="0" cy="0"/>
+          <a:chOff x="0" y="0"/>
+          <a:chExt cx="0" cy="0"/>
+        </a:xfrm>
+      </p:grpSpPr>
+      <p:sp>
+        <p:nvSpPr>
+          <p:cNvPr id="2" name="Title 1"/>
+          <p:cNvSpPr>
+            <a:spLocks noGrp="1"/>
+          </p:cNvSpPr>
+          <p:nvPr>
+            <p:ph type="title"/>
+          </p:nvPr>
+        </p:nvSpPr>
+        <p:spPr/>
+        <p:txBody>
+          <a:bodyPr/>
+          <a:lstStyle/>
+          <a:p>
+            <a:r>
+              <a:rPr lang="en-US" dirty="0"/>
+              <a:t>Currying</a:t>
+            </a:r>
+          </a:p>
+        </p:txBody>
+      </p:sp>
+      <p:pic>
+        <p:nvPicPr>
+          <p:cNvPr id="5" name="Picture 4"/>
+          <p:cNvPicPr>
+            <a:picLocks noChangeAspect="1"/>
+          </p:cNvPicPr>
+          <p:nvPr/>
+        </p:nvPicPr>
+        <p:blipFill>
+          <a:blip r:embed="rId2"/>
+          <a:stretch>
+            <a:fillRect/>
+          </a:stretch>
+        </p:blipFill>
+        <p:spPr>
+          <a:xfrm>
+            <a:off x="324000" y="1406317"/>
+            <a:ext cx="8305740" cy="630301"/>
+          </a:xfrm>
+          <a:prstGeom prst="rect">
+            <a:avLst/>
+          </a:prstGeom>
+        </p:spPr>
+      </p:pic>
+      <p:pic>
+        <p:nvPicPr>
+          <p:cNvPr id="6" name="Picture 5"/>
+          <p:cNvPicPr>
+            <a:picLocks noChangeAspect="1"/>
+          </p:cNvPicPr>
+          <p:nvPr/>
+        </p:nvPicPr>
+        <p:blipFill>
+          <a:blip r:embed="rId3"/>
+          <a:stretch>
+            <a:fillRect/>
+          </a:stretch>
+        </p:blipFill>
+        <p:spPr>
+          <a:xfrm>
+            <a:off x="324000" y="2460907"/>
+            <a:ext cx="10548781" cy="3150184"/>
+          </a:xfrm>
+          <a:prstGeom prst="rect">
+            <a:avLst/>
+          </a:prstGeom>
+        </p:spPr>
+      </p:pic>
+    </p:spTree>
+    <p:extLst>
+      <p:ext uri="{BB962C8B-B14F-4D97-AF65-F5344CB8AC3E}">
+        <p14:creationId xmlns:p14="http://schemas.microsoft.com/office/powerpoint/2010/main" val="1099745024"/>
+      </p:ext>
+    </p:extLst>
+  </p:cSld>
+  <p:clrMapOvr>
+    <a:masterClrMapping/>
+  </p:clrMapOvr>
+  <p:timing>
+    <p:tnLst>
+      <p:par>
+        <p:cTn id="1" dur="indefinite" restart="never" nodeType="tmRoot">
+          <p:childTnLst>
+            <p:seq concurrent="1" nextAc="seek">
+              <p:cTn id="2" dur="indefinite" nodeType="mainSeq">
+                <p:childTnLst>
+                  <p:par>
+                    <p:cTn id="3" fill="hold">
+                      <p:stCondLst>
+                        <p:cond delay="indefinite"/>
+                      </p:stCondLst>
+                      <p:childTnLst>
+                        <p:par>
+                          <p:cTn id="4" fill="hold">
+                            <p:stCondLst>
+                              <p:cond delay="0"/>
+                            </p:stCondLst>
+                            <p:childTnLst>
+                              <p:par>
+                                <p:cTn id="5" presetID="1" presetClass="entr" presetSubtype="0" fill="hold" nodeType="clickEffect">
+                                  <p:stCondLst>
+                                    <p:cond delay="0"/>
+                                  </p:stCondLst>
+                                  <p:childTnLst>
+                                    <p:set>
+                                      <p:cBhvr>
+                                        <p:cTn id="6" dur="1" fill="hold">
+                                          <p:stCondLst>
+                                            <p:cond delay="0"/>
+                                          </p:stCondLst>
+                                        </p:cTn>
+                                        <p:tgtEl>
+                                          <p:spTgt spid="6"/>
+                                        </p:tgtEl>
+                                        <p:attrNameLst>
+                                          <p:attrName>style.visibility</p:attrName>
+                                        </p:attrNameLst>
+                                      </p:cBhvr>
+                                      <p:to>
+                                        <p:strVal val="visible"/>
+                                      </p:to>
+                                    </p:set>
+                                  </p:childTnLst>
+                                </p:cTn>
+                              </p:par>
+                            </p:childTnLst>
+                          </p:cTn>
+                        </p:par>
+                      </p:childTnLst>
+                    </p:cTn>
+                  </p:par>
+                </p:childTnLst>
+              </p:cTn>
+              <p:prevCondLst>
+                <p:cond evt="onPrev" delay="0">
+                  <p:tgtEl>
+                    <p:sldTgt/>
+                  </p:tgtEl>
+                </p:cond>
+              </p:prevCondLst>
+              <p:nextCondLst>
+                <p:cond evt="onNext" delay="0">
+                  <p:tgtEl>
+                    <p:sldTgt/>
+                  </p:tgtEl>
+                </p:cond>
+              </p:nextCondLst>
+            </p:seq>
+          </p:childTnLst>
+        </p:cTn>
+      </p:par>
+    </p:tnLst>
+  </p:timing>
+</p:sld>
+</file>
+
+<file path=ppt/slides/slide27.xml><?xml version="1.0" encoding="utf-8"?>
+<p:sld xmlns:a="http://schemas.openxmlformats.org/drawingml/2006/main" xmlns:r="http://schemas.openxmlformats.org/officeDocument/2006/relationships" xmlns:p="http://schemas.openxmlformats.org/presentationml/2006/main">
+  <p:cSld>
+    <p:spTree>
+      <p:nvGrpSpPr>
+        <p:cNvPr id="1" name=""/>
+        <p:cNvGrpSpPr/>
+        <p:nvPr/>
+      </p:nvGrpSpPr>
+      <p:grpSpPr>
+        <a:xfrm>
+          <a:off x="0" y="0"/>
+          <a:ext cx="0" cy="0"/>
+          <a:chOff x="0" y="0"/>
+          <a:chExt cx="0" cy="0"/>
+        </a:xfrm>
+      </p:grpSpPr>
+      <p:sp>
+        <p:nvSpPr>
+          <p:cNvPr id="2" name="Title 1"/>
+          <p:cNvSpPr>
+            <a:spLocks noGrp="1"/>
+          </p:cNvSpPr>
+          <p:nvPr>
+            <p:ph type="title"/>
+          </p:nvPr>
+        </p:nvSpPr>
+        <p:spPr/>
+        <p:txBody>
+          <a:bodyPr/>
+          <a:lstStyle/>
+          <a:p>
+            <a:r>
+              <a:rPr lang="en-US" dirty="0"/>
+              <a:t>Currying</a:t>
+            </a:r>
+          </a:p>
+        </p:txBody>
+      </p:sp>
+      <p:pic>
+        <p:nvPicPr>
+          <p:cNvPr id="5" name="Picture 4"/>
+          <p:cNvPicPr>
+            <a:picLocks noChangeAspect="1"/>
+          </p:cNvPicPr>
+          <p:nvPr/>
+        </p:nvPicPr>
+        <p:blipFill>
+          <a:blip r:embed="rId2"/>
+          <a:stretch>
+            <a:fillRect/>
+          </a:stretch>
+        </p:blipFill>
+        <p:spPr>
+          <a:xfrm>
+            <a:off x="323999" y="1480410"/>
+            <a:ext cx="6958823" cy="1567589"/>
+          </a:xfrm>
+          <a:prstGeom prst="rect">
+            <a:avLst/>
+          </a:prstGeom>
+        </p:spPr>
+      </p:pic>
+    </p:spTree>
+    <p:extLst>
+      <p:ext uri="{BB962C8B-B14F-4D97-AF65-F5344CB8AC3E}">
+        <p14:creationId xmlns:p14="http://schemas.microsoft.com/office/powerpoint/2010/main" val="2683415084"/>
+      </p:ext>
+    </p:extLst>
+  </p:cSld>
+  <p:clrMapOvr>
+    <a:masterClrMapping/>
+  </p:clrMapOvr>
+  <p:timing>
+    <p:tnLst>
+      <p:par>
+        <p:cTn id="1" dur="indefinite" restart="never" nodeType="tmRoot"/>
+      </p:par>
+    </p:tnLst>
+  </p:timing>
+</p:sld>
+</file>
+
+<file path=ppt/slides/slide28.xml><?xml version="1.0" encoding="utf-8"?>
+<p:sld xmlns:a="http://schemas.openxmlformats.org/drawingml/2006/main" xmlns:r="http://schemas.openxmlformats.org/officeDocument/2006/relationships" xmlns:p="http://schemas.openxmlformats.org/presentationml/2006/main">
+  <p:cSld>
+    <p:spTree>
+      <p:nvGrpSpPr>
+        <p:cNvPr id="1" name=""/>
+        <p:cNvGrpSpPr/>
+        <p:nvPr/>
+      </p:nvGrpSpPr>
+      <p:grpSpPr>
+        <a:xfrm>
+          <a:off x="0" y="0"/>
+          <a:ext cx="0" cy="0"/>
+          <a:chOff x="0" y="0"/>
+          <a:chExt cx="0" cy="0"/>
+        </a:xfrm>
+      </p:grpSpPr>
+      <p:sp>
+        <p:nvSpPr>
+          <p:cNvPr id="2" name="Title 1"/>
+          <p:cNvSpPr>
+            <a:spLocks noGrp="1"/>
+          </p:cNvSpPr>
+          <p:nvPr>
+            <p:ph type="title"/>
+          </p:nvPr>
+        </p:nvSpPr>
+        <p:spPr/>
+        <p:txBody>
+          <a:bodyPr/>
+          <a:lstStyle/>
+          <a:p>
+            <a:r>
+              <a:rPr lang="en-US" dirty="0" smtClean="0"/>
+              <a:t>Currying</a:t>
+            </a:r>
+            <a:endParaRPr lang="en-US" dirty="0"/>
+          </a:p>
+        </p:txBody>
+      </p:sp>
+      <p:pic>
+        <p:nvPicPr>
+          <p:cNvPr id="5" name="Picture 4"/>
+          <p:cNvPicPr>
+            <a:picLocks noChangeAspect="1"/>
+          </p:cNvPicPr>
+          <p:nvPr/>
+        </p:nvPicPr>
+        <p:blipFill>
+          <a:blip r:embed="rId3"/>
+          <a:stretch>
+            <a:fillRect/>
+          </a:stretch>
+        </p:blipFill>
+        <p:spPr>
+          <a:xfrm>
+            <a:off x="428039" y="1374394"/>
+            <a:ext cx="7205815" cy="2086833"/>
+          </a:xfrm>
+          <a:prstGeom prst="rect">
+            <a:avLst/>
+          </a:prstGeom>
+        </p:spPr>
+      </p:pic>
+      <p:pic>
+        <p:nvPicPr>
+          <p:cNvPr id="6" name="Picture 5"/>
+          <p:cNvPicPr>
+            <a:picLocks noChangeAspect="1"/>
+          </p:cNvPicPr>
+          <p:nvPr/>
+        </p:nvPicPr>
+        <p:blipFill>
+          <a:blip r:embed="rId4"/>
+          <a:stretch>
+            <a:fillRect/>
+          </a:stretch>
+        </p:blipFill>
+        <p:spPr>
+          <a:xfrm>
+            <a:off x="428039" y="3872049"/>
+            <a:ext cx="7236876" cy="1572787"/>
+          </a:xfrm>
+          <a:prstGeom prst="rect">
+            <a:avLst/>
+          </a:prstGeom>
+        </p:spPr>
+      </p:pic>
+    </p:spTree>
+    <p:extLst>
+      <p:ext uri="{BB962C8B-B14F-4D97-AF65-F5344CB8AC3E}">
+        <p14:creationId xmlns:p14="http://schemas.microsoft.com/office/powerpoint/2010/main" val="3602854042"/>
+      </p:ext>
+    </p:extLst>
+  </p:cSld>
+  <p:clrMapOvr>
+    <a:masterClrMapping/>
+  </p:clrMapOvr>
+  <p:timing>
+    <p:tnLst>
+      <p:par>
+        <p:cTn id="1" dur="indefinite" restart="never" nodeType="tmRoot">
+          <p:childTnLst>
+            <p:seq concurrent="1" nextAc="seek">
+              <p:cTn id="2" dur="indefinite" nodeType="mainSeq">
+                <p:childTnLst>
+                  <p:par>
+                    <p:cTn id="3" fill="hold">
+                      <p:stCondLst>
+                        <p:cond delay="indefinite"/>
+                      </p:stCondLst>
+                      <p:childTnLst>
+                        <p:par>
+                          <p:cTn id="4" fill="hold">
+                            <p:stCondLst>
+                              <p:cond delay="0"/>
+                            </p:stCondLst>
+                            <p:childTnLst>
+                              <p:par>
+                                <p:cTn id="5" presetID="1" presetClass="entr" presetSubtype="0" fill="hold" nodeType="clickEffect">
+                                  <p:stCondLst>
+                                    <p:cond delay="0"/>
+                                  </p:stCondLst>
+                                  <p:childTnLst>
+                                    <p:set>
+                                      <p:cBhvr>
+                                        <p:cTn id="6" dur="1" fill="hold">
+                                          <p:stCondLst>
+                                            <p:cond delay="0"/>
+                                          </p:stCondLst>
+                                        </p:cTn>
+                                        <p:tgtEl>
+                                          <p:spTgt spid="6"/>
+                                        </p:tgtEl>
+                                        <p:attrNameLst>
+                                          <p:attrName>style.visibility</p:attrName>
+                                        </p:attrNameLst>
+                                      </p:cBhvr>
+                                      <p:to>
+                                        <p:strVal val="visible"/>
+                                      </p:to>
+                                    </p:set>
+                                  </p:childTnLst>
+                                </p:cTn>
+                              </p:par>
+                            </p:childTnLst>
+                          </p:cTn>
+                        </p:par>
+                      </p:childTnLst>
+                    </p:cTn>
+                  </p:par>
+                </p:childTnLst>
+              </p:cTn>
+              <p:prevCondLst>
+                <p:cond evt="onPrev" delay="0">
+                  <p:tgtEl>
+                    <p:sldTgt/>
+                  </p:tgtEl>
+                </p:cond>
+              </p:prevCondLst>
+              <p:nextCondLst>
+                <p:cond evt="onNext" delay="0">
+                  <p:tgtEl>
+                    <p:sldTgt/>
+                  </p:tgtEl>
+                </p:cond>
+              </p:nextCondLst>
+            </p:seq>
+          </p:childTnLst>
+        </p:cTn>
       </p:par>
     </p:tnLst>
   </p:timing>
@@ -10884,7 +13853,7 @@
           <p:nvPr/>
         </p:nvPicPr>
         <p:blipFill>
-          <a:blip r:embed="rId2">
+          <a:blip r:embed="rId3">
             <a:extLst>
               <a:ext uri="{28A0092B-C50C-407E-A947-70E740481C1C}">
                 <a14:useLocalDpi xmlns:a14="http://schemas.microsoft.com/office/drawing/2010/main" val="0"/>
@@ -10925,7 +13894,7 @@
           <p:nvPr/>
         </p:nvPicPr>
         <p:blipFill>
-          <a:blip r:embed="rId3">
+          <a:blip r:embed="rId4">
             <a:extLst>
               <a:ext uri="{28A0092B-C50C-407E-A947-70E740481C1C}">
                 <a14:useLocalDpi xmlns:a14="http://schemas.microsoft.com/office/drawing/2010/main" val="0"/>
@@ -10939,7 +13908,7 @@
         </p:blipFill>
         <p:spPr bwMode="auto">
           <a:xfrm>
-            <a:off x="3986169" y="2006942"/>
+            <a:off x="3861478" y="1344955"/>
             <a:ext cx="7620000" cy="3476626"/>
           </a:xfrm>
           <a:prstGeom prst="rect">
@@ -10957,6 +13926,57 @@
           </a:extLst>
         </p:spPr>
       </p:pic>
+      <p:sp>
+        <p:nvSpPr>
+          <p:cNvPr id="3" name="TextBox 2"/>
+          <p:cNvSpPr txBox="1"/>
+          <p:nvPr/>
+        </p:nvSpPr>
+        <p:spPr>
+          <a:xfrm>
+            <a:off x="3861478" y="5140036"/>
+            <a:ext cx="6861940" cy="276999"/>
+          </a:xfrm>
+          <a:prstGeom prst="rect">
+            <a:avLst/>
+          </a:prstGeom>
+          <a:noFill/>
+        </p:spPr>
+        <p:txBody>
+          <a:bodyPr wrap="square" lIns="0" tIns="0" rIns="0" bIns="0" rtlCol="0">
+            <a:spAutoFit/>
+          </a:bodyPr>
+          <a:lstStyle/>
+          <a:p>
+            <a:pPr fontAlgn="base">
+              <a:spcBef>
+                <a:spcPts val="600"/>
+              </a:spcBef>
+              <a:spcAft>
+                <a:spcPct val="0"/>
+              </a:spcAft>
+              <a:buClr>
+                <a:srgbClr val="F0AB00"/>
+              </a:buClr>
+              <a:buSzPct val="80000"/>
+            </a:pPr>
+            <a:r>
+              <a:rPr lang="en-US" sz="1800" kern="0" dirty="0">
+                <a:ea typeface="Arial Unicode MS" pitchFamily="34" charset="-128"/>
+                <a:cs typeface="Arial Unicode MS" pitchFamily="34" charset="-128"/>
+              </a:rPr>
+              <a:t>x</a:t>
+            </a:r>
+            <a:r>
+              <a:rPr lang="en-US" sz="1800" kern="0" dirty="0" smtClean="0">
+                <a:ea typeface="Arial Unicode MS" pitchFamily="34" charset="-128"/>
+                <a:cs typeface="Arial Unicode MS" pitchFamily="34" charset="-128"/>
+              </a:rPr>
+              <a:t> and y are global variable here. </a:t>
+            </a:r>
+          </a:p>
+        </p:txBody>
+      </p:sp>
     </p:spTree>
     <p:extLst>
       <p:ext uri="{BB962C8B-B14F-4D97-AF65-F5344CB8AC3E}">
@@ -11020,6 +14040,51 @@
                       </p:childTnLst>
                     </p:cTn>
                   </p:par>
+                  <p:par>
+                    <p:cTn id="7" fill="hold">
+                      <p:stCondLst>
+                        <p:cond delay="indefinite"/>
+                      </p:stCondLst>
+                      <p:childTnLst>
+                        <p:par>
+                          <p:cTn id="8" fill="hold">
+                            <p:stCondLst>
+                              <p:cond delay="0"/>
+                            </p:stCondLst>
+                            <p:childTnLst>
+                              <p:par>
+                                <p:cTn id="9" presetID="1" presetClass="entr" presetSubtype="0" fill="hold" grpId="0" nodeType="clickEffect">
+                                  <p:stCondLst>
+                                    <p:cond delay="0"/>
+                                  </p:stCondLst>
+                                  <p:childTnLst>
+                                    <p:set>
+                                      <p:cBhvr>
+                                        <p:cTn id="10" dur="1" fill="hold">
+                                          <p:stCondLst>
+                                            <p:cond delay="0"/>
+                                          </p:stCondLst>
+                                        </p:cTn>
+                                        <p:tgtEl>
+                                          <p:spTgt spid="3"/>
+                                        </p:tgtEl>
+                                        <p:attrNameLst>
+                                          <p:attrName>style.visibility</p:attrName>
+                                        </p:attrNameLst>
+                                      </p:cBhvr>
+                                      <p:to>
+                                        <p:strVal val="visible"/>
+                                      </p:to>
+                                    </p:set>
+                                  </p:childTnLst>
+                                </p:cTn>
+                              </p:par>
+                            </p:childTnLst>
+                          </p:cTn>
+                        </p:par>
+                      </p:childTnLst>
+                    </p:cTn>
+                  </p:par>
                 </p:childTnLst>
               </p:cTn>
               <p:prevCondLst>
@@ -11041,6 +14106,9 @@
         </p:cTn>
       </p:par>
     </p:tnLst>
+    <p:bldLst>
+      <p:bldP spid="3" grpId="0"/>
+    </p:bldLst>
   </p:timing>
 </p:sld>
 </file>
@@ -11288,7 +14356,7 @@
           <p:nvPr/>
         </p:nvPicPr>
         <p:blipFill>
-          <a:blip r:embed="rId2"/>
+          <a:blip r:embed="rId3"/>
           <a:stretch>
             <a:fillRect/>
           </a:stretch>
@@ -11312,7 +14380,7 @@
           <p:nvPr/>
         </p:nvPicPr>
         <p:blipFill>
-          <a:blip r:embed="rId3"/>
+          <a:blip r:embed="rId4"/>
           <a:stretch>
             <a:fillRect/>
           </a:stretch>
@@ -12273,7 +15341,7 @@
           <p:nvPr/>
         </p:nvPicPr>
         <p:blipFill>
-          <a:blip r:embed="rId2">
+          <a:blip r:embed="rId3">
             <a:extLst>
               <a:ext uri="{28A0092B-C50C-407E-A947-70E740481C1C}">
                 <a14:useLocalDpi xmlns:a14="http://schemas.microsoft.com/office/drawing/2010/main" val="0"/>

</xml_diff>

<commit_message>
improve slide in Parkyard hotel
</commit_message>
<xml_diff>
--- a/training/ProgrammingLanguage/001_closure.pptx
+++ b/training/ProgrammingLanguage/001_closure.pptx
@@ -5,10 +5,10 @@
     <p:sldMasterId id="2147483660" r:id="rId1"/>
   </p:sldMasterIdLst>
   <p:notesMasterIdLst>
-    <p:notesMasterId r:id="rId30"/>
+    <p:notesMasterId r:id="rId31"/>
   </p:notesMasterIdLst>
   <p:handoutMasterIdLst>
-    <p:handoutMasterId r:id="rId31"/>
+    <p:handoutMasterId r:id="rId32"/>
   </p:handoutMasterIdLst>
   <p:sldIdLst>
     <p:sldId id="340" r:id="rId2"/>
@@ -20,25 +20,26 @@
     <p:sldId id="364" r:id="rId8"/>
     <p:sldId id="365" r:id="rId9"/>
     <p:sldId id="366" r:id="rId10"/>
-    <p:sldId id="367" r:id="rId11"/>
-    <p:sldId id="368" r:id="rId12"/>
-    <p:sldId id="369" r:id="rId13"/>
-    <p:sldId id="370" r:id="rId14"/>
-    <p:sldId id="371" r:id="rId15"/>
-    <p:sldId id="372" r:id="rId16"/>
-    <p:sldId id="373" r:id="rId17"/>
-    <p:sldId id="374" r:id="rId18"/>
-    <p:sldId id="375" r:id="rId19"/>
-    <p:sldId id="376" r:id="rId20"/>
-    <p:sldId id="377" r:id="rId21"/>
-    <p:sldId id="378" r:id="rId22"/>
-    <p:sldId id="379" r:id="rId23"/>
-    <p:sldId id="380" r:id="rId24"/>
-    <p:sldId id="381" r:id="rId25"/>
-    <p:sldId id="382" r:id="rId26"/>
-    <p:sldId id="383" r:id="rId27"/>
-    <p:sldId id="384" r:id="rId28"/>
-    <p:sldId id="385" r:id="rId29"/>
+    <p:sldId id="386" r:id="rId11"/>
+    <p:sldId id="367" r:id="rId12"/>
+    <p:sldId id="368" r:id="rId13"/>
+    <p:sldId id="369" r:id="rId14"/>
+    <p:sldId id="370" r:id="rId15"/>
+    <p:sldId id="371" r:id="rId16"/>
+    <p:sldId id="372" r:id="rId17"/>
+    <p:sldId id="373" r:id="rId18"/>
+    <p:sldId id="374" r:id="rId19"/>
+    <p:sldId id="375" r:id="rId20"/>
+    <p:sldId id="376" r:id="rId21"/>
+    <p:sldId id="377" r:id="rId22"/>
+    <p:sldId id="378" r:id="rId23"/>
+    <p:sldId id="379" r:id="rId24"/>
+    <p:sldId id="380" r:id="rId25"/>
+    <p:sldId id="381" r:id="rId26"/>
+    <p:sldId id="382" r:id="rId27"/>
+    <p:sldId id="383" r:id="rId28"/>
+    <p:sldId id="384" r:id="rId29"/>
+    <p:sldId id="385" r:id="rId30"/>
   </p:sldIdLst>
   <p:sldSz cx="12195175" cy="6859588"/>
   <p:notesSz cx="6797675" cy="9874250"/>
@@ -175,6 +176,7 @@
             <p14:sldId id="364"/>
             <p14:sldId id="365"/>
             <p14:sldId id="366"/>
+            <p14:sldId id="386"/>
             <p14:sldId id="367"/>
             <p14:sldId id="368"/>
             <p14:sldId id="369"/>
@@ -719,41 +721,6 @@
       </p:grpSpPr>
       <p:sp>
         <p:nvSpPr>
-          <p:cNvPr id="2" name="Slide Image Placeholder 1"/>
-          <p:cNvSpPr>
-            <a:spLocks noGrp="1" noRot="1" noChangeAspect="1"/>
-          </p:cNvSpPr>
-          <p:nvPr>
-            <p:ph type="sldImg"/>
-          </p:nvPr>
-        </p:nvSpPr>
-        <p:spPr/>
-      </p:sp>
-      <p:sp>
-        <p:nvSpPr>
-          <p:cNvPr id="3" name="Notes Placeholder 2"/>
-          <p:cNvSpPr>
-            <a:spLocks noGrp="1"/>
-          </p:cNvSpPr>
-          <p:nvPr>
-            <p:ph type="body" idx="1"/>
-          </p:nvPr>
-        </p:nvSpPr>
-        <p:spPr/>
-        <p:txBody>
-          <a:bodyPr/>
-          <a:lstStyle/>
-          <a:p>
-            <a:r>
-              <a:rPr lang="en-US" dirty="0" smtClean="0"/>
-              <a:t>Demo: 005_lazy_evaluation.html</a:t>
-            </a:r>
-            <a:endParaRPr lang="en-US" dirty="0"/>
-          </a:p>
-        </p:txBody>
-      </p:sp>
-      <p:sp>
-        <p:nvSpPr>
           <p:cNvPr id="4" name="Slide Number Placeholder 3"/>
           <p:cNvSpPr>
             <a:spLocks noGrp="1"/>
@@ -770,16 +737,78 @@
             <a:fld id="{7D8C2C35-2B8A-446E-BEC0-FD36716C29AC}" type="slidenum">
               <a:rPr lang="de-DE" smtClean="0"/>
               <a:pPr/>
-              <a:t>11</a:t>
+              <a:t>10</a:t>
             </a:fld>
             <a:endParaRPr lang="de-DE" dirty="0"/>
+          </a:p>
+        </p:txBody>
+      </p:sp>
+      <p:sp>
+        <p:nvSpPr>
+          <p:cNvPr id="9" name="Slide Image Placeholder 8"/>
+          <p:cNvSpPr>
+            <a:spLocks noGrp="1" noRot="1" noChangeAspect="1"/>
+          </p:cNvSpPr>
+          <p:nvPr>
+            <p:ph type="sldImg"/>
+          </p:nvPr>
+        </p:nvSpPr>
+        <p:spPr>
+          <a:xfrm>
+            <a:off x="547688" y="612775"/>
+            <a:ext cx="5762625" cy="3241675"/>
+          </a:xfrm>
+        </p:spPr>
+      </p:sp>
+      <p:sp>
+        <p:nvSpPr>
+          <p:cNvPr id="10" name="Notes Placeholder 9"/>
+          <p:cNvSpPr>
+            <a:spLocks noGrp="1"/>
+          </p:cNvSpPr>
+          <p:nvPr>
+            <p:ph type="body" idx="1"/>
+          </p:nvPr>
+        </p:nvSpPr>
+        <p:spPr/>
+        <p:txBody>
+          <a:bodyPr>
+            <a:normAutofit/>
+          </a:bodyPr>
+          <a:lstStyle/>
+          <a:p>
+            <a:r>
+              <a:rPr lang="en-US" dirty="0" smtClean="0"/>
+              <a:t>Sometimes one wants to control when an expression is evaluated and that is evaluated exactly once:</a:t>
+            </a:r>
+          </a:p>
+          <a:p>
+            <a:pPr marL="285750" indent="-285750">
+              <a:buFontTx/>
+              <a:buChar char="-"/>
+            </a:pPr>
+            <a:r>
+              <a:rPr lang="en-US" dirty="0" smtClean="0"/>
+              <a:t>Result is used many times</a:t>
+            </a:r>
+          </a:p>
+          <a:p>
+            <a:pPr marL="285750" indent="-285750">
+              <a:buFontTx/>
+              <a:buChar char="-"/>
+            </a:pPr>
+            <a:r>
+              <a:rPr lang="en-US" dirty="0" smtClean="0"/>
+              <a:t>Computing is expensive</a:t>
+            </a:r>
+            <a:endParaRPr lang="en-US" dirty="0"/>
           </a:p>
         </p:txBody>
       </p:sp>
     </p:spTree>
     <p:extLst>
       <p:ext uri="{BB962C8B-B14F-4D97-AF65-F5344CB8AC3E}">
-        <p14:creationId xmlns:p14="http://schemas.microsoft.com/office/powerpoint/2010/main" val="3410434924"/>
+        <p14:creationId xmlns:p14="http://schemas.microsoft.com/office/powerpoint/2010/main" val="1867975161"/>
       </p:ext>
     </p:extLst>
   </p:cSld>
@@ -808,6 +837,41 @@
       </p:grpSpPr>
       <p:sp>
         <p:nvSpPr>
+          <p:cNvPr id="2" name="Slide Image Placeholder 1"/>
+          <p:cNvSpPr>
+            <a:spLocks noGrp="1" noRot="1" noChangeAspect="1"/>
+          </p:cNvSpPr>
+          <p:nvPr>
+            <p:ph type="sldImg"/>
+          </p:nvPr>
+        </p:nvSpPr>
+        <p:spPr/>
+      </p:sp>
+      <p:sp>
+        <p:nvSpPr>
+          <p:cNvPr id="3" name="Notes Placeholder 2"/>
+          <p:cNvSpPr>
+            <a:spLocks noGrp="1"/>
+          </p:cNvSpPr>
+          <p:nvPr>
+            <p:ph type="body" idx="1"/>
+          </p:nvPr>
+        </p:nvSpPr>
+        <p:spPr/>
+        <p:txBody>
+          <a:bodyPr/>
+          <a:lstStyle/>
+          <a:p>
+            <a:r>
+              <a:rPr lang="en-US" dirty="0" smtClean="0"/>
+              <a:t>Demo: 005_lazy_evaluation.html</a:t>
+            </a:r>
+            <a:endParaRPr lang="en-US" dirty="0"/>
+          </a:p>
+        </p:txBody>
+      </p:sp>
+      <p:sp>
+        <p:nvSpPr>
           <p:cNvPr id="4" name="Slide Number Placeholder 3"/>
           <p:cNvSpPr>
             <a:spLocks noGrp="1"/>
@@ -824,64 +888,16 @@
             <a:fld id="{7D8C2C35-2B8A-446E-BEC0-FD36716C29AC}" type="slidenum">
               <a:rPr lang="de-DE" smtClean="0"/>
               <a:pPr/>
-              <a:t>14</a:t>
+              <a:t>12</a:t>
             </a:fld>
             <a:endParaRPr lang="de-DE" dirty="0"/>
-          </a:p>
-        </p:txBody>
-      </p:sp>
-      <p:sp>
-        <p:nvSpPr>
-          <p:cNvPr id="9" name="Slide Image Placeholder 8"/>
-          <p:cNvSpPr>
-            <a:spLocks noGrp="1" noRot="1" noChangeAspect="1"/>
-          </p:cNvSpPr>
-          <p:nvPr>
-            <p:ph type="sldImg"/>
-          </p:nvPr>
-        </p:nvSpPr>
-        <p:spPr>
-          <a:xfrm>
-            <a:off x="547688" y="612775"/>
-            <a:ext cx="5762625" cy="3241675"/>
-          </a:xfrm>
-        </p:spPr>
-      </p:sp>
-      <p:sp>
-        <p:nvSpPr>
-          <p:cNvPr id="10" name="Notes Placeholder 9"/>
-          <p:cNvSpPr>
-            <a:spLocks noGrp="1"/>
-          </p:cNvSpPr>
-          <p:nvPr>
-            <p:ph type="body" idx="1"/>
-          </p:nvPr>
-        </p:nvSpPr>
-        <p:spPr/>
-        <p:txBody>
-          <a:bodyPr>
-            <a:normAutofit/>
-          </a:bodyPr>
-          <a:lstStyle/>
-          <a:p>
-            <a:r>
-              <a:rPr lang="en-US" dirty="0" smtClean="0"/>
-              <a:t>Here delay &amp; force is shown with a recursion:</a:t>
-            </a:r>
-          </a:p>
-          <a:p>
-            <a:r>
-              <a:rPr lang="en-US" dirty="0" smtClean="0"/>
-              <a:t>Base condition are 0 and 1; for 1 the heavy computation is performed; all other function calls use the result of the succeeding function</a:t>
-            </a:r>
-            <a:endParaRPr lang="en-US" dirty="0"/>
           </a:p>
         </p:txBody>
       </p:sp>
     </p:spTree>
     <p:extLst>
       <p:ext uri="{BB962C8B-B14F-4D97-AF65-F5344CB8AC3E}">
-        <p14:creationId xmlns:p14="http://schemas.microsoft.com/office/powerpoint/2010/main" val="682080673"/>
+        <p14:creationId xmlns:p14="http://schemas.microsoft.com/office/powerpoint/2010/main" val="3410434924"/>
       </p:ext>
     </p:extLst>
   </p:cSld>
@@ -910,41 +926,6 @@
       </p:grpSpPr>
       <p:sp>
         <p:nvSpPr>
-          <p:cNvPr id="2" name="Slide Image Placeholder 1"/>
-          <p:cNvSpPr>
-            <a:spLocks noGrp="1" noRot="1" noChangeAspect="1"/>
-          </p:cNvSpPr>
-          <p:nvPr>
-            <p:ph type="sldImg"/>
-          </p:nvPr>
-        </p:nvSpPr>
-        <p:spPr/>
-      </p:sp>
-      <p:sp>
-        <p:nvSpPr>
-          <p:cNvPr id="3" name="Notes Placeholder 2"/>
-          <p:cNvSpPr>
-            <a:spLocks noGrp="1"/>
-          </p:cNvSpPr>
-          <p:nvPr>
-            <p:ph type="body" idx="1"/>
-          </p:nvPr>
-        </p:nvSpPr>
-        <p:spPr/>
-        <p:txBody>
-          <a:bodyPr/>
-          <a:lstStyle/>
-          <a:p>
-            <a:r>
-              <a:rPr lang="en-US" dirty="0" smtClean="0"/>
-              <a:t>Demo: 007_singleton.html</a:t>
-            </a:r>
-            <a:endParaRPr lang="en-US" dirty="0"/>
-          </a:p>
-        </p:txBody>
-      </p:sp>
-      <p:sp>
-        <p:nvSpPr>
           <p:cNvPr id="4" name="Slide Number Placeholder 3"/>
           <p:cNvSpPr>
             <a:spLocks noGrp="1"/>
@@ -961,16 +942,64 @@
             <a:fld id="{7D8C2C35-2B8A-446E-BEC0-FD36716C29AC}" type="slidenum">
               <a:rPr lang="de-DE" smtClean="0"/>
               <a:pPr/>
-              <a:t>20</a:t>
+              <a:t>15</a:t>
             </a:fld>
             <a:endParaRPr lang="de-DE" dirty="0"/>
+          </a:p>
+        </p:txBody>
+      </p:sp>
+      <p:sp>
+        <p:nvSpPr>
+          <p:cNvPr id="9" name="Slide Image Placeholder 8"/>
+          <p:cNvSpPr>
+            <a:spLocks noGrp="1" noRot="1" noChangeAspect="1"/>
+          </p:cNvSpPr>
+          <p:nvPr>
+            <p:ph type="sldImg"/>
+          </p:nvPr>
+        </p:nvSpPr>
+        <p:spPr>
+          <a:xfrm>
+            <a:off x="547688" y="612775"/>
+            <a:ext cx="5762625" cy="3241675"/>
+          </a:xfrm>
+        </p:spPr>
+      </p:sp>
+      <p:sp>
+        <p:nvSpPr>
+          <p:cNvPr id="10" name="Notes Placeholder 9"/>
+          <p:cNvSpPr>
+            <a:spLocks noGrp="1"/>
+          </p:cNvSpPr>
+          <p:nvPr>
+            <p:ph type="body" idx="1"/>
+          </p:nvPr>
+        </p:nvSpPr>
+        <p:spPr/>
+        <p:txBody>
+          <a:bodyPr>
+            <a:normAutofit/>
+          </a:bodyPr>
+          <a:lstStyle/>
+          <a:p>
+            <a:r>
+              <a:rPr lang="en-US" dirty="0" smtClean="0"/>
+              <a:t>Here delay &amp; force is shown with a recursion:</a:t>
+            </a:r>
+          </a:p>
+          <a:p>
+            <a:r>
+              <a:rPr lang="en-US" dirty="0" smtClean="0"/>
+              <a:t>Base condition are 0 and 1; for 1 the heavy computation is performed; all other function calls use the result of the succeeding function</a:t>
+            </a:r>
+            <a:endParaRPr lang="en-US" dirty="0"/>
           </a:p>
         </p:txBody>
       </p:sp>
     </p:spTree>
     <p:extLst>
       <p:ext uri="{BB962C8B-B14F-4D97-AF65-F5344CB8AC3E}">
-        <p14:creationId xmlns:p14="http://schemas.microsoft.com/office/powerpoint/2010/main" val="2664122178"/>
+        <p14:creationId xmlns:p14="http://schemas.microsoft.com/office/powerpoint/2010/main" val="682080673"/>
       </p:ext>
     </p:extLst>
   </p:cSld>
@@ -1026,7 +1055,7 @@
           <a:p>
             <a:r>
               <a:rPr lang="en-US" dirty="0" smtClean="0"/>
-              <a:t>http://localhost:8090/cus.crm.mycalendar/?responderOn=true</a:t>
+              <a:t>Demo: 007_singleton.html</a:t>
             </a:r>
             <a:endParaRPr lang="en-US" dirty="0"/>
           </a:p>
@@ -1059,7 +1088,7 @@
     </p:spTree>
     <p:extLst>
       <p:ext uri="{BB962C8B-B14F-4D97-AF65-F5344CB8AC3E}">
-        <p14:creationId xmlns:p14="http://schemas.microsoft.com/office/powerpoint/2010/main" val="2696855891"/>
+        <p14:creationId xmlns:p14="http://schemas.microsoft.com/office/powerpoint/2010/main" val="2664122178"/>
       </p:ext>
     </p:extLst>
   </p:cSld>
@@ -1113,6 +1142,10 @@
           <a:bodyPr/>
           <a:lstStyle/>
           <a:p>
+            <a:r>
+              <a:rPr lang="en-US" dirty="0" smtClean="0"/>
+              <a:t>http://localhost:8090/cus.crm.mycalendar/?responderOn=true</a:t>
+            </a:r>
             <a:endParaRPr lang="en-US" dirty="0"/>
           </a:p>
         </p:txBody>
@@ -1135,7 +1168,92 @@
             <a:fld id="{7D8C2C35-2B8A-446E-BEC0-FD36716C29AC}" type="slidenum">
               <a:rPr lang="de-DE" smtClean="0"/>
               <a:pPr/>
-              <a:t>28</a:t>
+              <a:t>22</a:t>
+            </a:fld>
+            <a:endParaRPr lang="de-DE" dirty="0"/>
+          </a:p>
+        </p:txBody>
+      </p:sp>
+    </p:spTree>
+    <p:extLst>
+      <p:ext uri="{BB962C8B-B14F-4D97-AF65-F5344CB8AC3E}">
+        <p14:creationId xmlns:p14="http://schemas.microsoft.com/office/powerpoint/2010/main" val="2696855891"/>
+      </p:ext>
+    </p:extLst>
+  </p:cSld>
+  <p:clrMapOvr>
+    <a:masterClrMapping/>
+  </p:clrMapOvr>
+</p:notes>
+</file>
+
+<file path=ppt/notesSlides/notesSlide15.xml><?xml version="1.0" encoding="utf-8"?>
+<p:notes xmlns:a="http://schemas.openxmlformats.org/drawingml/2006/main" xmlns:r="http://schemas.openxmlformats.org/officeDocument/2006/relationships" xmlns:p="http://schemas.openxmlformats.org/presentationml/2006/main">
+  <p:cSld>
+    <p:spTree>
+      <p:nvGrpSpPr>
+        <p:cNvPr id="1" name=""/>
+        <p:cNvGrpSpPr/>
+        <p:nvPr/>
+      </p:nvGrpSpPr>
+      <p:grpSpPr>
+        <a:xfrm>
+          <a:off x="0" y="0"/>
+          <a:ext cx="0" cy="0"/>
+          <a:chOff x="0" y="0"/>
+          <a:chExt cx="0" cy="0"/>
+        </a:xfrm>
+      </p:grpSpPr>
+      <p:sp>
+        <p:nvSpPr>
+          <p:cNvPr id="2" name="Slide Image Placeholder 1"/>
+          <p:cNvSpPr>
+            <a:spLocks noGrp="1" noRot="1" noChangeAspect="1"/>
+          </p:cNvSpPr>
+          <p:nvPr>
+            <p:ph type="sldImg"/>
+          </p:nvPr>
+        </p:nvSpPr>
+        <p:spPr/>
+      </p:sp>
+      <p:sp>
+        <p:nvSpPr>
+          <p:cNvPr id="3" name="Notes Placeholder 2"/>
+          <p:cNvSpPr>
+            <a:spLocks noGrp="1"/>
+          </p:cNvSpPr>
+          <p:nvPr>
+            <p:ph type="body" idx="1"/>
+          </p:nvPr>
+        </p:nvSpPr>
+        <p:spPr/>
+        <p:txBody>
+          <a:bodyPr/>
+          <a:lstStyle/>
+          <a:p>
+            <a:endParaRPr lang="en-US" dirty="0"/>
+          </a:p>
+        </p:txBody>
+      </p:sp>
+      <p:sp>
+        <p:nvSpPr>
+          <p:cNvPr id="4" name="Slide Number Placeholder 3"/>
+          <p:cNvSpPr>
+            <a:spLocks noGrp="1"/>
+          </p:cNvSpPr>
+          <p:nvPr>
+            <p:ph type="sldNum" sz="quarter" idx="10"/>
+          </p:nvPr>
+        </p:nvSpPr>
+        <p:spPr/>
+        <p:txBody>
+          <a:bodyPr/>
+          <a:lstStyle/>
+          <a:p>
+            <a:fld id="{7D8C2C35-2B8A-446E-BEC0-FD36716C29AC}" type="slidenum">
+              <a:rPr lang="de-DE" smtClean="0"/>
+              <a:pPr/>
+              <a:t>29</a:t>
             </a:fld>
             <a:endParaRPr lang="de-DE" dirty="0"/>
           </a:p>
@@ -1230,8 +1348,109 @@
           <a:lstStyle/>
           <a:p>
             <a:r>
-              <a:rPr lang="en-US" dirty="0" smtClean="0"/>
-              <a:t>Remember: immutable data</a:t>
+              <a:rPr lang="zh-CN" altLang="en-US" dirty="0" smtClean="0"/>
+              <a:t>词法作用域 </a:t>
+            </a:r>
+            <a:r>
+              <a:rPr lang="en-US" altLang="zh-CN" dirty="0" smtClean="0"/>
+              <a:t>vs</a:t>
+            </a:r>
+            <a:r>
+              <a:rPr lang="en-US" altLang="zh-CN" baseline="0" dirty="0" smtClean="0"/>
+              <a:t> </a:t>
+            </a:r>
+            <a:r>
+              <a:rPr lang="zh-CN" altLang="en-US" baseline="0" dirty="0" smtClean="0"/>
+              <a:t>动态作用域</a:t>
+            </a:r>
+            <a:endParaRPr lang="en-US" altLang="zh-CN" baseline="0" dirty="0" smtClean="0"/>
+          </a:p>
+          <a:p>
+            <a:r>
+              <a:rPr lang="en-US" altLang="zh-CN" sz="1400" b="0" i="0" kern="1200" dirty="0" smtClean="0">
+                <a:solidFill>
+                  <a:schemeClr val="tx1"/>
+                </a:solidFill>
+                <a:effectLst/>
+                <a:latin typeface="+mn-lt"/>
+                <a:ea typeface="+mn-ea"/>
+                <a:cs typeface="+mn-cs"/>
+              </a:rPr>
+              <a:t>1. </a:t>
+            </a:r>
+            <a:r>
+              <a:rPr lang="zh-CN" altLang="en-US" sz="1400" b="0" i="0" kern="1200" dirty="0" smtClean="0">
+                <a:solidFill>
+                  <a:schemeClr val="tx1"/>
+                </a:solidFill>
+                <a:effectLst/>
+                <a:latin typeface="+mn-lt"/>
+                <a:ea typeface="+mn-ea"/>
+                <a:cs typeface="+mn-cs"/>
+              </a:rPr>
+              <a:t>在词法作用域下，一个符号参照到语境中符号名字出现的地方</a:t>
+            </a:r>
+            <a:r>
+              <a:rPr lang="en-US" altLang="zh-CN" sz="1400" b="0" i="0" kern="1200" dirty="0" smtClean="0">
+                <a:solidFill>
+                  <a:schemeClr val="tx1"/>
+                </a:solidFill>
+                <a:effectLst/>
+                <a:latin typeface="+mn-lt"/>
+                <a:ea typeface="+mn-ea"/>
+                <a:cs typeface="+mn-cs"/>
+              </a:rPr>
+              <a:t>(</a:t>
+            </a:r>
+            <a:r>
+              <a:rPr lang="zh-CN" altLang="en-US" sz="1400" b="0" i="0" kern="1200" dirty="0" smtClean="0">
+                <a:solidFill>
+                  <a:schemeClr val="tx1"/>
+                </a:solidFill>
+                <a:effectLst/>
+                <a:latin typeface="+mn-lt"/>
+                <a:ea typeface="+mn-ea"/>
+                <a:cs typeface="+mn-cs"/>
+              </a:rPr>
+              <a:t>可以理解为参照到定义</a:t>
+            </a:r>
+            <a:r>
+              <a:rPr lang="en-US" altLang="zh-CN" sz="1400" b="0" i="0" kern="1200" dirty="0" smtClean="0">
+                <a:solidFill>
+                  <a:schemeClr val="tx1"/>
+                </a:solidFill>
+                <a:effectLst/>
+                <a:latin typeface="+mn-lt"/>
+                <a:ea typeface="+mn-ea"/>
+                <a:cs typeface="+mn-cs"/>
+              </a:rPr>
+              <a:t>)</a:t>
+            </a:r>
+          </a:p>
+          <a:p>
+            <a:r>
+              <a:rPr lang="en-US" altLang="zh-CN" sz="1400" b="0" i="0" kern="1200" dirty="0" smtClean="0">
+                <a:solidFill>
+                  <a:schemeClr val="tx1"/>
+                </a:solidFill>
+                <a:effectLst/>
+                <a:latin typeface="+mn-lt"/>
+                <a:ea typeface="+mn-ea"/>
+                <a:cs typeface="+mn-cs"/>
+              </a:rPr>
+              <a:t>2. </a:t>
+            </a:r>
+            <a:r>
+              <a:rPr lang="zh-CN" altLang="en-US" sz="1400" b="0" i="0" kern="1200" dirty="0" smtClean="0">
+                <a:solidFill>
+                  <a:schemeClr val="tx1"/>
+                </a:solidFill>
+                <a:effectLst/>
+                <a:latin typeface="+mn-lt"/>
+                <a:ea typeface="+mn-ea"/>
+                <a:cs typeface="+mn-cs"/>
+              </a:rPr>
+              <a:t>变量的作用域是在定义时决定而不是执行时决定，也就是说词法作用域取决于源码，通过静态分析就能确定，因此词法作用域也叫做静态作用域。</a:t>
             </a:r>
             <a:endParaRPr lang="en-US" dirty="0"/>
           </a:p>
@@ -1625,18 +1844,230 @@
           <a:lstStyle/>
           <a:p>
             <a:r>
-              <a:rPr lang="en-US" dirty="0" smtClean="0"/>
-              <a:t>Do you remember those monolithic event handlers? Callbacks are much more elegant…</a:t>
-            </a:r>
-          </a:p>
-          <a:p>
-            <a:endParaRPr lang="en-US" dirty="0" smtClean="0"/>
-          </a:p>
-          <a:p>
-            <a:r>
-              <a:rPr lang="en-US" dirty="0" smtClean="0"/>
-              <a:t>On the other hand – a callback does not need to have free variables…</a:t>
-            </a:r>
+              <a:rPr lang="en-US" altLang="zh-CN" sz="1400" b="0" i="0" kern="1200" dirty="0" smtClean="0">
+                <a:solidFill>
+                  <a:schemeClr val="tx1"/>
+                </a:solidFill>
+                <a:effectLst/>
+                <a:latin typeface="+mn-lt"/>
+                <a:ea typeface="+mn-ea"/>
+                <a:cs typeface="+mn-cs"/>
+              </a:rPr>
+              <a:t>idiom</a:t>
+            </a:r>
+            <a:r>
+              <a:rPr lang="zh-CN" altLang="en-US" sz="1400" b="0" i="0" kern="1200" dirty="0" smtClean="0">
+                <a:solidFill>
+                  <a:schemeClr val="tx1"/>
+                </a:solidFill>
+                <a:effectLst/>
+                <a:latin typeface="+mn-lt"/>
+                <a:ea typeface="+mn-ea"/>
+                <a:cs typeface="+mn-cs"/>
+              </a:rPr>
+              <a:t>英</a:t>
+            </a:r>
+            <a:r>
+              <a:rPr lang="en-US" altLang="zh-CN" sz="1400" b="0" i="0" kern="1200" dirty="0" smtClean="0">
+                <a:solidFill>
+                  <a:schemeClr val="tx1"/>
+                </a:solidFill>
+                <a:effectLst/>
+                <a:latin typeface="+mn-lt"/>
+                <a:ea typeface="+mn-ea"/>
+                <a:cs typeface="+mn-cs"/>
+              </a:rPr>
+              <a:t>[ˈ</a:t>
+            </a:r>
+            <a:r>
+              <a:rPr lang="en-US" altLang="zh-CN" sz="1400" b="0" i="0" kern="1200" dirty="0" err="1" smtClean="0">
+                <a:solidFill>
+                  <a:schemeClr val="tx1"/>
+                </a:solidFill>
+                <a:effectLst/>
+                <a:latin typeface="+mn-lt"/>
+                <a:ea typeface="+mn-ea"/>
+                <a:cs typeface="+mn-cs"/>
+              </a:rPr>
+              <a:t>ɪdiəm</a:t>
+            </a:r>
+            <a:r>
+              <a:rPr lang="en-US" altLang="zh-CN" sz="1400" b="0" i="0" kern="1200" dirty="0" smtClean="0">
+                <a:solidFill>
+                  <a:schemeClr val="tx1"/>
+                </a:solidFill>
+                <a:effectLst/>
+                <a:latin typeface="+mn-lt"/>
+                <a:ea typeface="+mn-ea"/>
+                <a:cs typeface="+mn-cs"/>
+              </a:rPr>
+              <a:t>]</a:t>
+            </a:r>
+            <a:r>
+              <a:rPr lang="zh-CN" altLang="en-US" sz="1400" b="0" i="0" kern="1200" dirty="0" smtClean="0">
+                <a:solidFill>
+                  <a:schemeClr val="tx1"/>
+                </a:solidFill>
+                <a:effectLst/>
+                <a:latin typeface="+mn-lt"/>
+                <a:ea typeface="+mn-ea"/>
+                <a:cs typeface="+mn-cs"/>
+              </a:rPr>
+              <a:t>美</a:t>
+            </a:r>
+            <a:r>
+              <a:rPr lang="en-US" altLang="zh-CN" sz="1400" b="0" i="0" kern="1200" dirty="0" smtClean="0">
+                <a:solidFill>
+                  <a:schemeClr val="tx1"/>
+                </a:solidFill>
+                <a:effectLst/>
+                <a:latin typeface="+mn-lt"/>
+                <a:ea typeface="+mn-ea"/>
+                <a:cs typeface="+mn-cs"/>
+              </a:rPr>
+              <a:t>[ˈ</a:t>
+            </a:r>
+            <a:r>
+              <a:rPr lang="en-US" altLang="zh-CN" sz="1400" b="0" i="0" kern="1200" dirty="0" err="1" smtClean="0">
+                <a:solidFill>
+                  <a:schemeClr val="tx1"/>
+                </a:solidFill>
+                <a:effectLst/>
+                <a:latin typeface="+mn-lt"/>
+                <a:ea typeface="+mn-ea"/>
+                <a:cs typeface="+mn-cs"/>
+              </a:rPr>
+              <a:t>ɪdiəm</a:t>
+            </a:r>
+            <a:r>
+              <a:rPr lang="en-US" altLang="zh-CN" sz="1400" b="0" i="0" kern="1200" dirty="0" smtClean="0">
+                <a:solidFill>
+                  <a:schemeClr val="tx1"/>
+                </a:solidFill>
+                <a:effectLst/>
+                <a:latin typeface="+mn-lt"/>
+                <a:ea typeface="+mn-ea"/>
+                <a:cs typeface="+mn-cs"/>
+              </a:rPr>
+              <a:t>]</a:t>
+            </a:r>
+          </a:p>
+          <a:p>
+            <a:r>
+              <a:rPr lang="en-US" altLang="zh-CN" sz="1400" kern="1200" dirty="0" smtClean="0">
+                <a:solidFill>
+                  <a:schemeClr val="tx1"/>
+                </a:solidFill>
+                <a:effectLst/>
+                <a:latin typeface="+mn-lt"/>
+                <a:ea typeface="+mn-ea"/>
+                <a:cs typeface="+mn-cs"/>
+              </a:rPr>
+              <a:t>n.</a:t>
+            </a:r>
+            <a:r>
+              <a:rPr lang="zh-CN" altLang="en-US" sz="1400" kern="1200" dirty="0" smtClean="0">
+                <a:solidFill>
+                  <a:schemeClr val="tx1"/>
+                </a:solidFill>
+                <a:effectLst/>
+                <a:latin typeface="+mn-lt"/>
+                <a:ea typeface="+mn-ea"/>
+                <a:cs typeface="+mn-cs"/>
+              </a:rPr>
+              <a:t>习语，成语</a:t>
+            </a:r>
+            <a:r>
+              <a:rPr lang="en-US" altLang="zh-CN" sz="1400" kern="1200" dirty="0" smtClean="0">
+                <a:solidFill>
+                  <a:schemeClr val="tx1"/>
+                </a:solidFill>
+                <a:effectLst/>
+                <a:latin typeface="+mn-lt"/>
+                <a:ea typeface="+mn-ea"/>
+                <a:cs typeface="+mn-cs"/>
+              </a:rPr>
+              <a:t>; </a:t>
+            </a:r>
+            <a:r>
+              <a:rPr lang="zh-CN" altLang="en-US" sz="1400" kern="1200" dirty="0" smtClean="0">
+                <a:solidFill>
+                  <a:schemeClr val="tx1"/>
+                </a:solidFill>
+                <a:effectLst/>
+                <a:latin typeface="+mn-lt"/>
+                <a:ea typeface="+mn-ea"/>
+                <a:cs typeface="+mn-cs"/>
+              </a:rPr>
+              <a:t>方言，土语</a:t>
+            </a:r>
+            <a:r>
+              <a:rPr lang="en-US" altLang="zh-CN" sz="1400" kern="1200" dirty="0" smtClean="0">
+                <a:solidFill>
+                  <a:schemeClr val="tx1"/>
+                </a:solidFill>
+                <a:effectLst/>
+                <a:latin typeface="+mn-lt"/>
+                <a:ea typeface="+mn-ea"/>
+                <a:cs typeface="+mn-cs"/>
+              </a:rPr>
+              <a:t>; </a:t>
+            </a:r>
+            <a:r>
+              <a:rPr lang="zh-CN" altLang="en-US" sz="1400" kern="1200" dirty="0" smtClean="0">
+                <a:solidFill>
+                  <a:schemeClr val="tx1"/>
+                </a:solidFill>
+                <a:effectLst/>
+                <a:latin typeface="+mn-lt"/>
+                <a:ea typeface="+mn-ea"/>
+                <a:cs typeface="+mn-cs"/>
+              </a:rPr>
+              <a:t>（语言） 风格</a:t>
+            </a:r>
+            <a:r>
+              <a:rPr lang="en-US" altLang="zh-CN" sz="1400" kern="1200" dirty="0" smtClean="0">
+                <a:solidFill>
+                  <a:schemeClr val="tx1"/>
+                </a:solidFill>
+                <a:effectLst/>
+                <a:latin typeface="+mn-lt"/>
+                <a:ea typeface="+mn-ea"/>
+                <a:cs typeface="+mn-cs"/>
+              </a:rPr>
+              <a:t>; </a:t>
+            </a:r>
+            <a:r>
+              <a:rPr lang="zh-CN" altLang="en-US" sz="1400" kern="1200" dirty="0" smtClean="0">
+                <a:solidFill>
+                  <a:schemeClr val="tx1"/>
+                </a:solidFill>
+                <a:effectLst/>
+                <a:latin typeface="+mn-lt"/>
+                <a:ea typeface="+mn-ea"/>
+                <a:cs typeface="+mn-cs"/>
+              </a:rPr>
+              <a:t>惯用语法</a:t>
+            </a:r>
+            <a:r>
+              <a:rPr lang="en-US" altLang="zh-CN" sz="1400" kern="1200" dirty="0" smtClean="0">
+                <a:solidFill>
+                  <a:schemeClr val="tx1"/>
+                </a:solidFill>
+                <a:effectLst/>
+                <a:latin typeface="+mn-lt"/>
+                <a:ea typeface="+mn-ea"/>
+                <a:cs typeface="+mn-cs"/>
+              </a:rPr>
+              <a:t>;</a:t>
+            </a:r>
+            <a:r>
+              <a:rPr lang="zh-CN" altLang="en-US" dirty="0" smtClean="0"/>
+              <a:t/>
+            </a:r>
+            <a:br>
+              <a:rPr lang="zh-CN" altLang="en-US" dirty="0" smtClean="0"/>
+            </a:br>
             <a:endParaRPr lang="en-US" dirty="0"/>
           </a:p>
         </p:txBody>
@@ -8207,6 +8638,469 @@
           <a:lstStyle/>
           <a:p>
             <a:r>
+              <a:rPr lang="en-US" dirty="0" smtClean="0"/>
+              <a:t>Lazy Evaluation With Closures: Delay and Force</a:t>
+            </a:r>
+            <a:endParaRPr lang="en-US" dirty="0"/>
+          </a:p>
+        </p:txBody>
+      </p:sp>
+      <p:sp>
+        <p:nvSpPr>
+          <p:cNvPr id="9" name="Text Placeholder 8"/>
+          <p:cNvSpPr>
+            <a:spLocks noGrp="1"/>
+          </p:cNvSpPr>
+          <p:nvPr>
+            <p:ph type="body" sz="quarter" idx="11"/>
+          </p:nvPr>
+        </p:nvSpPr>
+        <p:spPr>
+          <a:xfrm>
+            <a:off x="323999" y="1691079"/>
+            <a:ext cx="6534001" cy="2160485"/>
+          </a:xfrm>
+        </p:spPr>
+        <p:txBody>
+          <a:bodyPr/>
+          <a:lstStyle/>
+          <a:p>
+            <a:r>
+              <a:rPr lang="en-US" sz="1800" dirty="0" err="1" smtClean="0"/>
+              <a:t>Thunk</a:t>
+            </a:r>
+            <a:r>
+              <a:rPr lang="en-US" sz="1800" dirty="0" smtClean="0"/>
+              <a:t>: a closure with no arguments</a:t>
+            </a:r>
+            <a:br>
+              <a:rPr lang="en-US" sz="1800" dirty="0" smtClean="0"/>
+            </a:br>
+            <a:r>
+              <a:rPr lang="en-US" sz="1800" dirty="0" smtClean="0"/>
+              <a:t>Used to delay evaluation of an expression until it is needed</a:t>
+            </a:r>
+            <a:br>
+              <a:rPr lang="en-US" sz="1800" dirty="0" smtClean="0"/>
+            </a:br>
+            <a:r>
+              <a:rPr lang="en-US" sz="1800" dirty="0" smtClean="0"/>
+              <a:t/>
+            </a:r>
+            <a:br>
+              <a:rPr lang="en-US" sz="1800" dirty="0" smtClean="0"/>
+            </a:br>
+            <a:r>
+              <a:rPr lang="en-US" sz="1800" dirty="0" smtClean="0"/>
+              <a:t>Example (in pseudo SML): parameters of a function</a:t>
+            </a:r>
+            <a:br>
+              <a:rPr lang="en-US" sz="1800" dirty="0" smtClean="0"/>
+            </a:br>
+            <a:r>
+              <a:rPr lang="en-US" sz="1400" b="0" dirty="0" smtClean="0">
+                <a:latin typeface="Courier New" panose="02070309020205020404" pitchFamily="49" charset="0"/>
+                <a:cs typeface="Courier New" panose="02070309020205020404" pitchFamily="49" charset="0"/>
+              </a:rPr>
+              <a:t>fun f (x, y, z) = if x then y else z</a:t>
+            </a:r>
+          </a:p>
+          <a:p>
+            <a:r>
+              <a:rPr lang="en-US" sz="1400" b="0" dirty="0" smtClean="0">
+                <a:latin typeface="Courier New" panose="02070309020205020404" pitchFamily="49" charset="0"/>
+                <a:cs typeface="Courier New" panose="02070309020205020404" pitchFamily="49" charset="0"/>
+              </a:rPr>
+              <a:t/>
+            </a:r>
+            <a:br>
+              <a:rPr lang="en-US" sz="1400" b="0" dirty="0" smtClean="0">
+                <a:latin typeface="Courier New" panose="02070309020205020404" pitchFamily="49" charset="0"/>
+                <a:cs typeface="Courier New" panose="02070309020205020404" pitchFamily="49" charset="0"/>
+              </a:rPr>
+            </a:br>
+            <a:r>
+              <a:rPr lang="en-US" sz="1400" b="0" dirty="0" smtClean="0">
+                <a:latin typeface="Courier New" panose="02070309020205020404" pitchFamily="49" charset="0"/>
+                <a:cs typeface="Courier New" panose="02070309020205020404" pitchFamily="49" charset="0"/>
+              </a:rPr>
+              <a:t>f (true, print “true”, print “false</a:t>
+            </a:r>
+            <a:r>
+              <a:rPr lang="en-US" sz="1400" b="0" dirty="0" smtClean="0">
+                <a:latin typeface="Courier New" panose="02070309020205020404" pitchFamily="49" charset="0"/>
+                <a:cs typeface="Courier New" panose="02070309020205020404" pitchFamily="49" charset="0"/>
+              </a:rPr>
+              <a:t>”)</a:t>
+            </a:r>
+            <a:endParaRPr lang="en-US" sz="1800" dirty="0"/>
+          </a:p>
+        </p:txBody>
+      </p:sp>
+      <p:sp>
+        <p:nvSpPr>
+          <p:cNvPr id="5" name="TextBox 4"/>
+          <p:cNvSpPr txBox="1"/>
+          <p:nvPr/>
+        </p:nvSpPr>
+        <p:spPr>
+          <a:xfrm>
+            <a:off x="4696690" y="3477491"/>
+            <a:ext cx="4322619" cy="553998"/>
+          </a:xfrm>
+          <a:prstGeom prst="rect">
+            <a:avLst/>
+          </a:prstGeom>
+          <a:noFill/>
+        </p:spPr>
+        <p:txBody>
+          <a:bodyPr wrap="square" lIns="0" tIns="0" rIns="0" bIns="0" rtlCol="0">
+            <a:spAutoFit/>
+          </a:bodyPr>
+          <a:lstStyle/>
+          <a:p>
+            <a:pPr fontAlgn="base">
+              <a:spcBef>
+                <a:spcPts val="600"/>
+              </a:spcBef>
+              <a:spcAft>
+                <a:spcPct val="0"/>
+              </a:spcAft>
+              <a:buClr>
+                <a:srgbClr val="F0AB00"/>
+              </a:buClr>
+              <a:buSzPct val="80000"/>
+            </a:pPr>
+            <a:r>
+              <a:rPr lang="en-US" sz="1800" dirty="0">
+                <a:latin typeface="Courier New" panose="02070309020205020404" pitchFamily="49" charset="0"/>
+                <a:cs typeface="Courier New" panose="02070309020205020404" pitchFamily="49" charset="0"/>
+                <a:sym typeface="Wingdings" panose="05000000000000000000" pitchFamily="2" charset="2"/>
+              </a:rPr>
+              <a:t>would print “</a:t>
+            </a:r>
+            <a:r>
+              <a:rPr lang="en-US" sz="1800" dirty="0" err="1">
+                <a:latin typeface="Courier New" panose="02070309020205020404" pitchFamily="49" charset="0"/>
+                <a:cs typeface="Courier New" panose="02070309020205020404" pitchFamily="49" charset="0"/>
+                <a:sym typeface="Wingdings" panose="05000000000000000000" pitchFamily="2" charset="2"/>
+              </a:rPr>
+              <a:t>true””false””true</a:t>
+            </a:r>
+            <a:r>
+              <a:rPr lang="en-US" sz="1800" dirty="0">
+                <a:latin typeface="Courier New" panose="02070309020205020404" pitchFamily="49" charset="0"/>
+                <a:cs typeface="Courier New" panose="02070309020205020404" pitchFamily="49" charset="0"/>
+                <a:sym typeface="Wingdings" panose="05000000000000000000" pitchFamily="2" charset="2"/>
+              </a:rPr>
+              <a:t>”</a:t>
+            </a:r>
+            <a:r>
+              <a:rPr lang="en-US" sz="1800" dirty="0">
+                <a:latin typeface="Courier New" panose="02070309020205020404" pitchFamily="49" charset="0"/>
+                <a:cs typeface="Courier New" panose="02070309020205020404" pitchFamily="49" charset="0"/>
+              </a:rPr>
+              <a:t/>
+            </a:r>
+            <a:br>
+              <a:rPr lang="en-US" sz="1800" dirty="0">
+                <a:latin typeface="Courier New" panose="02070309020205020404" pitchFamily="49" charset="0"/>
+                <a:cs typeface="Courier New" panose="02070309020205020404" pitchFamily="49" charset="0"/>
+              </a:rPr>
+            </a:br>
+            <a:endParaRPr lang="en-US" sz="1800" kern="0" dirty="0" smtClean="0">
+              <a:ea typeface="Arial Unicode MS" pitchFamily="34" charset="-128"/>
+              <a:cs typeface="Arial Unicode MS" pitchFamily="34" charset="-128"/>
+            </a:endParaRPr>
+          </a:p>
+        </p:txBody>
+      </p:sp>
+      <p:pic>
+        <p:nvPicPr>
+          <p:cNvPr id="6" name="Picture 5"/>
+          <p:cNvPicPr>
+            <a:picLocks noChangeAspect="1"/>
+          </p:cNvPicPr>
+          <p:nvPr/>
+        </p:nvPicPr>
+        <p:blipFill>
+          <a:blip r:embed="rId3"/>
+          <a:stretch>
+            <a:fillRect/>
+          </a:stretch>
+        </p:blipFill>
+        <p:spPr>
+          <a:xfrm>
+            <a:off x="296289" y="4031489"/>
+            <a:ext cx="10013548" cy="746825"/>
+          </a:xfrm>
+          <a:prstGeom prst="rect">
+            <a:avLst/>
+          </a:prstGeom>
+        </p:spPr>
+      </p:pic>
+      <p:sp>
+        <p:nvSpPr>
+          <p:cNvPr id="7" name="TextBox 6"/>
+          <p:cNvSpPr txBox="1"/>
+          <p:nvPr/>
+        </p:nvSpPr>
+        <p:spPr>
+          <a:xfrm>
+            <a:off x="323999" y="4959927"/>
+            <a:ext cx="11545201" cy="276999"/>
+          </a:xfrm>
+          <a:prstGeom prst="rect">
+            <a:avLst/>
+          </a:prstGeom>
+          <a:noFill/>
+        </p:spPr>
+        <p:txBody>
+          <a:bodyPr wrap="square" lIns="0" tIns="0" rIns="0" bIns="0" rtlCol="0">
+            <a:spAutoFit/>
+          </a:bodyPr>
+          <a:lstStyle/>
+          <a:p>
+            <a:pPr fontAlgn="base">
+              <a:spcBef>
+                <a:spcPts val="600"/>
+              </a:spcBef>
+              <a:spcAft>
+                <a:spcPct val="0"/>
+              </a:spcAft>
+              <a:buClr>
+                <a:srgbClr val="F0AB00"/>
+              </a:buClr>
+              <a:buSzPct val="80000"/>
+            </a:pPr>
+            <a:r>
+              <a:rPr lang="en-US" sz="1800" dirty="0"/>
+              <a:t>This works due to the fact that a function body is evaluated only if the function is </a:t>
+            </a:r>
+            <a:r>
+              <a:rPr lang="en-US" sz="1800" dirty="0" smtClean="0"/>
+              <a:t>called. </a:t>
+            </a:r>
+            <a:endParaRPr lang="en-US" sz="1800" dirty="0"/>
+          </a:p>
+        </p:txBody>
+      </p:sp>
+    </p:spTree>
+    <p:extLst>
+      <p:ext uri="{BB962C8B-B14F-4D97-AF65-F5344CB8AC3E}">
+        <p14:creationId xmlns:p14="http://schemas.microsoft.com/office/powerpoint/2010/main" val="228100004"/>
+      </p:ext>
+    </p:extLst>
+  </p:cSld>
+  <p:clrMapOvr>
+    <a:masterClrMapping/>
+  </p:clrMapOvr>
+  <p:transition spd="med"/>
+  <p:timing>
+    <p:tnLst>
+      <p:par>
+        <p:cTn id="1" dur="indefinite" restart="never" nodeType="tmRoot">
+          <p:childTnLst>
+            <p:seq concurrent="1" nextAc="seek">
+              <p:cTn id="2" dur="indefinite" nodeType="mainSeq">
+                <p:childTnLst>
+                  <p:par>
+                    <p:cTn id="3" fill="hold">
+                      <p:stCondLst>
+                        <p:cond delay="indefinite"/>
+                      </p:stCondLst>
+                      <p:childTnLst>
+                        <p:par>
+                          <p:cTn id="4" fill="hold">
+                            <p:stCondLst>
+                              <p:cond delay="0"/>
+                            </p:stCondLst>
+                            <p:childTnLst>
+                              <p:par>
+                                <p:cTn id="5" presetID="1" presetClass="entr" presetSubtype="0" fill="hold" grpId="0" nodeType="clickEffect">
+                                  <p:stCondLst>
+                                    <p:cond delay="0"/>
+                                  </p:stCondLst>
+                                  <p:childTnLst>
+                                    <p:set>
+                                      <p:cBhvr>
+                                        <p:cTn id="6" dur="1" fill="hold">
+                                          <p:stCondLst>
+                                            <p:cond delay="0"/>
+                                          </p:stCondLst>
+                                        </p:cTn>
+                                        <p:tgtEl>
+                                          <p:spTgt spid="5"/>
+                                        </p:tgtEl>
+                                        <p:attrNameLst>
+                                          <p:attrName>style.visibility</p:attrName>
+                                        </p:attrNameLst>
+                                      </p:cBhvr>
+                                      <p:to>
+                                        <p:strVal val="visible"/>
+                                      </p:to>
+                                    </p:set>
+                                  </p:childTnLst>
+                                </p:cTn>
+                              </p:par>
+                            </p:childTnLst>
+                          </p:cTn>
+                        </p:par>
+                      </p:childTnLst>
+                    </p:cTn>
+                  </p:par>
+                  <p:par>
+                    <p:cTn id="7" fill="hold">
+                      <p:stCondLst>
+                        <p:cond delay="indefinite"/>
+                      </p:stCondLst>
+                      <p:childTnLst>
+                        <p:par>
+                          <p:cTn id="8" fill="hold">
+                            <p:stCondLst>
+                              <p:cond delay="0"/>
+                            </p:stCondLst>
+                            <p:childTnLst>
+                              <p:par>
+                                <p:cTn id="9" presetID="1" presetClass="entr" presetSubtype="0" fill="hold" nodeType="clickEffect">
+                                  <p:stCondLst>
+                                    <p:cond delay="0"/>
+                                  </p:stCondLst>
+                                  <p:childTnLst>
+                                    <p:set>
+                                      <p:cBhvr>
+                                        <p:cTn id="10" dur="1" fill="hold">
+                                          <p:stCondLst>
+                                            <p:cond delay="0"/>
+                                          </p:stCondLst>
+                                        </p:cTn>
+                                        <p:tgtEl>
+                                          <p:spTgt spid="6"/>
+                                        </p:tgtEl>
+                                        <p:attrNameLst>
+                                          <p:attrName>style.visibility</p:attrName>
+                                        </p:attrNameLst>
+                                      </p:cBhvr>
+                                      <p:to>
+                                        <p:strVal val="visible"/>
+                                      </p:to>
+                                    </p:set>
+                                  </p:childTnLst>
+                                </p:cTn>
+                              </p:par>
+                            </p:childTnLst>
+                          </p:cTn>
+                        </p:par>
+                      </p:childTnLst>
+                    </p:cTn>
+                  </p:par>
+                  <p:par>
+                    <p:cTn id="11" fill="hold">
+                      <p:stCondLst>
+                        <p:cond delay="indefinite"/>
+                      </p:stCondLst>
+                      <p:childTnLst>
+                        <p:par>
+                          <p:cTn id="12" fill="hold">
+                            <p:stCondLst>
+                              <p:cond delay="0"/>
+                            </p:stCondLst>
+                            <p:childTnLst>
+                              <p:par>
+                                <p:cTn id="13" presetID="1" presetClass="entr" presetSubtype="0" fill="hold" grpId="0" nodeType="clickEffect">
+                                  <p:stCondLst>
+                                    <p:cond delay="0"/>
+                                  </p:stCondLst>
+                                  <p:childTnLst>
+                                    <p:set>
+                                      <p:cBhvr>
+                                        <p:cTn id="14" dur="1" fill="hold">
+                                          <p:stCondLst>
+                                            <p:cond delay="0"/>
+                                          </p:stCondLst>
+                                        </p:cTn>
+                                        <p:tgtEl>
+                                          <p:spTgt spid="7"/>
+                                        </p:tgtEl>
+                                        <p:attrNameLst>
+                                          <p:attrName>style.visibility</p:attrName>
+                                        </p:attrNameLst>
+                                      </p:cBhvr>
+                                      <p:to>
+                                        <p:strVal val="visible"/>
+                                      </p:to>
+                                    </p:set>
+                                  </p:childTnLst>
+                                </p:cTn>
+                              </p:par>
+                            </p:childTnLst>
+                          </p:cTn>
+                        </p:par>
+                      </p:childTnLst>
+                    </p:cTn>
+                  </p:par>
+                </p:childTnLst>
+              </p:cTn>
+              <p:prevCondLst>
+                <p:cond evt="onPrev" delay="0">
+                  <p:tgtEl>
+                    <p:sldTgt/>
+                  </p:tgtEl>
+                </p:cond>
+              </p:prevCondLst>
+              <p:nextCondLst>
+                <p:cond evt="onNext" delay="0">
+                  <p:tgtEl>
+                    <p:sldTgt/>
+                  </p:tgtEl>
+                </p:cond>
+              </p:nextCondLst>
+            </p:seq>
+          </p:childTnLst>
+        </p:cTn>
+      </p:par>
+    </p:tnLst>
+    <p:bldLst>
+      <p:bldP spid="5" grpId="0"/>
+      <p:bldP spid="7" grpId="0"/>
+    </p:bldLst>
+  </p:timing>
+</p:sld>
+</file>
+
+<file path=ppt/slides/slide11.xml><?xml version="1.0" encoding="utf-8"?>
+<p:sld xmlns:a="http://schemas.openxmlformats.org/drawingml/2006/main" xmlns:r="http://schemas.openxmlformats.org/officeDocument/2006/relationships" xmlns:p="http://schemas.openxmlformats.org/presentationml/2006/main">
+  <p:cSld>
+    <p:spTree>
+      <p:nvGrpSpPr>
+        <p:cNvPr id="1" name=""/>
+        <p:cNvGrpSpPr/>
+        <p:nvPr/>
+      </p:nvGrpSpPr>
+      <p:grpSpPr>
+        <a:xfrm>
+          <a:off x="0" y="0"/>
+          <a:ext cx="0" cy="0"/>
+          <a:chOff x="0" y="0"/>
+          <a:chExt cx="0" cy="0"/>
+        </a:xfrm>
+      </p:grpSpPr>
+      <p:sp>
+        <p:nvSpPr>
+          <p:cNvPr id="2" name="Title 1"/>
+          <p:cNvSpPr>
+            <a:spLocks noGrp="1"/>
+          </p:cNvSpPr>
+          <p:nvPr>
+            <p:ph type="title"/>
+          </p:nvPr>
+        </p:nvSpPr>
+        <p:spPr/>
+        <p:txBody>
+          <a:bodyPr/>
+          <a:lstStyle/>
+          <a:p>
+            <a:r>
               <a:rPr lang="en-US" altLang="zh-CN" dirty="0" smtClean="0"/>
               <a:t>JavaScript Example </a:t>
             </a:r>
@@ -8367,7 +9261,7 @@
 </p:sld>
 </file>
 
-<file path=ppt/slides/slide11.xml><?xml version="1.0" encoding="utf-8"?>
+<file path=ppt/slides/slide12.xml><?xml version="1.0" encoding="utf-8"?>
 <p:sld xmlns:a="http://schemas.openxmlformats.org/drawingml/2006/main" xmlns:r="http://schemas.openxmlformats.org/officeDocument/2006/relationships" xmlns:p="http://schemas.openxmlformats.org/presentationml/2006/main">
   <p:cSld>
     <p:spTree>
@@ -8577,7 +9471,7 @@
 </p:sld>
 </file>
 
-<file path=ppt/slides/slide12.xml><?xml version="1.0" encoding="utf-8"?>
+<file path=ppt/slides/slide13.xml><?xml version="1.0" encoding="utf-8"?>
 <p:sld xmlns:a="http://schemas.openxmlformats.org/drawingml/2006/main" xmlns:r="http://schemas.openxmlformats.org/officeDocument/2006/relationships" xmlns:p="http://schemas.openxmlformats.org/presentationml/2006/main">
   <p:cSld>
     <p:spTree>
@@ -8661,7 +9555,7 @@
 </p:sld>
 </file>
 
-<file path=ppt/slides/slide13.xml><?xml version="1.0" encoding="utf-8"?>
+<file path=ppt/slides/slide14.xml><?xml version="1.0" encoding="utf-8"?>
 <p:sld xmlns:a="http://schemas.openxmlformats.org/drawingml/2006/main" xmlns:r="http://schemas.openxmlformats.org/officeDocument/2006/relationships" xmlns:p="http://schemas.openxmlformats.org/presentationml/2006/main">
   <p:cSld>
     <p:spTree>
@@ -9029,7 +9923,7 @@
 </p:sld>
 </file>
 
-<file path=ppt/slides/slide14.xml><?xml version="1.0" encoding="utf-8"?>
+<file path=ppt/slides/slide15.xml><?xml version="1.0" encoding="utf-8"?>
 <p:sld xmlns:a="http://schemas.openxmlformats.org/drawingml/2006/main" xmlns:r="http://schemas.openxmlformats.org/officeDocument/2006/relationships" xmlns:p="http://schemas.openxmlformats.org/presentationml/2006/main">
   <p:cSld>
     <p:spTree>
@@ -9422,7 +10316,7 @@
 </p:sld>
 </file>
 
-<file path=ppt/slides/slide15.xml><?xml version="1.0" encoding="utf-8"?>
+<file path=ppt/slides/slide16.xml><?xml version="1.0" encoding="utf-8"?>
 <p:sld xmlns:a="http://schemas.openxmlformats.org/drawingml/2006/main" xmlns:r="http://schemas.openxmlformats.org/officeDocument/2006/relationships" xmlns:p="http://schemas.openxmlformats.org/presentationml/2006/main">
   <p:cSld>
     <p:spTree>
@@ -9644,8 +10538,16 @@
           </a:p>
           <a:p>
             <a:r>
+              <a:rPr lang="en-US" sz="1800" dirty="0" smtClean="0"/>
+              <a:t>$(‘#</a:t>
+            </a:r>
+            <a:r>
+              <a:rPr lang="en-US" sz="1800" dirty="0" err="1" smtClean="0"/>
+              <a:t>logon_button</a:t>
+            </a:r>
+            <a:r>
               <a:rPr lang="en-US" sz="1800" dirty="0"/>
-              <a:t>$('button').click(function(){</a:t>
+              <a:t>').click(function(){</a:t>
             </a:r>
           </a:p>
           <a:p>
@@ -9892,7 +10794,7 @@
 </p:sld>
 </file>
 
-<file path=ppt/slides/slide16.xml><?xml version="1.0" encoding="utf-8"?>
+<file path=ppt/slides/slide17.xml><?xml version="1.0" encoding="utf-8"?>
 <p:sld xmlns:a="http://schemas.openxmlformats.org/drawingml/2006/main" xmlns:r="http://schemas.openxmlformats.org/officeDocument/2006/relationships" xmlns:p="http://schemas.openxmlformats.org/presentationml/2006/main">
   <p:cSld>
     <p:spTree>
@@ -9992,7 +10894,19 @@
           <a:p>
             <a:r>
               <a:rPr lang="en-US" sz="2000" dirty="0"/>
-              <a:t>$( ''button').click(function(){</a:t>
+              <a:t>$( </a:t>
+            </a:r>
+            <a:r>
+              <a:rPr lang="en-US" sz="2000" dirty="0" smtClean="0"/>
+              <a:t>'‘#</a:t>
+            </a:r>
+            <a:r>
+              <a:rPr lang="en-US" sz="2000" dirty="0" err="1" smtClean="0"/>
+              <a:t>logon_button</a:t>
+            </a:r>
+            <a:r>
+              <a:rPr lang="en-US" sz="2000" dirty="0"/>
+              <a:t>').click(function(){</a:t>
             </a:r>
           </a:p>
           <a:p>
@@ -10160,7 +11074,7 @@
 </p:sld>
 </file>
 
-<file path=ppt/slides/slide17.xml><?xml version="1.0" encoding="utf-8"?>
+<file path=ppt/slides/slide18.xml><?xml version="1.0" encoding="utf-8"?>
 <p:sld xmlns:a="http://schemas.openxmlformats.org/drawingml/2006/main" xmlns:r="http://schemas.openxmlformats.org/officeDocument/2006/relationships" xmlns:p="http://schemas.openxmlformats.org/presentationml/2006/main">
   <p:cSld>
     <p:spTree>
@@ -10489,7 +11403,7 @@
 </p:sld>
 </file>
 
-<file path=ppt/slides/slide18.xml><?xml version="1.0" encoding="utf-8"?>
+<file path=ppt/slides/slide19.xml><?xml version="1.0" encoding="utf-8"?>
 <p:sld xmlns:a="http://schemas.openxmlformats.org/drawingml/2006/main" xmlns:r="http://schemas.openxmlformats.org/officeDocument/2006/relationships" xmlns:p="http://schemas.openxmlformats.org/presentationml/2006/main">
   <p:cSld>
     <p:spTree>
@@ -10768,324 +11682,6 @@
 </p:sld>
 </file>
 
-<file path=ppt/slides/slide19.xml><?xml version="1.0" encoding="utf-8"?>
-<p:sld xmlns:a="http://schemas.openxmlformats.org/drawingml/2006/main" xmlns:r="http://schemas.openxmlformats.org/officeDocument/2006/relationships" xmlns:p="http://schemas.openxmlformats.org/presentationml/2006/main">
-  <p:cSld>
-    <p:spTree>
-      <p:nvGrpSpPr>
-        <p:cNvPr id="1" name=""/>
-        <p:cNvGrpSpPr/>
-        <p:nvPr/>
-      </p:nvGrpSpPr>
-      <p:grpSpPr>
-        <a:xfrm>
-          <a:off x="0" y="0"/>
-          <a:ext cx="0" cy="0"/>
-          <a:chOff x="0" y="0"/>
-          <a:chExt cx="0" cy="0"/>
-        </a:xfrm>
-      </p:grpSpPr>
-      <p:sp>
-        <p:nvSpPr>
-          <p:cNvPr id="2" name="Title 1"/>
-          <p:cNvSpPr>
-            <a:spLocks noGrp="1"/>
-          </p:cNvSpPr>
-          <p:nvPr>
-            <p:ph type="title"/>
-          </p:nvPr>
-        </p:nvSpPr>
-        <p:spPr/>
-        <p:txBody>
-          <a:bodyPr/>
-          <a:lstStyle/>
-          <a:p>
-            <a:r>
-              <a:rPr lang="en-US" dirty="0"/>
-              <a:t>JavaScript Example: Lazy Load </a:t>
-            </a:r>
-            <a:r>
-              <a:rPr lang="en-US" dirty="0" smtClean="0"/>
-              <a:t>Scenario – final version</a:t>
-            </a:r>
-            <a:endParaRPr lang="en-US" dirty="0"/>
-          </a:p>
-        </p:txBody>
-      </p:sp>
-      <p:sp>
-        <p:nvSpPr>
-          <p:cNvPr id="5" name="TextBox 4"/>
-          <p:cNvSpPr txBox="1"/>
-          <p:nvPr/>
-        </p:nvSpPr>
-        <p:spPr>
-          <a:xfrm>
-            <a:off x="152400" y="1343891"/>
-            <a:ext cx="10903527" cy="3385542"/>
-          </a:xfrm>
-          <a:prstGeom prst="rect">
-            <a:avLst/>
-          </a:prstGeom>
-          <a:noFill/>
-        </p:spPr>
-        <p:txBody>
-          <a:bodyPr wrap="square" lIns="0" tIns="0" rIns="0" bIns="0" rtlCol="0">
-            <a:spAutoFit/>
-          </a:bodyPr>
-          <a:lstStyle/>
-          <a:p>
-            <a:r>
-              <a:rPr lang="en-US" sz="2000" dirty="0"/>
-              <a:t>We can also write a generic function to enable any other function to behave as singleton style:</a:t>
-            </a:r>
-          </a:p>
-          <a:p>
-            <a:endParaRPr lang="en-US" sz="2000" dirty="0"/>
-          </a:p>
-          <a:p>
-            <a:r>
-              <a:rPr lang="en-US" sz="2000" b="1" dirty="0" err="1"/>
-              <a:t>var</a:t>
-            </a:r>
-            <a:r>
-              <a:rPr lang="en-US" sz="2000" b="1" dirty="0"/>
-              <a:t> singleton = function(</a:t>
-            </a:r>
-            <a:r>
-              <a:rPr lang="en-US" sz="2000" b="1" dirty="0" err="1"/>
-              <a:t>fn</a:t>
-            </a:r>
-            <a:r>
-              <a:rPr lang="en-US" sz="2000" b="1" dirty="0"/>
-              <a:t>){</a:t>
-            </a:r>
-          </a:p>
-          <a:p>
-            <a:r>
-              <a:rPr lang="en-US" sz="2000" b="1" dirty="0"/>
-              <a:t>    </a:t>
-            </a:r>
-            <a:r>
-              <a:rPr lang="en-US" sz="2000" b="1" dirty="0" err="1"/>
-              <a:t>var</a:t>
-            </a:r>
-            <a:r>
-              <a:rPr lang="en-US" sz="2000" b="1" dirty="0"/>
-              <a:t> result;</a:t>
-            </a:r>
-          </a:p>
-          <a:p>
-            <a:r>
-              <a:rPr lang="en-US" sz="2000" b="1" dirty="0"/>
-              <a:t>    return function() {</a:t>
-            </a:r>
-          </a:p>
-          <a:p>
-            <a:r>
-              <a:rPr lang="en-US" sz="2000" b="1" dirty="0"/>
-              <a:t>        return result || ( result = </a:t>
-            </a:r>
-            <a:r>
-              <a:rPr lang="en-US" sz="2000" b="1" dirty="0" err="1"/>
-              <a:t>fn.apply</a:t>
-            </a:r>
-            <a:r>
-              <a:rPr lang="en-US" sz="2000" b="1" dirty="0"/>
-              <a:t>(</a:t>
-            </a:r>
-            <a:r>
-              <a:rPr lang="en-US" sz="2000" b="1" dirty="0" err="1"/>
-              <a:t>this,arguments</a:t>
-            </a:r>
-            <a:r>
-              <a:rPr lang="en-US" sz="2000" b="1" dirty="0"/>
-              <a:t>));</a:t>
-            </a:r>
-          </a:p>
-          <a:p>
-            <a:r>
-              <a:rPr lang="en-US" sz="2000" b="1" dirty="0"/>
-              <a:t>    }</a:t>
-            </a:r>
-          </a:p>
-          <a:p>
-            <a:r>
-              <a:rPr lang="en-US" sz="2000" b="1" dirty="0" smtClean="0"/>
-              <a:t>}</a:t>
-            </a:r>
-          </a:p>
-          <a:p>
-            <a:endParaRPr lang="en-US" sz="2000" dirty="0"/>
-          </a:p>
-          <a:p>
-            <a:r>
-              <a:rPr lang="en-US" sz="2000" dirty="0"/>
-              <a:t>The singleton function accepts a function as input, and return a new function which behaves like singleton. </a:t>
-            </a:r>
-          </a:p>
-        </p:txBody>
-      </p:sp>
-      <p:sp>
-        <p:nvSpPr>
-          <p:cNvPr id="4" name="TextBox 3"/>
-          <p:cNvSpPr txBox="1"/>
-          <p:nvPr/>
-        </p:nvSpPr>
-        <p:spPr>
-          <a:xfrm>
-            <a:off x="152400" y="4876800"/>
-            <a:ext cx="11430000" cy="923330"/>
-          </a:xfrm>
-          <a:prstGeom prst="rect">
-            <a:avLst/>
-          </a:prstGeom>
-          <a:noFill/>
-        </p:spPr>
-        <p:txBody>
-          <a:bodyPr wrap="square" lIns="0" tIns="0" rIns="0" bIns="0" rtlCol="0">
-            <a:spAutoFit/>
-          </a:bodyPr>
-          <a:lstStyle/>
-          <a:p>
-            <a:r>
-              <a:rPr lang="en-US" sz="2000" b="1" dirty="0" err="1"/>
-              <a:t>var</a:t>
-            </a:r>
-            <a:r>
-              <a:rPr lang="en-US" sz="2000" b="1" dirty="0"/>
-              <a:t> </a:t>
-            </a:r>
-            <a:r>
-              <a:rPr lang="en-US" sz="2000" b="1" dirty="0" err="1"/>
-              <a:t>createMask</a:t>
-            </a:r>
-            <a:r>
-              <a:rPr lang="en-US" sz="2000" b="1" dirty="0"/>
-              <a:t> = singleton(function(){</a:t>
-            </a:r>
-          </a:p>
-          <a:p>
-            <a:r>
-              <a:rPr lang="en-US" sz="2000" b="1" dirty="0"/>
-              <a:t>  return </a:t>
-            </a:r>
-            <a:r>
-              <a:rPr lang="en-US" sz="2000" b="1" dirty="0" err="1"/>
-              <a:t>document.body.appendChild</a:t>
-            </a:r>
-            <a:r>
-              <a:rPr lang="en-US" sz="2000" b="1" dirty="0"/>
-              <a:t>(</a:t>
-            </a:r>
-            <a:r>
-              <a:rPr lang="en-US" sz="2000" b="1" dirty="0" err="1"/>
-              <a:t>document.createElement</a:t>
-            </a:r>
-            <a:r>
-              <a:rPr lang="en-US" sz="2000" b="1" dirty="0"/>
-              <a:t>('div'));</a:t>
-            </a:r>
-          </a:p>
-          <a:p>
-            <a:r>
-              <a:rPr lang="en-US" sz="2000" b="1" dirty="0" smtClean="0"/>
-              <a:t>});</a:t>
-            </a:r>
-            <a:endParaRPr lang="en-US" sz="2000" b="1" dirty="0"/>
-          </a:p>
-        </p:txBody>
-      </p:sp>
-    </p:spTree>
-    <p:extLst>
-      <p:ext uri="{BB962C8B-B14F-4D97-AF65-F5344CB8AC3E}">
-        <p14:creationId xmlns:p14="http://schemas.microsoft.com/office/powerpoint/2010/main" val="1912123345"/>
-      </p:ext>
-    </p:extLst>
-  </p:cSld>
-  <p:clrMapOvr>
-    <a:masterClrMapping/>
-  </p:clrMapOvr>
-  <p:timing>
-    <p:tnLst>
-      <p:par>
-        <p:cTn id="1" dur="indefinite" restart="never" nodeType="tmRoot">
-          <p:childTnLst>
-            <p:seq concurrent="1" nextAc="seek">
-              <p:cTn id="2" dur="indefinite" nodeType="mainSeq">
-                <p:childTnLst>
-                  <p:par>
-                    <p:cTn id="3" fill="hold">
-                      <p:stCondLst>
-                        <p:cond delay="indefinite"/>
-                      </p:stCondLst>
-                      <p:childTnLst>
-                        <p:par>
-                          <p:cTn id="4" fill="hold">
-                            <p:stCondLst>
-                              <p:cond delay="0"/>
-                            </p:stCondLst>
-                            <p:childTnLst>
-                              <p:par>
-                                <p:cTn id="5" presetID="1" presetClass="entr" presetSubtype="0" fill="hold" grpId="0" nodeType="clickEffect">
-                                  <p:stCondLst>
-                                    <p:cond delay="0"/>
-                                  </p:stCondLst>
-                                  <p:childTnLst>
-                                    <p:set>
-                                      <p:cBhvr>
-                                        <p:cTn id="6" dur="1" fill="hold">
-                                          <p:stCondLst>
-                                            <p:cond delay="0"/>
-                                          </p:stCondLst>
-                                        </p:cTn>
-                                        <p:tgtEl>
-                                          <p:spTgt spid="4"/>
-                                        </p:tgtEl>
-                                        <p:attrNameLst>
-                                          <p:attrName>style.visibility</p:attrName>
-                                        </p:attrNameLst>
-                                      </p:cBhvr>
-                                      <p:to>
-                                        <p:strVal val="visible"/>
-                                      </p:to>
-                                    </p:set>
-                                  </p:childTnLst>
-                                </p:cTn>
-                              </p:par>
-                            </p:childTnLst>
-                          </p:cTn>
-                        </p:par>
-                      </p:childTnLst>
-                    </p:cTn>
-                  </p:par>
-                </p:childTnLst>
-              </p:cTn>
-              <p:prevCondLst>
-                <p:cond evt="onPrev" delay="0">
-                  <p:tgtEl>
-                    <p:sldTgt/>
-                  </p:tgtEl>
-                </p:cond>
-              </p:prevCondLst>
-              <p:nextCondLst>
-                <p:cond evt="onNext" delay="0">
-                  <p:tgtEl>
-                    <p:sldTgt/>
-                  </p:tgtEl>
-                </p:cond>
-              </p:nextCondLst>
-            </p:seq>
-          </p:childTnLst>
-        </p:cTn>
-      </p:par>
-    </p:tnLst>
-    <p:bldLst>
-      <p:bldP spid="4" grpId="0"/>
-    </p:bldLst>
-  </p:timing>
-</p:sld>
-</file>
-
 <file path=ppt/slides/slide2.xml><?xml version="1.0" encoding="utf-8"?>
 <p:sld xmlns:a="http://schemas.openxmlformats.org/drawingml/2006/main" xmlns:r="http://schemas.openxmlformats.org/officeDocument/2006/relationships" xmlns:p="http://schemas.openxmlformats.org/presentationml/2006/main">
   <p:cSld>
@@ -11166,9 +11762,54 @@
               <a:t>defined</a:t>
             </a:r>
             <a:r>
+              <a:rPr lang="en-US" sz="1800" u="sng" dirty="0" smtClean="0"/>
+              <a:t>,</a:t>
+            </a:r>
+            <a:r>
               <a:rPr lang="en-US" sz="1800" dirty="0" smtClean="0"/>
-              <a:t>)</a:t>
-            </a:r>
+              <a:t> the </a:t>
+            </a:r>
+            <a:r>
+              <a:rPr lang="en-US" altLang="zh-CN" sz="1800" dirty="0" smtClean="0"/>
+              <a:t>scope</a:t>
+            </a:r>
+            <a:r>
+              <a:rPr lang="en-US" altLang="zh-CN" sz="1800" dirty="0"/>
+              <a:t> </a:t>
+            </a:r>
+            <a:r>
+              <a:rPr lang="en-US" sz="1800" dirty="0" smtClean="0"/>
+              <a:t>of </a:t>
+            </a:r>
+            <a:r>
+              <a:rPr lang="en-US" sz="1800" dirty="0"/>
+              <a:t>an </a:t>
+            </a:r>
+            <a:r>
+              <a:rPr lang="en-US" altLang="zh-CN" sz="1800" dirty="0"/>
+              <a:t>identifier</a:t>
+            </a:r>
+            <a:r>
+              <a:rPr lang="en-US" sz="1800" dirty="0"/>
+              <a:t> is fixed </a:t>
+            </a:r>
+            <a:r>
+              <a:rPr lang="en-US" sz="1800" dirty="0" smtClean="0"/>
+              <a:t>at</a:t>
+            </a:r>
+            <a:r>
+              <a:rPr lang="en-US" sz="1800" dirty="0"/>
+              <a:t> </a:t>
+            </a:r>
+            <a:r>
+              <a:rPr lang="en-US" altLang="zh-CN" sz="1800" dirty="0" smtClean="0"/>
+              <a:t>compile time</a:t>
+            </a:r>
+            <a:r>
+              <a:rPr lang="en-US" sz="1800" dirty="0" smtClean="0"/>
+              <a:t>) </a:t>
+            </a:r>
+            <a:endParaRPr lang="en-US" sz="1800" dirty="0" smtClean="0"/>
           </a:p>
           <a:p>
             <a:r>
@@ -11326,7 +11967,11 @@
             <a:graphicFrameLocks noGrp="1"/>
           </p:cNvGraphicFramePr>
           <p:nvPr>
-            <p:extLst/>
+            <p:extLst>
+              <p:ext uri="{D42A27DB-BD31-4B8C-83A1-F6EECF244321}">
+                <p14:modId xmlns:p14="http://schemas.microsoft.com/office/powerpoint/2010/main" val="3588873633"/>
+              </p:ext>
+            </p:extLst>
           </p:nvPr>
         </p:nvGraphicFramePr>
         <p:xfrm>
@@ -11392,20 +12037,29 @@
                     <a:lstStyle/>
                     <a:p>
                       <a:r>
-                        <a:rPr lang="de-DE" sz="1400" dirty="0" err="1" smtClean="0">
+                        <a:rPr lang="de-DE" sz="1600" b="1" dirty="0" err="1" smtClean="0">
+                          <a:solidFill>
+                            <a:srgbClr val="FF0000"/>
+                          </a:solidFill>
                           <a:latin typeface="Courier New" panose="02070309020205020404" pitchFamily="49" charset="0"/>
                           <a:cs typeface="Courier New" panose="02070309020205020404" pitchFamily="49" charset="0"/>
                         </a:rPr>
                         <a:t>val</a:t>
                       </a:r>
                       <a:r>
-                        <a:rPr lang="de-DE" sz="1400" dirty="0" smtClean="0">
+                        <a:rPr lang="de-DE" sz="1600" b="1" dirty="0" smtClean="0">
+                          <a:solidFill>
+                            <a:srgbClr val="FF0000"/>
+                          </a:solidFill>
                           <a:latin typeface="Courier New" panose="02070309020205020404" pitchFamily="49" charset="0"/>
                           <a:cs typeface="Courier New" panose="02070309020205020404" pitchFamily="49" charset="0"/>
                         </a:rPr>
                         <a:t> z = 2</a:t>
                       </a:r>
-                      <a:endParaRPr lang="de-DE" sz="1400" dirty="0">
+                      <a:endParaRPr lang="de-DE" sz="1600" b="1" dirty="0">
+                        <a:solidFill>
+                          <a:srgbClr val="FF0000"/>
+                        </a:solidFill>
                         <a:latin typeface="Courier New" panose="02070309020205020404" pitchFamily="49" charset="0"/>
                         <a:cs typeface="Courier New" panose="02070309020205020404" pitchFamily="49" charset="0"/>
                       </a:endParaRPr>
@@ -11419,20 +12073,29 @@
                     <a:lstStyle/>
                     <a:p>
                       <a:r>
-                        <a:rPr lang="de-DE" sz="1400" dirty="0" err="1" smtClean="0">
+                        <a:rPr lang="de-DE" sz="1600" b="1" dirty="0" err="1" smtClean="0">
+                          <a:solidFill>
+                            <a:srgbClr val="FF0000"/>
+                          </a:solidFill>
                           <a:latin typeface="Courier New" panose="02070309020205020404" pitchFamily="49" charset="0"/>
                           <a:cs typeface="Courier New" panose="02070309020205020404" pitchFamily="49" charset="0"/>
                         </a:rPr>
                         <a:t>val</a:t>
                       </a:r>
                       <a:r>
-                        <a:rPr lang="de-DE" sz="1400" dirty="0" smtClean="0">
+                        <a:rPr lang="de-DE" sz="1600" b="1" dirty="0" smtClean="0">
+                          <a:solidFill>
+                            <a:srgbClr val="FF0000"/>
+                          </a:solidFill>
                           <a:latin typeface="Courier New" panose="02070309020205020404" pitchFamily="49" charset="0"/>
                           <a:cs typeface="Courier New" panose="02070309020205020404" pitchFamily="49" charset="0"/>
                         </a:rPr>
                         <a:t> z = 3</a:t>
                       </a:r>
-                      <a:endParaRPr lang="de-DE" sz="1400" dirty="0">
+                      <a:endParaRPr lang="de-DE" sz="1600" b="1" dirty="0">
+                        <a:solidFill>
+                          <a:srgbClr val="FF0000"/>
+                        </a:solidFill>
                         <a:latin typeface="Courier New" panose="02070309020205020404" pitchFamily="49" charset="0"/>
                         <a:cs typeface="Courier New" panose="02070309020205020404" pitchFamily="49" charset="0"/>
                       </a:endParaRPr>
@@ -11500,6 +12163,427 @@
           <a:p>
             <a:r>
               <a:rPr lang="en-US" dirty="0"/>
+              <a:t>JavaScript Example: Lazy Load </a:t>
+            </a:r>
+            <a:r>
+              <a:rPr lang="en-US" dirty="0" smtClean="0"/>
+              <a:t>Scenario – final version</a:t>
+            </a:r>
+            <a:endParaRPr lang="en-US" dirty="0"/>
+          </a:p>
+        </p:txBody>
+      </p:sp>
+      <p:sp>
+        <p:nvSpPr>
+          <p:cNvPr id="5" name="TextBox 4"/>
+          <p:cNvSpPr txBox="1"/>
+          <p:nvPr/>
+        </p:nvSpPr>
+        <p:spPr>
+          <a:xfrm>
+            <a:off x="152400" y="1343891"/>
+            <a:ext cx="10903527" cy="615553"/>
+          </a:xfrm>
+          <a:prstGeom prst="rect">
+            <a:avLst/>
+          </a:prstGeom>
+          <a:noFill/>
+        </p:spPr>
+        <p:txBody>
+          <a:bodyPr wrap="square" lIns="0" tIns="0" rIns="0" bIns="0" rtlCol="0">
+            <a:spAutoFit/>
+          </a:bodyPr>
+          <a:lstStyle/>
+          <a:p>
+            <a:r>
+              <a:rPr lang="en-US" sz="2000" dirty="0"/>
+              <a:t>We can also write a generic function to enable any other function to behave as singleton style:</a:t>
+            </a:r>
+          </a:p>
+          <a:p>
+            <a:endParaRPr lang="en-US" sz="2000" dirty="0"/>
+          </a:p>
+        </p:txBody>
+      </p:sp>
+      <p:sp>
+        <p:nvSpPr>
+          <p:cNvPr id="4" name="TextBox 3"/>
+          <p:cNvSpPr txBox="1"/>
+          <p:nvPr/>
+        </p:nvSpPr>
+        <p:spPr>
+          <a:xfrm>
+            <a:off x="152400" y="4876800"/>
+            <a:ext cx="11430000" cy="923330"/>
+          </a:xfrm>
+          <a:prstGeom prst="rect">
+            <a:avLst/>
+          </a:prstGeom>
+          <a:noFill/>
+        </p:spPr>
+        <p:txBody>
+          <a:bodyPr wrap="square" lIns="0" tIns="0" rIns="0" bIns="0" rtlCol="0">
+            <a:spAutoFit/>
+          </a:bodyPr>
+          <a:lstStyle/>
+          <a:p>
+            <a:r>
+              <a:rPr lang="en-US" sz="2000" b="1" dirty="0" err="1"/>
+              <a:t>var</a:t>
+            </a:r>
+            <a:r>
+              <a:rPr lang="en-US" sz="2000" b="1" dirty="0"/>
+              <a:t> </a:t>
+            </a:r>
+            <a:r>
+              <a:rPr lang="en-US" sz="2000" b="1" dirty="0" err="1">
+                <a:solidFill>
+                  <a:srgbClr val="FF0000"/>
+                </a:solidFill>
+              </a:rPr>
+              <a:t>createMask</a:t>
+            </a:r>
+            <a:r>
+              <a:rPr lang="en-US" sz="2000" b="1" dirty="0"/>
+              <a:t> = </a:t>
+            </a:r>
+            <a:r>
+              <a:rPr lang="en-US" sz="2000" b="1" dirty="0">
+                <a:solidFill>
+                  <a:srgbClr val="FF0000"/>
+                </a:solidFill>
+              </a:rPr>
+              <a:t>singleton</a:t>
+            </a:r>
+            <a:r>
+              <a:rPr lang="en-US" sz="2000" b="1" dirty="0"/>
+              <a:t>(function(){</a:t>
+            </a:r>
+          </a:p>
+          <a:p>
+            <a:r>
+              <a:rPr lang="en-US" sz="2000" b="1" dirty="0"/>
+              <a:t>  return </a:t>
+            </a:r>
+            <a:r>
+              <a:rPr lang="en-US" sz="2000" b="1" dirty="0" err="1"/>
+              <a:t>document.body.appendChild</a:t>
+            </a:r>
+            <a:r>
+              <a:rPr lang="en-US" sz="2000" b="1" dirty="0"/>
+              <a:t>(</a:t>
+            </a:r>
+            <a:r>
+              <a:rPr lang="en-US" sz="2000" b="1" dirty="0" err="1"/>
+              <a:t>document.createElement</a:t>
+            </a:r>
+            <a:r>
+              <a:rPr lang="en-US" sz="2000" b="1" dirty="0"/>
+              <a:t>('div'));</a:t>
+            </a:r>
+          </a:p>
+          <a:p>
+            <a:r>
+              <a:rPr lang="en-US" sz="2000" b="1" dirty="0" smtClean="0"/>
+              <a:t>});</a:t>
+            </a:r>
+            <a:endParaRPr lang="en-US" sz="2000" b="1" dirty="0"/>
+          </a:p>
+        </p:txBody>
+      </p:sp>
+      <p:sp>
+        <p:nvSpPr>
+          <p:cNvPr id="3" name="TextBox 2"/>
+          <p:cNvSpPr txBox="1"/>
+          <p:nvPr/>
+        </p:nvSpPr>
+        <p:spPr>
+          <a:xfrm>
+            <a:off x="152400" y="1814945"/>
+            <a:ext cx="11817927" cy="2569934"/>
+          </a:xfrm>
+          <a:prstGeom prst="rect">
+            <a:avLst/>
+          </a:prstGeom>
+          <a:noFill/>
+        </p:spPr>
+        <p:txBody>
+          <a:bodyPr wrap="square" lIns="0" tIns="0" rIns="0" bIns="0" rtlCol="0">
+            <a:spAutoFit/>
+          </a:bodyPr>
+          <a:lstStyle/>
+          <a:p>
+            <a:r>
+              <a:rPr lang="en-US" sz="1800" b="1" dirty="0" err="1"/>
+              <a:t>var</a:t>
+            </a:r>
+            <a:r>
+              <a:rPr lang="en-US" sz="1800" b="1" dirty="0"/>
+              <a:t> singleton = function(</a:t>
+            </a:r>
+            <a:r>
+              <a:rPr lang="en-US" sz="1800" b="1" dirty="0" err="1"/>
+              <a:t>fn</a:t>
+            </a:r>
+            <a:r>
+              <a:rPr lang="en-US" sz="1800" b="1" dirty="0"/>
+              <a:t>){</a:t>
+            </a:r>
+          </a:p>
+          <a:p>
+            <a:r>
+              <a:rPr lang="en-US" sz="1800" b="1" dirty="0"/>
+              <a:t>    </a:t>
+            </a:r>
+            <a:r>
+              <a:rPr lang="en-US" sz="1800" b="1" dirty="0" err="1"/>
+              <a:t>var</a:t>
+            </a:r>
+            <a:r>
+              <a:rPr lang="en-US" sz="1800" b="1" dirty="0"/>
+              <a:t> result;</a:t>
+            </a:r>
+          </a:p>
+          <a:p>
+            <a:r>
+              <a:rPr lang="en-US" sz="1800" b="1" dirty="0"/>
+              <a:t>    return function() {</a:t>
+            </a:r>
+          </a:p>
+          <a:p>
+            <a:r>
+              <a:rPr lang="en-US" sz="1800" b="1" dirty="0"/>
+              <a:t>        return result || ( result = </a:t>
+            </a:r>
+            <a:r>
+              <a:rPr lang="en-US" sz="1800" b="1" dirty="0" err="1"/>
+              <a:t>fn.apply</a:t>
+            </a:r>
+            <a:r>
+              <a:rPr lang="en-US" sz="1800" b="1" dirty="0"/>
+              <a:t>(</a:t>
+            </a:r>
+            <a:r>
+              <a:rPr lang="en-US" sz="1800" b="1" dirty="0" err="1"/>
+              <a:t>this,arguments</a:t>
+            </a:r>
+            <a:r>
+              <a:rPr lang="en-US" sz="1800" b="1" dirty="0"/>
+              <a:t>));</a:t>
+            </a:r>
+          </a:p>
+          <a:p>
+            <a:r>
+              <a:rPr lang="en-US" sz="1800" b="1" dirty="0"/>
+              <a:t>    }</a:t>
+            </a:r>
+          </a:p>
+          <a:p>
+            <a:r>
+              <a:rPr lang="en-US" sz="1800" b="1" dirty="0"/>
+              <a:t>}</a:t>
+            </a:r>
+          </a:p>
+          <a:p>
+            <a:endParaRPr lang="en-US" sz="1800" dirty="0"/>
+          </a:p>
+          <a:p>
+            <a:r>
+              <a:rPr lang="en-US" sz="1800" dirty="0"/>
+              <a:t>The singleton function accepts a function as input, and return a new function which behaves like singleton. </a:t>
+            </a:r>
+          </a:p>
+          <a:p>
+            <a:pPr fontAlgn="base">
+              <a:spcBef>
+                <a:spcPts val="600"/>
+              </a:spcBef>
+              <a:spcAft>
+                <a:spcPct val="0"/>
+              </a:spcAft>
+              <a:buClr>
+                <a:srgbClr val="F0AB00"/>
+              </a:buClr>
+              <a:buSzPct val="80000"/>
+            </a:pPr>
+            <a:endParaRPr lang="en-US" sz="1800" kern="0" dirty="0" err="1" smtClean="0">
+              <a:ea typeface="Arial Unicode MS" pitchFamily="34" charset="-128"/>
+              <a:cs typeface="Arial Unicode MS" pitchFamily="34" charset="-128"/>
+            </a:endParaRPr>
+          </a:p>
+        </p:txBody>
+      </p:sp>
+    </p:spTree>
+    <p:extLst>
+      <p:ext uri="{BB962C8B-B14F-4D97-AF65-F5344CB8AC3E}">
+        <p14:creationId xmlns:p14="http://schemas.microsoft.com/office/powerpoint/2010/main" val="1912123345"/>
+      </p:ext>
+    </p:extLst>
+  </p:cSld>
+  <p:clrMapOvr>
+    <a:masterClrMapping/>
+  </p:clrMapOvr>
+  <p:timing>
+    <p:tnLst>
+      <p:par>
+        <p:cTn id="1" dur="indefinite" restart="never" nodeType="tmRoot">
+          <p:childTnLst>
+            <p:seq concurrent="1" nextAc="seek">
+              <p:cTn id="2" dur="indefinite" nodeType="mainSeq">
+                <p:childTnLst>
+                  <p:par>
+                    <p:cTn id="3" fill="hold">
+                      <p:stCondLst>
+                        <p:cond delay="indefinite"/>
+                      </p:stCondLst>
+                      <p:childTnLst>
+                        <p:par>
+                          <p:cTn id="4" fill="hold">
+                            <p:stCondLst>
+                              <p:cond delay="0"/>
+                            </p:stCondLst>
+                            <p:childTnLst>
+                              <p:par>
+                                <p:cTn id="5" presetID="1" presetClass="entr" presetSubtype="0" fill="hold" grpId="0" nodeType="clickEffect">
+                                  <p:stCondLst>
+                                    <p:cond delay="0"/>
+                                  </p:stCondLst>
+                                  <p:childTnLst>
+                                    <p:set>
+                                      <p:cBhvr>
+                                        <p:cTn id="6" dur="1" fill="hold">
+                                          <p:stCondLst>
+                                            <p:cond delay="0"/>
+                                          </p:stCondLst>
+                                        </p:cTn>
+                                        <p:tgtEl>
+                                          <p:spTgt spid="3"/>
+                                        </p:tgtEl>
+                                        <p:attrNameLst>
+                                          <p:attrName>style.visibility</p:attrName>
+                                        </p:attrNameLst>
+                                      </p:cBhvr>
+                                      <p:to>
+                                        <p:strVal val="visible"/>
+                                      </p:to>
+                                    </p:set>
+                                  </p:childTnLst>
+                                </p:cTn>
+                              </p:par>
+                            </p:childTnLst>
+                          </p:cTn>
+                        </p:par>
+                      </p:childTnLst>
+                    </p:cTn>
+                  </p:par>
+                  <p:par>
+                    <p:cTn id="7" fill="hold">
+                      <p:stCondLst>
+                        <p:cond delay="indefinite"/>
+                      </p:stCondLst>
+                      <p:childTnLst>
+                        <p:par>
+                          <p:cTn id="8" fill="hold">
+                            <p:stCondLst>
+                              <p:cond delay="0"/>
+                            </p:stCondLst>
+                            <p:childTnLst>
+                              <p:par>
+                                <p:cTn id="9" presetID="1" presetClass="entr" presetSubtype="0" fill="hold" grpId="0" nodeType="clickEffect">
+                                  <p:stCondLst>
+                                    <p:cond delay="0"/>
+                                  </p:stCondLst>
+                                  <p:childTnLst>
+                                    <p:set>
+                                      <p:cBhvr>
+                                        <p:cTn id="10" dur="1" fill="hold">
+                                          <p:stCondLst>
+                                            <p:cond delay="0"/>
+                                          </p:stCondLst>
+                                        </p:cTn>
+                                        <p:tgtEl>
+                                          <p:spTgt spid="4"/>
+                                        </p:tgtEl>
+                                        <p:attrNameLst>
+                                          <p:attrName>style.visibility</p:attrName>
+                                        </p:attrNameLst>
+                                      </p:cBhvr>
+                                      <p:to>
+                                        <p:strVal val="visible"/>
+                                      </p:to>
+                                    </p:set>
+                                  </p:childTnLst>
+                                </p:cTn>
+                              </p:par>
+                            </p:childTnLst>
+                          </p:cTn>
+                        </p:par>
+                      </p:childTnLst>
+                    </p:cTn>
+                  </p:par>
+                </p:childTnLst>
+              </p:cTn>
+              <p:prevCondLst>
+                <p:cond evt="onPrev" delay="0">
+                  <p:tgtEl>
+                    <p:sldTgt/>
+                  </p:tgtEl>
+                </p:cond>
+              </p:prevCondLst>
+              <p:nextCondLst>
+                <p:cond evt="onNext" delay="0">
+                  <p:tgtEl>
+                    <p:sldTgt/>
+                  </p:tgtEl>
+                </p:cond>
+              </p:nextCondLst>
+            </p:seq>
+          </p:childTnLst>
+        </p:cTn>
+      </p:par>
+    </p:tnLst>
+    <p:bldLst>
+      <p:bldP spid="4" grpId="0"/>
+      <p:bldP spid="3" grpId="0"/>
+    </p:bldLst>
+  </p:timing>
+</p:sld>
+</file>
+
+<file path=ppt/slides/slide21.xml><?xml version="1.0" encoding="utf-8"?>
+<p:sld xmlns:a="http://schemas.openxmlformats.org/drawingml/2006/main" xmlns:r="http://schemas.openxmlformats.org/officeDocument/2006/relationships" xmlns:p="http://schemas.openxmlformats.org/presentationml/2006/main">
+  <p:cSld>
+    <p:spTree>
+      <p:nvGrpSpPr>
+        <p:cNvPr id="1" name=""/>
+        <p:cNvGrpSpPr/>
+        <p:nvPr/>
+      </p:nvGrpSpPr>
+      <p:grpSpPr>
+        <a:xfrm>
+          <a:off x="0" y="0"/>
+          <a:ext cx="0" cy="0"/>
+          <a:chOff x="0" y="0"/>
+          <a:chExt cx="0" cy="0"/>
+        </a:xfrm>
+      </p:grpSpPr>
+      <p:sp>
+        <p:nvSpPr>
+          <p:cNvPr id="2" name="Title 1"/>
+          <p:cNvSpPr>
+            <a:spLocks noGrp="1"/>
+          </p:cNvSpPr>
+          <p:nvPr>
+            <p:ph type="title"/>
+          </p:nvPr>
+        </p:nvSpPr>
+        <p:spPr/>
+        <p:txBody>
+          <a:bodyPr/>
+          <a:lstStyle/>
+          <a:p>
+            <a:r>
+              <a:rPr lang="en-US" dirty="0"/>
               <a:t>JavaScript Example: Lazy Load Scenario – final version</a:t>
             </a:r>
           </a:p>
@@ -11592,7 +12676,41 @@
                 <a:ea typeface="Arial Unicode MS" pitchFamily="34" charset="-128"/>
                 <a:cs typeface="Arial Unicode MS" pitchFamily="34" charset="-128"/>
               </a:rPr>
-              <a:t>Bridge Pattern: decouple the abstract part and the concrete implementation part, so that each of both could change independently. </a:t>
+              <a:t>Bridge Pattern: decouple the </a:t>
+            </a:r>
+            <a:r>
+              <a:rPr lang="en-US" altLang="zh-CN" sz="2800" b="1" kern="0" dirty="0" smtClean="0">
+                <a:solidFill>
+                  <a:srgbClr val="FF0000"/>
+                </a:solidFill>
+                <a:ea typeface="Arial Unicode MS" pitchFamily="34" charset="-128"/>
+                <a:cs typeface="Arial Unicode MS" pitchFamily="34" charset="-128"/>
+              </a:rPr>
+              <a:t>abstract part </a:t>
+            </a:r>
+            <a:r>
+              <a:rPr lang="en-US" altLang="zh-CN" sz="2800" kern="0" dirty="0" smtClean="0">
+                <a:ea typeface="Arial Unicode MS" pitchFamily="34" charset="-128"/>
+                <a:cs typeface="Arial Unicode MS" pitchFamily="34" charset="-128"/>
+              </a:rPr>
+              <a:t>and the </a:t>
+            </a:r>
+            <a:r>
+              <a:rPr lang="en-US" altLang="zh-CN" sz="2800" b="1" kern="0" dirty="0" smtClean="0">
+                <a:solidFill>
+                  <a:srgbClr val="FF0000"/>
+                </a:solidFill>
+                <a:ea typeface="Arial Unicode MS" pitchFamily="34" charset="-128"/>
+                <a:cs typeface="Arial Unicode MS" pitchFamily="34" charset="-128"/>
+              </a:rPr>
+              <a:t>concrete implementation part</a:t>
+            </a:r>
+            <a:r>
+              <a:rPr lang="en-US" altLang="zh-CN" sz="2800" kern="0" dirty="0" smtClean="0">
+                <a:ea typeface="Arial Unicode MS" pitchFamily="34" charset="-128"/>
+                <a:cs typeface="Arial Unicode MS" pitchFamily="34" charset="-128"/>
+              </a:rPr>
+              <a:t>, so that each of both could change independently. </a:t>
             </a:r>
             <a:endParaRPr lang="en-US" sz="2800" kern="0" dirty="0" smtClean="0">
               <a:ea typeface="Arial Unicode MS" pitchFamily="34" charset="-128"/>
@@ -11601,6 +12719,78 @@
           </a:p>
         </p:txBody>
       </p:sp>
+      <p:cxnSp>
+        <p:nvCxnSpPr>
+          <p:cNvPr id="5" name="Straight Arrow Connector 4"/>
+          <p:cNvCxnSpPr/>
+          <p:nvPr/>
+        </p:nvCxnSpPr>
+        <p:spPr>
+          <a:xfrm flipH="1">
+            <a:off x="1565564" y="2202873"/>
+            <a:ext cx="4544291" cy="1622438"/>
+          </a:xfrm>
+          <a:prstGeom prst="straightConnector1">
+            <a:avLst/>
+          </a:prstGeom>
+          <a:ln w="25400">
+            <a:solidFill>
+              <a:srgbClr val="FFC000"/>
+            </a:solidFill>
+            <a:tailEnd type="triangle"/>
+          </a:ln>
+        </p:spPr>
+        <p:style>
+          <a:lnRef idx="1">
+            <a:schemeClr val="accent1"/>
+          </a:lnRef>
+          <a:fillRef idx="0">
+            <a:schemeClr val="accent1"/>
+          </a:fillRef>
+          <a:effectRef idx="0">
+            <a:schemeClr val="accent1"/>
+          </a:effectRef>
+          <a:fontRef idx="minor">
+            <a:schemeClr val="tx1"/>
+          </a:fontRef>
+        </p:style>
+      </p:cxnSp>
+      <p:cxnSp>
+        <p:nvCxnSpPr>
+          <p:cNvPr id="10" name="Straight Arrow Connector 9"/>
+          <p:cNvCxnSpPr/>
+          <p:nvPr/>
+        </p:nvCxnSpPr>
+        <p:spPr>
+          <a:xfrm flipH="1">
+            <a:off x="3810001" y="2507673"/>
+            <a:ext cx="2299854" cy="2479963"/>
+          </a:xfrm>
+          <a:prstGeom prst="straightConnector1">
+            <a:avLst/>
+          </a:prstGeom>
+          <a:ln w="25400">
+            <a:solidFill>
+              <a:srgbClr val="FFC000"/>
+            </a:solidFill>
+            <a:tailEnd type="triangle"/>
+          </a:ln>
+        </p:spPr>
+        <p:style>
+          <a:lnRef idx="1">
+            <a:schemeClr val="accent1"/>
+          </a:lnRef>
+          <a:fillRef idx="0">
+            <a:schemeClr val="accent1"/>
+          </a:fillRef>
+          <a:effectRef idx="0">
+            <a:schemeClr val="accent1"/>
+          </a:effectRef>
+          <a:fontRef idx="minor">
+            <a:schemeClr val="tx1"/>
+          </a:fontRef>
+        </p:style>
+      </p:cxnSp>
     </p:spTree>
     <p:extLst>
       <p:ext uri="{BB962C8B-B14F-4D97-AF65-F5344CB8AC3E}">
@@ -11645,11 +12835,142 @@
                                           </p:stCondLst>
                                         </p:cTn>
                                         <p:tgtEl>
-                                          <p:spTgt spid="3">
-                                            <p:txEl>
-                                              <p:pRg st="0" end="0"/>
-                                            </p:txEl>
-                                          </p:spTgt>
+                                          <p:spTgt spid="6"/>
+                                        </p:tgtEl>
+                                        <p:attrNameLst>
+                                          <p:attrName>style.visibility</p:attrName>
+                                        </p:attrNameLst>
+                                      </p:cBhvr>
+                                      <p:to>
+                                        <p:strVal val="visible"/>
+                                      </p:to>
+                                    </p:set>
+                                  </p:childTnLst>
+                                </p:cTn>
+                              </p:par>
+                            </p:childTnLst>
+                          </p:cTn>
+                        </p:par>
+                      </p:childTnLst>
+                    </p:cTn>
+                  </p:par>
+                  <p:par>
+                    <p:cTn id="7" fill="hold">
+                      <p:stCondLst>
+                        <p:cond delay="indefinite"/>
+                      </p:stCondLst>
+                      <p:childTnLst>
+                        <p:par>
+                          <p:cTn id="8" fill="hold">
+                            <p:stCondLst>
+                              <p:cond delay="0"/>
+                            </p:stCondLst>
+                            <p:childTnLst>
+                              <p:par>
+                                <p:cTn id="9" presetID="1" presetClass="entr" presetSubtype="0" fill="hold" grpId="0" nodeType="clickEffect">
+                                  <p:stCondLst>
+                                    <p:cond delay="0"/>
+                                  </p:stCondLst>
+                                  <p:childTnLst>
+                                    <p:set>
+                                      <p:cBhvr>
+                                        <p:cTn id="10" dur="1" fill="hold">
+                                          <p:stCondLst>
+                                            <p:cond delay="0"/>
+                                          </p:stCondLst>
+                                        </p:cTn>
+                                        <p:tgtEl>
+                                          <p:spTgt spid="3"/>
+                                        </p:tgtEl>
+                                        <p:attrNameLst>
+                                          <p:attrName>style.visibility</p:attrName>
+                                        </p:attrNameLst>
+                                      </p:cBhvr>
+                                      <p:to>
+                                        <p:strVal val="visible"/>
+                                      </p:to>
+                                    </p:set>
+                                  </p:childTnLst>
+                                </p:cTn>
+                              </p:par>
+                            </p:childTnLst>
+                          </p:cTn>
+                        </p:par>
+                      </p:childTnLst>
+                    </p:cTn>
+                  </p:par>
+                  <p:par>
+                    <p:cTn id="11" fill="hold">
+                      <p:stCondLst>
+                        <p:cond delay="indefinite"/>
+                      </p:stCondLst>
+                      <p:childTnLst>
+                        <p:par>
+                          <p:cTn id="12" fill="hold">
+                            <p:stCondLst>
+                              <p:cond delay="0"/>
+                            </p:stCondLst>
+                            <p:childTnLst>
+                              <p:par>
+                                <p:cTn id="13" presetID="1" presetClass="entr" presetSubtype="0" fill="hold" nodeType="clickEffect">
+                                  <p:stCondLst>
+                                    <p:cond delay="0"/>
+                                  </p:stCondLst>
+                                  <p:childTnLst>
+                                    <p:set>
+                                      <p:cBhvr>
+                                        <p:cTn id="14" dur="1" fill="hold">
+                                          <p:stCondLst>
+                                            <p:cond delay="0"/>
+                                          </p:stCondLst>
+                                        </p:cTn>
+                                        <p:tgtEl>
+                                          <p:spTgt spid="5"/>
+                                        </p:tgtEl>
+                                        <p:attrNameLst>
+                                          <p:attrName>style.visibility</p:attrName>
+                                        </p:attrNameLst>
+                                      </p:cBhvr>
+                                      <p:to>
+                                        <p:strVal val="visible"/>
+                                      </p:to>
+                                    </p:set>
+                                  </p:childTnLst>
+                                </p:cTn>
+                              </p:par>
+                            </p:childTnLst>
+                          </p:cTn>
+                        </p:par>
+                      </p:childTnLst>
+                    </p:cTn>
+                  </p:par>
+                  <p:par>
+                    <p:cTn id="15" fill="hold">
+                      <p:stCondLst>
+                        <p:cond delay="indefinite"/>
+                      </p:stCondLst>
+                      <p:childTnLst>
+                        <p:par>
+                          <p:cTn id="16" fill="hold">
+                            <p:stCondLst>
+                              <p:cond delay="0"/>
+                            </p:stCondLst>
+                            <p:childTnLst>
+                              <p:par>
+                                <p:cTn id="17" presetID="1" presetClass="entr" presetSubtype="0" fill="hold" nodeType="clickEffect">
+                                  <p:stCondLst>
+                                    <p:cond delay="0"/>
+                                  </p:stCondLst>
+                                  <p:childTnLst>
+                                    <p:set>
+                                      <p:cBhvr>
+                                        <p:cTn id="18" dur="1" fill="hold">
+                                          <p:stCondLst>
+                                            <p:cond delay="0"/>
+                                          </p:stCondLst>
+                                        </p:cTn>
+                                        <p:tgtEl>
+                                          <p:spTgt spid="10"/>
                                         </p:tgtEl>
                                         <p:attrNameLst>
                                           <p:attrName>style.visibility</p:attrName>
@@ -11689,185 +13010,9 @@
         </p:cTn>
       </p:par>
     </p:tnLst>
-  </p:timing>
-</p:sld>
-</file>
-
-<file path=ppt/slides/slide21.xml><?xml version="1.0" encoding="utf-8"?>
-<p:sld xmlns:a="http://schemas.openxmlformats.org/drawingml/2006/main" xmlns:r="http://schemas.openxmlformats.org/officeDocument/2006/relationships" xmlns:p="http://schemas.openxmlformats.org/presentationml/2006/main">
-  <p:cSld>
-    <p:spTree>
-      <p:nvGrpSpPr>
-        <p:cNvPr id="1" name=""/>
-        <p:cNvGrpSpPr/>
-        <p:nvPr/>
-      </p:nvGrpSpPr>
-      <p:grpSpPr>
-        <a:xfrm>
-          <a:off x="0" y="0"/>
-          <a:ext cx="0" cy="0"/>
-          <a:chOff x="0" y="0"/>
-          <a:chExt cx="0" cy="0"/>
-        </a:xfrm>
-      </p:grpSpPr>
-      <p:sp>
-        <p:nvSpPr>
-          <p:cNvPr id="2" name="Title 1"/>
-          <p:cNvSpPr>
-            <a:spLocks noGrp="1"/>
-          </p:cNvSpPr>
-          <p:nvPr>
-            <p:ph type="title"/>
-          </p:nvPr>
-        </p:nvSpPr>
-        <p:spPr/>
-        <p:txBody>
-          <a:bodyPr/>
-          <a:lstStyle/>
-          <a:p>
-            <a:r>
-              <a:rPr lang="en-US" dirty="0" smtClean="0"/>
-              <a:t>An example in UI5 Application</a:t>
-            </a:r>
-            <a:endParaRPr lang="en-US" dirty="0"/>
-          </a:p>
-        </p:txBody>
-      </p:sp>
-      <p:sp>
-        <p:nvSpPr>
-          <p:cNvPr id="5" name="TextBox 4"/>
-          <p:cNvSpPr txBox="1"/>
-          <p:nvPr/>
-        </p:nvSpPr>
-        <p:spPr>
-          <a:xfrm>
-            <a:off x="166255" y="1440873"/>
-            <a:ext cx="11513127" cy="1708160"/>
-          </a:xfrm>
-          <a:prstGeom prst="rect">
-            <a:avLst/>
-          </a:prstGeom>
-          <a:noFill/>
-        </p:spPr>
-        <p:txBody>
-          <a:bodyPr wrap="square" lIns="0" tIns="0" rIns="0" bIns="0" rtlCol="0">
-            <a:spAutoFit/>
-          </a:bodyPr>
-          <a:lstStyle/>
-          <a:p>
-            <a:pPr fontAlgn="base">
-              <a:spcBef>
-                <a:spcPts val="600"/>
-              </a:spcBef>
-              <a:spcAft>
-                <a:spcPct val="0"/>
-              </a:spcAft>
-              <a:buClr>
-                <a:srgbClr val="F0AB00"/>
-              </a:buClr>
-              <a:buSzPct val="80000"/>
-            </a:pPr>
-            <a:r>
-              <a:rPr lang="en-US" sz="2400" kern="0" dirty="0" smtClean="0">
-                <a:ea typeface="Arial Unicode MS" pitchFamily="34" charset="-128"/>
-                <a:cs typeface="Arial Unicode MS" pitchFamily="34" charset="-128"/>
-              </a:rPr>
-              <a:t>This pattern is widely used in JavaScript Libraries and applications. </a:t>
-            </a:r>
-          </a:p>
-          <a:p>
-            <a:pPr fontAlgn="base">
-              <a:spcBef>
-                <a:spcPts val="600"/>
-              </a:spcBef>
-              <a:spcAft>
-                <a:spcPct val="0"/>
-              </a:spcAft>
-              <a:buClr>
-                <a:srgbClr val="F0AB00"/>
-              </a:buClr>
-              <a:buSzPct val="80000"/>
-            </a:pPr>
-            <a:endParaRPr lang="en-US" sz="2400" kern="0" dirty="0">
-              <a:ea typeface="Arial Unicode MS" pitchFamily="34" charset="-128"/>
-              <a:cs typeface="Arial Unicode MS" pitchFamily="34" charset="-128"/>
-            </a:endParaRPr>
-          </a:p>
-          <a:p>
-            <a:pPr fontAlgn="base">
-              <a:spcBef>
-                <a:spcPts val="600"/>
-              </a:spcBef>
-              <a:spcAft>
-                <a:spcPct val="0"/>
-              </a:spcAft>
-              <a:buClr>
-                <a:srgbClr val="F0AB00"/>
-              </a:buClr>
-              <a:buSzPct val="80000"/>
-            </a:pPr>
-            <a:r>
-              <a:rPr lang="en-US" sz="2400" kern="0" dirty="0" smtClean="0">
-                <a:ea typeface="Arial Unicode MS" pitchFamily="34" charset="-128"/>
-                <a:cs typeface="Arial Unicode MS" pitchFamily="34" charset="-128"/>
-              </a:rPr>
-              <a:t>An example </a:t>
-            </a:r>
-            <a:r>
-              <a:rPr lang="en-US" sz="2400" kern="0" dirty="0">
-                <a:ea typeface="Arial Unicode MS" pitchFamily="34" charset="-128"/>
-                <a:cs typeface="Arial Unicode MS" pitchFamily="34" charset="-128"/>
-              </a:rPr>
-              <a:t>in Fiori: </a:t>
-            </a:r>
-            <a:r>
-              <a:rPr lang="en-US" sz="2400" kern="0" dirty="0" err="1">
-                <a:ea typeface="Arial Unicode MS" pitchFamily="34" charset="-128"/>
-                <a:cs typeface="Arial Unicode MS" pitchFamily="34" charset="-128"/>
-              </a:rPr>
-              <a:t>jQueryproxy.wrf</a:t>
-            </a:r>
-            <a:endParaRPr lang="en-US" sz="2400" kern="0" dirty="0" smtClean="0">
-              <a:ea typeface="Arial Unicode MS" pitchFamily="34" charset="-128"/>
-              <a:cs typeface="Arial Unicode MS" pitchFamily="34" charset="-128"/>
-            </a:endParaRPr>
-          </a:p>
-          <a:p>
-            <a:pPr fontAlgn="base">
-              <a:spcBef>
-                <a:spcPts val="600"/>
-              </a:spcBef>
-              <a:spcAft>
-                <a:spcPct val="0"/>
-              </a:spcAft>
-              <a:buClr>
-                <a:srgbClr val="F0AB00"/>
-              </a:buClr>
-              <a:buSzPct val="80000"/>
-            </a:pPr>
-            <a:endParaRPr lang="en-US" sz="2400" kern="0" dirty="0" smtClean="0">
-              <a:ea typeface="Arial Unicode MS" pitchFamily="34" charset="-128"/>
-              <a:cs typeface="Arial Unicode MS" pitchFamily="34" charset="-128"/>
-            </a:endParaRPr>
-          </a:p>
-        </p:txBody>
-      </p:sp>
-    </p:spTree>
-    <p:extLst>
-      <p:ext uri="{BB962C8B-B14F-4D97-AF65-F5344CB8AC3E}">
-        <p14:creationId xmlns:p14="http://schemas.microsoft.com/office/powerpoint/2010/main" val="672182119"/>
-      </p:ext>
-    </p:extLst>
-  </p:cSld>
-  <p:clrMapOvr>
-    <a:masterClrMapping/>
-  </p:clrMapOvr>
-  <p:timing>
-    <p:tnLst>
-      <p:par>
-        <p:cTn id="1" dur="indefinite" restart="never" nodeType="tmRoot"/>
-      </p:par>
-    </p:tnLst>
+    <p:bldLst>
+      <p:bldP spid="3" grpId="0"/>
+    </p:bldLst>
   </p:timing>
 </p:sld>
 </file>
@@ -11906,6 +13051,185 @@
           <a:p>
             <a:r>
               <a:rPr lang="en-US" dirty="0" smtClean="0"/>
+              <a:t>An example in UI5 Application</a:t>
+            </a:r>
+            <a:endParaRPr lang="en-US" dirty="0"/>
+          </a:p>
+        </p:txBody>
+      </p:sp>
+      <p:sp>
+        <p:nvSpPr>
+          <p:cNvPr id="5" name="TextBox 4"/>
+          <p:cNvSpPr txBox="1"/>
+          <p:nvPr/>
+        </p:nvSpPr>
+        <p:spPr>
+          <a:xfrm>
+            <a:off x="166255" y="1440873"/>
+            <a:ext cx="11513127" cy="1708160"/>
+          </a:xfrm>
+          <a:prstGeom prst="rect">
+            <a:avLst/>
+          </a:prstGeom>
+          <a:noFill/>
+        </p:spPr>
+        <p:txBody>
+          <a:bodyPr wrap="square" lIns="0" tIns="0" rIns="0" bIns="0" rtlCol="0">
+            <a:spAutoFit/>
+          </a:bodyPr>
+          <a:lstStyle/>
+          <a:p>
+            <a:pPr fontAlgn="base">
+              <a:spcBef>
+                <a:spcPts val="600"/>
+              </a:spcBef>
+              <a:spcAft>
+                <a:spcPct val="0"/>
+              </a:spcAft>
+              <a:buClr>
+                <a:srgbClr val="F0AB00"/>
+              </a:buClr>
+              <a:buSzPct val="80000"/>
+            </a:pPr>
+            <a:r>
+              <a:rPr lang="en-US" sz="2400" kern="0" dirty="0" smtClean="0">
+                <a:ea typeface="Arial Unicode MS" pitchFamily="34" charset="-128"/>
+                <a:cs typeface="Arial Unicode MS" pitchFamily="34" charset="-128"/>
+              </a:rPr>
+              <a:t>This pattern is widely used in JavaScript Libraries and applications. </a:t>
+            </a:r>
+          </a:p>
+          <a:p>
+            <a:pPr fontAlgn="base">
+              <a:spcBef>
+                <a:spcPts val="600"/>
+              </a:spcBef>
+              <a:spcAft>
+                <a:spcPct val="0"/>
+              </a:spcAft>
+              <a:buClr>
+                <a:srgbClr val="F0AB00"/>
+              </a:buClr>
+              <a:buSzPct val="80000"/>
+            </a:pPr>
+            <a:endParaRPr lang="en-US" sz="2400" kern="0" dirty="0">
+              <a:ea typeface="Arial Unicode MS" pitchFamily="34" charset="-128"/>
+              <a:cs typeface="Arial Unicode MS" pitchFamily="34" charset="-128"/>
+            </a:endParaRPr>
+          </a:p>
+          <a:p>
+            <a:pPr fontAlgn="base">
+              <a:spcBef>
+                <a:spcPts val="600"/>
+              </a:spcBef>
+              <a:spcAft>
+                <a:spcPct val="0"/>
+              </a:spcAft>
+              <a:buClr>
+                <a:srgbClr val="F0AB00"/>
+              </a:buClr>
+              <a:buSzPct val="80000"/>
+            </a:pPr>
+            <a:r>
+              <a:rPr lang="en-US" sz="2400" kern="0" dirty="0" smtClean="0">
+                <a:ea typeface="Arial Unicode MS" pitchFamily="34" charset="-128"/>
+                <a:cs typeface="Arial Unicode MS" pitchFamily="34" charset="-128"/>
+              </a:rPr>
+              <a:t>An example </a:t>
+            </a:r>
+            <a:r>
+              <a:rPr lang="en-US" sz="2400" kern="0" dirty="0">
+                <a:ea typeface="Arial Unicode MS" pitchFamily="34" charset="-128"/>
+                <a:cs typeface="Arial Unicode MS" pitchFamily="34" charset="-128"/>
+              </a:rPr>
+              <a:t>in Fiori: </a:t>
+            </a:r>
+            <a:r>
+              <a:rPr lang="en-US" sz="2400" kern="0" dirty="0" err="1">
+                <a:ea typeface="Arial Unicode MS" pitchFamily="34" charset="-128"/>
+                <a:cs typeface="Arial Unicode MS" pitchFamily="34" charset="-128"/>
+              </a:rPr>
+              <a:t>jQueryproxy.wrf</a:t>
+            </a:r>
+            <a:endParaRPr lang="en-US" sz="2400" kern="0" dirty="0" smtClean="0">
+              <a:ea typeface="Arial Unicode MS" pitchFamily="34" charset="-128"/>
+              <a:cs typeface="Arial Unicode MS" pitchFamily="34" charset="-128"/>
+            </a:endParaRPr>
+          </a:p>
+          <a:p>
+            <a:pPr fontAlgn="base">
+              <a:spcBef>
+                <a:spcPts val="600"/>
+              </a:spcBef>
+              <a:spcAft>
+                <a:spcPct val="0"/>
+              </a:spcAft>
+              <a:buClr>
+                <a:srgbClr val="F0AB00"/>
+              </a:buClr>
+              <a:buSzPct val="80000"/>
+            </a:pPr>
+            <a:endParaRPr lang="en-US" sz="2400" kern="0" dirty="0" smtClean="0">
+              <a:ea typeface="Arial Unicode MS" pitchFamily="34" charset="-128"/>
+              <a:cs typeface="Arial Unicode MS" pitchFamily="34" charset="-128"/>
+            </a:endParaRPr>
+          </a:p>
+        </p:txBody>
+      </p:sp>
+    </p:spTree>
+    <p:extLst>
+      <p:ext uri="{BB962C8B-B14F-4D97-AF65-F5344CB8AC3E}">
+        <p14:creationId xmlns:p14="http://schemas.microsoft.com/office/powerpoint/2010/main" val="672182119"/>
+      </p:ext>
+    </p:extLst>
+  </p:cSld>
+  <p:clrMapOvr>
+    <a:masterClrMapping/>
+  </p:clrMapOvr>
+  <p:timing>
+    <p:tnLst>
+      <p:par>
+        <p:cTn id="1" dur="indefinite" restart="never" nodeType="tmRoot"/>
+      </p:par>
+    </p:tnLst>
+  </p:timing>
+</p:sld>
+</file>
+
+<file path=ppt/slides/slide23.xml><?xml version="1.0" encoding="utf-8"?>
+<p:sld xmlns:a="http://schemas.openxmlformats.org/drawingml/2006/main" xmlns:r="http://schemas.openxmlformats.org/officeDocument/2006/relationships" xmlns:p="http://schemas.openxmlformats.org/presentationml/2006/main">
+  <p:cSld>
+    <p:spTree>
+      <p:nvGrpSpPr>
+        <p:cNvPr id="1" name=""/>
+        <p:cNvGrpSpPr/>
+        <p:nvPr/>
+      </p:nvGrpSpPr>
+      <p:grpSpPr>
+        <a:xfrm>
+          <a:off x="0" y="0"/>
+          <a:ext cx="0" cy="0"/>
+          <a:chOff x="0" y="0"/>
+          <a:chExt cx="0" cy="0"/>
+        </a:xfrm>
+      </p:grpSpPr>
+      <p:sp>
+        <p:nvSpPr>
+          <p:cNvPr id="2" name="Title 1"/>
+          <p:cNvSpPr>
+            <a:spLocks noGrp="1"/>
+          </p:cNvSpPr>
+          <p:nvPr>
+            <p:ph type="title"/>
+          </p:nvPr>
+        </p:nvSpPr>
+        <p:spPr/>
+        <p:txBody>
+          <a:bodyPr/>
+          <a:lstStyle/>
+          <a:p>
+            <a:r>
+              <a:rPr lang="en-US" dirty="0" smtClean="0"/>
               <a:t>Currying</a:t>
             </a:r>
             <a:endParaRPr lang="en-US" dirty="0"/>
@@ -11947,11 +13271,19 @@
               <a:buSzPct val="80000"/>
             </a:pPr>
             <a:r>
-              <a:rPr lang="en-US" sz="2400"/>
-              <a:t>n mathematics and computer science, currying is the technique of translating the evaluation of a function that takes multiple arguments (or a tuple of arguments) into evaluating a sequence of functions, each with a single argument</a:t>
-            </a:r>
-            <a:r>
-              <a:rPr lang="en-US" sz="2400" smtClean="0"/>
+              <a:rPr lang="en-US" sz="2400" dirty="0"/>
+              <a:t>I</a:t>
+            </a:r>
+            <a:r>
+              <a:rPr lang="en-US" sz="2400" dirty="0" smtClean="0"/>
+              <a:t>n </a:t>
+            </a:r>
+            <a:r>
+              <a:rPr lang="en-US" sz="2400" dirty="0"/>
+              <a:t>mathematics and computer science, currying is the technique of translating the evaluation of a function that takes multiple arguments (or a tuple of arguments) into evaluating a sequence of functions, each with a single argument</a:t>
+            </a:r>
+            <a:r>
+              <a:rPr lang="en-US" sz="2400" dirty="0" smtClean="0"/>
               <a:t>. </a:t>
             </a:r>
           </a:p>
@@ -11969,12 +13301,12 @@
               <a:buSzPct val="80000"/>
             </a:pPr>
             <a:r>
-              <a:rPr lang="en-US" sz="2400" smtClean="0">
+              <a:rPr lang="en-US" sz="2400" dirty="0" smtClean="0">
                 <a:hlinkClick r:id="rId2" tooltip="Haskell Curry"/>
               </a:rPr>
               <a:t>Haskell Curry</a:t>
             </a:r>
-            <a:endParaRPr lang="en-US" sz="2400" smtClean="0"/>
+            <a:endParaRPr lang="en-US" sz="2400" dirty="0" smtClean="0"/>
           </a:p>
           <a:p>
             <a:pPr fontAlgn="base">
@@ -11990,7 +13322,7 @@
               <a:buSzPct val="80000"/>
             </a:pPr>
             <a:r>
-              <a:rPr lang="en-US" sz="2400" kern="0">
+              <a:rPr lang="en-US" sz="2400" kern="0" dirty="0">
                 <a:ea typeface="Arial Unicode MS" pitchFamily="34" charset="-128"/>
                 <a:cs typeface="Arial Unicode MS" pitchFamily="34" charset="-128"/>
                 <a:hlinkClick r:id="rId3"/>
@@ -11998,14 +13330,14 @@
               <a:t>https://</a:t>
             </a:r>
             <a:r>
-              <a:rPr lang="en-US" sz="2400" kern="0" smtClean="0">
+              <a:rPr lang="en-US" sz="2400" kern="0" dirty="0" smtClean="0">
                 <a:ea typeface="Arial Unicode MS" pitchFamily="34" charset="-128"/>
                 <a:cs typeface="Arial Unicode MS" pitchFamily="34" charset="-128"/>
                 <a:hlinkClick r:id="rId3"/>
               </a:rPr>
               <a:t>en.wikipedia.org/wiki/Currying</a:t>
             </a:r>
-            <a:endParaRPr lang="en-US" sz="2400" kern="0" smtClean="0">
+            <a:endParaRPr lang="en-US" sz="2400" kern="0" dirty="0" smtClean="0">
               <a:ea typeface="Arial Unicode MS" pitchFamily="34" charset="-128"/>
               <a:cs typeface="Arial Unicode MS" pitchFamily="34" charset="-128"/>
             </a:endParaRPr>
@@ -12210,7 +13542,7 @@
         </p:blipFill>
         <p:spPr>
           <a:xfrm>
-            <a:off x="7441075" y="4702310"/>
+            <a:off x="5987836" y="5121869"/>
             <a:ext cx="2312526" cy="892555"/>
           </a:xfrm>
           <a:prstGeom prst="rect">
@@ -12354,7 +13686,7 @@
 </p:sld>
 </file>
 
-<file path=ppt/slides/slide23.xml><?xml version="1.0" encoding="utf-8"?>
+<file path=ppt/slides/slide24.xml><?xml version="1.0" encoding="utf-8"?>
 <p:sld xmlns:a="http://schemas.openxmlformats.org/drawingml/2006/main" xmlns:r="http://schemas.openxmlformats.org/officeDocument/2006/relationships" xmlns:p="http://schemas.openxmlformats.org/presentationml/2006/main">
   <p:cSld>
     <p:spTree>
@@ -12529,7 +13861,7 @@
 </p:sld>
 </file>
 
-<file path=ppt/slides/slide24.xml><?xml version="1.0" encoding="utf-8"?>
+<file path=ppt/slides/slide25.xml><?xml version="1.0" encoding="utf-8"?>
 <p:sld xmlns:a="http://schemas.openxmlformats.org/drawingml/2006/main" xmlns:r="http://schemas.openxmlformats.org/officeDocument/2006/relationships" xmlns:p="http://schemas.openxmlformats.org/presentationml/2006/main">
   <p:cSld>
     <p:spTree>
@@ -12610,10 +13942,6 @@
               </a:rPr>
               <a:t>It is a natural product in a given programming language where the function could be treated as first class.</a:t>
             </a:r>
-            <a:endParaRPr lang="en-US" sz="3200" kern="0" dirty="0" smtClean="0">
-              <a:ea typeface="Arial Unicode MS" pitchFamily="34" charset="-128"/>
-              <a:cs typeface="Arial Unicode MS" pitchFamily="34" charset="-128"/>
-            </a:endParaRPr>
           </a:p>
         </p:txBody>
       </p:sp>
@@ -12706,10 +14034,6 @@
               </a:rPr>
               <a:t>approach1</a:t>
             </a:r>
-            <a:endParaRPr lang="en-US" sz="1800" kern="0" dirty="0" smtClean="0">
-              <a:ea typeface="Arial Unicode MS" pitchFamily="34" charset="-128"/>
-              <a:cs typeface="Arial Unicode MS" pitchFamily="34" charset="-128"/>
-            </a:endParaRPr>
           </a:p>
         </p:txBody>
       </p:sp>
@@ -12754,10 +14078,6 @@
               </a:rPr>
               <a:t>approach2</a:t>
             </a:r>
-            <a:endParaRPr lang="en-US" sz="1800" kern="0" dirty="0" smtClean="0">
-              <a:ea typeface="Arial Unicode MS" pitchFamily="34" charset="-128"/>
-              <a:cs typeface="Arial Unicode MS" pitchFamily="34" charset="-128"/>
-            </a:endParaRPr>
           </a:p>
         </p:txBody>
       </p:sp>
@@ -12841,10 +14161,6 @@
               </a:rPr>
               <a:t>Approach2: Could be used if it makes sense to specify some arguments in a sequential way.  </a:t>
             </a:r>
-            <a:endParaRPr lang="en-US" sz="2000" kern="0" dirty="0" smtClean="0">
-              <a:ea typeface="Arial Unicode MS" pitchFamily="34" charset="-128"/>
-              <a:cs typeface="Arial Unicode MS" pitchFamily="34" charset="-128"/>
-            </a:endParaRPr>
           </a:p>
         </p:txBody>
       </p:sp>
@@ -13067,7 +14383,7 @@
 </p:sld>
 </file>
 
-<file path=ppt/slides/slide25.xml><?xml version="1.0" encoding="utf-8"?>
+<file path=ppt/slides/slide26.xml><?xml version="1.0" encoding="utf-8"?>
 <p:sld xmlns:a="http://schemas.openxmlformats.org/drawingml/2006/main" xmlns:r="http://schemas.openxmlformats.org/officeDocument/2006/relationships" xmlns:p="http://schemas.openxmlformats.org/presentationml/2006/main">
   <p:cSld>
     <p:spTree>
@@ -13182,10 +14498,6 @@
               </a:rPr>
               <a:t> functions. </a:t>
             </a:r>
-            <a:endParaRPr lang="en-US" sz="2800" kern="0" dirty="0" smtClean="0">
-              <a:ea typeface="Arial Unicode MS" pitchFamily="34" charset="-128"/>
-              <a:cs typeface="Arial Unicode MS" pitchFamily="34" charset="-128"/>
-            </a:endParaRPr>
           </a:p>
         </p:txBody>
       </p:sp>
@@ -13370,7 +14682,7 @@
 </p:sld>
 </file>
 
-<file path=ppt/slides/slide26.xml><?xml version="1.0" encoding="utf-8"?>
+<file path=ppt/slides/slide27.xml><?xml version="1.0" encoding="utf-8"?>
 <p:sld xmlns:a="http://schemas.openxmlformats.org/drawingml/2006/main" xmlns:r="http://schemas.openxmlformats.org/officeDocument/2006/relationships" xmlns:p="http://schemas.openxmlformats.org/presentationml/2006/main">
   <p:cSld>
     <p:spTree>
@@ -13545,7 +14857,7 @@
 </p:sld>
 </file>
 
-<file path=ppt/slides/slide27.xml><?xml version="1.0" encoding="utf-8"?>
+<file path=ppt/slides/slide28.xml><?xml version="1.0" encoding="utf-8"?>
 <p:sld xmlns:a="http://schemas.openxmlformats.org/drawingml/2006/main" xmlns:r="http://schemas.openxmlformats.org/officeDocument/2006/relationships" xmlns:p="http://schemas.openxmlformats.org/presentationml/2006/main">
   <p:cSld>
     <p:spTree>
@@ -13578,9 +14890,10 @@
           <a:lstStyle/>
           <a:p>
             <a:r>
-              <a:rPr lang="en-US" dirty="0"/>
-              <a:t>Currying</a:t>
-            </a:r>
+              <a:rPr lang="en-US" dirty="0" smtClean="0"/>
+              <a:t>Currying – build customized functions</a:t>
+            </a:r>
+            <a:endParaRPr lang="en-US" dirty="0"/>
           </a:p>
         </p:txBody>
       </p:sp>
@@ -13628,7 +14941,7 @@
 </p:sld>
 </file>
 
-<file path=ppt/slides/slide28.xml><?xml version="1.0" encoding="utf-8"?>
+<file path=ppt/slides/slide29.xml><?xml version="1.0" encoding="utf-8"?>
 <p:sld xmlns:a="http://schemas.openxmlformats.org/drawingml/2006/main" xmlns:r="http://schemas.openxmlformats.org/officeDocument/2006/relationships" xmlns:p="http://schemas.openxmlformats.org/presentationml/2006/main">
   <p:cSld>
     <p:spTree>
@@ -13662,7 +14975,7 @@
           <a:p>
             <a:r>
               <a:rPr lang="en-US" dirty="0" smtClean="0"/>
-              <a:t>Currying</a:t>
+              <a:t>Currying – using Bridge Pattern </a:t>
             </a:r>
             <a:endParaRPr lang="en-US" dirty="0"/>
           </a:p>
@@ -13716,6 +15029,54 @@
           </a:prstGeom>
         </p:spPr>
       </p:pic>
+      <p:sp>
+        <p:nvSpPr>
+          <p:cNvPr id="3" name="TextBox 2"/>
+          <p:cNvSpPr txBox="1"/>
+          <p:nvPr/>
+        </p:nvSpPr>
+        <p:spPr>
+          <a:xfrm>
+            <a:off x="428039" y="5717158"/>
+            <a:ext cx="11168216" cy="276999"/>
+          </a:xfrm>
+          <a:prstGeom prst="rect">
+            <a:avLst/>
+          </a:prstGeom>
+          <a:noFill/>
+        </p:spPr>
+        <p:txBody>
+          <a:bodyPr wrap="square" lIns="0" tIns="0" rIns="0" bIns="0" rtlCol="0">
+            <a:spAutoFit/>
+          </a:bodyPr>
+          <a:lstStyle/>
+          <a:p>
+            <a:pPr fontAlgn="base">
+              <a:spcBef>
+                <a:spcPts val="600"/>
+              </a:spcBef>
+              <a:spcAft>
+                <a:spcPct val="0"/>
+              </a:spcAft>
+              <a:buClr>
+                <a:srgbClr val="F0AB00"/>
+              </a:buClr>
+              <a:buSzPct val="80000"/>
+            </a:pPr>
+            <a:r>
+              <a:rPr lang="en-US" sz="1800" kern="0" dirty="0" smtClean="0">
+                <a:ea typeface="Arial Unicode MS" pitchFamily="34" charset="-128"/>
+                <a:cs typeface="Arial Unicode MS" pitchFamily="34" charset="-128"/>
+              </a:rPr>
+              <a:t>Abstract part and concrete implementation part is decoupled. </a:t>
+            </a:r>
+            <a:endParaRPr lang="en-US" sz="1800" kern="0" dirty="0" smtClean="0">
+              <a:ea typeface="Arial Unicode MS" pitchFamily="34" charset="-128"/>
+              <a:cs typeface="Arial Unicode MS" pitchFamily="34" charset="-128"/>
+            </a:endParaRPr>
+          </a:p>
+        </p:txBody>
+      </p:sp>
     </p:spTree>
     <p:extLst>
       <p:ext uri="{BB962C8B-B14F-4D97-AF65-F5344CB8AC3E}">
@@ -13779,6 +15140,51 @@
                       </p:childTnLst>
                     </p:cTn>
                   </p:par>
+                  <p:par>
+                    <p:cTn id="7" fill="hold">
+                      <p:stCondLst>
+                        <p:cond delay="indefinite"/>
+                      </p:stCondLst>
+                      <p:childTnLst>
+                        <p:par>
+                          <p:cTn id="8" fill="hold">
+                            <p:stCondLst>
+                              <p:cond delay="0"/>
+                            </p:stCondLst>
+                            <p:childTnLst>
+                              <p:par>
+                                <p:cTn id="9" presetID="1" presetClass="entr" presetSubtype="0" fill="hold" grpId="0" nodeType="clickEffect">
+                                  <p:stCondLst>
+                                    <p:cond delay="0"/>
+                                  </p:stCondLst>
+                                  <p:childTnLst>
+                                    <p:set>
+                                      <p:cBhvr>
+                                        <p:cTn id="10" dur="1" fill="hold">
+                                          <p:stCondLst>
+                                            <p:cond delay="0"/>
+                                          </p:stCondLst>
+                                        </p:cTn>
+                                        <p:tgtEl>
+                                          <p:spTgt spid="3"/>
+                                        </p:tgtEl>
+                                        <p:attrNameLst>
+                                          <p:attrName>style.visibility</p:attrName>
+                                        </p:attrNameLst>
+                                      </p:cBhvr>
+                                      <p:to>
+                                        <p:strVal val="visible"/>
+                                      </p:to>
+                                    </p:set>
+                                  </p:childTnLst>
+                                </p:cTn>
+                              </p:par>
+                            </p:childTnLst>
+                          </p:cTn>
+                        </p:par>
+                      </p:childTnLst>
+                    </p:cTn>
+                  </p:par>
                 </p:childTnLst>
               </p:cTn>
               <p:prevCondLst>
@@ -13800,6 +15206,9 @@
         </p:cTn>
       </p:par>
     </p:tnLst>
+    <p:bldLst>
+      <p:bldP spid="3" grpId="0"/>
+    </p:bldLst>
   </p:timing>
 </p:sld>
 </file>
@@ -13972,8 +15381,74 @@
                 <a:ea typeface="Arial Unicode MS" pitchFamily="34" charset="-128"/>
                 <a:cs typeface="Arial Unicode MS" pitchFamily="34" charset="-128"/>
               </a:rPr>
-              <a:t> and y are global variable here. </a:t>
-            </a:r>
+              <a:t> and y are global variable here</a:t>
+            </a:r>
+            <a:r>
+              <a:rPr lang="en-US" sz="1800" kern="0" dirty="0" smtClean="0">
+                <a:ea typeface="Arial Unicode MS" pitchFamily="34" charset="-128"/>
+                <a:cs typeface="Arial Unicode MS" pitchFamily="34" charset="-128"/>
+              </a:rPr>
+              <a:t>. </a:t>
+            </a:r>
+            <a:endParaRPr lang="en-US" sz="1800" kern="0" dirty="0" smtClean="0">
+              <a:ea typeface="Arial Unicode MS" pitchFamily="34" charset="-128"/>
+              <a:cs typeface="Arial Unicode MS" pitchFamily="34" charset="-128"/>
+            </a:endParaRPr>
+          </a:p>
+        </p:txBody>
+      </p:sp>
+      <p:sp>
+        <p:nvSpPr>
+          <p:cNvPr id="4" name="TextBox 3"/>
+          <p:cNvSpPr txBox="1"/>
+          <p:nvPr/>
+        </p:nvSpPr>
+        <p:spPr>
+          <a:xfrm>
+            <a:off x="3861478" y="5514109"/>
+            <a:ext cx="4284995" cy="276999"/>
+          </a:xfrm>
+          <a:prstGeom prst="rect">
+            <a:avLst/>
+          </a:prstGeom>
+          <a:noFill/>
+        </p:spPr>
+        <p:txBody>
+          <a:bodyPr wrap="square" lIns="0" tIns="0" rIns="0" bIns="0" rtlCol="0">
+            <a:spAutoFit/>
+          </a:bodyPr>
+          <a:lstStyle/>
+          <a:p>
+            <a:pPr fontAlgn="base">
+              <a:spcBef>
+                <a:spcPts val="600"/>
+              </a:spcBef>
+              <a:spcAft>
+                <a:spcPct val="0"/>
+              </a:spcAft>
+              <a:buClr>
+                <a:srgbClr val="F0AB00"/>
+              </a:buClr>
+              <a:buSzPct val="80000"/>
+            </a:pPr>
+            <a:r>
+              <a:rPr lang="en-US" sz="1800" kern="0" dirty="0">
+                <a:ea typeface="Arial Unicode MS" pitchFamily="34" charset="-128"/>
+                <a:cs typeface="Arial Unicode MS" pitchFamily="34" charset="-128"/>
+              </a:rPr>
+              <a:t>z</a:t>
+            </a:r>
+            <a:r>
+              <a:rPr lang="en-US" sz="1800" kern="0" dirty="0" smtClean="0">
+                <a:ea typeface="Arial Unicode MS" pitchFamily="34" charset="-128"/>
+                <a:cs typeface="Arial Unicode MS" pitchFamily="34" charset="-128"/>
+              </a:rPr>
+              <a:t> = 3</a:t>
+            </a:r>
+            <a:endParaRPr lang="en-US" sz="1800" kern="0" dirty="0" smtClean="0">
+              <a:ea typeface="Arial Unicode MS" pitchFamily="34" charset="-128"/>
+              <a:cs typeface="Arial Unicode MS" pitchFamily="34" charset="-128"/>
+            </a:endParaRPr>
           </a:p>
         </p:txBody>
       </p:sp>
@@ -14085,6 +15560,51 @@
                       </p:childTnLst>
                     </p:cTn>
                   </p:par>
+                  <p:par>
+                    <p:cTn id="11" fill="hold">
+                      <p:stCondLst>
+                        <p:cond delay="indefinite"/>
+                      </p:stCondLst>
+                      <p:childTnLst>
+                        <p:par>
+                          <p:cTn id="12" fill="hold">
+                            <p:stCondLst>
+                              <p:cond delay="0"/>
+                            </p:stCondLst>
+                            <p:childTnLst>
+                              <p:par>
+                                <p:cTn id="13" presetID="1" presetClass="entr" presetSubtype="0" fill="hold" grpId="0" nodeType="clickEffect">
+                                  <p:stCondLst>
+                                    <p:cond delay="0"/>
+                                  </p:stCondLst>
+                                  <p:childTnLst>
+                                    <p:set>
+                                      <p:cBhvr>
+                                        <p:cTn id="14" dur="1" fill="hold">
+                                          <p:stCondLst>
+                                            <p:cond delay="0"/>
+                                          </p:stCondLst>
+                                        </p:cTn>
+                                        <p:tgtEl>
+                                          <p:spTgt spid="4"/>
+                                        </p:tgtEl>
+                                        <p:attrNameLst>
+                                          <p:attrName>style.visibility</p:attrName>
+                                        </p:attrNameLst>
+                                      </p:cBhvr>
+                                      <p:to>
+                                        <p:strVal val="visible"/>
+                                      </p:to>
+                                    </p:set>
+                                  </p:childTnLst>
+                                </p:cTn>
+                              </p:par>
+                            </p:childTnLst>
+                          </p:cTn>
+                        </p:par>
+                      </p:childTnLst>
+                    </p:cTn>
+                  </p:par>
                 </p:childTnLst>
               </p:cTn>
               <p:prevCondLst>
@@ -14108,6 +15628,7 @@
     </p:tnLst>
     <p:bldLst>
       <p:bldP spid="3" grpId="0"/>
+      <p:bldP spid="4" grpId="0"/>
     </p:bldLst>
   </p:timing>
 </p:sld>

</xml_diff>

<commit_message>
add after delivering training on 2015-12-14
</commit_message>
<xml_diff>
--- a/training/ProgrammingLanguage/001_closure.pptx
+++ b/training/ProgrammingLanguage/001_closure.pptx
@@ -5,10 +5,10 @@
     <p:sldMasterId id="2147483660" r:id="rId1"/>
   </p:sldMasterIdLst>
   <p:notesMasterIdLst>
-    <p:notesMasterId r:id="rId31"/>
+    <p:notesMasterId r:id="rId30"/>
   </p:notesMasterIdLst>
   <p:handoutMasterIdLst>
-    <p:handoutMasterId r:id="rId32"/>
+    <p:handoutMasterId r:id="rId31"/>
   </p:handoutMasterIdLst>
   <p:sldIdLst>
     <p:sldId id="340" r:id="rId2"/>
@@ -19,27 +19,26 @@
     <p:sldId id="363" r:id="rId7"/>
     <p:sldId id="364" r:id="rId8"/>
     <p:sldId id="365" r:id="rId9"/>
-    <p:sldId id="366" r:id="rId10"/>
-    <p:sldId id="386" r:id="rId11"/>
-    <p:sldId id="367" r:id="rId12"/>
-    <p:sldId id="368" r:id="rId13"/>
-    <p:sldId id="369" r:id="rId14"/>
-    <p:sldId id="370" r:id="rId15"/>
-    <p:sldId id="371" r:id="rId16"/>
-    <p:sldId id="372" r:id="rId17"/>
-    <p:sldId id="373" r:id="rId18"/>
-    <p:sldId id="374" r:id="rId19"/>
-    <p:sldId id="375" r:id="rId20"/>
-    <p:sldId id="376" r:id="rId21"/>
-    <p:sldId id="377" r:id="rId22"/>
-    <p:sldId id="378" r:id="rId23"/>
-    <p:sldId id="379" r:id="rId24"/>
-    <p:sldId id="380" r:id="rId25"/>
-    <p:sldId id="381" r:id="rId26"/>
-    <p:sldId id="382" r:id="rId27"/>
-    <p:sldId id="383" r:id="rId28"/>
-    <p:sldId id="384" r:id="rId29"/>
-    <p:sldId id="385" r:id="rId30"/>
+    <p:sldId id="386" r:id="rId10"/>
+    <p:sldId id="367" r:id="rId11"/>
+    <p:sldId id="368" r:id="rId12"/>
+    <p:sldId id="369" r:id="rId13"/>
+    <p:sldId id="370" r:id="rId14"/>
+    <p:sldId id="371" r:id="rId15"/>
+    <p:sldId id="372" r:id="rId16"/>
+    <p:sldId id="373" r:id="rId17"/>
+    <p:sldId id="374" r:id="rId18"/>
+    <p:sldId id="375" r:id="rId19"/>
+    <p:sldId id="376" r:id="rId20"/>
+    <p:sldId id="377" r:id="rId21"/>
+    <p:sldId id="378" r:id="rId22"/>
+    <p:sldId id="379" r:id="rId23"/>
+    <p:sldId id="380" r:id="rId24"/>
+    <p:sldId id="381" r:id="rId25"/>
+    <p:sldId id="382" r:id="rId26"/>
+    <p:sldId id="383" r:id="rId27"/>
+    <p:sldId id="384" r:id="rId28"/>
+    <p:sldId id="385" r:id="rId29"/>
   </p:sldIdLst>
   <p:sldSz cx="12195175" cy="6859588"/>
   <p:notesSz cx="6797675" cy="9874250"/>
@@ -175,7 +174,6 @@
             <p14:sldId id="363"/>
             <p14:sldId id="364"/>
             <p14:sldId id="365"/>
-            <p14:sldId id="366"/>
             <p14:sldId id="386"/>
             <p14:sldId id="367"/>
             <p14:sldId id="368"/>
@@ -721,6 +719,41 @@
       </p:grpSpPr>
       <p:sp>
         <p:nvSpPr>
+          <p:cNvPr id="2" name="Slide Image Placeholder 1"/>
+          <p:cNvSpPr>
+            <a:spLocks noGrp="1" noRot="1" noChangeAspect="1"/>
+          </p:cNvSpPr>
+          <p:nvPr>
+            <p:ph type="sldImg"/>
+          </p:nvPr>
+        </p:nvSpPr>
+        <p:spPr/>
+      </p:sp>
+      <p:sp>
+        <p:nvSpPr>
+          <p:cNvPr id="3" name="Notes Placeholder 2"/>
+          <p:cNvSpPr>
+            <a:spLocks noGrp="1"/>
+          </p:cNvSpPr>
+          <p:nvPr>
+            <p:ph type="body" idx="1"/>
+          </p:nvPr>
+        </p:nvSpPr>
+        <p:spPr/>
+        <p:txBody>
+          <a:bodyPr/>
+          <a:lstStyle/>
+          <a:p>
+            <a:r>
+              <a:rPr lang="en-US" dirty="0" smtClean="0"/>
+              <a:t>Demo: 005_lazy_evaluation.html</a:t>
+            </a:r>
+            <a:endParaRPr lang="en-US" dirty="0"/>
+          </a:p>
+        </p:txBody>
+      </p:sp>
+      <p:sp>
+        <p:nvSpPr>
           <p:cNvPr id="4" name="Slide Number Placeholder 3"/>
           <p:cNvSpPr>
             <a:spLocks noGrp="1"/>
@@ -737,78 +770,16 @@
             <a:fld id="{7D8C2C35-2B8A-446E-BEC0-FD36716C29AC}" type="slidenum">
               <a:rPr lang="de-DE" smtClean="0"/>
               <a:pPr/>
-              <a:t>10</a:t>
+              <a:t>11</a:t>
             </a:fld>
             <a:endParaRPr lang="de-DE" dirty="0"/>
-          </a:p>
-        </p:txBody>
-      </p:sp>
-      <p:sp>
-        <p:nvSpPr>
-          <p:cNvPr id="9" name="Slide Image Placeholder 8"/>
-          <p:cNvSpPr>
-            <a:spLocks noGrp="1" noRot="1" noChangeAspect="1"/>
-          </p:cNvSpPr>
-          <p:nvPr>
-            <p:ph type="sldImg"/>
-          </p:nvPr>
-        </p:nvSpPr>
-        <p:spPr>
-          <a:xfrm>
-            <a:off x="547688" y="612775"/>
-            <a:ext cx="5762625" cy="3241675"/>
-          </a:xfrm>
-        </p:spPr>
-      </p:sp>
-      <p:sp>
-        <p:nvSpPr>
-          <p:cNvPr id="10" name="Notes Placeholder 9"/>
-          <p:cNvSpPr>
-            <a:spLocks noGrp="1"/>
-          </p:cNvSpPr>
-          <p:nvPr>
-            <p:ph type="body" idx="1"/>
-          </p:nvPr>
-        </p:nvSpPr>
-        <p:spPr/>
-        <p:txBody>
-          <a:bodyPr>
-            <a:normAutofit/>
-          </a:bodyPr>
-          <a:lstStyle/>
-          <a:p>
-            <a:r>
-              <a:rPr lang="en-US" dirty="0" smtClean="0"/>
-              <a:t>Sometimes one wants to control when an expression is evaluated and that is evaluated exactly once:</a:t>
-            </a:r>
-          </a:p>
-          <a:p>
-            <a:pPr marL="285750" indent="-285750">
-              <a:buFontTx/>
-              <a:buChar char="-"/>
-            </a:pPr>
-            <a:r>
-              <a:rPr lang="en-US" dirty="0" smtClean="0"/>
-              <a:t>Result is used many times</a:t>
-            </a:r>
-          </a:p>
-          <a:p>
-            <a:pPr marL="285750" indent="-285750">
-              <a:buFontTx/>
-              <a:buChar char="-"/>
-            </a:pPr>
-            <a:r>
-              <a:rPr lang="en-US" dirty="0" smtClean="0"/>
-              <a:t>Computing is expensive</a:t>
-            </a:r>
-            <a:endParaRPr lang="en-US" dirty="0"/>
           </a:p>
         </p:txBody>
       </p:sp>
     </p:spTree>
     <p:extLst>
       <p:ext uri="{BB962C8B-B14F-4D97-AF65-F5344CB8AC3E}">
-        <p14:creationId xmlns:p14="http://schemas.microsoft.com/office/powerpoint/2010/main" val="1867975161"/>
+        <p14:creationId xmlns:p14="http://schemas.microsoft.com/office/powerpoint/2010/main" val="3410434924"/>
       </p:ext>
     </p:extLst>
   </p:cSld>
@@ -837,41 +808,6 @@
       </p:grpSpPr>
       <p:sp>
         <p:nvSpPr>
-          <p:cNvPr id="2" name="Slide Image Placeholder 1"/>
-          <p:cNvSpPr>
-            <a:spLocks noGrp="1" noRot="1" noChangeAspect="1"/>
-          </p:cNvSpPr>
-          <p:nvPr>
-            <p:ph type="sldImg"/>
-          </p:nvPr>
-        </p:nvSpPr>
-        <p:spPr/>
-      </p:sp>
-      <p:sp>
-        <p:nvSpPr>
-          <p:cNvPr id="3" name="Notes Placeholder 2"/>
-          <p:cNvSpPr>
-            <a:spLocks noGrp="1"/>
-          </p:cNvSpPr>
-          <p:nvPr>
-            <p:ph type="body" idx="1"/>
-          </p:nvPr>
-        </p:nvSpPr>
-        <p:spPr/>
-        <p:txBody>
-          <a:bodyPr/>
-          <a:lstStyle/>
-          <a:p>
-            <a:r>
-              <a:rPr lang="en-US" dirty="0" smtClean="0"/>
-              <a:t>Demo: 005_lazy_evaluation.html</a:t>
-            </a:r>
-            <a:endParaRPr lang="en-US" dirty="0"/>
-          </a:p>
-        </p:txBody>
-      </p:sp>
-      <p:sp>
-        <p:nvSpPr>
           <p:cNvPr id="4" name="Slide Number Placeholder 3"/>
           <p:cNvSpPr>
             <a:spLocks noGrp="1"/>
@@ -888,16 +824,64 @@
             <a:fld id="{7D8C2C35-2B8A-446E-BEC0-FD36716C29AC}" type="slidenum">
               <a:rPr lang="de-DE" smtClean="0"/>
               <a:pPr/>
-              <a:t>12</a:t>
+              <a:t>14</a:t>
             </a:fld>
             <a:endParaRPr lang="de-DE" dirty="0"/>
+          </a:p>
+        </p:txBody>
+      </p:sp>
+      <p:sp>
+        <p:nvSpPr>
+          <p:cNvPr id="9" name="Slide Image Placeholder 8"/>
+          <p:cNvSpPr>
+            <a:spLocks noGrp="1" noRot="1" noChangeAspect="1"/>
+          </p:cNvSpPr>
+          <p:nvPr>
+            <p:ph type="sldImg"/>
+          </p:nvPr>
+        </p:nvSpPr>
+        <p:spPr>
+          <a:xfrm>
+            <a:off x="547688" y="612775"/>
+            <a:ext cx="5762625" cy="3241675"/>
+          </a:xfrm>
+        </p:spPr>
+      </p:sp>
+      <p:sp>
+        <p:nvSpPr>
+          <p:cNvPr id="10" name="Notes Placeholder 9"/>
+          <p:cNvSpPr>
+            <a:spLocks noGrp="1"/>
+          </p:cNvSpPr>
+          <p:nvPr>
+            <p:ph type="body" idx="1"/>
+          </p:nvPr>
+        </p:nvSpPr>
+        <p:spPr/>
+        <p:txBody>
+          <a:bodyPr>
+            <a:normAutofit/>
+          </a:bodyPr>
+          <a:lstStyle/>
+          <a:p>
+            <a:r>
+              <a:rPr lang="en-US" dirty="0" smtClean="0"/>
+              <a:t>Here delay &amp; force is shown with a recursion:</a:t>
+            </a:r>
+          </a:p>
+          <a:p>
+            <a:r>
+              <a:rPr lang="en-US" dirty="0" smtClean="0"/>
+              <a:t>Base condition are 0 and 1; for 1 the heavy computation is performed; all other function calls use the result of the succeeding function</a:t>
+            </a:r>
+            <a:endParaRPr lang="en-US" dirty="0"/>
           </a:p>
         </p:txBody>
       </p:sp>
     </p:spTree>
     <p:extLst>
       <p:ext uri="{BB962C8B-B14F-4D97-AF65-F5344CB8AC3E}">
-        <p14:creationId xmlns:p14="http://schemas.microsoft.com/office/powerpoint/2010/main" val="3410434924"/>
+        <p14:creationId xmlns:p14="http://schemas.microsoft.com/office/powerpoint/2010/main" val="682080673"/>
       </p:ext>
     </p:extLst>
   </p:cSld>
@@ -926,6 +910,41 @@
       </p:grpSpPr>
       <p:sp>
         <p:nvSpPr>
+          <p:cNvPr id="2" name="Slide Image Placeholder 1"/>
+          <p:cNvSpPr>
+            <a:spLocks noGrp="1" noRot="1" noChangeAspect="1"/>
+          </p:cNvSpPr>
+          <p:nvPr>
+            <p:ph type="sldImg"/>
+          </p:nvPr>
+        </p:nvSpPr>
+        <p:spPr/>
+      </p:sp>
+      <p:sp>
+        <p:nvSpPr>
+          <p:cNvPr id="3" name="Notes Placeholder 2"/>
+          <p:cNvSpPr>
+            <a:spLocks noGrp="1"/>
+          </p:cNvSpPr>
+          <p:nvPr>
+            <p:ph type="body" idx="1"/>
+          </p:nvPr>
+        </p:nvSpPr>
+        <p:spPr/>
+        <p:txBody>
+          <a:bodyPr/>
+          <a:lstStyle/>
+          <a:p>
+            <a:r>
+              <a:rPr lang="en-US" dirty="0" smtClean="0"/>
+              <a:t>Demo: 007_singleton.html</a:t>
+            </a:r>
+            <a:endParaRPr lang="en-US" dirty="0"/>
+          </a:p>
+        </p:txBody>
+      </p:sp>
+      <p:sp>
+        <p:nvSpPr>
           <p:cNvPr id="4" name="Slide Number Placeholder 3"/>
           <p:cNvSpPr>
             <a:spLocks noGrp="1"/>
@@ -942,64 +961,16 @@
             <a:fld id="{7D8C2C35-2B8A-446E-BEC0-FD36716C29AC}" type="slidenum">
               <a:rPr lang="de-DE" smtClean="0"/>
               <a:pPr/>
-              <a:t>15</a:t>
+              <a:t>20</a:t>
             </a:fld>
             <a:endParaRPr lang="de-DE" dirty="0"/>
-          </a:p>
-        </p:txBody>
-      </p:sp>
-      <p:sp>
-        <p:nvSpPr>
-          <p:cNvPr id="9" name="Slide Image Placeholder 8"/>
-          <p:cNvSpPr>
-            <a:spLocks noGrp="1" noRot="1" noChangeAspect="1"/>
-          </p:cNvSpPr>
-          <p:nvPr>
-            <p:ph type="sldImg"/>
-          </p:nvPr>
-        </p:nvSpPr>
-        <p:spPr>
-          <a:xfrm>
-            <a:off x="547688" y="612775"/>
-            <a:ext cx="5762625" cy="3241675"/>
-          </a:xfrm>
-        </p:spPr>
-      </p:sp>
-      <p:sp>
-        <p:nvSpPr>
-          <p:cNvPr id="10" name="Notes Placeholder 9"/>
-          <p:cNvSpPr>
-            <a:spLocks noGrp="1"/>
-          </p:cNvSpPr>
-          <p:nvPr>
-            <p:ph type="body" idx="1"/>
-          </p:nvPr>
-        </p:nvSpPr>
-        <p:spPr/>
-        <p:txBody>
-          <a:bodyPr>
-            <a:normAutofit/>
-          </a:bodyPr>
-          <a:lstStyle/>
-          <a:p>
-            <a:r>
-              <a:rPr lang="en-US" dirty="0" smtClean="0"/>
-              <a:t>Here delay &amp; force is shown with a recursion:</a:t>
-            </a:r>
-          </a:p>
-          <a:p>
-            <a:r>
-              <a:rPr lang="en-US" dirty="0" smtClean="0"/>
-              <a:t>Base condition are 0 and 1; for 1 the heavy computation is performed; all other function calls use the result of the succeeding function</a:t>
-            </a:r>
-            <a:endParaRPr lang="en-US" dirty="0"/>
           </a:p>
         </p:txBody>
       </p:sp>
     </p:spTree>
     <p:extLst>
       <p:ext uri="{BB962C8B-B14F-4D97-AF65-F5344CB8AC3E}">
-        <p14:creationId xmlns:p14="http://schemas.microsoft.com/office/powerpoint/2010/main" val="682080673"/>
+        <p14:creationId xmlns:p14="http://schemas.microsoft.com/office/powerpoint/2010/main" val="2664122178"/>
       </p:ext>
     </p:extLst>
   </p:cSld>
@@ -1055,7 +1026,7 @@
           <a:p>
             <a:r>
               <a:rPr lang="en-US" dirty="0" smtClean="0"/>
-              <a:t>Demo: 007_singleton.html</a:t>
+              <a:t>http://localhost:8090/cus.crm.mycalendar/?responderOn=true</a:t>
             </a:r>
             <a:endParaRPr lang="en-US" dirty="0"/>
           </a:p>
@@ -1088,7 +1059,7 @@
     </p:spTree>
     <p:extLst>
       <p:ext uri="{BB962C8B-B14F-4D97-AF65-F5344CB8AC3E}">
-        <p14:creationId xmlns:p14="http://schemas.microsoft.com/office/powerpoint/2010/main" val="2664122178"/>
+        <p14:creationId xmlns:p14="http://schemas.microsoft.com/office/powerpoint/2010/main" val="2696855891"/>
       </p:ext>
     </p:extLst>
   </p:cSld>
@@ -1142,10 +1113,6 @@
           <a:bodyPr/>
           <a:lstStyle/>
           <a:p>
-            <a:r>
-              <a:rPr lang="en-US" dirty="0" smtClean="0"/>
-              <a:t>http://localhost:8090/cus.crm.mycalendar/?responderOn=true</a:t>
-            </a:r>
             <a:endParaRPr lang="en-US" dirty="0"/>
           </a:p>
         </p:txBody>
@@ -1168,92 +1135,7 @@
             <a:fld id="{7D8C2C35-2B8A-446E-BEC0-FD36716C29AC}" type="slidenum">
               <a:rPr lang="de-DE" smtClean="0"/>
               <a:pPr/>
-              <a:t>22</a:t>
-            </a:fld>
-            <a:endParaRPr lang="de-DE" dirty="0"/>
-          </a:p>
-        </p:txBody>
-      </p:sp>
-    </p:spTree>
-    <p:extLst>
-      <p:ext uri="{BB962C8B-B14F-4D97-AF65-F5344CB8AC3E}">
-        <p14:creationId xmlns:p14="http://schemas.microsoft.com/office/powerpoint/2010/main" val="2696855891"/>
-      </p:ext>
-    </p:extLst>
-  </p:cSld>
-  <p:clrMapOvr>
-    <a:masterClrMapping/>
-  </p:clrMapOvr>
-</p:notes>
-</file>
-
-<file path=ppt/notesSlides/notesSlide15.xml><?xml version="1.0" encoding="utf-8"?>
-<p:notes xmlns:a="http://schemas.openxmlformats.org/drawingml/2006/main" xmlns:r="http://schemas.openxmlformats.org/officeDocument/2006/relationships" xmlns:p="http://schemas.openxmlformats.org/presentationml/2006/main">
-  <p:cSld>
-    <p:spTree>
-      <p:nvGrpSpPr>
-        <p:cNvPr id="1" name=""/>
-        <p:cNvGrpSpPr/>
-        <p:nvPr/>
-      </p:nvGrpSpPr>
-      <p:grpSpPr>
-        <a:xfrm>
-          <a:off x="0" y="0"/>
-          <a:ext cx="0" cy="0"/>
-          <a:chOff x="0" y="0"/>
-          <a:chExt cx="0" cy="0"/>
-        </a:xfrm>
-      </p:grpSpPr>
-      <p:sp>
-        <p:nvSpPr>
-          <p:cNvPr id="2" name="Slide Image Placeholder 1"/>
-          <p:cNvSpPr>
-            <a:spLocks noGrp="1" noRot="1" noChangeAspect="1"/>
-          </p:cNvSpPr>
-          <p:nvPr>
-            <p:ph type="sldImg"/>
-          </p:nvPr>
-        </p:nvSpPr>
-        <p:spPr/>
-      </p:sp>
-      <p:sp>
-        <p:nvSpPr>
-          <p:cNvPr id="3" name="Notes Placeholder 2"/>
-          <p:cNvSpPr>
-            <a:spLocks noGrp="1"/>
-          </p:cNvSpPr>
-          <p:nvPr>
-            <p:ph type="body" idx="1"/>
-          </p:nvPr>
-        </p:nvSpPr>
-        <p:spPr/>
-        <p:txBody>
-          <a:bodyPr/>
-          <a:lstStyle/>
-          <a:p>
-            <a:endParaRPr lang="en-US" dirty="0"/>
-          </a:p>
-        </p:txBody>
-      </p:sp>
-      <p:sp>
-        <p:nvSpPr>
-          <p:cNvPr id="4" name="Slide Number Placeholder 3"/>
-          <p:cNvSpPr>
-            <a:spLocks noGrp="1"/>
-          </p:cNvSpPr>
-          <p:nvPr>
-            <p:ph type="sldNum" sz="quarter" idx="10"/>
-          </p:nvPr>
-        </p:nvSpPr>
-        <p:spPr/>
-        <p:txBody>
-          <a:bodyPr/>
-          <a:lstStyle/>
-          <a:p>
-            <a:fld id="{7D8C2C35-2B8A-446E-BEC0-FD36716C29AC}" type="slidenum">
-              <a:rPr lang="de-DE" smtClean="0"/>
-              <a:pPr/>
-              <a:t>29</a:t>
+              <a:t>28</a:t>
             </a:fld>
             <a:endParaRPr lang="de-DE" dirty="0"/>
           </a:p>
@@ -2376,7 +2258,7 @@
     </p:spTree>
     <p:extLst>
       <p:ext uri="{BB962C8B-B14F-4D97-AF65-F5344CB8AC3E}">
-        <p14:creationId xmlns:p14="http://schemas.microsoft.com/office/powerpoint/2010/main" val="4149311787"/>
+        <p14:creationId xmlns:p14="http://schemas.microsoft.com/office/powerpoint/2010/main" val="1867975161"/>
       </p:ext>
     </p:extLst>
   </p:cSld>
@@ -8638,469 +8520,6 @@
           <a:lstStyle/>
           <a:p>
             <a:r>
-              <a:rPr lang="en-US" dirty="0" smtClean="0"/>
-              <a:t>Lazy Evaluation With Closures: Delay and Force</a:t>
-            </a:r>
-            <a:endParaRPr lang="en-US" dirty="0"/>
-          </a:p>
-        </p:txBody>
-      </p:sp>
-      <p:sp>
-        <p:nvSpPr>
-          <p:cNvPr id="9" name="Text Placeholder 8"/>
-          <p:cNvSpPr>
-            <a:spLocks noGrp="1"/>
-          </p:cNvSpPr>
-          <p:nvPr>
-            <p:ph type="body" sz="quarter" idx="11"/>
-          </p:nvPr>
-        </p:nvSpPr>
-        <p:spPr>
-          <a:xfrm>
-            <a:off x="323999" y="1691079"/>
-            <a:ext cx="6534001" cy="2160485"/>
-          </a:xfrm>
-        </p:spPr>
-        <p:txBody>
-          <a:bodyPr/>
-          <a:lstStyle/>
-          <a:p>
-            <a:r>
-              <a:rPr lang="en-US" sz="1800" dirty="0" err="1" smtClean="0"/>
-              <a:t>Thunk</a:t>
-            </a:r>
-            <a:r>
-              <a:rPr lang="en-US" sz="1800" dirty="0" smtClean="0"/>
-              <a:t>: a closure with no arguments</a:t>
-            </a:r>
-            <a:br>
-              <a:rPr lang="en-US" sz="1800" dirty="0" smtClean="0"/>
-            </a:br>
-            <a:r>
-              <a:rPr lang="en-US" sz="1800" dirty="0" smtClean="0"/>
-              <a:t>Used to delay evaluation of an expression until it is needed</a:t>
-            </a:r>
-            <a:br>
-              <a:rPr lang="en-US" sz="1800" dirty="0" smtClean="0"/>
-            </a:br>
-            <a:r>
-              <a:rPr lang="en-US" sz="1800" dirty="0" smtClean="0"/>
-              <a:t/>
-            </a:r>
-            <a:br>
-              <a:rPr lang="en-US" sz="1800" dirty="0" smtClean="0"/>
-            </a:br>
-            <a:r>
-              <a:rPr lang="en-US" sz="1800" dirty="0" smtClean="0"/>
-              <a:t>Example (in pseudo SML): parameters of a function</a:t>
-            </a:r>
-            <a:br>
-              <a:rPr lang="en-US" sz="1800" dirty="0" smtClean="0"/>
-            </a:br>
-            <a:r>
-              <a:rPr lang="en-US" sz="1400" b="0" dirty="0" smtClean="0">
-                <a:latin typeface="Courier New" panose="02070309020205020404" pitchFamily="49" charset="0"/>
-                <a:cs typeface="Courier New" panose="02070309020205020404" pitchFamily="49" charset="0"/>
-              </a:rPr>
-              <a:t>fun f (x, y, z) = if x then y else z</a:t>
-            </a:r>
-          </a:p>
-          <a:p>
-            <a:r>
-              <a:rPr lang="en-US" sz="1400" b="0" dirty="0" smtClean="0">
-                <a:latin typeface="Courier New" panose="02070309020205020404" pitchFamily="49" charset="0"/>
-                <a:cs typeface="Courier New" panose="02070309020205020404" pitchFamily="49" charset="0"/>
-              </a:rPr>
-              <a:t/>
-            </a:r>
-            <a:br>
-              <a:rPr lang="en-US" sz="1400" b="0" dirty="0" smtClean="0">
-                <a:latin typeface="Courier New" panose="02070309020205020404" pitchFamily="49" charset="0"/>
-                <a:cs typeface="Courier New" panose="02070309020205020404" pitchFamily="49" charset="0"/>
-              </a:rPr>
-            </a:br>
-            <a:r>
-              <a:rPr lang="en-US" sz="1400" b="0" dirty="0" smtClean="0">
-                <a:latin typeface="Courier New" panose="02070309020205020404" pitchFamily="49" charset="0"/>
-                <a:cs typeface="Courier New" panose="02070309020205020404" pitchFamily="49" charset="0"/>
-              </a:rPr>
-              <a:t>f (true, print “true”, print “false</a:t>
-            </a:r>
-            <a:r>
-              <a:rPr lang="en-US" sz="1400" b="0" dirty="0" smtClean="0">
-                <a:latin typeface="Courier New" panose="02070309020205020404" pitchFamily="49" charset="0"/>
-                <a:cs typeface="Courier New" panose="02070309020205020404" pitchFamily="49" charset="0"/>
-              </a:rPr>
-              <a:t>”)</a:t>
-            </a:r>
-            <a:endParaRPr lang="en-US" sz="1800" dirty="0"/>
-          </a:p>
-        </p:txBody>
-      </p:sp>
-      <p:sp>
-        <p:nvSpPr>
-          <p:cNvPr id="5" name="TextBox 4"/>
-          <p:cNvSpPr txBox="1"/>
-          <p:nvPr/>
-        </p:nvSpPr>
-        <p:spPr>
-          <a:xfrm>
-            <a:off x="4696690" y="3477491"/>
-            <a:ext cx="4322619" cy="553998"/>
-          </a:xfrm>
-          <a:prstGeom prst="rect">
-            <a:avLst/>
-          </a:prstGeom>
-          <a:noFill/>
-        </p:spPr>
-        <p:txBody>
-          <a:bodyPr wrap="square" lIns="0" tIns="0" rIns="0" bIns="0" rtlCol="0">
-            <a:spAutoFit/>
-          </a:bodyPr>
-          <a:lstStyle/>
-          <a:p>
-            <a:pPr fontAlgn="base">
-              <a:spcBef>
-                <a:spcPts val="600"/>
-              </a:spcBef>
-              <a:spcAft>
-                <a:spcPct val="0"/>
-              </a:spcAft>
-              <a:buClr>
-                <a:srgbClr val="F0AB00"/>
-              </a:buClr>
-              <a:buSzPct val="80000"/>
-            </a:pPr>
-            <a:r>
-              <a:rPr lang="en-US" sz="1800" dirty="0">
-                <a:latin typeface="Courier New" panose="02070309020205020404" pitchFamily="49" charset="0"/>
-                <a:cs typeface="Courier New" panose="02070309020205020404" pitchFamily="49" charset="0"/>
-                <a:sym typeface="Wingdings" panose="05000000000000000000" pitchFamily="2" charset="2"/>
-              </a:rPr>
-              <a:t>would print “</a:t>
-            </a:r>
-            <a:r>
-              <a:rPr lang="en-US" sz="1800" dirty="0" err="1">
-                <a:latin typeface="Courier New" panose="02070309020205020404" pitchFamily="49" charset="0"/>
-                <a:cs typeface="Courier New" panose="02070309020205020404" pitchFamily="49" charset="0"/>
-                <a:sym typeface="Wingdings" panose="05000000000000000000" pitchFamily="2" charset="2"/>
-              </a:rPr>
-              <a:t>true””false””true</a:t>
-            </a:r>
-            <a:r>
-              <a:rPr lang="en-US" sz="1800" dirty="0">
-                <a:latin typeface="Courier New" panose="02070309020205020404" pitchFamily="49" charset="0"/>
-                <a:cs typeface="Courier New" panose="02070309020205020404" pitchFamily="49" charset="0"/>
-                <a:sym typeface="Wingdings" panose="05000000000000000000" pitchFamily="2" charset="2"/>
-              </a:rPr>
-              <a:t>”</a:t>
-            </a:r>
-            <a:r>
-              <a:rPr lang="en-US" sz="1800" dirty="0">
-                <a:latin typeface="Courier New" panose="02070309020205020404" pitchFamily="49" charset="0"/>
-                <a:cs typeface="Courier New" panose="02070309020205020404" pitchFamily="49" charset="0"/>
-              </a:rPr>
-              <a:t/>
-            </a:r>
-            <a:br>
-              <a:rPr lang="en-US" sz="1800" dirty="0">
-                <a:latin typeface="Courier New" panose="02070309020205020404" pitchFamily="49" charset="0"/>
-                <a:cs typeface="Courier New" panose="02070309020205020404" pitchFamily="49" charset="0"/>
-              </a:rPr>
-            </a:br>
-            <a:endParaRPr lang="en-US" sz="1800" kern="0" dirty="0" smtClean="0">
-              <a:ea typeface="Arial Unicode MS" pitchFamily="34" charset="-128"/>
-              <a:cs typeface="Arial Unicode MS" pitchFamily="34" charset="-128"/>
-            </a:endParaRPr>
-          </a:p>
-        </p:txBody>
-      </p:sp>
-      <p:pic>
-        <p:nvPicPr>
-          <p:cNvPr id="6" name="Picture 5"/>
-          <p:cNvPicPr>
-            <a:picLocks noChangeAspect="1"/>
-          </p:cNvPicPr>
-          <p:nvPr/>
-        </p:nvPicPr>
-        <p:blipFill>
-          <a:blip r:embed="rId3"/>
-          <a:stretch>
-            <a:fillRect/>
-          </a:stretch>
-        </p:blipFill>
-        <p:spPr>
-          <a:xfrm>
-            <a:off x="296289" y="4031489"/>
-            <a:ext cx="10013548" cy="746825"/>
-          </a:xfrm>
-          <a:prstGeom prst="rect">
-            <a:avLst/>
-          </a:prstGeom>
-        </p:spPr>
-      </p:pic>
-      <p:sp>
-        <p:nvSpPr>
-          <p:cNvPr id="7" name="TextBox 6"/>
-          <p:cNvSpPr txBox="1"/>
-          <p:nvPr/>
-        </p:nvSpPr>
-        <p:spPr>
-          <a:xfrm>
-            <a:off x="323999" y="4959927"/>
-            <a:ext cx="11545201" cy="276999"/>
-          </a:xfrm>
-          <a:prstGeom prst="rect">
-            <a:avLst/>
-          </a:prstGeom>
-          <a:noFill/>
-        </p:spPr>
-        <p:txBody>
-          <a:bodyPr wrap="square" lIns="0" tIns="0" rIns="0" bIns="0" rtlCol="0">
-            <a:spAutoFit/>
-          </a:bodyPr>
-          <a:lstStyle/>
-          <a:p>
-            <a:pPr fontAlgn="base">
-              <a:spcBef>
-                <a:spcPts val="600"/>
-              </a:spcBef>
-              <a:spcAft>
-                <a:spcPct val="0"/>
-              </a:spcAft>
-              <a:buClr>
-                <a:srgbClr val="F0AB00"/>
-              </a:buClr>
-              <a:buSzPct val="80000"/>
-            </a:pPr>
-            <a:r>
-              <a:rPr lang="en-US" sz="1800" dirty="0"/>
-              <a:t>This works due to the fact that a function body is evaluated only if the function is </a:t>
-            </a:r>
-            <a:r>
-              <a:rPr lang="en-US" sz="1800" dirty="0" smtClean="0"/>
-              <a:t>called. </a:t>
-            </a:r>
-            <a:endParaRPr lang="en-US" sz="1800" dirty="0"/>
-          </a:p>
-        </p:txBody>
-      </p:sp>
-    </p:spTree>
-    <p:extLst>
-      <p:ext uri="{BB962C8B-B14F-4D97-AF65-F5344CB8AC3E}">
-        <p14:creationId xmlns:p14="http://schemas.microsoft.com/office/powerpoint/2010/main" val="228100004"/>
-      </p:ext>
-    </p:extLst>
-  </p:cSld>
-  <p:clrMapOvr>
-    <a:masterClrMapping/>
-  </p:clrMapOvr>
-  <p:transition spd="med"/>
-  <p:timing>
-    <p:tnLst>
-      <p:par>
-        <p:cTn id="1" dur="indefinite" restart="never" nodeType="tmRoot">
-          <p:childTnLst>
-            <p:seq concurrent="1" nextAc="seek">
-              <p:cTn id="2" dur="indefinite" nodeType="mainSeq">
-                <p:childTnLst>
-                  <p:par>
-                    <p:cTn id="3" fill="hold">
-                      <p:stCondLst>
-                        <p:cond delay="indefinite"/>
-                      </p:stCondLst>
-                      <p:childTnLst>
-                        <p:par>
-                          <p:cTn id="4" fill="hold">
-                            <p:stCondLst>
-                              <p:cond delay="0"/>
-                            </p:stCondLst>
-                            <p:childTnLst>
-                              <p:par>
-                                <p:cTn id="5" presetID="1" presetClass="entr" presetSubtype="0" fill="hold" grpId="0" nodeType="clickEffect">
-                                  <p:stCondLst>
-                                    <p:cond delay="0"/>
-                                  </p:stCondLst>
-                                  <p:childTnLst>
-                                    <p:set>
-                                      <p:cBhvr>
-                                        <p:cTn id="6" dur="1" fill="hold">
-                                          <p:stCondLst>
-                                            <p:cond delay="0"/>
-                                          </p:stCondLst>
-                                        </p:cTn>
-                                        <p:tgtEl>
-                                          <p:spTgt spid="5"/>
-                                        </p:tgtEl>
-                                        <p:attrNameLst>
-                                          <p:attrName>style.visibility</p:attrName>
-                                        </p:attrNameLst>
-                                      </p:cBhvr>
-                                      <p:to>
-                                        <p:strVal val="visible"/>
-                                      </p:to>
-                                    </p:set>
-                                  </p:childTnLst>
-                                </p:cTn>
-                              </p:par>
-                            </p:childTnLst>
-                          </p:cTn>
-                        </p:par>
-                      </p:childTnLst>
-                    </p:cTn>
-                  </p:par>
-                  <p:par>
-                    <p:cTn id="7" fill="hold">
-                      <p:stCondLst>
-                        <p:cond delay="indefinite"/>
-                      </p:stCondLst>
-                      <p:childTnLst>
-                        <p:par>
-                          <p:cTn id="8" fill="hold">
-                            <p:stCondLst>
-                              <p:cond delay="0"/>
-                            </p:stCondLst>
-                            <p:childTnLst>
-                              <p:par>
-                                <p:cTn id="9" presetID="1" presetClass="entr" presetSubtype="0" fill="hold" nodeType="clickEffect">
-                                  <p:stCondLst>
-                                    <p:cond delay="0"/>
-                                  </p:stCondLst>
-                                  <p:childTnLst>
-                                    <p:set>
-                                      <p:cBhvr>
-                                        <p:cTn id="10" dur="1" fill="hold">
-                                          <p:stCondLst>
-                                            <p:cond delay="0"/>
-                                          </p:stCondLst>
-                                        </p:cTn>
-                                        <p:tgtEl>
-                                          <p:spTgt spid="6"/>
-                                        </p:tgtEl>
-                                        <p:attrNameLst>
-                                          <p:attrName>style.visibility</p:attrName>
-                                        </p:attrNameLst>
-                                      </p:cBhvr>
-                                      <p:to>
-                                        <p:strVal val="visible"/>
-                                      </p:to>
-                                    </p:set>
-                                  </p:childTnLst>
-                                </p:cTn>
-                              </p:par>
-                            </p:childTnLst>
-                          </p:cTn>
-                        </p:par>
-                      </p:childTnLst>
-                    </p:cTn>
-                  </p:par>
-                  <p:par>
-                    <p:cTn id="11" fill="hold">
-                      <p:stCondLst>
-                        <p:cond delay="indefinite"/>
-                      </p:stCondLst>
-                      <p:childTnLst>
-                        <p:par>
-                          <p:cTn id="12" fill="hold">
-                            <p:stCondLst>
-                              <p:cond delay="0"/>
-                            </p:stCondLst>
-                            <p:childTnLst>
-                              <p:par>
-                                <p:cTn id="13" presetID="1" presetClass="entr" presetSubtype="0" fill="hold" grpId="0" nodeType="clickEffect">
-                                  <p:stCondLst>
-                                    <p:cond delay="0"/>
-                                  </p:stCondLst>
-                                  <p:childTnLst>
-                                    <p:set>
-                                      <p:cBhvr>
-                                        <p:cTn id="14" dur="1" fill="hold">
-                                          <p:stCondLst>
-                                            <p:cond delay="0"/>
-                                          </p:stCondLst>
-                                        </p:cTn>
-                                        <p:tgtEl>
-                                          <p:spTgt spid="7"/>
-                                        </p:tgtEl>
-                                        <p:attrNameLst>
-                                          <p:attrName>style.visibility</p:attrName>
-                                        </p:attrNameLst>
-                                      </p:cBhvr>
-                                      <p:to>
-                                        <p:strVal val="visible"/>
-                                      </p:to>
-                                    </p:set>
-                                  </p:childTnLst>
-                                </p:cTn>
-                              </p:par>
-                            </p:childTnLst>
-                          </p:cTn>
-                        </p:par>
-                      </p:childTnLst>
-                    </p:cTn>
-                  </p:par>
-                </p:childTnLst>
-              </p:cTn>
-              <p:prevCondLst>
-                <p:cond evt="onPrev" delay="0">
-                  <p:tgtEl>
-                    <p:sldTgt/>
-                  </p:tgtEl>
-                </p:cond>
-              </p:prevCondLst>
-              <p:nextCondLst>
-                <p:cond evt="onNext" delay="0">
-                  <p:tgtEl>
-                    <p:sldTgt/>
-                  </p:tgtEl>
-                </p:cond>
-              </p:nextCondLst>
-            </p:seq>
-          </p:childTnLst>
-        </p:cTn>
-      </p:par>
-    </p:tnLst>
-    <p:bldLst>
-      <p:bldP spid="5" grpId="0"/>
-      <p:bldP spid="7" grpId="0"/>
-    </p:bldLst>
-  </p:timing>
-</p:sld>
-</file>
-
-<file path=ppt/slides/slide11.xml><?xml version="1.0" encoding="utf-8"?>
-<p:sld xmlns:a="http://schemas.openxmlformats.org/drawingml/2006/main" xmlns:r="http://schemas.openxmlformats.org/officeDocument/2006/relationships" xmlns:p="http://schemas.openxmlformats.org/presentationml/2006/main">
-  <p:cSld>
-    <p:spTree>
-      <p:nvGrpSpPr>
-        <p:cNvPr id="1" name=""/>
-        <p:cNvGrpSpPr/>
-        <p:nvPr/>
-      </p:nvGrpSpPr>
-      <p:grpSpPr>
-        <a:xfrm>
-          <a:off x="0" y="0"/>
-          <a:ext cx="0" cy="0"/>
-          <a:chOff x="0" y="0"/>
-          <a:chExt cx="0" cy="0"/>
-        </a:xfrm>
-      </p:grpSpPr>
-      <p:sp>
-        <p:nvSpPr>
-          <p:cNvPr id="2" name="Title 1"/>
-          <p:cNvSpPr>
-            <a:spLocks noGrp="1"/>
-          </p:cNvSpPr>
-          <p:nvPr>
-            <p:ph type="title"/>
-          </p:nvPr>
-        </p:nvSpPr>
-        <p:spPr/>
-        <p:txBody>
-          <a:bodyPr/>
-          <a:lstStyle/>
-          <a:p>
-            <a:r>
               <a:rPr lang="en-US" altLang="zh-CN" dirty="0" smtClean="0"/>
               <a:t>JavaScript Example </a:t>
             </a:r>
@@ -9261,7 +8680,7 @@
 </p:sld>
 </file>
 
-<file path=ppt/slides/slide12.xml><?xml version="1.0" encoding="utf-8"?>
+<file path=ppt/slides/slide11.xml><?xml version="1.0" encoding="utf-8"?>
 <p:sld xmlns:a="http://schemas.openxmlformats.org/drawingml/2006/main" xmlns:r="http://schemas.openxmlformats.org/officeDocument/2006/relationships" xmlns:p="http://schemas.openxmlformats.org/presentationml/2006/main">
   <p:cSld>
     <p:spTree>
@@ -9471,7 +8890,7 @@
 </p:sld>
 </file>
 
-<file path=ppt/slides/slide13.xml><?xml version="1.0" encoding="utf-8"?>
+<file path=ppt/slides/slide12.xml><?xml version="1.0" encoding="utf-8"?>
 <p:sld xmlns:a="http://schemas.openxmlformats.org/drawingml/2006/main" xmlns:r="http://schemas.openxmlformats.org/officeDocument/2006/relationships" xmlns:p="http://schemas.openxmlformats.org/presentationml/2006/main">
   <p:cSld>
     <p:spTree>
@@ -9555,7 +8974,7 @@
 </p:sld>
 </file>
 
-<file path=ppt/slides/slide14.xml><?xml version="1.0" encoding="utf-8"?>
+<file path=ppt/slides/slide13.xml><?xml version="1.0" encoding="utf-8"?>
 <p:sld xmlns:a="http://schemas.openxmlformats.org/drawingml/2006/main" xmlns:r="http://schemas.openxmlformats.org/officeDocument/2006/relationships" xmlns:p="http://schemas.openxmlformats.org/presentationml/2006/main">
   <p:cSld>
     <p:spTree>
@@ -9923,7 +9342,7 @@
 </p:sld>
 </file>
 
-<file path=ppt/slides/slide15.xml><?xml version="1.0" encoding="utf-8"?>
+<file path=ppt/slides/slide14.xml><?xml version="1.0" encoding="utf-8"?>
 <p:sld xmlns:a="http://schemas.openxmlformats.org/drawingml/2006/main" xmlns:r="http://schemas.openxmlformats.org/officeDocument/2006/relationships" xmlns:p="http://schemas.openxmlformats.org/presentationml/2006/main">
   <p:cSld>
     <p:spTree>
@@ -10316,7 +9735,7 @@
 </p:sld>
 </file>
 
-<file path=ppt/slides/slide16.xml><?xml version="1.0" encoding="utf-8"?>
+<file path=ppt/slides/slide15.xml><?xml version="1.0" encoding="utf-8"?>
 <p:sld xmlns:a="http://schemas.openxmlformats.org/drawingml/2006/main" xmlns:r="http://schemas.openxmlformats.org/officeDocument/2006/relationships" xmlns:p="http://schemas.openxmlformats.org/presentationml/2006/main">
   <p:cSld>
     <p:spTree>
@@ -10794,7 +10213,7 @@
 </p:sld>
 </file>
 
-<file path=ppt/slides/slide17.xml><?xml version="1.0" encoding="utf-8"?>
+<file path=ppt/slides/slide16.xml><?xml version="1.0" encoding="utf-8"?>
 <p:sld xmlns:a="http://schemas.openxmlformats.org/drawingml/2006/main" xmlns:r="http://schemas.openxmlformats.org/officeDocument/2006/relationships" xmlns:p="http://schemas.openxmlformats.org/presentationml/2006/main">
   <p:cSld>
     <p:spTree>
@@ -11074,7 +10493,7 @@
 </p:sld>
 </file>
 
-<file path=ppt/slides/slide18.xml><?xml version="1.0" encoding="utf-8"?>
+<file path=ppt/slides/slide17.xml><?xml version="1.0" encoding="utf-8"?>
 <p:sld xmlns:a="http://schemas.openxmlformats.org/drawingml/2006/main" xmlns:r="http://schemas.openxmlformats.org/officeDocument/2006/relationships" xmlns:p="http://schemas.openxmlformats.org/presentationml/2006/main">
   <p:cSld>
     <p:spTree>
@@ -11403,7 +10822,7 @@
 </p:sld>
 </file>
 
-<file path=ppt/slides/slide19.xml><?xml version="1.0" encoding="utf-8"?>
+<file path=ppt/slides/slide18.xml><?xml version="1.0" encoding="utf-8"?>
 <p:sld xmlns:a="http://schemas.openxmlformats.org/drawingml/2006/main" xmlns:r="http://schemas.openxmlformats.org/officeDocument/2006/relationships" xmlns:p="http://schemas.openxmlformats.org/presentationml/2006/main">
   <p:cSld>
     <p:spTree>
@@ -11682,6 +11101,427 @@
 </p:sld>
 </file>
 
+<file path=ppt/slides/slide19.xml><?xml version="1.0" encoding="utf-8"?>
+<p:sld xmlns:a="http://schemas.openxmlformats.org/drawingml/2006/main" xmlns:r="http://schemas.openxmlformats.org/officeDocument/2006/relationships" xmlns:p="http://schemas.openxmlformats.org/presentationml/2006/main">
+  <p:cSld>
+    <p:spTree>
+      <p:nvGrpSpPr>
+        <p:cNvPr id="1" name=""/>
+        <p:cNvGrpSpPr/>
+        <p:nvPr/>
+      </p:nvGrpSpPr>
+      <p:grpSpPr>
+        <a:xfrm>
+          <a:off x="0" y="0"/>
+          <a:ext cx="0" cy="0"/>
+          <a:chOff x="0" y="0"/>
+          <a:chExt cx="0" cy="0"/>
+        </a:xfrm>
+      </p:grpSpPr>
+      <p:sp>
+        <p:nvSpPr>
+          <p:cNvPr id="2" name="Title 1"/>
+          <p:cNvSpPr>
+            <a:spLocks noGrp="1"/>
+          </p:cNvSpPr>
+          <p:nvPr>
+            <p:ph type="title"/>
+          </p:nvPr>
+        </p:nvSpPr>
+        <p:spPr/>
+        <p:txBody>
+          <a:bodyPr/>
+          <a:lstStyle/>
+          <a:p>
+            <a:r>
+              <a:rPr lang="en-US" dirty="0"/>
+              <a:t>JavaScript Example: Lazy Load </a:t>
+            </a:r>
+            <a:r>
+              <a:rPr lang="en-US" dirty="0" smtClean="0"/>
+              <a:t>Scenario – final version</a:t>
+            </a:r>
+            <a:endParaRPr lang="en-US" dirty="0"/>
+          </a:p>
+        </p:txBody>
+      </p:sp>
+      <p:sp>
+        <p:nvSpPr>
+          <p:cNvPr id="5" name="TextBox 4"/>
+          <p:cNvSpPr txBox="1"/>
+          <p:nvPr/>
+        </p:nvSpPr>
+        <p:spPr>
+          <a:xfrm>
+            <a:off x="152400" y="1343891"/>
+            <a:ext cx="10903527" cy="615553"/>
+          </a:xfrm>
+          <a:prstGeom prst="rect">
+            <a:avLst/>
+          </a:prstGeom>
+          <a:noFill/>
+        </p:spPr>
+        <p:txBody>
+          <a:bodyPr wrap="square" lIns="0" tIns="0" rIns="0" bIns="0" rtlCol="0">
+            <a:spAutoFit/>
+          </a:bodyPr>
+          <a:lstStyle/>
+          <a:p>
+            <a:r>
+              <a:rPr lang="en-US" sz="2000" dirty="0"/>
+              <a:t>We can also write a generic function to enable any other function to behave as singleton style:</a:t>
+            </a:r>
+          </a:p>
+          <a:p>
+            <a:endParaRPr lang="en-US" sz="2000" dirty="0"/>
+          </a:p>
+        </p:txBody>
+      </p:sp>
+      <p:sp>
+        <p:nvSpPr>
+          <p:cNvPr id="4" name="TextBox 3"/>
+          <p:cNvSpPr txBox="1"/>
+          <p:nvPr/>
+        </p:nvSpPr>
+        <p:spPr>
+          <a:xfrm>
+            <a:off x="152400" y="4876800"/>
+            <a:ext cx="11430000" cy="923330"/>
+          </a:xfrm>
+          <a:prstGeom prst="rect">
+            <a:avLst/>
+          </a:prstGeom>
+          <a:noFill/>
+        </p:spPr>
+        <p:txBody>
+          <a:bodyPr wrap="square" lIns="0" tIns="0" rIns="0" bIns="0" rtlCol="0">
+            <a:spAutoFit/>
+          </a:bodyPr>
+          <a:lstStyle/>
+          <a:p>
+            <a:r>
+              <a:rPr lang="en-US" sz="2000" b="1" dirty="0" err="1"/>
+              <a:t>var</a:t>
+            </a:r>
+            <a:r>
+              <a:rPr lang="en-US" sz="2000" b="1" dirty="0"/>
+              <a:t> </a:t>
+            </a:r>
+            <a:r>
+              <a:rPr lang="en-US" sz="2000" b="1" dirty="0" err="1">
+                <a:solidFill>
+                  <a:srgbClr val="FF0000"/>
+                </a:solidFill>
+              </a:rPr>
+              <a:t>createMask</a:t>
+            </a:r>
+            <a:r>
+              <a:rPr lang="en-US" sz="2000" b="1" dirty="0"/>
+              <a:t> = </a:t>
+            </a:r>
+            <a:r>
+              <a:rPr lang="en-US" sz="2000" b="1" dirty="0">
+                <a:solidFill>
+                  <a:srgbClr val="FF0000"/>
+                </a:solidFill>
+              </a:rPr>
+              <a:t>singleton</a:t>
+            </a:r>
+            <a:r>
+              <a:rPr lang="en-US" sz="2000" b="1" dirty="0"/>
+              <a:t>(function(){</a:t>
+            </a:r>
+          </a:p>
+          <a:p>
+            <a:r>
+              <a:rPr lang="en-US" sz="2000" b="1" dirty="0"/>
+              <a:t>  return </a:t>
+            </a:r>
+            <a:r>
+              <a:rPr lang="en-US" sz="2000" b="1" dirty="0" err="1"/>
+              <a:t>document.body.appendChild</a:t>
+            </a:r>
+            <a:r>
+              <a:rPr lang="en-US" sz="2000" b="1" dirty="0"/>
+              <a:t>(</a:t>
+            </a:r>
+            <a:r>
+              <a:rPr lang="en-US" sz="2000" b="1" dirty="0" err="1"/>
+              <a:t>document.createElement</a:t>
+            </a:r>
+            <a:r>
+              <a:rPr lang="en-US" sz="2000" b="1" dirty="0"/>
+              <a:t>('div'));</a:t>
+            </a:r>
+          </a:p>
+          <a:p>
+            <a:r>
+              <a:rPr lang="en-US" sz="2000" b="1" dirty="0" smtClean="0"/>
+              <a:t>});</a:t>
+            </a:r>
+            <a:endParaRPr lang="en-US" sz="2000" b="1" dirty="0"/>
+          </a:p>
+        </p:txBody>
+      </p:sp>
+      <p:sp>
+        <p:nvSpPr>
+          <p:cNvPr id="3" name="TextBox 2"/>
+          <p:cNvSpPr txBox="1"/>
+          <p:nvPr/>
+        </p:nvSpPr>
+        <p:spPr>
+          <a:xfrm>
+            <a:off x="152400" y="1814945"/>
+            <a:ext cx="11817927" cy="2569934"/>
+          </a:xfrm>
+          <a:prstGeom prst="rect">
+            <a:avLst/>
+          </a:prstGeom>
+          <a:noFill/>
+        </p:spPr>
+        <p:txBody>
+          <a:bodyPr wrap="square" lIns="0" tIns="0" rIns="0" bIns="0" rtlCol="0">
+            <a:spAutoFit/>
+          </a:bodyPr>
+          <a:lstStyle/>
+          <a:p>
+            <a:r>
+              <a:rPr lang="en-US" sz="1800" b="1" dirty="0" err="1"/>
+              <a:t>var</a:t>
+            </a:r>
+            <a:r>
+              <a:rPr lang="en-US" sz="1800" b="1" dirty="0"/>
+              <a:t> singleton = function(</a:t>
+            </a:r>
+            <a:r>
+              <a:rPr lang="en-US" sz="1800" b="1" dirty="0" err="1"/>
+              <a:t>fn</a:t>
+            </a:r>
+            <a:r>
+              <a:rPr lang="en-US" sz="1800" b="1" dirty="0"/>
+              <a:t>){</a:t>
+            </a:r>
+          </a:p>
+          <a:p>
+            <a:r>
+              <a:rPr lang="en-US" sz="1800" b="1" dirty="0"/>
+              <a:t>    </a:t>
+            </a:r>
+            <a:r>
+              <a:rPr lang="en-US" sz="1800" b="1" dirty="0" err="1"/>
+              <a:t>var</a:t>
+            </a:r>
+            <a:r>
+              <a:rPr lang="en-US" sz="1800" b="1" dirty="0"/>
+              <a:t> result;</a:t>
+            </a:r>
+          </a:p>
+          <a:p>
+            <a:r>
+              <a:rPr lang="en-US" sz="1800" b="1" dirty="0"/>
+              <a:t>    return function() {</a:t>
+            </a:r>
+          </a:p>
+          <a:p>
+            <a:r>
+              <a:rPr lang="en-US" sz="1800" b="1" dirty="0"/>
+              <a:t>        return result || ( result = </a:t>
+            </a:r>
+            <a:r>
+              <a:rPr lang="en-US" sz="1800" b="1" dirty="0" err="1"/>
+              <a:t>fn.apply</a:t>
+            </a:r>
+            <a:r>
+              <a:rPr lang="en-US" sz="1800" b="1" dirty="0"/>
+              <a:t>(</a:t>
+            </a:r>
+            <a:r>
+              <a:rPr lang="en-US" sz="1800" b="1" dirty="0" err="1"/>
+              <a:t>this,arguments</a:t>
+            </a:r>
+            <a:r>
+              <a:rPr lang="en-US" sz="1800" b="1" dirty="0"/>
+              <a:t>));</a:t>
+            </a:r>
+          </a:p>
+          <a:p>
+            <a:r>
+              <a:rPr lang="en-US" sz="1800" b="1" dirty="0"/>
+              <a:t>    }</a:t>
+            </a:r>
+          </a:p>
+          <a:p>
+            <a:r>
+              <a:rPr lang="en-US" sz="1800" b="1" dirty="0"/>
+              <a:t>}</a:t>
+            </a:r>
+          </a:p>
+          <a:p>
+            <a:endParaRPr lang="en-US" sz="1800" dirty="0"/>
+          </a:p>
+          <a:p>
+            <a:r>
+              <a:rPr lang="en-US" sz="1800" dirty="0"/>
+              <a:t>The singleton function accepts a function as input, and return a new function which behaves like singleton. </a:t>
+            </a:r>
+          </a:p>
+          <a:p>
+            <a:pPr fontAlgn="base">
+              <a:spcBef>
+                <a:spcPts val="600"/>
+              </a:spcBef>
+              <a:spcAft>
+                <a:spcPct val="0"/>
+              </a:spcAft>
+              <a:buClr>
+                <a:srgbClr val="F0AB00"/>
+              </a:buClr>
+              <a:buSzPct val="80000"/>
+            </a:pPr>
+            <a:endParaRPr lang="en-US" sz="1800" kern="0" dirty="0" err="1" smtClean="0">
+              <a:ea typeface="Arial Unicode MS" pitchFamily="34" charset="-128"/>
+              <a:cs typeface="Arial Unicode MS" pitchFamily="34" charset="-128"/>
+            </a:endParaRPr>
+          </a:p>
+        </p:txBody>
+      </p:sp>
+    </p:spTree>
+    <p:extLst>
+      <p:ext uri="{BB962C8B-B14F-4D97-AF65-F5344CB8AC3E}">
+        <p14:creationId xmlns:p14="http://schemas.microsoft.com/office/powerpoint/2010/main" val="1912123345"/>
+      </p:ext>
+    </p:extLst>
+  </p:cSld>
+  <p:clrMapOvr>
+    <a:masterClrMapping/>
+  </p:clrMapOvr>
+  <p:timing>
+    <p:tnLst>
+      <p:par>
+        <p:cTn id="1" dur="indefinite" restart="never" nodeType="tmRoot">
+          <p:childTnLst>
+            <p:seq concurrent="1" nextAc="seek">
+              <p:cTn id="2" dur="indefinite" nodeType="mainSeq">
+                <p:childTnLst>
+                  <p:par>
+                    <p:cTn id="3" fill="hold">
+                      <p:stCondLst>
+                        <p:cond delay="indefinite"/>
+                      </p:stCondLst>
+                      <p:childTnLst>
+                        <p:par>
+                          <p:cTn id="4" fill="hold">
+                            <p:stCondLst>
+                              <p:cond delay="0"/>
+                            </p:stCondLst>
+                            <p:childTnLst>
+                              <p:par>
+                                <p:cTn id="5" presetID="1" presetClass="entr" presetSubtype="0" fill="hold" grpId="0" nodeType="clickEffect">
+                                  <p:stCondLst>
+                                    <p:cond delay="0"/>
+                                  </p:stCondLst>
+                                  <p:childTnLst>
+                                    <p:set>
+                                      <p:cBhvr>
+                                        <p:cTn id="6" dur="1" fill="hold">
+                                          <p:stCondLst>
+                                            <p:cond delay="0"/>
+                                          </p:stCondLst>
+                                        </p:cTn>
+                                        <p:tgtEl>
+                                          <p:spTgt spid="3"/>
+                                        </p:tgtEl>
+                                        <p:attrNameLst>
+                                          <p:attrName>style.visibility</p:attrName>
+                                        </p:attrNameLst>
+                                      </p:cBhvr>
+                                      <p:to>
+                                        <p:strVal val="visible"/>
+                                      </p:to>
+                                    </p:set>
+                                  </p:childTnLst>
+                                </p:cTn>
+                              </p:par>
+                            </p:childTnLst>
+                          </p:cTn>
+                        </p:par>
+                      </p:childTnLst>
+                    </p:cTn>
+                  </p:par>
+                  <p:par>
+                    <p:cTn id="7" fill="hold">
+                      <p:stCondLst>
+                        <p:cond delay="indefinite"/>
+                      </p:stCondLst>
+                      <p:childTnLst>
+                        <p:par>
+                          <p:cTn id="8" fill="hold">
+                            <p:stCondLst>
+                              <p:cond delay="0"/>
+                            </p:stCondLst>
+                            <p:childTnLst>
+                              <p:par>
+                                <p:cTn id="9" presetID="1" presetClass="entr" presetSubtype="0" fill="hold" grpId="0" nodeType="clickEffect">
+                                  <p:stCondLst>
+                                    <p:cond delay="0"/>
+                                  </p:stCondLst>
+                                  <p:childTnLst>
+                                    <p:set>
+                                      <p:cBhvr>
+                                        <p:cTn id="10" dur="1" fill="hold">
+                                          <p:stCondLst>
+                                            <p:cond delay="0"/>
+                                          </p:stCondLst>
+                                        </p:cTn>
+                                        <p:tgtEl>
+                                          <p:spTgt spid="4"/>
+                                        </p:tgtEl>
+                                        <p:attrNameLst>
+                                          <p:attrName>style.visibility</p:attrName>
+                                        </p:attrNameLst>
+                                      </p:cBhvr>
+                                      <p:to>
+                                        <p:strVal val="visible"/>
+                                      </p:to>
+                                    </p:set>
+                                  </p:childTnLst>
+                                </p:cTn>
+                              </p:par>
+                            </p:childTnLst>
+                          </p:cTn>
+                        </p:par>
+                      </p:childTnLst>
+                    </p:cTn>
+                  </p:par>
+                </p:childTnLst>
+              </p:cTn>
+              <p:prevCondLst>
+                <p:cond evt="onPrev" delay="0">
+                  <p:tgtEl>
+                    <p:sldTgt/>
+                  </p:tgtEl>
+                </p:cond>
+              </p:prevCondLst>
+              <p:nextCondLst>
+                <p:cond evt="onNext" delay="0">
+                  <p:tgtEl>
+                    <p:sldTgt/>
+                  </p:tgtEl>
+                </p:cond>
+              </p:nextCondLst>
+            </p:seq>
+          </p:childTnLst>
+        </p:cTn>
+      </p:par>
+    </p:tnLst>
+    <p:bldLst>
+      <p:bldP spid="4" grpId="0"/>
+      <p:bldP spid="3" grpId="0"/>
+    </p:bldLst>
+  </p:timing>
+</p:sld>
+</file>
+
 <file path=ppt/slides/slide2.xml><?xml version="1.0" encoding="utf-8"?>
 <p:sld xmlns:a="http://schemas.openxmlformats.org/drawingml/2006/main" xmlns:r="http://schemas.openxmlformats.org/officeDocument/2006/relationships" xmlns:p="http://schemas.openxmlformats.org/presentationml/2006/main">
   <p:cSld>
@@ -11721,7 +11561,7 @@
             </a:r>
             <a:r>
               <a:rPr lang="en-US" dirty="0"/>
-              <a:t>Scope (in SML)</a:t>
+              <a:t>Scope </a:t>
             </a:r>
           </a:p>
         </p:txBody>
@@ -11739,7 +11579,7 @@
         <p:spPr>
           <a:xfrm>
             <a:off x="323999" y="1691079"/>
-            <a:ext cx="10044951" cy="4392042"/>
+            <a:ext cx="10044951" cy="1827976"/>
           </a:xfrm>
         </p:spPr>
         <p:txBody>
@@ -11759,11 +11599,7 @@
             </a:r>
             <a:r>
               <a:rPr lang="en-US" sz="1800" u="sng" dirty="0" smtClean="0"/>
-              <a:t>defined</a:t>
-            </a:r>
-            <a:r>
-              <a:rPr lang="en-US" sz="1800" u="sng" dirty="0" smtClean="0"/>
-              <a:t>,</a:t>
+              <a:t>defined,</a:t>
             </a:r>
             <a:r>
               <a:rPr lang="en-US" sz="1800" dirty="0" smtClean="0"/>
@@ -11809,7 +11645,6 @@
               <a:rPr lang="en-US" sz="1800" dirty="0" smtClean="0"/>
               <a:t>) </a:t>
             </a:r>
-            <a:endParaRPr lang="en-US" sz="1800" dirty="0" smtClean="0"/>
           </a:p>
           <a:p>
             <a:r>
@@ -11824,158 +11659,200 @@
               <a:rPr lang="en-US" sz="1800" dirty="0" smtClean="0"/>
               <a:t>)</a:t>
             </a:r>
-          </a:p>
-          <a:p>
-            <a:pPr defTabSz="361950"/>
-            <a:r>
-              <a:rPr lang="en-US" sz="1800" dirty="0" smtClean="0"/>
+            <a:endParaRPr lang="en-US" sz="1800" dirty="0" smtClean="0"/>
+          </a:p>
+        </p:txBody>
+      </p:sp>
+      <p:sp>
+        <p:nvSpPr>
+          <p:cNvPr id="4" name="TextBox 3"/>
+          <p:cNvSpPr txBox="1"/>
+          <p:nvPr/>
+        </p:nvSpPr>
+        <p:spPr>
+          <a:xfrm>
+            <a:off x="323999" y="3519055"/>
+            <a:ext cx="10773492" cy="2200602"/>
+          </a:xfrm>
+          <a:prstGeom prst="rect">
+            <a:avLst/>
+          </a:prstGeom>
+          <a:noFill/>
+        </p:spPr>
+        <p:txBody>
+          <a:bodyPr wrap="square" lIns="0" tIns="0" rIns="0" bIns="0" rtlCol="0">
+            <a:spAutoFit/>
+          </a:bodyPr>
+          <a:lstStyle/>
+          <a:p>
+            <a:pPr fontAlgn="base">
+              <a:spcBef>
+                <a:spcPts val="600"/>
+              </a:spcBef>
+              <a:spcAft>
+                <a:spcPct val="0"/>
+              </a:spcAft>
+              <a:buClr>
+                <a:srgbClr val="F0AB00"/>
+              </a:buClr>
+              <a:buSzPct val="80000"/>
+            </a:pPr>
+            <a:r>
+              <a:rPr lang="en-US" sz="2400" dirty="0"/>
               <a:t>Example:</a:t>
             </a:r>
             <a:br>
-              <a:rPr lang="en-US" sz="1800" dirty="0" smtClean="0"/>
+              <a:rPr lang="en-US" sz="2400" dirty="0"/>
             </a:br>
             <a:r>
-              <a:rPr lang="en-US" sz="1800" dirty="0" smtClean="0"/>
+              <a:rPr lang="en-US" sz="2400" dirty="0"/>
               <a:t>	</a:t>
             </a:r>
             <a:r>
-              <a:rPr lang="en-US" sz="1400" b="0" dirty="0" err="1" smtClean="0">
+              <a:rPr lang="en-US" sz="1800" dirty="0" err="1">
                 <a:latin typeface="Courier New" panose="02070309020205020404" pitchFamily="49" charset="0"/>
                 <a:cs typeface="Courier New" panose="02070309020205020404" pitchFamily="49" charset="0"/>
               </a:rPr>
               <a:t>val</a:t>
             </a:r>
             <a:r>
-              <a:rPr lang="en-US" sz="1400" b="0" dirty="0" smtClean="0">
+              <a:rPr lang="en-US" sz="1800" dirty="0">
                 <a:latin typeface="Courier New" panose="02070309020205020404" pitchFamily="49" charset="0"/>
                 <a:cs typeface="Courier New" panose="02070309020205020404" pitchFamily="49" charset="0"/>
               </a:rPr>
               <a:t> x = 2</a:t>
             </a:r>
             <a:br>
-              <a:rPr lang="en-US" sz="1400" b="0" dirty="0" smtClean="0">
+              <a:rPr lang="en-US" sz="1800" dirty="0">
                 <a:latin typeface="Courier New" panose="02070309020205020404" pitchFamily="49" charset="0"/>
                 <a:cs typeface="Courier New" panose="02070309020205020404" pitchFamily="49" charset="0"/>
               </a:rPr>
             </a:br>
             <a:r>
-              <a:rPr lang="en-US" sz="1400" b="0" dirty="0" smtClean="0">
+              <a:rPr lang="en-US" sz="1800" dirty="0">
                 <a:latin typeface="Courier New" panose="02070309020205020404" pitchFamily="49" charset="0"/>
                 <a:cs typeface="Courier New" panose="02070309020205020404" pitchFamily="49" charset="0"/>
               </a:rPr>
               <a:t>	fun f (y) = x * y</a:t>
             </a:r>
-            <a:r>
-              <a:rPr lang="en-US" sz="1400" b="0" dirty="0">
+            <a:br>
+              <a:rPr lang="en-US" sz="1800" dirty="0">
                 <a:latin typeface="Courier New" panose="02070309020205020404" pitchFamily="49" charset="0"/>
                 <a:cs typeface="Courier New" panose="02070309020205020404" pitchFamily="49" charset="0"/>
               </a:rPr>
-              <a:t/>
-            </a:r>
-            <a:br>
-              <a:rPr lang="en-US" sz="1400" b="0" dirty="0">
+            </a:br>
+            <a:r>
+              <a:rPr lang="en-US" sz="1800" dirty="0">
                 <a:latin typeface="Courier New" panose="02070309020205020404" pitchFamily="49" charset="0"/>
                 <a:cs typeface="Courier New" panose="02070309020205020404" pitchFamily="49" charset="0"/>
               </a:rPr>
-            </a:br>
-            <a:r>
-              <a:rPr lang="en-US" sz="1400" b="0" dirty="0" smtClean="0">
+              <a:t>	</a:t>
+            </a:r>
+            <a:r>
+              <a:rPr lang="en-US" sz="1800" dirty="0" err="1">
                 <a:latin typeface="Courier New" panose="02070309020205020404" pitchFamily="49" charset="0"/>
                 <a:cs typeface="Courier New" panose="02070309020205020404" pitchFamily="49" charset="0"/>
               </a:rPr>
-              <a:t>	</a:t>
-            </a:r>
-            <a:r>
-              <a:rPr lang="en-US" sz="1400" b="0" dirty="0" err="1" smtClean="0">
+              <a:t>val</a:t>
+            </a:r>
+            <a:r>
+              <a:rPr lang="en-US" sz="1800" dirty="0">
                 <a:latin typeface="Courier New" panose="02070309020205020404" pitchFamily="49" charset="0"/>
                 <a:cs typeface="Courier New" panose="02070309020205020404" pitchFamily="49" charset="0"/>
               </a:rPr>
-              <a:t>val</a:t>
-            </a:r>
-            <a:r>
-              <a:rPr lang="en-US" sz="1400" b="0" dirty="0" smtClean="0">
+              <a:t> x = 3</a:t>
+            </a:r>
+            <a:br>
+              <a:rPr lang="en-US" sz="1800" dirty="0">
                 <a:latin typeface="Courier New" panose="02070309020205020404" pitchFamily="49" charset="0"/>
                 <a:cs typeface="Courier New" panose="02070309020205020404" pitchFamily="49" charset="0"/>
               </a:rPr>
-              <a:t> x = 3</a:t>
-            </a:r>
-            <a:br>
-              <a:rPr lang="en-US" sz="1400" b="0" dirty="0" smtClean="0">
+            </a:br>
+            <a:r>
+              <a:rPr lang="en-US" sz="1800" dirty="0">
                 <a:latin typeface="Courier New" panose="02070309020205020404" pitchFamily="49" charset="0"/>
                 <a:cs typeface="Courier New" panose="02070309020205020404" pitchFamily="49" charset="0"/>
               </a:rPr>
-            </a:br>
-            <a:r>
-              <a:rPr lang="en-US" sz="1400" b="0" dirty="0" smtClean="0">
+              <a:t>	</a:t>
+            </a:r>
+            <a:r>
+              <a:rPr lang="en-US" sz="1800" dirty="0" err="1">
                 <a:latin typeface="Courier New" panose="02070309020205020404" pitchFamily="49" charset="0"/>
                 <a:cs typeface="Courier New" panose="02070309020205020404" pitchFamily="49" charset="0"/>
               </a:rPr>
-              <a:t>	</a:t>
-            </a:r>
-            <a:r>
-              <a:rPr lang="en-US" sz="1400" b="0" dirty="0" err="1" smtClean="0">
+              <a:t>val</a:t>
+            </a:r>
+            <a:r>
+              <a:rPr lang="en-US" sz="1800" dirty="0">
                 <a:latin typeface="Courier New" panose="02070309020205020404" pitchFamily="49" charset="0"/>
                 <a:cs typeface="Courier New" panose="02070309020205020404" pitchFamily="49" charset="0"/>
               </a:rPr>
-              <a:t>val</a:t>
-            </a:r>
-            <a:r>
-              <a:rPr lang="en-US" sz="1400" b="0" dirty="0" smtClean="0">
+              <a:t> y = 2</a:t>
+            </a:r>
+            <a:br>
+              <a:rPr lang="en-US" sz="1800" dirty="0">
                 <a:latin typeface="Courier New" panose="02070309020205020404" pitchFamily="49" charset="0"/>
                 <a:cs typeface="Courier New" panose="02070309020205020404" pitchFamily="49" charset="0"/>
               </a:rPr>
-              <a:t> y = 2</a:t>
-            </a:r>
-            <a:br>
-              <a:rPr lang="en-US" sz="1400" b="0" dirty="0" smtClean="0">
+            </a:br>
+            <a:r>
+              <a:rPr lang="en-US" sz="1800" dirty="0">
                 <a:latin typeface="Courier New" panose="02070309020205020404" pitchFamily="49" charset="0"/>
                 <a:cs typeface="Courier New" panose="02070309020205020404" pitchFamily="49" charset="0"/>
               </a:rPr>
-            </a:br>
-            <a:r>
-              <a:rPr lang="en-US" sz="1400" b="0" dirty="0" smtClean="0">
+              <a:t>	</a:t>
+            </a:r>
+            <a:r>
+              <a:rPr lang="en-US" sz="1800" dirty="0" err="1">
                 <a:latin typeface="Courier New" panose="02070309020205020404" pitchFamily="49" charset="0"/>
                 <a:cs typeface="Courier New" panose="02070309020205020404" pitchFamily="49" charset="0"/>
               </a:rPr>
-              <a:t>	</a:t>
-            </a:r>
-            <a:r>
-              <a:rPr lang="en-US" sz="1400" b="0" dirty="0" err="1" smtClean="0">
+              <a:t>val</a:t>
+            </a:r>
+            <a:r>
+              <a:rPr lang="en-US" sz="1800" dirty="0">
                 <a:latin typeface="Courier New" panose="02070309020205020404" pitchFamily="49" charset="0"/>
                 <a:cs typeface="Courier New" panose="02070309020205020404" pitchFamily="49" charset="0"/>
               </a:rPr>
-              <a:t>val</a:t>
-            </a:r>
-            <a:r>
-              <a:rPr lang="en-US" sz="1400" b="0" dirty="0" smtClean="0">
-                <a:latin typeface="Courier New" panose="02070309020205020404" pitchFamily="49" charset="0"/>
-                <a:cs typeface="Courier New" panose="02070309020205020404" pitchFamily="49" charset="0"/>
-              </a:rPr>
               <a:t> z = f(x - y)</a:t>
             </a:r>
-            <a:endParaRPr lang="en-US" sz="1400" b="0" dirty="0">
-              <a:latin typeface="Courier New" panose="02070309020205020404" pitchFamily="49" charset="0"/>
-              <a:cs typeface="Courier New" panose="02070309020205020404" pitchFamily="49" charset="0"/>
+          </a:p>
+          <a:p>
+            <a:pPr fontAlgn="base">
+              <a:spcBef>
+                <a:spcPts val="600"/>
+              </a:spcBef>
+              <a:spcAft>
+                <a:spcPct val="0"/>
+              </a:spcAft>
+              <a:buClr>
+                <a:srgbClr val="F0AB00"/>
+              </a:buClr>
+              <a:buSzPct val="80000"/>
+            </a:pPr>
+            <a:endParaRPr lang="en-US" sz="1800" kern="0" dirty="0" err="1" smtClean="0">
+              <a:ea typeface="Arial Unicode MS" pitchFamily="34" charset="-128"/>
+              <a:cs typeface="Arial Unicode MS" pitchFamily="34" charset="-128"/>
             </a:endParaRPr>
           </a:p>
         </p:txBody>
       </p:sp>
       <p:graphicFrame>
         <p:nvGraphicFramePr>
-          <p:cNvPr id="3" name="Table 2"/>
+          <p:cNvPr id="6" name="Table 5"/>
           <p:cNvGraphicFramePr>
             <a:graphicFrameLocks noGrp="1"/>
           </p:cNvGraphicFramePr>
           <p:nvPr>
             <p:extLst>
               <p:ext uri="{D42A27DB-BD31-4B8C-83A1-F6EECF244321}">
-                <p14:modId xmlns:p14="http://schemas.microsoft.com/office/powerpoint/2010/main" val="3588873633"/>
+                <p14:modId xmlns:p14="http://schemas.microsoft.com/office/powerpoint/2010/main" val="188667607"/>
               </p:ext>
             </p:extLst>
           </p:nvPr>
         </p:nvGraphicFramePr>
         <p:xfrm>
-          <a:off x="327552" y="5226273"/>
+          <a:off x="323999" y="5347031"/>
           <a:ext cx="11416772" cy="747807"/>
         </p:xfrm>
         <a:graphic>
@@ -12122,310 +11999,6 @@
   <p:timing>
     <p:tnLst>
       <p:par>
-        <p:cTn id="1" dur="indefinite" restart="never" nodeType="tmRoot"/>
-      </p:par>
-    </p:tnLst>
-  </p:timing>
-</p:sld>
-</file>
-
-<file path=ppt/slides/slide20.xml><?xml version="1.0" encoding="utf-8"?>
-<p:sld xmlns:a="http://schemas.openxmlformats.org/drawingml/2006/main" xmlns:r="http://schemas.openxmlformats.org/officeDocument/2006/relationships" xmlns:p="http://schemas.openxmlformats.org/presentationml/2006/main">
-  <p:cSld>
-    <p:spTree>
-      <p:nvGrpSpPr>
-        <p:cNvPr id="1" name=""/>
-        <p:cNvGrpSpPr/>
-        <p:nvPr/>
-      </p:nvGrpSpPr>
-      <p:grpSpPr>
-        <a:xfrm>
-          <a:off x="0" y="0"/>
-          <a:ext cx="0" cy="0"/>
-          <a:chOff x="0" y="0"/>
-          <a:chExt cx="0" cy="0"/>
-        </a:xfrm>
-      </p:grpSpPr>
-      <p:sp>
-        <p:nvSpPr>
-          <p:cNvPr id="2" name="Title 1"/>
-          <p:cNvSpPr>
-            <a:spLocks noGrp="1"/>
-          </p:cNvSpPr>
-          <p:nvPr>
-            <p:ph type="title"/>
-          </p:nvPr>
-        </p:nvSpPr>
-        <p:spPr/>
-        <p:txBody>
-          <a:bodyPr/>
-          <a:lstStyle/>
-          <a:p>
-            <a:r>
-              <a:rPr lang="en-US" dirty="0"/>
-              <a:t>JavaScript Example: Lazy Load </a:t>
-            </a:r>
-            <a:r>
-              <a:rPr lang="en-US" dirty="0" smtClean="0"/>
-              <a:t>Scenario – final version</a:t>
-            </a:r>
-            <a:endParaRPr lang="en-US" dirty="0"/>
-          </a:p>
-        </p:txBody>
-      </p:sp>
-      <p:sp>
-        <p:nvSpPr>
-          <p:cNvPr id="5" name="TextBox 4"/>
-          <p:cNvSpPr txBox="1"/>
-          <p:nvPr/>
-        </p:nvSpPr>
-        <p:spPr>
-          <a:xfrm>
-            <a:off x="152400" y="1343891"/>
-            <a:ext cx="10903527" cy="615553"/>
-          </a:xfrm>
-          <a:prstGeom prst="rect">
-            <a:avLst/>
-          </a:prstGeom>
-          <a:noFill/>
-        </p:spPr>
-        <p:txBody>
-          <a:bodyPr wrap="square" lIns="0" tIns="0" rIns="0" bIns="0" rtlCol="0">
-            <a:spAutoFit/>
-          </a:bodyPr>
-          <a:lstStyle/>
-          <a:p>
-            <a:r>
-              <a:rPr lang="en-US" sz="2000" dirty="0"/>
-              <a:t>We can also write a generic function to enable any other function to behave as singleton style:</a:t>
-            </a:r>
-          </a:p>
-          <a:p>
-            <a:endParaRPr lang="en-US" sz="2000" dirty="0"/>
-          </a:p>
-        </p:txBody>
-      </p:sp>
-      <p:sp>
-        <p:nvSpPr>
-          <p:cNvPr id="4" name="TextBox 3"/>
-          <p:cNvSpPr txBox="1"/>
-          <p:nvPr/>
-        </p:nvSpPr>
-        <p:spPr>
-          <a:xfrm>
-            <a:off x="152400" y="4876800"/>
-            <a:ext cx="11430000" cy="923330"/>
-          </a:xfrm>
-          <a:prstGeom prst="rect">
-            <a:avLst/>
-          </a:prstGeom>
-          <a:noFill/>
-        </p:spPr>
-        <p:txBody>
-          <a:bodyPr wrap="square" lIns="0" tIns="0" rIns="0" bIns="0" rtlCol="0">
-            <a:spAutoFit/>
-          </a:bodyPr>
-          <a:lstStyle/>
-          <a:p>
-            <a:r>
-              <a:rPr lang="en-US" sz="2000" b="1" dirty="0" err="1"/>
-              <a:t>var</a:t>
-            </a:r>
-            <a:r>
-              <a:rPr lang="en-US" sz="2000" b="1" dirty="0"/>
-              <a:t> </a:t>
-            </a:r>
-            <a:r>
-              <a:rPr lang="en-US" sz="2000" b="1" dirty="0" err="1">
-                <a:solidFill>
-                  <a:srgbClr val="FF0000"/>
-                </a:solidFill>
-              </a:rPr>
-              <a:t>createMask</a:t>
-            </a:r>
-            <a:r>
-              <a:rPr lang="en-US" sz="2000" b="1" dirty="0"/>
-              <a:t> = </a:t>
-            </a:r>
-            <a:r>
-              <a:rPr lang="en-US" sz="2000" b="1" dirty="0">
-                <a:solidFill>
-                  <a:srgbClr val="FF0000"/>
-                </a:solidFill>
-              </a:rPr>
-              <a:t>singleton</a:t>
-            </a:r>
-            <a:r>
-              <a:rPr lang="en-US" sz="2000" b="1" dirty="0"/>
-              <a:t>(function(){</a:t>
-            </a:r>
-          </a:p>
-          <a:p>
-            <a:r>
-              <a:rPr lang="en-US" sz="2000" b="1" dirty="0"/>
-              <a:t>  return </a:t>
-            </a:r>
-            <a:r>
-              <a:rPr lang="en-US" sz="2000" b="1" dirty="0" err="1"/>
-              <a:t>document.body.appendChild</a:t>
-            </a:r>
-            <a:r>
-              <a:rPr lang="en-US" sz="2000" b="1" dirty="0"/>
-              <a:t>(</a:t>
-            </a:r>
-            <a:r>
-              <a:rPr lang="en-US" sz="2000" b="1" dirty="0" err="1"/>
-              <a:t>document.createElement</a:t>
-            </a:r>
-            <a:r>
-              <a:rPr lang="en-US" sz="2000" b="1" dirty="0"/>
-              <a:t>('div'));</a:t>
-            </a:r>
-          </a:p>
-          <a:p>
-            <a:r>
-              <a:rPr lang="en-US" sz="2000" b="1" dirty="0" smtClean="0"/>
-              <a:t>});</a:t>
-            </a:r>
-            <a:endParaRPr lang="en-US" sz="2000" b="1" dirty="0"/>
-          </a:p>
-        </p:txBody>
-      </p:sp>
-      <p:sp>
-        <p:nvSpPr>
-          <p:cNvPr id="3" name="TextBox 2"/>
-          <p:cNvSpPr txBox="1"/>
-          <p:nvPr/>
-        </p:nvSpPr>
-        <p:spPr>
-          <a:xfrm>
-            <a:off x="152400" y="1814945"/>
-            <a:ext cx="11817927" cy="2569934"/>
-          </a:xfrm>
-          <a:prstGeom prst="rect">
-            <a:avLst/>
-          </a:prstGeom>
-          <a:noFill/>
-        </p:spPr>
-        <p:txBody>
-          <a:bodyPr wrap="square" lIns="0" tIns="0" rIns="0" bIns="0" rtlCol="0">
-            <a:spAutoFit/>
-          </a:bodyPr>
-          <a:lstStyle/>
-          <a:p>
-            <a:r>
-              <a:rPr lang="en-US" sz="1800" b="1" dirty="0" err="1"/>
-              <a:t>var</a:t>
-            </a:r>
-            <a:r>
-              <a:rPr lang="en-US" sz="1800" b="1" dirty="0"/>
-              <a:t> singleton = function(</a:t>
-            </a:r>
-            <a:r>
-              <a:rPr lang="en-US" sz="1800" b="1" dirty="0" err="1"/>
-              <a:t>fn</a:t>
-            </a:r>
-            <a:r>
-              <a:rPr lang="en-US" sz="1800" b="1" dirty="0"/>
-              <a:t>){</a:t>
-            </a:r>
-          </a:p>
-          <a:p>
-            <a:r>
-              <a:rPr lang="en-US" sz="1800" b="1" dirty="0"/>
-              <a:t>    </a:t>
-            </a:r>
-            <a:r>
-              <a:rPr lang="en-US" sz="1800" b="1" dirty="0" err="1"/>
-              <a:t>var</a:t>
-            </a:r>
-            <a:r>
-              <a:rPr lang="en-US" sz="1800" b="1" dirty="0"/>
-              <a:t> result;</a:t>
-            </a:r>
-          </a:p>
-          <a:p>
-            <a:r>
-              <a:rPr lang="en-US" sz="1800" b="1" dirty="0"/>
-              <a:t>    return function() {</a:t>
-            </a:r>
-          </a:p>
-          <a:p>
-            <a:r>
-              <a:rPr lang="en-US" sz="1800" b="1" dirty="0"/>
-              <a:t>        return result || ( result = </a:t>
-            </a:r>
-            <a:r>
-              <a:rPr lang="en-US" sz="1800" b="1" dirty="0" err="1"/>
-              <a:t>fn.apply</a:t>
-            </a:r>
-            <a:r>
-              <a:rPr lang="en-US" sz="1800" b="1" dirty="0"/>
-              <a:t>(</a:t>
-            </a:r>
-            <a:r>
-              <a:rPr lang="en-US" sz="1800" b="1" dirty="0" err="1"/>
-              <a:t>this,arguments</a:t>
-            </a:r>
-            <a:r>
-              <a:rPr lang="en-US" sz="1800" b="1" dirty="0"/>
-              <a:t>));</a:t>
-            </a:r>
-          </a:p>
-          <a:p>
-            <a:r>
-              <a:rPr lang="en-US" sz="1800" b="1" dirty="0"/>
-              <a:t>    }</a:t>
-            </a:r>
-          </a:p>
-          <a:p>
-            <a:r>
-              <a:rPr lang="en-US" sz="1800" b="1" dirty="0"/>
-              <a:t>}</a:t>
-            </a:r>
-          </a:p>
-          <a:p>
-            <a:endParaRPr lang="en-US" sz="1800" dirty="0"/>
-          </a:p>
-          <a:p>
-            <a:r>
-              <a:rPr lang="en-US" sz="1800" dirty="0"/>
-              <a:t>The singleton function accepts a function as input, and return a new function which behaves like singleton. </a:t>
-            </a:r>
-          </a:p>
-          <a:p>
-            <a:pPr fontAlgn="base">
-              <a:spcBef>
-                <a:spcPts val="600"/>
-              </a:spcBef>
-              <a:spcAft>
-                <a:spcPct val="0"/>
-              </a:spcAft>
-              <a:buClr>
-                <a:srgbClr val="F0AB00"/>
-              </a:buClr>
-              <a:buSzPct val="80000"/>
-            </a:pPr>
-            <a:endParaRPr lang="en-US" sz="1800" kern="0" dirty="0" err="1" smtClean="0">
-              <a:ea typeface="Arial Unicode MS" pitchFamily="34" charset="-128"/>
-              <a:cs typeface="Arial Unicode MS" pitchFamily="34" charset="-128"/>
-            </a:endParaRPr>
-          </a:p>
-        </p:txBody>
-      </p:sp>
-    </p:spTree>
-    <p:extLst>
-      <p:ext uri="{BB962C8B-B14F-4D97-AF65-F5344CB8AC3E}">
-        <p14:creationId xmlns:p14="http://schemas.microsoft.com/office/powerpoint/2010/main" val="1912123345"/>
-      </p:ext>
-    </p:extLst>
-  </p:cSld>
-  <p:clrMapOvr>
-    <a:masterClrMapping/>
-  </p:clrMapOvr>
-  <p:timing>
-    <p:tnLst>
-      <p:par>
         <p:cTn id="1" dur="indefinite" restart="never" nodeType="tmRoot">
           <p:childTnLst>
             <p:seq concurrent="1" nextAc="seek">
@@ -12457,7 +12030,7 @@
                                           </p:stCondLst>
                                         </p:cTn>
                                         <p:tgtEl>
-                                          <p:spTgt spid="3"/>
+                                          <p:spTgt spid="4"/>
                                         </p:tgtEl>
                                         <p:attrNameLst>
                                           <p:attrName>style.visibility</p:attrName>
@@ -12489,7 +12062,7 @@
                             </p:stCondLst>
                             <p:childTnLst>
                               <p:par>
-                                <p:cTn id="9" presetID="1" presetClass="entr" presetSubtype="0" fill="hold" grpId="0" nodeType="clickEffect">
+                                <p:cTn id="9" presetID="1" presetClass="entr" presetSubtype="0" fill="hold" nodeType="clickEffect">
                                   <p:stCondLst>
                                     <p:cond delay="0"/>
                                   </p:stCondLst>
@@ -12502,7 +12075,7 @@
                                           </p:stCondLst>
                                         </p:cTn>
                                         <p:tgtEl>
-                                          <p:spTgt spid="4"/>
+                                          <p:spTgt spid="6"/>
                                         </p:tgtEl>
                                         <p:attrNameLst>
                                           <p:attrName>style.visibility</p:attrName>
@@ -12544,13 +12117,12 @@
     </p:tnLst>
     <p:bldLst>
       <p:bldP spid="4" grpId="0"/>
-      <p:bldP spid="3" grpId="0"/>
     </p:bldLst>
   </p:timing>
 </p:sld>
 </file>
 
-<file path=ppt/slides/slide21.xml><?xml version="1.0" encoding="utf-8"?>
+<file path=ppt/slides/slide20.xml><?xml version="1.0" encoding="utf-8"?>
 <p:sld xmlns:a="http://schemas.openxmlformats.org/drawingml/2006/main" xmlns:r="http://schemas.openxmlformats.org/officeDocument/2006/relationships" xmlns:p="http://schemas.openxmlformats.org/presentationml/2006/main">
   <p:cSld>
     <p:spTree>
@@ -13017,7 +12589,7 @@
 </p:sld>
 </file>
 
-<file path=ppt/slides/slide22.xml><?xml version="1.0" encoding="utf-8"?>
+<file path=ppt/slides/slide21.xml><?xml version="1.0" encoding="utf-8"?>
 <p:sld xmlns:a="http://schemas.openxmlformats.org/drawingml/2006/main" xmlns:r="http://schemas.openxmlformats.org/officeDocument/2006/relationships" xmlns:p="http://schemas.openxmlformats.org/presentationml/2006/main">
   <p:cSld>
     <p:spTree>
@@ -13196,7 +12768,7 @@
 </p:sld>
 </file>
 
-<file path=ppt/slides/slide23.xml><?xml version="1.0" encoding="utf-8"?>
+<file path=ppt/slides/slide22.xml><?xml version="1.0" encoding="utf-8"?>
 <p:sld xmlns:a="http://schemas.openxmlformats.org/drawingml/2006/main" xmlns:r="http://schemas.openxmlformats.org/officeDocument/2006/relationships" xmlns:p="http://schemas.openxmlformats.org/presentationml/2006/main">
   <p:cSld>
     <p:spTree>
@@ -13686,7 +13258,7 @@
 </p:sld>
 </file>
 
-<file path=ppt/slides/slide24.xml><?xml version="1.0" encoding="utf-8"?>
+<file path=ppt/slides/slide23.xml><?xml version="1.0" encoding="utf-8"?>
 <p:sld xmlns:a="http://schemas.openxmlformats.org/drawingml/2006/main" xmlns:r="http://schemas.openxmlformats.org/officeDocument/2006/relationships" xmlns:p="http://schemas.openxmlformats.org/presentationml/2006/main">
   <p:cSld>
     <p:spTree>
@@ -13861,7 +13433,7 @@
 </p:sld>
 </file>
 
-<file path=ppt/slides/slide25.xml><?xml version="1.0" encoding="utf-8"?>
+<file path=ppt/slides/slide24.xml><?xml version="1.0" encoding="utf-8"?>
 <p:sld xmlns:a="http://schemas.openxmlformats.org/drawingml/2006/main" xmlns:r="http://schemas.openxmlformats.org/officeDocument/2006/relationships" xmlns:p="http://schemas.openxmlformats.org/presentationml/2006/main">
   <p:cSld>
     <p:spTree>
@@ -14383,7 +13955,7 @@
 </p:sld>
 </file>
 
-<file path=ppt/slides/slide26.xml><?xml version="1.0" encoding="utf-8"?>
+<file path=ppt/slides/slide25.xml><?xml version="1.0" encoding="utf-8"?>
 <p:sld xmlns:a="http://schemas.openxmlformats.org/drawingml/2006/main" xmlns:r="http://schemas.openxmlformats.org/officeDocument/2006/relationships" xmlns:p="http://schemas.openxmlformats.org/presentationml/2006/main">
   <p:cSld>
     <p:spTree>
@@ -14682,7 +14254,7 @@
 </p:sld>
 </file>
 
-<file path=ppt/slides/slide27.xml><?xml version="1.0" encoding="utf-8"?>
+<file path=ppt/slides/slide26.xml><?xml version="1.0" encoding="utf-8"?>
 <p:sld xmlns:a="http://schemas.openxmlformats.org/drawingml/2006/main" xmlns:r="http://schemas.openxmlformats.org/officeDocument/2006/relationships" xmlns:p="http://schemas.openxmlformats.org/presentationml/2006/main">
   <p:cSld>
     <p:spTree>
@@ -14857,7 +14429,7 @@
 </p:sld>
 </file>
 
-<file path=ppt/slides/slide28.xml><?xml version="1.0" encoding="utf-8"?>
+<file path=ppt/slides/slide27.xml><?xml version="1.0" encoding="utf-8"?>
 <p:sld xmlns:a="http://schemas.openxmlformats.org/drawingml/2006/main" xmlns:r="http://schemas.openxmlformats.org/officeDocument/2006/relationships" xmlns:p="http://schemas.openxmlformats.org/presentationml/2006/main">
   <p:cSld>
     <p:spTree>
@@ -14941,7 +14513,7 @@
 </p:sld>
 </file>
 
-<file path=ppt/slides/slide29.xml><?xml version="1.0" encoding="utf-8"?>
+<file path=ppt/slides/slide28.xml><?xml version="1.0" encoding="utf-8"?>
 <p:sld xmlns:a="http://schemas.openxmlformats.org/drawingml/2006/main" xmlns:r="http://schemas.openxmlformats.org/officeDocument/2006/relationships" xmlns:p="http://schemas.openxmlformats.org/presentationml/2006/main">
   <p:cSld>
     <p:spTree>
@@ -15070,10 +14642,6 @@
               </a:rPr>
               <a:t>Abstract part and concrete implementation part is decoupled. </a:t>
             </a:r>
-            <a:endParaRPr lang="en-US" sz="1800" kern="0" dirty="0" smtClean="0">
-              <a:ea typeface="Arial Unicode MS" pitchFamily="34" charset="-128"/>
-              <a:cs typeface="Arial Unicode MS" pitchFamily="34" charset="-128"/>
-            </a:endParaRPr>
           </a:p>
         </p:txBody>
       </p:sp>
@@ -15381,19 +14949,8 @@
                 <a:ea typeface="Arial Unicode MS" pitchFamily="34" charset="-128"/>
                 <a:cs typeface="Arial Unicode MS" pitchFamily="34" charset="-128"/>
               </a:rPr>
-              <a:t> and y are global variable here</a:t>
-            </a:r>
-            <a:r>
-              <a:rPr lang="en-US" sz="1800" kern="0" dirty="0" smtClean="0">
-                <a:ea typeface="Arial Unicode MS" pitchFamily="34" charset="-128"/>
-                <a:cs typeface="Arial Unicode MS" pitchFamily="34" charset="-128"/>
-              </a:rPr>
-              <a:t>. </a:t>
-            </a:r>
-            <a:endParaRPr lang="en-US" sz="1800" kern="0" dirty="0" smtClean="0">
-              <a:ea typeface="Arial Unicode MS" pitchFamily="34" charset="-128"/>
-              <a:cs typeface="Arial Unicode MS" pitchFamily="34" charset="-128"/>
-            </a:endParaRPr>
+              <a:t> and y are global variable here. </a:t>
+            </a:r>
           </a:p>
         </p:txBody>
       </p:sp>
@@ -15445,10 +15002,6 @@
               </a:rPr>
               <a:t> = 3</a:t>
             </a:r>
-            <a:endParaRPr lang="en-US" sz="1800" kern="0" dirty="0" smtClean="0">
-              <a:ea typeface="Arial Unicode MS" pitchFamily="34" charset="-128"/>
-              <a:cs typeface="Arial Unicode MS" pitchFamily="34" charset="-128"/>
-            </a:endParaRPr>
           </a:p>
         </p:txBody>
       </p:sp>
@@ -16262,7 +15815,7 @@
         <p:spPr>
           <a:xfrm>
             <a:off x="420129" y="3447535"/>
-            <a:ext cx="10070757" cy="2754600"/>
+            <a:ext cx="10070757" cy="3108543"/>
           </a:xfrm>
           <a:prstGeom prst="rect">
             <a:avLst/>
@@ -16401,6 +15954,98 @@
             </a:r>
           </a:p>
           <a:p>
+            <a:pPr lvl="1" fontAlgn="base">
+              <a:spcBef>
+                <a:spcPts val="600"/>
+              </a:spcBef>
+              <a:spcAft>
+                <a:spcPct val="0"/>
+              </a:spcAft>
+              <a:buClr>
+                <a:srgbClr val="F0AB00"/>
+              </a:buClr>
+              <a:buSzPct val="80000"/>
+            </a:pPr>
+            <a:r>
+              <a:rPr lang="en-US" sz="1800" kern="0" dirty="0" smtClean="0">
+                <a:ea typeface="Arial Unicode MS" pitchFamily="34" charset="-128"/>
+                <a:cs typeface="Arial Unicode MS" pitchFamily="34" charset="-128"/>
+              </a:rPr>
+              <a:t>	if( !</a:t>
+            </a:r>
+            <a:r>
+              <a:rPr lang="en-US" sz="1800" kern="0" dirty="0" err="1" smtClean="0">
+                <a:ea typeface="Arial Unicode MS" pitchFamily="34" charset="-128"/>
+                <a:cs typeface="Arial Unicode MS" pitchFamily="34" charset="-128"/>
+              </a:rPr>
+              <a:t>oButton</a:t>
+            </a:r>
+            <a:r>
+              <a:rPr lang="en-US" sz="1800" kern="0" dirty="0" smtClean="0">
+                <a:ea typeface="Arial Unicode MS" pitchFamily="34" charset="-128"/>
+                <a:cs typeface="Arial Unicode MS" pitchFamily="34" charset="-128"/>
+              </a:rPr>
+              <a:t>) </a:t>
+            </a:r>
+            <a:r>
+              <a:rPr lang="en-US" altLang="zh-CN" sz="1800" kern="0" dirty="0" smtClean="0">
+                <a:ea typeface="Arial Unicode MS" pitchFamily="34" charset="-128"/>
+                <a:cs typeface="Arial Unicode MS" pitchFamily="34" charset="-128"/>
+              </a:rPr>
+              <a:t>{</a:t>
+            </a:r>
+            <a:endParaRPr lang="en-US" sz="1800" kern="0" dirty="0" smtClean="0">
+              <a:ea typeface="Arial Unicode MS" pitchFamily="34" charset="-128"/>
+              <a:cs typeface="Arial Unicode MS" pitchFamily="34" charset="-128"/>
+            </a:endParaRPr>
+          </a:p>
+          <a:p>
+            <a:pPr lvl="1" fontAlgn="base">
+              <a:spcBef>
+                <a:spcPts val="600"/>
+              </a:spcBef>
+              <a:spcAft>
+                <a:spcPct val="0"/>
+              </a:spcAft>
+              <a:buClr>
+                <a:srgbClr val="F0AB00"/>
+              </a:buClr>
+              <a:buSzPct val="80000"/>
+            </a:pPr>
+            <a:r>
+              <a:rPr lang="en-US" sz="1800" kern="0" dirty="0" smtClean="0">
+                <a:ea typeface="Arial Unicode MS" pitchFamily="34" charset="-128"/>
+                <a:cs typeface="Arial Unicode MS" pitchFamily="34" charset="-128"/>
+              </a:rPr>
+              <a:t>		return;</a:t>
+            </a:r>
+          </a:p>
+          <a:p>
+            <a:pPr lvl="2" fontAlgn="base">
+              <a:spcBef>
+                <a:spcPts val="600"/>
+              </a:spcBef>
+              <a:spcAft>
+                <a:spcPct val="0"/>
+              </a:spcAft>
+              <a:buClr>
+                <a:srgbClr val="F0AB00"/>
+              </a:buClr>
+              <a:buNone/>
+            </a:pPr>
+            <a:r>
+              <a:rPr lang="en-US" altLang="zh-CN" sz="1400" kern="0" dirty="0">
+                <a:ea typeface="Arial Unicode MS" pitchFamily="34" charset="-128"/>
+                <a:cs typeface="Arial Unicode MS" pitchFamily="34" charset="-128"/>
+              </a:rPr>
+              <a:t>}</a:t>
+            </a:r>
+            <a:endParaRPr lang="en-US" sz="1400" kern="0" dirty="0" smtClean="0">
+              <a:ea typeface="Arial Unicode MS" pitchFamily="34" charset="-128"/>
+              <a:cs typeface="Arial Unicode MS" pitchFamily="34" charset="-128"/>
+            </a:endParaRPr>
+          </a:p>
+          <a:p>
             <a:pPr fontAlgn="base">
               <a:spcBef>
                 <a:spcPts val="600"/>
@@ -16414,91 +16059,35 @@
               <a:buSzPct val="80000"/>
             </a:pPr>
             <a:r>
-              <a:rPr lang="en-US" sz="1800" kern="0" dirty="0">
+              <a:rPr lang="en-US" sz="1800" kern="0" dirty="0" smtClean="0">
                 <a:ea typeface="Arial Unicode MS" pitchFamily="34" charset="-128"/>
                 <a:cs typeface="Arial Unicode MS" pitchFamily="34" charset="-128"/>
               </a:rPr>
-              <a:t>	if( !</a:t>
-            </a:r>
-            <a:r>
-              <a:rPr lang="en-US" sz="1800" kern="0" dirty="0" err="1">
+              <a:t>	</a:t>
+            </a:r>
+            <a:r>
+              <a:rPr lang="en-US" sz="1800" kern="0" dirty="0" err="1" smtClean="0">
                 <a:ea typeface="Arial Unicode MS" pitchFamily="34" charset="-128"/>
                 <a:cs typeface="Arial Unicode MS" pitchFamily="34" charset="-128"/>
               </a:rPr>
-              <a:t>oButton</a:t>
-            </a:r>
-            <a:r>
-              <a:rPr lang="en-US" sz="1800" kern="0" dirty="0">
+              <a:t>oButton.onclick</a:t>
+            </a:r>
+            <a:r>
+              <a:rPr lang="en-US" sz="1800" kern="0" dirty="0" smtClean="0">
                 <a:ea typeface="Arial Unicode MS" pitchFamily="34" charset="-128"/>
                 <a:cs typeface="Arial Unicode MS" pitchFamily="34" charset="-128"/>
               </a:rPr>
-              <a:t>)</a:t>
-            </a:r>
-          </a:p>
-          <a:p>
-            <a:pPr fontAlgn="base">
-              <a:spcBef>
-                <a:spcPts val="600"/>
-              </a:spcBef>
-              <a:spcAft>
-                <a:spcPct val="0"/>
-              </a:spcAft>
-              <a:buClr>
-                <a:srgbClr val="F0AB00"/>
-              </a:buClr>
-              <a:buSzPct val="80000"/>
-            </a:pPr>
-            <a:r>
-              <a:rPr lang="en-US" sz="1800" kern="0" dirty="0">
+              <a:t> = function(</a:t>
+            </a:r>
+            <a:r>
+              <a:rPr lang="en-US" sz="1800" kern="0" dirty="0" err="1" smtClean="0">
                 <a:ea typeface="Arial Unicode MS" pitchFamily="34" charset="-128"/>
                 <a:cs typeface="Arial Unicode MS" pitchFamily="34" charset="-128"/>
               </a:rPr>
-              <a:t>		return;</a:t>
-            </a:r>
-          </a:p>
-          <a:p>
-            <a:pPr fontAlgn="base">
-              <a:spcBef>
-                <a:spcPts val="600"/>
-              </a:spcBef>
-              <a:spcAft>
-                <a:spcPct val="0"/>
-              </a:spcAft>
-              <a:buClr>
-                <a:srgbClr val="F0AB00"/>
-              </a:buClr>
-              <a:buSzPct val="80000"/>
-            </a:pPr>
-            <a:r>
-              <a:rPr lang="en-US" sz="1800" kern="0" dirty="0">
-                <a:ea typeface="Arial Unicode MS" pitchFamily="34" charset="-128"/>
-                <a:cs typeface="Arial Unicode MS" pitchFamily="34" charset="-128"/>
-              </a:rPr>
-              <a:t>	</a:t>
-            </a:r>
-            <a:r>
-              <a:rPr lang="en-US" sz="1800" kern="0" dirty="0" err="1">
-                <a:ea typeface="Arial Unicode MS" pitchFamily="34" charset="-128"/>
-                <a:cs typeface="Arial Unicode MS" pitchFamily="34" charset="-128"/>
-              </a:rPr>
-              <a:t>oButton.onclick</a:t>
-            </a:r>
-            <a:r>
-              <a:rPr lang="en-US" sz="1800" kern="0" dirty="0">
-                <a:ea typeface="Arial Unicode MS" pitchFamily="34" charset="-128"/>
-                <a:cs typeface="Arial Unicode MS" pitchFamily="34" charset="-128"/>
-              </a:rPr>
-              <a:t> = function(</a:t>
-            </a:r>
-            <a:r>
-              <a:rPr lang="en-US" sz="1800" kern="0" dirty="0" err="1">
-                <a:ea typeface="Arial Unicode MS" pitchFamily="34" charset="-128"/>
-                <a:cs typeface="Arial Unicode MS" pitchFamily="34" charset="-128"/>
-              </a:rPr>
               <a:t>oEvent</a:t>
             </a:r>
             <a:r>
-              <a:rPr lang="en-US" sz="1800" kern="0" dirty="0">
+              <a:rPr lang="en-US" sz="1800" kern="0" dirty="0" smtClean="0">
                 <a:ea typeface="Arial Unicode MS" pitchFamily="34" charset="-128"/>
                 <a:cs typeface="Arial Unicode MS" pitchFamily="34" charset="-128"/>
               </a:rPr>
@@ -17035,7 +16624,7 @@
         <p:spPr>
           <a:xfrm>
             <a:off x="323999" y="1691079"/>
-            <a:ext cx="11067901" cy="4392042"/>
+            <a:ext cx="6534001" cy="2160485"/>
           </a:xfrm>
         </p:spPr>
         <p:txBody>
@@ -17101,257 +16690,22 @@
                 <a:latin typeface="Courier New" panose="02070309020205020404" pitchFamily="49" charset="0"/>
                 <a:cs typeface="Courier New" panose="02070309020205020404" pitchFamily="49" charset="0"/>
               </a:rPr>
-              <a:t>f (true, print “true”, print “false”) </a:t>
-            </a:r>
-            <a:r>
-              <a:rPr lang="en-US" sz="1400" b="0" dirty="0" smtClean="0">
-                <a:latin typeface="Courier New" panose="02070309020205020404" pitchFamily="49" charset="0"/>
-                <a:cs typeface="Courier New" panose="02070309020205020404" pitchFamily="49" charset="0"/>
-                <a:sym typeface="Wingdings" panose="05000000000000000000" pitchFamily="2" charset="2"/>
-              </a:rPr>
-              <a:t> would print “</a:t>
-            </a:r>
-            <a:r>
-              <a:rPr lang="en-US" sz="1400" b="0" dirty="0" err="1" smtClean="0">
-                <a:latin typeface="Courier New" panose="02070309020205020404" pitchFamily="49" charset="0"/>
-                <a:cs typeface="Courier New" panose="02070309020205020404" pitchFamily="49" charset="0"/>
-                <a:sym typeface="Wingdings" panose="05000000000000000000" pitchFamily="2" charset="2"/>
-              </a:rPr>
-              <a:t>true””false””true</a:t>
-            </a:r>
-            <a:r>
-              <a:rPr lang="en-US" sz="1400" b="0" dirty="0" smtClean="0">
-                <a:latin typeface="Courier New" panose="02070309020205020404" pitchFamily="49" charset="0"/>
-                <a:cs typeface="Courier New" panose="02070309020205020404" pitchFamily="49" charset="0"/>
-                <a:sym typeface="Wingdings" panose="05000000000000000000" pitchFamily="2" charset="2"/>
-              </a:rPr>
-              <a:t>”</a:t>
-            </a:r>
-            <a:r>
-              <a:rPr lang="en-US" sz="1400" b="0" dirty="0">
-                <a:latin typeface="Courier New" panose="02070309020205020404" pitchFamily="49" charset="0"/>
-                <a:cs typeface="Courier New" panose="02070309020205020404" pitchFamily="49" charset="0"/>
-              </a:rPr>
-              <a:t/>
-            </a:r>
-            <a:br>
-              <a:rPr lang="en-US" sz="1400" b="0" dirty="0">
-                <a:latin typeface="Courier New" panose="02070309020205020404" pitchFamily="49" charset="0"/>
-                <a:cs typeface="Courier New" panose="02070309020205020404" pitchFamily="49" charset="0"/>
-              </a:rPr>
-            </a:br>
-            <a:r>
-              <a:rPr lang="en-US" sz="1400" b="0" dirty="0">
-                <a:latin typeface="Courier New" panose="02070309020205020404" pitchFamily="49" charset="0"/>
-                <a:cs typeface="Courier New" panose="02070309020205020404" pitchFamily="49" charset="0"/>
-              </a:rPr>
-              <a:t/>
-            </a:r>
-            <a:br>
-              <a:rPr lang="en-US" sz="1400" b="0" dirty="0">
-                <a:latin typeface="Courier New" panose="02070309020205020404" pitchFamily="49" charset="0"/>
-                <a:cs typeface="Courier New" panose="02070309020205020404" pitchFamily="49" charset="0"/>
-              </a:rPr>
-            </a:br>
-            <a:r>
-              <a:rPr lang="en-US" sz="1400" b="0" dirty="0" smtClean="0">
-                <a:latin typeface="Courier New" panose="02070309020205020404" pitchFamily="49" charset="0"/>
-                <a:cs typeface="Courier New" panose="02070309020205020404" pitchFamily="49" charset="0"/>
-              </a:rPr>
-              <a:t>f </a:t>
-            </a:r>
-            <a:r>
-              <a:rPr lang="en-US" sz="1400" b="0" dirty="0">
-                <a:latin typeface="Courier New" panose="02070309020205020404" pitchFamily="49" charset="0"/>
-                <a:cs typeface="Courier New" panose="02070309020205020404" pitchFamily="49" charset="0"/>
-              </a:rPr>
-              <a:t>(true, </a:t>
-            </a:r>
-            <a:r>
-              <a:rPr lang="en-US" sz="1400" dirty="0" err="1" smtClean="0">
-                <a:latin typeface="Courier New" panose="02070309020205020404" pitchFamily="49" charset="0"/>
-                <a:cs typeface="Courier New" panose="02070309020205020404" pitchFamily="49" charset="0"/>
-              </a:rPr>
-              <a:t>fn</a:t>
-            </a:r>
-            <a:r>
-              <a:rPr lang="en-US" sz="1400" dirty="0" smtClean="0">
-                <a:latin typeface="Courier New" panose="02070309020205020404" pitchFamily="49" charset="0"/>
-                <a:cs typeface="Courier New" panose="02070309020205020404" pitchFamily="49" charset="0"/>
-              </a:rPr>
-              <a:t> </a:t>
-            </a:r>
-            <a:r>
-              <a:rPr lang="en-US" sz="1400" dirty="0">
-                <a:latin typeface="Courier New" panose="02070309020205020404" pitchFamily="49" charset="0"/>
-                <a:cs typeface="Courier New" panose="02070309020205020404" pitchFamily="49" charset="0"/>
-              </a:rPr>
-              <a:t>_</a:t>
-            </a:r>
-            <a:r>
-              <a:rPr lang="en-US" sz="1400" dirty="0" smtClean="0">
-                <a:latin typeface="Courier New" panose="02070309020205020404" pitchFamily="49" charset="0"/>
-                <a:cs typeface="Courier New" panose="02070309020205020404" pitchFamily="49" charset="0"/>
-              </a:rPr>
-              <a:t> =&gt; print </a:t>
-            </a:r>
-            <a:r>
-              <a:rPr lang="en-US" sz="1400" dirty="0">
-                <a:latin typeface="Courier New" panose="02070309020205020404" pitchFamily="49" charset="0"/>
-                <a:cs typeface="Courier New" panose="02070309020205020404" pitchFamily="49" charset="0"/>
-              </a:rPr>
-              <a:t>“true”, </a:t>
-            </a:r>
-            <a:r>
-              <a:rPr lang="en-US" sz="1400" dirty="0" err="1" smtClean="0">
-                <a:latin typeface="Courier New" panose="02070309020205020404" pitchFamily="49" charset="0"/>
-                <a:cs typeface="Courier New" panose="02070309020205020404" pitchFamily="49" charset="0"/>
-              </a:rPr>
-              <a:t>fn</a:t>
-            </a:r>
-            <a:r>
-              <a:rPr lang="en-US" sz="1400" dirty="0" smtClean="0">
-                <a:latin typeface="Courier New" panose="02070309020205020404" pitchFamily="49" charset="0"/>
-                <a:cs typeface="Courier New" panose="02070309020205020404" pitchFamily="49" charset="0"/>
-              </a:rPr>
-              <a:t> _  </a:t>
-            </a:r>
-            <a:r>
-              <a:rPr lang="en-US" sz="1400" dirty="0">
-                <a:latin typeface="Courier New" panose="02070309020205020404" pitchFamily="49" charset="0"/>
-                <a:cs typeface="Courier New" panose="02070309020205020404" pitchFamily="49" charset="0"/>
-              </a:rPr>
-              <a:t>=&gt; </a:t>
-            </a:r>
-            <a:r>
-              <a:rPr lang="en-US" sz="1400" dirty="0" smtClean="0">
-                <a:latin typeface="Courier New" panose="02070309020205020404" pitchFamily="49" charset="0"/>
-                <a:cs typeface="Courier New" panose="02070309020205020404" pitchFamily="49" charset="0"/>
-              </a:rPr>
-              <a:t>print </a:t>
-            </a:r>
-            <a:r>
-              <a:rPr lang="en-US" sz="1400" dirty="0">
-                <a:latin typeface="Courier New" panose="02070309020205020404" pitchFamily="49" charset="0"/>
-                <a:cs typeface="Courier New" panose="02070309020205020404" pitchFamily="49" charset="0"/>
-              </a:rPr>
-              <a:t>“</a:t>
-            </a:r>
-            <a:r>
-              <a:rPr lang="en-US" sz="1400" dirty="0" smtClean="0">
-                <a:latin typeface="Courier New" panose="02070309020205020404" pitchFamily="49" charset="0"/>
-                <a:cs typeface="Courier New" panose="02070309020205020404" pitchFamily="49" charset="0"/>
-              </a:rPr>
-              <a:t>false”</a:t>
-            </a:r>
-            <a:r>
-              <a:rPr lang="en-US" sz="1400" b="0" dirty="0" smtClean="0">
-                <a:latin typeface="Courier New" panose="02070309020205020404" pitchFamily="49" charset="0"/>
-                <a:cs typeface="Courier New" panose="02070309020205020404" pitchFamily="49" charset="0"/>
-              </a:rPr>
-              <a:t>) </a:t>
-            </a:r>
-            <a:r>
-              <a:rPr lang="en-US" sz="1400" b="0" dirty="0">
-                <a:latin typeface="Courier New" panose="02070309020205020404" pitchFamily="49" charset="0"/>
-                <a:cs typeface="Courier New" panose="02070309020205020404" pitchFamily="49" charset="0"/>
-                <a:sym typeface="Wingdings" panose="05000000000000000000" pitchFamily="2" charset="2"/>
-              </a:rPr>
-              <a:t> would print “true</a:t>
-            </a:r>
-            <a:r>
-              <a:rPr lang="en-US" sz="1400" b="0" dirty="0" smtClean="0">
-                <a:latin typeface="Courier New" panose="02070309020205020404" pitchFamily="49" charset="0"/>
-                <a:cs typeface="Courier New" panose="02070309020205020404" pitchFamily="49" charset="0"/>
-                <a:sym typeface="Wingdings" panose="05000000000000000000" pitchFamily="2" charset="2"/>
-              </a:rPr>
-              <a:t>” or print “false</a:t>
-            </a:r>
-            <a:r>
-              <a:rPr lang="en-US" sz="1400" b="0" dirty="0">
-                <a:latin typeface="Courier New" panose="02070309020205020404" pitchFamily="49" charset="0"/>
-                <a:cs typeface="Courier New" panose="02070309020205020404" pitchFamily="49" charset="0"/>
-                <a:sym typeface="Wingdings" panose="05000000000000000000" pitchFamily="2" charset="2"/>
-              </a:rPr>
-              <a:t>”</a:t>
-            </a:r>
-            <a:endParaRPr lang="en-US" sz="1600" b="0" dirty="0" smtClean="0">
-              <a:latin typeface="Courier New" panose="02070309020205020404" pitchFamily="49" charset="0"/>
-              <a:cs typeface="Courier New" panose="02070309020205020404" pitchFamily="49" charset="0"/>
-            </a:endParaRPr>
-          </a:p>
-          <a:p>
-            <a:endParaRPr lang="en-US" sz="1800" dirty="0" smtClean="0"/>
-          </a:p>
-          <a:p>
-            <a:r>
-              <a:rPr lang="en-US" sz="1800" dirty="0" smtClean="0"/>
-              <a:t>This works due to the fact that a function body is evaluated only if the function is called</a:t>
-            </a:r>
-            <a:r>
-              <a:rPr lang="en-US" sz="1800" dirty="0"/>
-              <a:t/>
-            </a:r>
-            <a:br>
-              <a:rPr lang="en-US" sz="1800" dirty="0"/>
-            </a:br>
+              <a:t>f (true, print “true”, print “false”)</a:t>
+            </a:r>
             <a:endParaRPr lang="en-US" sz="1800" dirty="0"/>
           </a:p>
         </p:txBody>
       </p:sp>
       <p:sp>
         <p:nvSpPr>
-          <p:cNvPr id="3" name="Left Brace 2"/>
-          <p:cNvSpPr/>
-          <p:nvPr/>
-        </p:nvSpPr>
-        <p:spPr>
-          <a:xfrm rot="-5400000">
-            <a:off x="2223325" y="3120199"/>
-            <a:ext cx="155448" cy="2236851"/>
-          </a:xfrm>
-          <a:prstGeom prst="leftBrace">
-            <a:avLst/>
-          </a:prstGeom>
-          <a:ln w="6350">
-            <a:solidFill>
-              <a:schemeClr val="tx1"/>
-            </a:solidFill>
-          </a:ln>
-        </p:spPr>
-        <p:style>
-          <a:lnRef idx="1">
-            <a:schemeClr val="accent1"/>
-          </a:lnRef>
-          <a:fillRef idx="0">
-            <a:schemeClr val="accent1"/>
-          </a:fillRef>
-          <a:effectRef idx="0">
-            <a:schemeClr val="accent1"/>
-          </a:effectRef>
-          <a:fontRef idx="minor">
-            <a:schemeClr val="tx1"/>
-          </a:fontRef>
-        </p:style>
-        <p:txBody>
-          <a:bodyPr rtlCol="0" anchor="ctr"/>
-          <a:lstStyle/>
-          <a:p>
-            <a:pPr algn="ctr"/>
-            <a:endParaRPr lang="en-US"/>
-          </a:p>
-        </p:txBody>
-      </p:sp>
-      <p:sp>
-        <p:nvSpPr>
-          <p:cNvPr id="4" name="TextBox 3"/>
+          <p:cNvPr id="5" name="TextBox 4"/>
           <p:cNvSpPr txBox="1"/>
           <p:nvPr/>
         </p:nvSpPr>
         <p:spPr>
           <a:xfrm>
-            <a:off x="2058194" y="4378553"/>
-            <a:ext cx="485710" cy="215444"/>
+            <a:off x="4696690" y="3477491"/>
+            <a:ext cx="4322619" cy="553998"/>
           </a:xfrm>
           <a:prstGeom prst="rect">
             <a:avLst/>
@@ -17359,14 +16713,14 @@
           <a:noFill/>
         </p:spPr>
         <p:txBody>
-          <a:bodyPr wrap="none" lIns="0" tIns="0" rIns="0" bIns="0" rtlCol="0">
+          <a:bodyPr wrap="square" lIns="0" tIns="0" rIns="0" bIns="0" rtlCol="0">
             <a:spAutoFit/>
           </a:bodyPr>
           <a:lstStyle/>
           <a:p>
             <a:pPr fontAlgn="base">
               <a:spcBef>
-                <a:spcPct val="50000"/>
+                <a:spcPts val="600"/>
               </a:spcBef>
               <a:spcAft>
                 <a:spcPct val="0"/>
@@ -17377,72 +16731,83 @@
               <a:buSzPct val="80000"/>
             </a:pPr>
             <a:r>
-              <a:rPr lang="en-US" sz="1400" b="1" kern="0" dirty="0" err="1" smtClean="0">
-                <a:ea typeface="Arial Unicode MS" pitchFamily="34" charset="-128"/>
-                <a:cs typeface="Arial Unicode MS" pitchFamily="34" charset="-128"/>
-              </a:rPr>
-              <a:t>thunk</a:t>
-            </a:r>
-            <a:endParaRPr lang="en-US" sz="1400" b="1" kern="0" dirty="0" smtClean="0">
+              <a:rPr lang="en-US" sz="1800" dirty="0">
+                <a:latin typeface="Courier New" panose="02070309020205020404" pitchFamily="49" charset="0"/>
+                <a:cs typeface="Courier New" panose="02070309020205020404" pitchFamily="49" charset="0"/>
+                <a:sym typeface="Wingdings" panose="05000000000000000000" pitchFamily="2" charset="2"/>
+              </a:rPr>
+              <a:t>would print “</a:t>
+            </a:r>
+            <a:r>
+              <a:rPr lang="en-US" sz="1800" dirty="0" err="1">
+                <a:latin typeface="Courier New" panose="02070309020205020404" pitchFamily="49" charset="0"/>
+                <a:cs typeface="Courier New" panose="02070309020205020404" pitchFamily="49" charset="0"/>
+                <a:sym typeface="Wingdings" panose="05000000000000000000" pitchFamily="2" charset="2"/>
+              </a:rPr>
+              <a:t>true””false””true</a:t>
+            </a:r>
+            <a:r>
+              <a:rPr lang="en-US" sz="1800" dirty="0">
+                <a:latin typeface="Courier New" panose="02070309020205020404" pitchFamily="49" charset="0"/>
+                <a:cs typeface="Courier New" panose="02070309020205020404" pitchFamily="49" charset="0"/>
+                <a:sym typeface="Wingdings" panose="05000000000000000000" pitchFamily="2" charset="2"/>
+              </a:rPr>
+              <a:t>”</a:t>
+            </a:r>
+            <a:r>
+              <a:rPr lang="en-US" sz="1800" dirty="0">
+                <a:latin typeface="Courier New" panose="02070309020205020404" pitchFamily="49" charset="0"/>
+                <a:cs typeface="Courier New" panose="02070309020205020404" pitchFamily="49" charset="0"/>
+              </a:rPr>
+              <a:t/>
+            </a:r>
+            <a:br>
+              <a:rPr lang="en-US" sz="1800" dirty="0">
+                <a:latin typeface="Courier New" panose="02070309020205020404" pitchFamily="49" charset="0"/>
+                <a:cs typeface="Courier New" panose="02070309020205020404" pitchFamily="49" charset="0"/>
+              </a:rPr>
+            </a:br>
+            <a:endParaRPr lang="en-US" sz="1800" kern="0" dirty="0" smtClean="0">
               <a:ea typeface="Arial Unicode MS" pitchFamily="34" charset="-128"/>
               <a:cs typeface="Arial Unicode MS" pitchFamily="34" charset="-128"/>
             </a:endParaRPr>
           </a:p>
         </p:txBody>
       </p:sp>
-      <p:sp>
-        <p:nvSpPr>
-          <p:cNvPr id="8" name="Left Brace 7"/>
-          <p:cNvSpPr/>
+      <p:pic>
+        <p:nvPicPr>
+          <p:cNvPr id="6" name="Picture 5"/>
+          <p:cNvPicPr>
+            <a:picLocks noChangeAspect="1"/>
+          </p:cNvPicPr>
           <p:nvPr/>
-        </p:nvSpPr>
+        </p:nvPicPr>
+        <p:blipFill>
+          <a:blip r:embed="rId3"/>
+          <a:stretch>
+            <a:fillRect/>
+          </a:stretch>
+        </p:blipFill>
         <p:spPr>
-          <a:xfrm rot="-5400000">
-            <a:off x="4761207" y="3049293"/>
-            <a:ext cx="166039" cy="2389253"/>
+          <a:xfrm>
+            <a:off x="296289" y="4031489"/>
+            <a:ext cx="10013548" cy="746825"/>
           </a:xfrm>
-          <a:prstGeom prst="leftBrace">
+          <a:prstGeom prst="rect">
             <a:avLst/>
           </a:prstGeom>
-          <a:ln w="6350">
-            <a:solidFill>
-              <a:schemeClr val="tx1"/>
-            </a:solidFill>
-          </a:ln>
         </p:spPr>
-        <p:style>
-          <a:lnRef idx="1">
-            <a:schemeClr val="accent1"/>
-          </a:lnRef>
-          <a:fillRef idx="0">
-            <a:schemeClr val="accent1"/>
-          </a:fillRef>
-          <a:effectRef idx="0">
-            <a:schemeClr val="accent1"/>
-          </a:effectRef>
-          <a:fontRef idx="minor">
-            <a:schemeClr val="tx1"/>
-          </a:fontRef>
-        </p:style>
-        <p:txBody>
-          <a:bodyPr rtlCol="0" anchor="ctr"/>
-          <a:lstStyle/>
-          <a:p>
-            <a:pPr algn="ctr"/>
-            <a:endParaRPr lang="en-US"/>
-          </a:p>
-        </p:txBody>
-      </p:sp>
-      <p:sp>
-        <p:nvSpPr>
-          <p:cNvPr id="10" name="TextBox 9"/>
+      </p:pic>
+      <p:sp>
+        <p:nvSpPr>
+          <p:cNvPr id="7" name="TextBox 6"/>
           <p:cNvSpPr txBox="1"/>
           <p:nvPr/>
         </p:nvSpPr>
         <p:spPr>
           <a:xfrm>
-            <a:off x="4525170" y="4378553"/>
-            <a:ext cx="485710" cy="215444"/>
+            <a:off x="323999" y="4959927"/>
+            <a:ext cx="11545201" cy="276999"/>
           </a:xfrm>
           <a:prstGeom prst="rect">
             <a:avLst/>
@@ -17450,14 +16815,14 @@
           <a:noFill/>
         </p:spPr>
         <p:txBody>
-          <a:bodyPr wrap="none" lIns="0" tIns="0" rIns="0" bIns="0" rtlCol="0">
+          <a:bodyPr wrap="square" lIns="0" tIns="0" rIns="0" bIns="0" rtlCol="0">
             <a:spAutoFit/>
           </a:bodyPr>
           <a:lstStyle/>
           <a:p>
             <a:pPr fontAlgn="base">
               <a:spcBef>
-                <a:spcPct val="50000"/>
+                <a:spcPts val="600"/>
               </a:spcBef>
               <a:spcAft>
                 <a:spcPct val="0"/>
@@ -17468,23 +16833,21 @@
               <a:buSzPct val="80000"/>
             </a:pPr>
             <a:r>
-              <a:rPr lang="en-US" sz="1400" b="1" kern="0" dirty="0" err="1" smtClean="0">
-                <a:ea typeface="Arial Unicode MS" pitchFamily="34" charset="-128"/>
-                <a:cs typeface="Arial Unicode MS" pitchFamily="34" charset="-128"/>
-              </a:rPr>
-              <a:t>thunk</a:t>
-            </a:r>
-            <a:endParaRPr lang="en-US" sz="1400" b="1" kern="0" dirty="0" smtClean="0">
-              <a:ea typeface="Arial Unicode MS" pitchFamily="34" charset="-128"/>
-              <a:cs typeface="Arial Unicode MS" pitchFamily="34" charset="-128"/>
-            </a:endParaRPr>
+              <a:rPr lang="en-US" sz="1800" dirty="0"/>
+              <a:t>This works due to the fact that a function body is evaluated only if the function is </a:t>
+            </a:r>
+            <a:r>
+              <a:rPr lang="en-US" sz="1800" dirty="0" smtClean="0"/>
+              <a:t>called. </a:t>
+            </a:r>
+            <a:endParaRPr lang="en-US" sz="1800" dirty="0"/>
           </a:p>
         </p:txBody>
       </p:sp>
     </p:spTree>
     <p:extLst>
       <p:ext uri="{BB962C8B-B14F-4D97-AF65-F5344CB8AC3E}">
-        <p14:creationId xmlns:p14="http://schemas.microsoft.com/office/powerpoint/2010/main" val="1251234047"/>
+        <p14:creationId xmlns:p14="http://schemas.microsoft.com/office/powerpoint/2010/main" val="228100004"/>
       </p:ext>
     </p:extLst>
   </p:cSld>
@@ -17495,9 +16858,171 @@
   <p:timing>
     <p:tnLst>
       <p:par>
-        <p:cTn id="1" dur="indefinite" restart="never" nodeType="tmRoot"/>
+        <p:cTn id="1" dur="indefinite" restart="never" nodeType="tmRoot">
+          <p:childTnLst>
+            <p:seq concurrent="1" nextAc="seek">
+              <p:cTn id="2" dur="indefinite" nodeType="mainSeq">
+                <p:childTnLst>
+                  <p:par>
+                    <p:cTn id="3" fill="hold">
+                      <p:stCondLst>
+                        <p:cond delay="indefinite"/>
+                      </p:stCondLst>
+                      <p:childTnLst>
+                        <p:par>
+                          <p:cTn id="4" fill="hold">
+                            <p:stCondLst>
+                              <p:cond delay="0"/>
+                            </p:stCondLst>
+                            <p:childTnLst>
+                              <p:par>
+                                <p:cTn id="5" presetID="1" presetClass="entr" presetSubtype="0" fill="hold" grpId="0" nodeType="clickEffect">
+                                  <p:stCondLst>
+                                    <p:cond delay="0"/>
+                                  </p:stCondLst>
+                                  <p:childTnLst>
+                                    <p:set>
+                                      <p:cBhvr>
+                                        <p:cTn id="6" dur="1" fill="hold">
+                                          <p:stCondLst>
+                                            <p:cond delay="0"/>
+                                          </p:stCondLst>
+                                        </p:cTn>
+                                        <p:tgtEl>
+                                          <p:spTgt spid="5"/>
+                                        </p:tgtEl>
+                                        <p:attrNameLst>
+                                          <p:attrName>style.visibility</p:attrName>
+                                        </p:attrNameLst>
+                                      </p:cBhvr>
+                                      <p:to>
+                                        <p:strVal val="visible"/>
+                                      </p:to>
+                                    </p:set>
+                                  </p:childTnLst>
+                                </p:cTn>
+                              </p:par>
+                            </p:childTnLst>
+                          </p:cTn>
+                        </p:par>
+                      </p:childTnLst>
+                    </p:cTn>
+                  </p:par>
+                  <p:par>
+                    <p:cTn id="7" fill="hold">
+                      <p:stCondLst>
+                        <p:cond delay="indefinite"/>
+                      </p:stCondLst>
+                      <p:childTnLst>
+                        <p:par>
+                          <p:cTn id="8" fill="hold">
+                            <p:stCondLst>
+                              <p:cond delay="0"/>
+                            </p:stCondLst>
+                            <p:childTnLst>
+                              <p:par>
+                                <p:cTn id="9" presetID="1" presetClass="entr" presetSubtype="0" fill="hold" nodeType="clickEffect">
+                                  <p:stCondLst>
+                                    <p:cond delay="0"/>
+                                  </p:stCondLst>
+                                  <p:childTnLst>
+                                    <p:set>
+                                      <p:cBhvr>
+                                        <p:cTn id="10" dur="1" fill="hold">
+                                          <p:stCondLst>
+                                            <p:cond delay="0"/>
+                                          </p:stCondLst>
+                                        </p:cTn>
+                                        <p:tgtEl>
+                                          <p:spTgt spid="6"/>
+                                        </p:tgtEl>
+                                        <p:attrNameLst>
+                                          <p:attrName>style.visibility</p:attrName>
+                                        </p:attrNameLst>
+                                      </p:cBhvr>
+                                      <p:to>
+                                        <p:strVal val="visible"/>
+                                      </p:to>
+                                    </p:set>
+                                  </p:childTnLst>
+                                </p:cTn>
+                              </p:par>
+                            </p:childTnLst>
+                          </p:cTn>
+                        </p:par>
+                      </p:childTnLst>
+                    </p:cTn>
+                  </p:par>
+                  <p:par>
+                    <p:cTn id="11" fill="hold">
+                      <p:stCondLst>
+                        <p:cond delay="indefinite"/>
+                      </p:stCondLst>
+                      <p:childTnLst>
+                        <p:par>
+                          <p:cTn id="12" fill="hold">
+                            <p:stCondLst>
+                              <p:cond delay="0"/>
+                            </p:stCondLst>
+                            <p:childTnLst>
+                              <p:par>
+                                <p:cTn id="13" presetID="1" presetClass="entr" presetSubtype="0" fill="hold" grpId="0" nodeType="clickEffect">
+                                  <p:stCondLst>
+                                    <p:cond delay="0"/>
+                                  </p:stCondLst>
+                                  <p:childTnLst>
+                                    <p:set>
+                                      <p:cBhvr>
+                                        <p:cTn id="14" dur="1" fill="hold">
+                                          <p:stCondLst>
+                                            <p:cond delay="0"/>
+                                          </p:stCondLst>
+                                        </p:cTn>
+                                        <p:tgtEl>
+                                          <p:spTgt spid="7"/>
+                                        </p:tgtEl>
+                                        <p:attrNameLst>
+                                          <p:attrName>style.visibility</p:attrName>
+                                        </p:attrNameLst>
+                                      </p:cBhvr>
+                                      <p:to>
+                                        <p:strVal val="visible"/>
+                                      </p:to>
+                                    </p:set>
+                                  </p:childTnLst>
+                                </p:cTn>
+                              </p:par>
+                            </p:childTnLst>
+                          </p:cTn>
+                        </p:par>
+                      </p:childTnLst>
+                    </p:cTn>
+                  </p:par>
+                </p:childTnLst>
+              </p:cTn>
+              <p:prevCondLst>
+                <p:cond evt="onPrev" delay="0">
+                  <p:tgtEl>
+                    <p:sldTgt/>
+                  </p:tgtEl>
+                </p:cond>
+              </p:prevCondLst>
+              <p:nextCondLst>
+                <p:cond evt="onNext" delay="0">
+                  <p:tgtEl>
+                    <p:sldTgt/>
+                  </p:tgtEl>
+                </p:cond>
+              </p:nextCondLst>
+            </p:seq>
+          </p:childTnLst>
+        </p:cTn>
       </p:par>
     </p:tnLst>
+    <p:bldLst>
+      <p:bldP spid="5" grpId="0"/>
+      <p:bldP spid="7" grpId="0"/>
+    </p:bldLst>
   </p:timing>
 </p:sld>
 </file>

</xml_diff>